<commit_message>
Centered stack in architecture image and improved text.
Signed-off-by: Ralph Lange (CR/AEE1) <ralph.lange@de.bosch.com>
</commit_message>
<xml_diff>
--- a/img/micro-ROS_architecture.pptx
+++ b/img/micro-ROS_architecture.pptx
@@ -105,6 +105,11 @@
       </a:defRPr>
     </a:lvl9pPr>
   </p:defaultTextStyle>
+  <p:extLst>
+    <p:ext uri="{EFAFB233-063F-42B5-8137-9DF3F51BA10A}">
+      <p15:sldGuideLst xmlns:p15="http://schemas.microsoft.com/office/powerpoint/2012/main"/>
+    </p:ext>
+  </p:extLst>
 </p:presentation>
 </file>
 
@@ -2973,8 +2978,8 @@
         </p:nvSpPr>
         <p:spPr>
           <a:xfrm>
-            <a:off x="5067299" y="3632482"/>
-            <a:ext cx="1076325" cy="172678"/>
+            <a:off x="5505450" y="3632482"/>
+            <a:ext cx="638174" cy="172678"/>
           </a:xfrm>
           <a:custGeom>
             <a:avLst/>
@@ -3358,15 +3363,7 @@
                   <a:prstClr val="white"/>
                 </a:solidFill>
               </a:rPr>
-              <a:t>Micro </a:t>
-            </a:r>
-            <a:r>
-              <a:rPr lang="en-US" sz="1400" kern="0" dirty="0">
-                <a:solidFill>
-                  <a:prstClr val="white"/>
-                </a:solidFill>
-              </a:rPr>
-              <a:t>XRCE-DDS Middleware</a:t>
+              <a:t>Micro XRCE-DDS Middleware</a:t>
             </a:r>
           </a:p>
         </p:txBody>
@@ -3493,8 +3490,8 @@
         </p:nvSpPr>
         <p:spPr>
           <a:xfrm>
-            <a:off x="3208020" y="1989992"/>
-            <a:ext cx="1338703" cy="3332482"/>
+            <a:off x="4739624" y="1989992"/>
+            <a:ext cx="617760" cy="2904965"/>
           </a:xfrm>
           <a:prstGeom prst="rect">
             <a:avLst/>
@@ -3516,55 +3513,37 @@
           <a:effectLst/>
         </p:spPr>
         <p:txBody>
-          <a:bodyPr wrap="none" bIns="36000" rtlCol="0" anchor="b"/>
+          <a:bodyPr vert="horz" wrap="none" bIns="36000" rtlCol="0" anchor="b"/>
           <a:lstStyle/>
           <a:p>
             <a:pPr algn="ctr"/>
             <a:r>
-              <a:rPr lang="en-US" sz="1400" kern="0" dirty="0">
-                <a:solidFill>
-                  <a:prstClr val="white"/>
-                </a:solidFill>
-              </a:rPr>
-              <a:t>Standard</a:t>
-            </a:r>
-            <a:br>
-              <a:rPr lang="en-US" sz="1400" kern="0" dirty="0">
-                <a:solidFill>
-                  <a:prstClr val="white"/>
-                </a:solidFill>
-              </a:rPr>
-            </a:br>
-            <a:r>
-              <a:rPr lang="en-US" sz="1400" kern="0" dirty="0">
+              <a:rPr lang="en-US" sz="1400" kern="0" dirty="0" smtClean="0">
                 <a:solidFill>
                   <a:prstClr val="white"/>
                 </a:solidFill>
               </a:rPr>
               <a:t>ROS 2</a:t>
             </a:r>
-            <a:br>
-              <a:rPr lang="en-US" sz="1400" kern="0" dirty="0">
-                <a:solidFill>
-                  <a:prstClr val="white"/>
-                </a:solidFill>
-              </a:rPr>
-            </a:br>
-            <a:r>
-              <a:rPr lang="en-US" sz="1400" kern="0" dirty="0">
-                <a:solidFill>
-                  <a:prstClr val="white"/>
-                </a:solidFill>
-              </a:rPr>
-              <a:t/>
-            </a:r>
-            <a:br>
-              <a:rPr lang="en-US" sz="1400" kern="0" dirty="0">
-                <a:solidFill>
-                  <a:prstClr val="white"/>
-                </a:solidFill>
-              </a:rPr>
-            </a:br>
+          </a:p>
+          <a:p>
+            <a:pPr algn="ctr"/>
+            <a:r>
+              <a:rPr lang="en-US" sz="1400" kern="0" dirty="0" smtClean="0">
+                <a:solidFill>
+                  <a:prstClr val="white"/>
+                </a:solidFill>
+              </a:rPr>
+              <a:t>stack</a:t>
+            </a:r>
+            <a:endParaRPr lang="en-US" sz="1400" kern="0" dirty="0">
+              <a:solidFill>
+                <a:prstClr val="white"/>
+              </a:solidFill>
+            </a:endParaRPr>
+          </a:p>
+          <a:p>
+            <a:pPr algn="ctr"/>
             <a:endParaRPr lang="en-US" sz="1400" kern="0" dirty="0" smtClean="0">
               <a:solidFill>
                 <a:prstClr val="white"/>
@@ -3589,51 +3568,37 @@
           </a:p>
           <a:p>
             <a:pPr algn="ctr"/>
-            <a:r>
-              <a:rPr lang="en-US" sz="1400" kern="0" dirty="0">
-                <a:solidFill>
-                  <a:prstClr val="white"/>
-                </a:solidFill>
-              </a:rPr>
-              <a:t/>
-            </a:r>
-            <a:br>
-              <a:rPr lang="en-US" sz="1400" kern="0" dirty="0">
-                <a:solidFill>
-                  <a:prstClr val="white"/>
-                </a:solidFill>
-              </a:rPr>
-            </a:br>
-            <a:r>
-              <a:rPr lang="en-US" sz="1400" kern="0" dirty="0">
-                <a:solidFill>
-                  <a:prstClr val="white"/>
-                </a:solidFill>
-              </a:rPr>
-              <a:t/>
-            </a:r>
-            <a:br>
-              <a:rPr lang="en-US" sz="1400" kern="0" dirty="0">
-                <a:solidFill>
-                  <a:prstClr val="white"/>
-                </a:solidFill>
-              </a:rPr>
-            </a:br>
-            <a:r>
-              <a:rPr lang="en-US" sz="1400" kern="0" dirty="0">
-                <a:solidFill>
-                  <a:prstClr val="white"/>
-                </a:solidFill>
-              </a:rPr>
-              <a:t>on </a:t>
-            </a:r>
+            <a:endParaRPr lang="en-US" sz="1400" kern="0" dirty="0">
+              <a:solidFill>
+                <a:prstClr val="white"/>
+              </a:solidFill>
+            </a:endParaRPr>
+          </a:p>
+          <a:p>
+            <a:pPr algn="ctr"/>
+            <a:endParaRPr lang="en-US" sz="1400" kern="0" dirty="0" smtClean="0">
+              <a:solidFill>
+                <a:prstClr val="white"/>
+              </a:solidFill>
+            </a:endParaRPr>
+          </a:p>
+          <a:p>
+            <a:pPr algn="ctr"/>
+            <a:endParaRPr lang="en-US" sz="1400" kern="0" dirty="0">
+              <a:solidFill>
+                <a:prstClr val="white"/>
+              </a:solidFill>
+            </a:endParaRPr>
+          </a:p>
+          <a:p>
+            <a:pPr algn="ctr"/>
             <a:r>
               <a:rPr lang="en-US" sz="1400" kern="0" dirty="0" smtClean="0">
                 <a:solidFill>
                   <a:prstClr val="white"/>
                 </a:solidFill>
               </a:rPr>
-              <a:t>a</a:t>
+              <a:t>on a</a:t>
             </a:r>
             <a:br>
               <a:rPr lang="en-US" sz="1400" kern="0" dirty="0" smtClean="0">
@@ -3648,7 +3613,7 @@
                   <a:prstClr val="white"/>
                 </a:solidFill>
               </a:rPr>
-              <a:t>“normal” OS</a:t>
+              <a:t>normal</a:t>
             </a:r>
             <a:br>
               <a:rPr lang="en-US" sz="1400" kern="0" dirty="0" smtClean="0">
@@ -3663,37 +3628,7 @@
                   <a:prstClr val="white"/>
                 </a:solidFill>
               </a:rPr>
-              <a:t>and</a:t>
-            </a:r>
-            <a:br>
-              <a:rPr lang="en-US" sz="1400" kern="0" dirty="0" smtClean="0">
-                <a:solidFill>
-                  <a:prstClr val="white"/>
-                </a:solidFill>
-              </a:rPr>
-            </a:br>
-            <a:r>
-              <a:rPr lang="en-US" sz="1400" kern="0" dirty="0" smtClean="0">
-                <a:solidFill>
-                  <a:prstClr val="white"/>
-                </a:solidFill>
-              </a:rPr>
-              <a:t>microprocessor</a:t>
-            </a:r>
-            <a:br>
-              <a:rPr lang="en-US" sz="1400" kern="0" dirty="0" smtClean="0">
-                <a:solidFill>
-                  <a:prstClr val="white"/>
-                </a:solidFill>
-              </a:rPr>
-            </a:br>
-            <a:r>
-              <a:rPr lang="en-US" sz="1400" kern="0" dirty="0" smtClean="0">
-                <a:solidFill>
-                  <a:prstClr val="white"/>
-                </a:solidFill>
-              </a:rPr>
-              <a:t>platform</a:t>
+              <a:t>OS</a:t>
             </a:r>
             <a:endParaRPr lang="en-US" sz="1400" kern="0" dirty="0">
               <a:solidFill>
@@ -3721,8 +3656,8 @@
         </p:nvSpPr>
         <p:spPr>
           <a:xfrm rot="16200000">
-            <a:off x="8432487" y="3136315"/>
-            <a:ext cx="3998968" cy="373353"/>
+            <a:off x="8479811" y="3088992"/>
+            <a:ext cx="3998968" cy="468000"/>
           </a:xfrm>
           <a:prstGeom prst="rect">
             <a:avLst/>
@@ -3775,8 +3710,8 @@
         </p:nvSpPr>
         <p:spPr>
           <a:xfrm>
-            <a:off x="3208020" y="1323508"/>
-            <a:ext cx="1116000" cy="468000"/>
+            <a:off x="4739624" y="1323508"/>
+            <a:ext cx="936000" cy="468000"/>
           </a:xfrm>
           <a:prstGeom prst="rect">
             <a:avLst/>
@@ -3798,7 +3733,7 @@
           <a:effectLst/>
         </p:spPr>
         <p:txBody>
-          <a:bodyPr rtlCol="0" anchor="ctr"/>
+          <a:bodyPr wrap="none" lIns="0" rIns="0" rtlCol="0" anchor="ctr"/>
           <a:lstStyle/>
           <a:p>
             <a:pPr algn="ctr">
@@ -4306,8 +4241,8 @@
         </p:nvSpPr>
         <p:spPr>
           <a:xfrm>
-            <a:off x="8527828" y="2586409"/>
-            <a:ext cx="706085" cy="324000"/>
+            <a:off x="8579820" y="2586409"/>
+            <a:ext cx="653983" cy="324000"/>
           </a:xfrm>
           <a:prstGeom prst="rect">
             <a:avLst/>
@@ -4327,20 +4262,27 @@
           <a:effectLst/>
         </p:spPr>
         <p:txBody>
-          <a:bodyPr lIns="0" tIns="0" rIns="0" bIns="0" rtlCol="0" anchor="ctr"/>
+          <a:bodyPr wrap="none" lIns="0" tIns="0" rIns="0" bIns="0" rtlCol="0" anchor="ctr"/>
           <a:lstStyle/>
           <a:p>
             <a:pPr algn="ctr">
               <a:defRPr/>
             </a:pPr>
             <a:r>
-              <a:rPr lang="en-US" sz="1000" kern="0" dirty="0">
-                <a:solidFill>
-                  <a:prstClr val="white"/>
-                </a:solidFill>
-              </a:rPr>
-              <a:t>Predictable </a:t>
-            </a:r>
+              <a:rPr lang="en-US" sz="1000" kern="0" dirty="0" smtClean="0">
+                <a:solidFill>
+                  <a:prstClr val="white"/>
+                </a:solidFill>
+              </a:rPr>
+              <a:t>Predictable</a:t>
+            </a:r>
+            <a:br>
+              <a:rPr lang="en-US" sz="1000" kern="0" dirty="0" smtClean="0">
+                <a:solidFill>
+                  <a:prstClr val="white"/>
+                </a:solidFill>
+              </a:rPr>
+            </a:br>
             <a:r>
               <a:rPr lang="en-US" sz="1000" kern="0" dirty="0" smtClean="0">
                 <a:solidFill>
@@ -4375,8 +4317,8 @@
         </p:nvSpPr>
         <p:spPr>
           <a:xfrm>
-            <a:off x="7112000" y="1989992"/>
-            <a:ext cx="2203326" cy="468000"/>
+            <a:off x="7162352" y="1989992"/>
+            <a:ext cx="2152974" cy="468000"/>
           </a:xfrm>
           <a:prstGeom prst="rect">
             <a:avLst/>
@@ -4593,8 +4535,8 @@
         </p:nvSpPr>
         <p:spPr>
           <a:xfrm>
-            <a:off x="6147327" y="5088474"/>
-            <a:ext cx="3168000" cy="234000"/>
+            <a:off x="4739624" y="5088474"/>
+            <a:ext cx="617760" cy="234000"/>
           </a:xfrm>
           <a:prstGeom prst="rect">
             <a:avLst/>
@@ -4623,13 +4565,18 @@
               <a:defRPr/>
             </a:pPr>
             <a:r>
-              <a:rPr lang="en-US" sz="1400" kern="0" dirty="0">
-                <a:solidFill>
-                  <a:prstClr val="white"/>
-                </a:solidFill>
-              </a:rPr>
-              <a:t>Microcontroller platform</a:t>
-            </a:r>
+              <a:rPr lang="en-US" sz="1400" kern="0" dirty="0" err="1" smtClean="0">
+                <a:solidFill>
+                  <a:prstClr val="white"/>
+                </a:solidFill>
+              </a:rPr>
+              <a:t>uP</a:t>
+            </a:r>
+            <a:endParaRPr lang="en-US" sz="1400" kern="0" dirty="0">
+              <a:solidFill>
+                <a:prstClr val="white"/>
+              </a:solidFill>
+            </a:endParaRPr>
           </a:p>
         </p:txBody>
       </p:sp>
@@ -4651,7 +4598,7 @@
         </p:nvSpPr>
         <p:spPr>
           <a:xfrm>
-            <a:off x="4335595" y="1407175"/>
+            <a:off x="5683785" y="1407175"/>
             <a:ext cx="461012" cy="369332"/>
           </a:xfrm>
           <a:prstGeom prst="rect">
@@ -4677,11 +4624,6 @@
               </a:rPr>
               <a:t>…</a:t>
             </a:r>
-            <a:endParaRPr lang="en-US" dirty="0">
-              <a:solidFill>
-                <a:srgbClr val="BFBFBF"/>
-              </a:solidFill>
-            </a:endParaRPr>
           </a:p>
         </p:txBody>
       </p:sp>
@@ -4703,8 +4645,8 @@
         </p:nvSpPr>
         <p:spPr>
           <a:xfrm>
-            <a:off x="7336611" y="1323508"/>
-            <a:ext cx="1116000" cy="468000"/>
+            <a:off x="7162352" y="1323508"/>
+            <a:ext cx="936000" cy="468000"/>
           </a:xfrm>
           <a:prstGeom prst="rect">
             <a:avLst/>
@@ -4726,7 +4668,7 @@
           <a:effectLst/>
         </p:spPr>
         <p:txBody>
-          <a:bodyPr rtlCol="0" anchor="ctr"/>
+          <a:bodyPr wrap="none" lIns="0" rIns="0" rtlCol="0" anchor="ctr"/>
           <a:lstStyle/>
           <a:p>
             <a:pPr algn="ctr">
@@ -4776,8 +4718,8 @@
         </p:nvSpPr>
         <p:spPr>
           <a:xfrm>
-            <a:off x="4271013" y="3470683"/>
-            <a:ext cx="792000" cy="468000"/>
+            <a:off x="4891857" y="3470683"/>
+            <a:ext cx="612000" cy="468000"/>
           </a:xfrm>
           <a:prstGeom prst="rect">
             <a:avLst/>
@@ -4831,7 +4773,7 @@
         </p:nvSpPr>
         <p:spPr>
           <a:xfrm>
-            <a:off x="5208217" y="3751299"/>
+            <a:off x="5435478" y="3762374"/>
             <a:ext cx="736099" cy="553998"/>
           </a:xfrm>
           <a:prstGeom prst="rect">
@@ -4854,7 +4796,15 @@
             </a:br>
             <a:r>
               <a:rPr lang="en-US" sz="1000" dirty="0" smtClean="0"/>
-              <a:t>Bluetooth,</a:t>
+              <a:t>Bluetooth</a:t>
+            </a:r>
+            <a:r>
+              <a:rPr lang="en-US" sz="1000" dirty="0" smtClean="0"/>
+              <a:t>,</a:t>
+            </a:r>
+            <a:r>
+              <a:rPr lang="en-US" sz="1000" dirty="0" smtClean="0"/>
+              <a:t/>
             </a:r>
             <a:br>
               <a:rPr lang="en-US" sz="1000" dirty="0" smtClean="0"/>
@@ -4886,7 +4836,7 @@
         <p:spPr>
           <a:xfrm>
             <a:off x="6147327" y="1323508"/>
-            <a:ext cx="1116000" cy="468000"/>
+            <a:ext cx="936000" cy="468000"/>
           </a:xfrm>
           <a:prstGeom prst="rect">
             <a:avLst/>
@@ -4908,7 +4858,7 @@
           <a:effectLst/>
         </p:spPr>
         <p:txBody>
-          <a:bodyPr rtlCol="0" anchor="ctr"/>
+          <a:bodyPr wrap="none" lIns="0" rIns="0" rtlCol="0" anchor="ctr"/>
           <a:lstStyle/>
           <a:p>
             <a:pPr algn="ctr">
@@ -4958,7 +4908,7 @@
         </p:nvSpPr>
         <p:spPr>
           <a:xfrm>
-            <a:off x="8457732" y="1407175"/>
+            <a:off x="8102103" y="1407175"/>
             <a:ext cx="461012" cy="369332"/>
           </a:xfrm>
           <a:prstGeom prst="rect">
@@ -4984,11 +4934,6 @@
               </a:rPr>
               <a:t>…</a:t>
             </a:r>
-            <a:endParaRPr lang="en-US" dirty="0">
-              <a:solidFill>
-                <a:srgbClr val="BFBFBF"/>
-              </a:solidFill>
-            </a:endParaRPr>
           </a:p>
         </p:txBody>
       </p:sp>
@@ -5116,6 +5061,69 @@
               </a:rPr>
               <a:t>modes</a:t>
             </a:r>
+          </a:p>
+        </p:txBody>
+      </p:sp>
+      <p:sp>
+        <p:nvSpPr>
+          <p:cNvPr id="39" name="Rectangle 38">
+            <a:extLst>
+              <a:ext uri="{FF2B5EF4-FFF2-40B4-BE49-F238E27FC236}">
+                <a16:creationId xmlns:a16="http://schemas.microsoft.com/office/drawing/2014/main" id="{F3FF6FA8-BE1D-467A-BE04-8FFD8DA52E69}"/>
+              </a:ext>
+            </a:extLst>
+          </p:cNvPr>
+          <p:cNvSpPr/>
+          <p:nvPr>
+            <p:custDataLst>
+              <p:tags r:id="rId25"/>
+            </p:custDataLst>
+          </p:nvPr>
+        </p:nvSpPr>
+        <p:spPr>
+          <a:xfrm>
+            <a:off x="6147327" y="5088474"/>
+            <a:ext cx="3168000" cy="234000"/>
+          </a:xfrm>
+          <a:prstGeom prst="rect">
+            <a:avLst/>
+          </a:prstGeom>
+          <a:solidFill>
+            <a:schemeClr val="bg1">
+              <a:lumMod val="85000"/>
+            </a:schemeClr>
+          </a:solidFill>
+          <a:ln w="19050" cap="flat" cmpd="sng" algn="ctr">
+            <a:solidFill>
+              <a:schemeClr val="bg1">
+                <a:lumMod val="75000"/>
+              </a:schemeClr>
+            </a:solidFill>
+            <a:prstDash val="solid"/>
+            <a:miter lim="800000"/>
+          </a:ln>
+          <a:effectLst/>
+        </p:spPr>
+        <p:txBody>
+          <a:bodyPr rtlCol="0" anchor="ctr"/>
+          <a:lstStyle/>
+          <a:p>
+            <a:pPr algn="ctr">
+              <a:defRPr/>
+            </a:pPr>
+            <a:r>
+              <a:rPr lang="en-US" sz="1400" kern="0" dirty="0" smtClean="0">
+                <a:solidFill>
+                  <a:prstClr val="white"/>
+                </a:solidFill>
+              </a:rPr>
+              <a:t>microcontroller</a:t>
+            </a:r>
+            <a:endParaRPr lang="en-US" sz="1400" kern="0" dirty="0">
+              <a:solidFill>
+                <a:prstClr val="white"/>
+              </a:solidFill>
+            </a:endParaRPr>
           </a:p>
         </p:txBody>
       </p:sp>
@@ -5200,11 +5208,6 @@
               </a:rPr>
               <a:t>…</a:t>
             </a:r>
-            <a:endParaRPr lang="en-US" dirty="0">
-              <a:solidFill>
-                <a:prstClr val="black"/>
-              </a:solidFill>
-            </a:endParaRPr>
           </a:p>
         </p:txBody>
       </p:sp>
@@ -5737,15 +5740,7 @@
                   <a:prstClr val="white"/>
                 </a:solidFill>
               </a:rPr>
-              <a:t>Micro </a:t>
-            </a:r>
-            <a:r>
-              <a:rPr lang="en-US" sz="1400" kern="0" dirty="0">
-                <a:solidFill>
-                  <a:prstClr val="white"/>
-                </a:solidFill>
-              </a:rPr>
-              <a:t>XRCE-DDS Middleware</a:t>
+              <a:t>Micro XRCE-DDS Middleware</a:t>
             </a:r>
           </a:p>
         </p:txBody>
@@ -7053,11 +7048,6 @@
               </a:rPr>
               <a:t>…</a:t>
             </a:r>
-            <a:endParaRPr lang="en-US" dirty="0">
-              <a:solidFill>
-                <a:prstClr val="black"/>
-              </a:solidFill>
-            </a:endParaRPr>
           </a:p>
         </p:txBody>
       </p:sp>
@@ -7770,14 +7760,14 @@
 <file path=ppt/tags/tag25.xml><?xml version="1.0" encoding="utf-8"?>
 <p:tagLst xmlns:a="http://schemas.openxmlformats.org/drawingml/2006/main" xmlns:r="http://schemas.openxmlformats.org/officeDocument/2006/relationships" xmlns:p="http://schemas.openxmlformats.org/presentationml/2006/main">
   <p:tag name="COLORSETCLASSNAME" val="ColorSet2"/>
-  <p:tag name="COLORS" val="Black;-1;-2;-2;-1;-2"/>
+  <p:tag name="COLORS" val="-1;-1;-1;-1;-1;-2"/>
 </p:tagLst>
 </file>
 
 <file path=ppt/tags/tag26.xml><?xml version="1.0" encoding="utf-8"?>
 <p:tagLst xmlns:a="http://schemas.openxmlformats.org/drawingml/2006/main" xmlns:r="http://schemas.openxmlformats.org/officeDocument/2006/relationships" xmlns:p="http://schemas.openxmlformats.org/presentationml/2006/main">
   <p:tag name="COLORSETCLASSNAME" val="ColorSet2"/>
-  <p:tag name="COLORS" val="-1;-1;-1;-1;-1;-2"/>
+  <p:tag name="COLORS" val="Black;-1;-2;-2;-1;-2"/>
 </p:tagLst>
 </file>
 
@@ -7791,14 +7781,14 @@
 <file path=ppt/tags/tag28.xml><?xml version="1.0" encoding="utf-8"?>
 <p:tagLst xmlns:a="http://schemas.openxmlformats.org/drawingml/2006/main" xmlns:r="http://schemas.openxmlformats.org/officeDocument/2006/relationships" xmlns:p="http://schemas.openxmlformats.org/presentationml/2006/main">
   <p:tag name="COLORSETCLASSNAME" val="ColorSet2"/>
-  <p:tag name="COLORS" val="-1;-1;Primary;-1;-1;-2"/>
+  <p:tag name="COLORS" val="-1;-1;-1;-1;-1;-2"/>
 </p:tagLst>
 </file>
 
 <file path=ppt/tags/tag29.xml><?xml version="1.0" encoding="utf-8"?>
 <p:tagLst xmlns:a="http://schemas.openxmlformats.org/drawingml/2006/main" xmlns:r="http://schemas.openxmlformats.org/officeDocument/2006/relationships" xmlns:p="http://schemas.openxmlformats.org/presentationml/2006/main">
   <p:tag name="COLORSETCLASSNAME" val="ColorSet2"/>
-  <p:tag name="COLORS" val="Primary;-1;-1;-1;-1;-2"/>
+  <p:tag name="COLORS" val="-1;-1;Primary;-1;-1;-2"/>
 </p:tagLst>
 </file>
 
@@ -7812,7 +7802,7 @@
 <file path=ppt/tags/tag30.xml><?xml version="1.0" encoding="utf-8"?>
 <p:tagLst xmlns:a="http://schemas.openxmlformats.org/drawingml/2006/main" xmlns:r="http://schemas.openxmlformats.org/officeDocument/2006/relationships" xmlns:p="http://schemas.openxmlformats.org/presentationml/2006/main">
   <p:tag name="COLORSETCLASSNAME" val="ColorSet2"/>
-  <p:tag name="COLORS" val="-1;-1;Primary;-1;-1;-2"/>
+  <p:tag name="COLORS" val="Primary;-1;-1;-1;-1;-2"/>
 </p:tagLst>
 </file>
 
@@ -7840,35 +7830,35 @@
 <file path=ppt/tags/tag34.xml><?xml version="1.0" encoding="utf-8"?>
 <p:tagLst xmlns:a="http://schemas.openxmlformats.org/drawingml/2006/main" xmlns:r="http://schemas.openxmlformats.org/officeDocument/2006/relationships" xmlns:p="http://schemas.openxmlformats.org/presentationml/2006/main">
   <p:tag name="COLORSETCLASSNAME" val="ColorSet2"/>
-  <p:tag name="COLORS" val="DarkBlue;-1;-1;-1;-1;-2"/>
+  <p:tag name="COLORS" val="-1;-1;Primary;-1;-1;-2"/>
 </p:tagLst>
 </file>
 
 <file path=ppt/tags/tag35.xml><?xml version="1.0" encoding="utf-8"?>
 <p:tagLst xmlns:a="http://schemas.openxmlformats.org/drawingml/2006/main" xmlns:r="http://schemas.openxmlformats.org/officeDocument/2006/relationships" xmlns:p="http://schemas.openxmlformats.org/presentationml/2006/main">
   <p:tag name="COLORSETCLASSNAME" val="ColorSet2"/>
-  <p:tag name="COLORS" val="Primary;-1;-1;-1;-1;-2"/>
+  <p:tag name="COLORS" val="DarkBlue;-1;-1;-1;-1;-2"/>
 </p:tagLst>
 </file>
 
 <file path=ppt/tags/tag36.xml><?xml version="1.0" encoding="utf-8"?>
 <p:tagLst xmlns:a="http://schemas.openxmlformats.org/drawingml/2006/main" xmlns:r="http://schemas.openxmlformats.org/officeDocument/2006/relationships" xmlns:p="http://schemas.openxmlformats.org/presentationml/2006/main">
   <p:tag name="COLORSETCLASSNAME" val="ColorSet2"/>
-  <p:tag name="COLORS" val="-1;-1;-1;-1;-1;-2"/>
+  <p:tag name="COLORS" val="Primary;-1;-1;-1;-1;-2"/>
 </p:tagLst>
 </file>
 
 <file path=ppt/tags/tag37.xml><?xml version="1.0" encoding="utf-8"?>
 <p:tagLst xmlns:a="http://schemas.openxmlformats.org/drawingml/2006/main" xmlns:r="http://schemas.openxmlformats.org/officeDocument/2006/relationships" xmlns:p="http://schemas.openxmlformats.org/presentationml/2006/main">
   <p:tag name="COLORSETCLASSNAME" val="ColorSet2"/>
-  <p:tag name="COLORS" val="-1;-1;Primary;-1;-1;-2"/>
+  <p:tag name="COLORS" val="-1;-1;-1;-1;-1;-2"/>
 </p:tagLst>
 </file>
 
 <file path=ppt/tags/tag38.xml><?xml version="1.0" encoding="utf-8"?>
 <p:tagLst xmlns:a="http://schemas.openxmlformats.org/drawingml/2006/main" xmlns:r="http://schemas.openxmlformats.org/officeDocument/2006/relationships" xmlns:p="http://schemas.openxmlformats.org/presentationml/2006/main">
   <p:tag name="COLORSETCLASSNAME" val="ColorSet2"/>
-  <p:tag name="COLORS" val="-1;-1;-1;-1;-1;-2"/>
+  <p:tag name="COLORS" val="-1;-1;Primary;-1;-1;-2"/>
 </p:tagLst>
 </file>
 
@@ -7903,49 +7893,49 @@
 <file path=ppt/tags/tag42.xml><?xml version="1.0" encoding="utf-8"?>
 <p:tagLst xmlns:a="http://schemas.openxmlformats.org/drawingml/2006/main" xmlns:r="http://schemas.openxmlformats.org/officeDocument/2006/relationships" xmlns:p="http://schemas.openxmlformats.org/presentationml/2006/main">
   <p:tag name="COLORSETCLASSNAME" val="ColorSet2"/>
-  <p:tag name="COLORS" val="-1;-1;Primary;-1;-1;-2"/>
+  <p:tag name="COLORS" val="-1;-1;-1;-1;-1;-2"/>
 </p:tagLst>
 </file>
 
 <file path=ppt/tags/tag43.xml><?xml version="1.0" encoding="utf-8"?>
 <p:tagLst xmlns:a="http://schemas.openxmlformats.org/drawingml/2006/main" xmlns:r="http://schemas.openxmlformats.org/officeDocument/2006/relationships" xmlns:p="http://schemas.openxmlformats.org/presentationml/2006/main">
   <p:tag name="COLORSETCLASSNAME" val="ColorSet2"/>
-  <p:tag name="COLORS" val="Primary;-1;-1;-1;-1;-2"/>
+  <p:tag name="COLORS" val="-1;-1;Primary;-1;-1;-2"/>
 </p:tagLst>
 </file>
 
 <file path=ppt/tags/tag44.xml><?xml version="1.0" encoding="utf-8"?>
 <p:tagLst xmlns:a="http://schemas.openxmlformats.org/drawingml/2006/main" xmlns:r="http://schemas.openxmlformats.org/officeDocument/2006/relationships" xmlns:p="http://schemas.openxmlformats.org/presentationml/2006/main">
   <p:tag name="COLORSETCLASSNAME" val="ColorSet2"/>
-  <p:tag name="COLORS" val="-1;-1;Primary;-1;-1;-2"/>
+  <p:tag name="COLORS" val="Primary;-1;-1;-1;-1;-2"/>
 </p:tagLst>
 </file>
 
 <file path=ppt/tags/tag45.xml><?xml version="1.0" encoding="utf-8"?>
 <p:tagLst xmlns:a="http://schemas.openxmlformats.org/drawingml/2006/main" xmlns:r="http://schemas.openxmlformats.org/officeDocument/2006/relationships" xmlns:p="http://schemas.openxmlformats.org/presentationml/2006/main">
   <p:tag name="COLORSETCLASSNAME" val="ColorSet2"/>
-  <p:tag name="COLORS" val="-1;-1;-1;-1;-1;-2"/>
+  <p:tag name="COLORS" val="-1;-1;Primary;-1;-1;-2"/>
 </p:tagLst>
 </file>
 
 <file path=ppt/tags/tag46.xml><?xml version="1.0" encoding="utf-8"?>
 <p:tagLst xmlns:a="http://schemas.openxmlformats.org/drawingml/2006/main" xmlns:r="http://schemas.openxmlformats.org/officeDocument/2006/relationships" xmlns:p="http://schemas.openxmlformats.org/presentationml/2006/main">
   <p:tag name="COLORSETCLASSNAME" val="ColorSet2"/>
-  <p:tag name="COLORS" val="Black;-1;-2;-2;-1;-2"/>
+  <p:tag name="COLORS" val="-1;-1;-1;-1;-1;-2"/>
 </p:tagLst>
 </file>
 
 <file path=ppt/tags/tag47.xml><?xml version="1.0" encoding="utf-8"?>
 <p:tagLst xmlns:a="http://schemas.openxmlformats.org/drawingml/2006/main" xmlns:r="http://schemas.openxmlformats.org/officeDocument/2006/relationships" xmlns:p="http://schemas.openxmlformats.org/presentationml/2006/main">
   <p:tag name="COLORSETCLASSNAME" val="ColorSet2"/>
-  <p:tag name="COLORS" val="-1;-1;-1;-1;-1;-2"/>
+  <p:tag name="COLORS" val="Black;-1;-2;-2;-1;-2"/>
 </p:tagLst>
 </file>
 
 <file path=ppt/tags/tag48.xml><?xml version="1.0" encoding="utf-8"?>
 <p:tagLst xmlns:a="http://schemas.openxmlformats.org/drawingml/2006/main" xmlns:r="http://schemas.openxmlformats.org/officeDocument/2006/relationships" xmlns:p="http://schemas.openxmlformats.org/presentationml/2006/main">
   <p:tag name="COLORSETCLASSNAME" val="ColorSet2"/>
-  <p:tag name="COLORS" val="Primary;-1;-1;-1;-1;-2"/>
+  <p:tag name="COLORS" val="-1;-1;-1;-1;-1;-2"/>
 </p:tagLst>
 </file>
 
@@ -7966,18 +7956,25 @@
 <file path=ppt/tags/tag50.xml><?xml version="1.0" encoding="utf-8"?>
 <p:tagLst xmlns:a="http://schemas.openxmlformats.org/drawingml/2006/main" xmlns:r="http://schemas.openxmlformats.org/officeDocument/2006/relationships" xmlns:p="http://schemas.openxmlformats.org/presentationml/2006/main">
   <p:tag name="COLORSETCLASSNAME" val="ColorSet2"/>
-  <p:tag name="COLORS" val="-1;-1;Primary;-1;-1;-2"/>
+  <p:tag name="COLORS" val="Primary;-1;-1;-1;-1;-2"/>
 </p:tagLst>
 </file>
 
 <file path=ppt/tags/tag51.xml><?xml version="1.0" encoding="utf-8"?>
 <p:tagLst xmlns:a="http://schemas.openxmlformats.org/drawingml/2006/main" xmlns:r="http://schemas.openxmlformats.org/officeDocument/2006/relationships" xmlns:p="http://schemas.openxmlformats.org/presentationml/2006/main">
   <p:tag name="COLORSETCLASSNAME" val="ColorSet2"/>
+  <p:tag name="COLORS" val="-1;-1;Primary;-1;-1;-2"/>
+</p:tagLst>
+</file>
+
+<file path=ppt/tags/tag52.xml><?xml version="1.0" encoding="utf-8"?>
+<p:tagLst xmlns:a="http://schemas.openxmlformats.org/drawingml/2006/main" xmlns:r="http://schemas.openxmlformats.org/officeDocument/2006/relationships" xmlns:p="http://schemas.openxmlformats.org/presentationml/2006/main">
+  <p:tag name="COLORSETCLASSNAME" val="ColorSet2"/>
   <p:tag name="COLORS" val="Primary;-1;-1;-1;-1;-2"/>
 </p:tagLst>
 </file>
 
-<file path=ppt/tags/tag52.xml><?xml version="1.0" encoding="utf-8"?>
+<file path=ppt/tags/tag53.xml><?xml version="1.0" encoding="utf-8"?>
 <p:tagLst xmlns:a="http://schemas.openxmlformats.org/drawingml/2006/main" xmlns:r="http://schemas.openxmlformats.org/officeDocument/2006/relationships" xmlns:p="http://schemas.openxmlformats.org/presentationml/2006/main">
   <p:tag name="COLORSETCLASSNAME" val="ColorSet2"/>
   <p:tag name="COLORS" val="Primary;-1;-1;-1;-1;-2"/>

</xml_diff>

<commit_message>
Improve client library API diagram.
</commit_message>
<xml_diff>
--- a/img/micro-ROS_architecture.pptx
+++ b/img/micro-ROS_architecture.pptx
@@ -20665,7 +20665,7 @@
           <a:prstGeom prst="corner">
             <a:avLst>
               <a:gd fmla="val 26552" name="adj1"/>
-              <a:gd fmla="val 76431" name="adj2"/>
+              <a:gd fmla="val 267408" name="adj2"/>
             </a:avLst>
           </a:prstGeom>
           <a:solidFill>
@@ -20734,7 +20734,7 @@
         </p:nvSpPr>
         <p:spPr>
           <a:xfrm>
-            <a:off x="4568438" y="1021900"/>
+            <a:off x="4446138" y="1076225"/>
             <a:ext cx="3518400" cy="1327800"/>
           </a:xfrm>
           <a:prstGeom prst="rect">
@@ -21218,7 +21218,7 @@
         </p:nvSpPr>
         <p:spPr>
           <a:xfrm>
-            <a:off x="5530075" y="1177875"/>
+            <a:off x="5407775" y="1232200"/>
             <a:ext cx="780300" cy="468000"/>
           </a:xfrm>
           <a:prstGeom prst="rect">
@@ -21322,7 +21322,7 @@
         </p:nvSpPr>
         <p:spPr>
           <a:xfrm>
-            <a:off x="6366402" y="1177875"/>
+            <a:off x="6244102" y="1232200"/>
             <a:ext cx="780300" cy="468000"/>
           </a:xfrm>
           <a:prstGeom prst="rect">
@@ -21403,7 +21403,7 @@
         </p:nvSpPr>
         <p:spPr>
           <a:xfrm>
-            <a:off x="7202750" y="1177875"/>
+            <a:off x="7080450" y="1232200"/>
             <a:ext cx="780300" cy="468000"/>
           </a:xfrm>
           <a:prstGeom prst="rect">
@@ -21484,7 +21484,7 @@
         </p:nvSpPr>
         <p:spPr>
           <a:xfrm>
-            <a:off x="5530075" y="1766875"/>
+            <a:off x="5407775" y="1821200"/>
             <a:ext cx="780300" cy="468000"/>
           </a:xfrm>
           <a:prstGeom prst="rect">
@@ -22755,7 +22755,7 @@
         </p:nvSpPr>
         <p:spPr>
           <a:xfrm>
-            <a:off x="6366413" y="1766875"/>
+            <a:off x="6244113" y="1821200"/>
             <a:ext cx="780300" cy="468000"/>
           </a:xfrm>
           <a:prstGeom prst="rect">
@@ -23377,6 +23377,285 @@
 </file>
 
 <file path=ppt/theme/theme1.xml><?xml version="1.0" encoding="utf-8"?>
+<a:theme xmlns:a="http://schemas.openxmlformats.org/drawingml/2006/main" xmlns:r="http://schemas.openxmlformats.org/officeDocument/2006/relationships">
+  <a:themeElements>
+    <a:clrScheme name="Default">
+      <a:dk1>
+        <a:srgbClr val="000000"/>
+      </a:dk1>
+      <a:lt1>
+        <a:srgbClr val="FFFFFF"/>
+      </a:lt1>
+      <a:dk2>
+        <a:srgbClr val="158158"/>
+      </a:dk2>
+      <a:lt2>
+        <a:srgbClr val="F3F3F3"/>
+      </a:lt2>
+      <a:accent1>
+        <a:srgbClr val="058DC7"/>
+      </a:accent1>
+      <a:accent2>
+        <a:srgbClr val="50B432"/>
+      </a:accent2>
+      <a:accent3>
+        <a:srgbClr val="ED561B"/>
+      </a:accent3>
+      <a:accent4>
+        <a:srgbClr val="EDEF00"/>
+      </a:accent4>
+      <a:accent5>
+        <a:srgbClr val="24CBE5"/>
+      </a:accent5>
+      <a:accent6>
+        <a:srgbClr val="64E572"/>
+      </a:accent6>
+      <a:hlink>
+        <a:srgbClr val="2200CC"/>
+      </a:hlink>
+      <a:folHlink>
+        <a:srgbClr val="551A8B"/>
+      </a:folHlink>
+    </a:clrScheme>
+    <a:fontScheme name="Office">
+      <a:majorFont>
+        <a:latin typeface="Arial"/>
+        <a:ea typeface=""/>
+        <a:cs typeface=""/>
+        <a:font script="Jpan" typeface="ＭＳ Ｐゴシック"/>
+        <a:font script="Hang" typeface="맑은 고딕"/>
+        <a:font script="Hans" typeface="宋体"/>
+        <a:font script="Hant" typeface="新細明體"/>
+        <a:font script="Arab" typeface="Times New Roman"/>
+        <a:font script="Hebr" typeface="Times New Roman"/>
+        <a:font script="Thai" typeface="Angsana New"/>
+        <a:font script="Ethi" typeface="Nyala"/>
+        <a:font script="Beng" typeface="Vrinda"/>
+        <a:font script="Gujr" typeface="Shruti"/>
+        <a:font script="Khmr" typeface="MoolBoran"/>
+        <a:font script="Knda" typeface="Tunga"/>
+        <a:font script="Guru" typeface="Raavi"/>
+        <a:font script="Cans" typeface="Euphemia"/>
+        <a:font script="Cher" typeface="Plantagenet Cherokee"/>
+        <a:font script="Yiii" typeface="Microsoft Yi Baiti"/>
+        <a:font script="Tibt" typeface="Microsoft Himalaya"/>
+        <a:font script="Thaa" typeface="MV Boli"/>
+        <a:font script="Deva" typeface="Mangal"/>
+        <a:font script="Telu" typeface="Gautami"/>
+        <a:font script="Taml" typeface="Latha"/>
+        <a:font script="Syrc" typeface="Estrangelo Edessa"/>
+        <a:font script="Orya" typeface="Kalinga"/>
+        <a:font script="Mlym" typeface="Kartika"/>
+        <a:font script="Laoo" typeface="DokChampa"/>
+        <a:font script="Sinh" typeface="Iskoola Pota"/>
+        <a:font script="Mong" typeface="Mongolian Baiti"/>
+        <a:font script="Viet" typeface="Times New Roman"/>
+        <a:font script="Uigh" typeface="Microsoft Uighur"/>
+        <a:font script="Geor" typeface="Sylfaen"/>
+      </a:majorFont>
+      <a:minorFont>
+        <a:latin typeface="Arial"/>
+        <a:ea typeface=""/>
+        <a:cs typeface=""/>
+        <a:font script="Jpan" typeface="ＭＳ Ｐゴシック"/>
+        <a:font script="Hang" typeface="맑은 고딕"/>
+        <a:font script="Hans" typeface="宋体"/>
+        <a:font script="Hant" typeface="新細明體"/>
+        <a:font script="Arab" typeface="Arial"/>
+        <a:font script="Hebr" typeface="Arial"/>
+        <a:font script="Thai" typeface="Cordia New"/>
+        <a:font script="Ethi" typeface="Nyala"/>
+        <a:font script="Beng" typeface="Vrinda"/>
+        <a:font script="Gujr" typeface="Shruti"/>
+        <a:font script="Khmr" typeface="DaunPenh"/>
+        <a:font script="Knda" typeface="Tunga"/>
+        <a:font script="Guru" typeface="Raavi"/>
+        <a:font script="Cans" typeface="Euphemia"/>
+        <a:font script="Cher" typeface="Plantagenet Cherokee"/>
+        <a:font script="Yiii" typeface="Microsoft Yi Baiti"/>
+        <a:font script="Tibt" typeface="Microsoft Himalaya"/>
+        <a:font script="Thaa" typeface="MV Boli"/>
+        <a:font script="Deva" typeface="Mangal"/>
+        <a:font script="Telu" typeface="Gautami"/>
+        <a:font script="Taml" typeface="Latha"/>
+        <a:font script="Syrc" typeface="Estrangelo Edessa"/>
+        <a:font script="Orya" typeface="Kalinga"/>
+        <a:font script="Mlym" typeface="Kartika"/>
+        <a:font script="Laoo" typeface="DokChampa"/>
+        <a:font script="Sinh" typeface="Iskoola Pota"/>
+        <a:font script="Mong" typeface="Mongolian Baiti"/>
+        <a:font script="Viet" typeface="Arial"/>
+        <a:font script="Uigh" typeface="Microsoft Uighur"/>
+        <a:font script="Geor" typeface="Sylfaen"/>
+      </a:minorFont>
+    </a:fontScheme>
+    <a:fmtScheme name="Office">
+      <a:fillStyleLst>
+        <a:solidFill>
+          <a:schemeClr val="phClr"/>
+        </a:solidFill>
+        <a:gradFill rotWithShape="1">
+          <a:gsLst>
+            <a:gs pos="0">
+              <a:schemeClr val="phClr">
+                <a:tint val="50000"/>
+                <a:satMod val="300000"/>
+              </a:schemeClr>
+            </a:gs>
+            <a:gs pos="35000">
+              <a:schemeClr val="phClr">
+                <a:tint val="37000"/>
+                <a:satMod val="300000"/>
+              </a:schemeClr>
+            </a:gs>
+            <a:gs pos="100000">
+              <a:schemeClr val="phClr">
+                <a:tint val="15000"/>
+                <a:satMod val="350000"/>
+              </a:schemeClr>
+            </a:gs>
+          </a:gsLst>
+          <a:lin ang="16200000" scaled="1"/>
+        </a:gradFill>
+        <a:gradFill rotWithShape="1">
+          <a:gsLst>
+            <a:gs pos="0">
+              <a:schemeClr val="phClr">
+                <a:tint val="100000"/>
+                <a:shade val="100000"/>
+                <a:satMod val="130000"/>
+              </a:schemeClr>
+            </a:gs>
+            <a:gs pos="100000">
+              <a:schemeClr val="phClr">
+                <a:tint val="50000"/>
+                <a:shade val="100000"/>
+                <a:satMod val="350000"/>
+              </a:schemeClr>
+            </a:gs>
+          </a:gsLst>
+          <a:lin ang="16200000" scaled="0"/>
+        </a:gradFill>
+      </a:fillStyleLst>
+      <a:lnStyleLst>
+        <a:ln w="9525" cap="flat" cmpd="sng" algn="ctr">
+          <a:solidFill>
+            <a:schemeClr val="phClr">
+              <a:shade val="95000"/>
+              <a:satMod val="105000"/>
+            </a:schemeClr>
+          </a:solidFill>
+          <a:prstDash val="solid"/>
+        </a:ln>
+        <a:ln w="25400" cap="flat" cmpd="sng" algn="ctr">
+          <a:solidFill>
+            <a:schemeClr val="phClr"/>
+          </a:solidFill>
+          <a:prstDash val="solid"/>
+        </a:ln>
+        <a:ln w="38100" cap="flat" cmpd="sng" algn="ctr">
+          <a:solidFill>
+            <a:schemeClr val="phClr"/>
+          </a:solidFill>
+          <a:prstDash val="solid"/>
+        </a:ln>
+      </a:lnStyleLst>
+      <a:effectStyleLst>
+        <a:effectStyle>
+          <a:effectLst>
+            <a:outerShdw blurRad="40000" dist="20000" dir="5400000" rotWithShape="0">
+              <a:srgbClr val="000000">
+                <a:alpha val="38000"/>
+              </a:srgbClr>
+            </a:outerShdw>
+          </a:effectLst>
+        </a:effectStyle>
+        <a:effectStyle>
+          <a:effectLst>
+            <a:outerShdw blurRad="40000" dist="23000" dir="5400000" rotWithShape="0">
+              <a:srgbClr val="000000">
+                <a:alpha val="35000"/>
+              </a:srgbClr>
+            </a:outerShdw>
+          </a:effectLst>
+        </a:effectStyle>
+        <a:effectStyle>
+          <a:effectLst>
+            <a:outerShdw blurRad="40000" dist="23000" dir="5400000" rotWithShape="0">
+              <a:srgbClr val="000000">
+                <a:alpha val="35000"/>
+              </a:srgbClr>
+            </a:outerShdw>
+          </a:effectLst>
+          <a:scene3d>
+            <a:camera prst="orthographicFront">
+              <a:rot lat="0" lon="0" rev="0"/>
+            </a:camera>
+            <a:lightRig rig="threePt" dir="t">
+              <a:rot lat="0" lon="0" rev="1200000"/>
+            </a:lightRig>
+          </a:scene3d>
+          <a:sp3d>
+            <a:bevelT w="63500" h="25400"/>
+          </a:sp3d>
+        </a:effectStyle>
+      </a:effectStyleLst>
+      <a:bgFillStyleLst>
+        <a:solidFill>
+          <a:schemeClr val="phClr"/>
+        </a:solidFill>
+        <a:gradFill rotWithShape="1">
+          <a:gsLst>
+            <a:gs pos="0">
+              <a:schemeClr val="phClr">
+                <a:tint val="40000"/>
+                <a:satMod val="350000"/>
+              </a:schemeClr>
+            </a:gs>
+            <a:gs pos="40000">
+              <a:schemeClr val="phClr">
+                <a:tint val="45000"/>
+                <a:shade val="99000"/>
+                <a:satMod val="350000"/>
+              </a:schemeClr>
+            </a:gs>
+            <a:gs pos="100000">
+              <a:schemeClr val="phClr">
+                <a:shade val="20000"/>
+                <a:satMod val="255000"/>
+              </a:schemeClr>
+            </a:gs>
+          </a:gsLst>
+          <a:path path="circle">
+            <a:fillToRect l="50000" t="-80000" r="50000" b="180000"/>
+          </a:path>
+        </a:gradFill>
+        <a:gradFill rotWithShape="1">
+          <a:gsLst>
+            <a:gs pos="0">
+              <a:schemeClr val="phClr">
+                <a:tint val="80000"/>
+                <a:satMod val="300000"/>
+              </a:schemeClr>
+            </a:gs>
+            <a:gs pos="100000">
+              <a:schemeClr val="phClr">
+                <a:shade val="30000"/>
+                <a:satMod val="200000"/>
+              </a:schemeClr>
+            </a:gs>
+          </a:gsLst>
+          <a:path path="circle">
+            <a:fillToRect l="50000" t="50000" r="50000" b="50000"/>
+          </a:path>
+        </a:gradFill>
+      </a:bgFillStyleLst>
+    </a:fmtScheme>
+  </a:themeElements>
+</a:theme>
+</file>
+
+<file path=ppt/theme/theme2.xml><?xml version="1.0" encoding="utf-8"?>
 <a:theme xmlns:a="http://schemas.openxmlformats.org/drawingml/2006/main" xmlns:r="http://schemas.openxmlformats.org/officeDocument/2006/relationships" name="Office Theme">
   <a:themeElements>
     <a:clrScheme name="Office">
@@ -23653,283 +23932,4 @@
     </a:fmtScheme>
   </a:themeElements>
 </a:theme>
-</file>
-
-<file path=ppt/theme/theme2.xml><?xml version="1.0" encoding="utf-8"?>
-<a:theme xmlns:a="http://schemas.openxmlformats.org/drawingml/2006/main" xmlns:r="http://schemas.openxmlformats.org/officeDocument/2006/relationships">
-  <a:themeElements>
-    <a:clrScheme name="Default">
-      <a:dk1>
-        <a:srgbClr val="000000"/>
-      </a:dk1>
-      <a:lt1>
-        <a:srgbClr val="FFFFFF"/>
-      </a:lt1>
-      <a:dk2>
-        <a:srgbClr val="158158"/>
-      </a:dk2>
-      <a:lt2>
-        <a:srgbClr val="F3F3F3"/>
-      </a:lt2>
-      <a:accent1>
-        <a:srgbClr val="058DC7"/>
-      </a:accent1>
-      <a:accent2>
-        <a:srgbClr val="50B432"/>
-      </a:accent2>
-      <a:accent3>
-        <a:srgbClr val="ED561B"/>
-      </a:accent3>
-      <a:accent4>
-        <a:srgbClr val="EDEF00"/>
-      </a:accent4>
-      <a:accent5>
-        <a:srgbClr val="24CBE5"/>
-      </a:accent5>
-      <a:accent6>
-        <a:srgbClr val="64E572"/>
-      </a:accent6>
-      <a:hlink>
-        <a:srgbClr val="2200CC"/>
-      </a:hlink>
-      <a:folHlink>
-        <a:srgbClr val="551A8B"/>
-      </a:folHlink>
-    </a:clrScheme>
-    <a:fontScheme name="Office">
-      <a:majorFont>
-        <a:latin typeface="Arial"/>
-        <a:ea typeface=""/>
-        <a:cs typeface=""/>
-        <a:font script="Jpan" typeface="ＭＳ Ｐゴシック"/>
-        <a:font script="Hang" typeface="맑은 고딕"/>
-        <a:font script="Hans" typeface="宋体"/>
-        <a:font script="Hant" typeface="新細明體"/>
-        <a:font script="Arab" typeface="Times New Roman"/>
-        <a:font script="Hebr" typeface="Times New Roman"/>
-        <a:font script="Thai" typeface="Angsana New"/>
-        <a:font script="Ethi" typeface="Nyala"/>
-        <a:font script="Beng" typeface="Vrinda"/>
-        <a:font script="Gujr" typeface="Shruti"/>
-        <a:font script="Khmr" typeface="MoolBoran"/>
-        <a:font script="Knda" typeface="Tunga"/>
-        <a:font script="Guru" typeface="Raavi"/>
-        <a:font script="Cans" typeface="Euphemia"/>
-        <a:font script="Cher" typeface="Plantagenet Cherokee"/>
-        <a:font script="Yiii" typeface="Microsoft Yi Baiti"/>
-        <a:font script="Tibt" typeface="Microsoft Himalaya"/>
-        <a:font script="Thaa" typeface="MV Boli"/>
-        <a:font script="Deva" typeface="Mangal"/>
-        <a:font script="Telu" typeface="Gautami"/>
-        <a:font script="Taml" typeface="Latha"/>
-        <a:font script="Syrc" typeface="Estrangelo Edessa"/>
-        <a:font script="Orya" typeface="Kalinga"/>
-        <a:font script="Mlym" typeface="Kartika"/>
-        <a:font script="Laoo" typeface="DokChampa"/>
-        <a:font script="Sinh" typeface="Iskoola Pota"/>
-        <a:font script="Mong" typeface="Mongolian Baiti"/>
-        <a:font script="Viet" typeface="Times New Roman"/>
-        <a:font script="Uigh" typeface="Microsoft Uighur"/>
-        <a:font script="Geor" typeface="Sylfaen"/>
-      </a:majorFont>
-      <a:minorFont>
-        <a:latin typeface="Arial"/>
-        <a:ea typeface=""/>
-        <a:cs typeface=""/>
-        <a:font script="Jpan" typeface="ＭＳ Ｐゴシック"/>
-        <a:font script="Hang" typeface="맑은 고딕"/>
-        <a:font script="Hans" typeface="宋体"/>
-        <a:font script="Hant" typeface="新細明體"/>
-        <a:font script="Arab" typeface="Arial"/>
-        <a:font script="Hebr" typeface="Arial"/>
-        <a:font script="Thai" typeface="Cordia New"/>
-        <a:font script="Ethi" typeface="Nyala"/>
-        <a:font script="Beng" typeface="Vrinda"/>
-        <a:font script="Gujr" typeface="Shruti"/>
-        <a:font script="Khmr" typeface="DaunPenh"/>
-        <a:font script="Knda" typeface="Tunga"/>
-        <a:font script="Guru" typeface="Raavi"/>
-        <a:font script="Cans" typeface="Euphemia"/>
-        <a:font script="Cher" typeface="Plantagenet Cherokee"/>
-        <a:font script="Yiii" typeface="Microsoft Yi Baiti"/>
-        <a:font script="Tibt" typeface="Microsoft Himalaya"/>
-        <a:font script="Thaa" typeface="MV Boli"/>
-        <a:font script="Deva" typeface="Mangal"/>
-        <a:font script="Telu" typeface="Gautami"/>
-        <a:font script="Taml" typeface="Latha"/>
-        <a:font script="Syrc" typeface="Estrangelo Edessa"/>
-        <a:font script="Orya" typeface="Kalinga"/>
-        <a:font script="Mlym" typeface="Kartika"/>
-        <a:font script="Laoo" typeface="DokChampa"/>
-        <a:font script="Sinh" typeface="Iskoola Pota"/>
-        <a:font script="Mong" typeface="Mongolian Baiti"/>
-        <a:font script="Viet" typeface="Arial"/>
-        <a:font script="Uigh" typeface="Microsoft Uighur"/>
-        <a:font script="Geor" typeface="Sylfaen"/>
-      </a:minorFont>
-    </a:fontScheme>
-    <a:fmtScheme name="Office">
-      <a:fillStyleLst>
-        <a:solidFill>
-          <a:schemeClr val="phClr"/>
-        </a:solidFill>
-        <a:gradFill rotWithShape="1">
-          <a:gsLst>
-            <a:gs pos="0">
-              <a:schemeClr val="phClr">
-                <a:tint val="50000"/>
-                <a:satMod val="300000"/>
-              </a:schemeClr>
-            </a:gs>
-            <a:gs pos="35000">
-              <a:schemeClr val="phClr">
-                <a:tint val="37000"/>
-                <a:satMod val="300000"/>
-              </a:schemeClr>
-            </a:gs>
-            <a:gs pos="100000">
-              <a:schemeClr val="phClr">
-                <a:tint val="15000"/>
-                <a:satMod val="350000"/>
-              </a:schemeClr>
-            </a:gs>
-          </a:gsLst>
-          <a:lin ang="16200000" scaled="1"/>
-        </a:gradFill>
-        <a:gradFill rotWithShape="1">
-          <a:gsLst>
-            <a:gs pos="0">
-              <a:schemeClr val="phClr">
-                <a:tint val="100000"/>
-                <a:shade val="100000"/>
-                <a:satMod val="130000"/>
-              </a:schemeClr>
-            </a:gs>
-            <a:gs pos="100000">
-              <a:schemeClr val="phClr">
-                <a:tint val="50000"/>
-                <a:shade val="100000"/>
-                <a:satMod val="350000"/>
-              </a:schemeClr>
-            </a:gs>
-          </a:gsLst>
-          <a:lin ang="16200000" scaled="0"/>
-        </a:gradFill>
-      </a:fillStyleLst>
-      <a:lnStyleLst>
-        <a:ln w="9525" cap="flat" cmpd="sng" algn="ctr">
-          <a:solidFill>
-            <a:schemeClr val="phClr">
-              <a:shade val="95000"/>
-              <a:satMod val="105000"/>
-            </a:schemeClr>
-          </a:solidFill>
-          <a:prstDash val="solid"/>
-        </a:ln>
-        <a:ln w="25400" cap="flat" cmpd="sng" algn="ctr">
-          <a:solidFill>
-            <a:schemeClr val="phClr"/>
-          </a:solidFill>
-          <a:prstDash val="solid"/>
-        </a:ln>
-        <a:ln w="38100" cap="flat" cmpd="sng" algn="ctr">
-          <a:solidFill>
-            <a:schemeClr val="phClr"/>
-          </a:solidFill>
-          <a:prstDash val="solid"/>
-        </a:ln>
-      </a:lnStyleLst>
-      <a:effectStyleLst>
-        <a:effectStyle>
-          <a:effectLst>
-            <a:outerShdw blurRad="40000" dist="20000" dir="5400000" rotWithShape="0">
-              <a:srgbClr val="000000">
-                <a:alpha val="38000"/>
-              </a:srgbClr>
-            </a:outerShdw>
-          </a:effectLst>
-        </a:effectStyle>
-        <a:effectStyle>
-          <a:effectLst>
-            <a:outerShdw blurRad="40000" dist="23000" dir="5400000" rotWithShape="0">
-              <a:srgbClr val="000000">
-                <a:alpha val="35000"/>
-              </a:srgbClr>
-            </a:outerShdw>
-          </a:effectLst>
-        </a:effectStyle>
-        <a:effectStyle>
-          <a:effectLst>
-            <a:outerShdw blurRad="40000" dist="23000" dir="5400000" rotWithShape="0">
-              <a:srgbClr val="000000">
-                <a:alpha val="35000"/>
-              </a:srgbClr>
-            </a:outerShdw>
-          </a:effectLst>
-          <a:scene3d>
-            <a:camera prst="orthographicFront">
-              <a:rot lat="0" lon="0" rev="0"/>
-            </a:camera>
-            <a:lightRig rig="threePt" dir="t">
-              <a:rot lat="0" lon="0" rev="1200000"/>
-            </a:lightRig>
-          </a:scene3d>
-          <a:sp3d>
-            <a:bevelT w="63500" h="25400"/>
-          </a:sp3d>
-        </a:effectStyle>
-      </a:effectStyleLst>
-      <a:bgFillStyleLst>
-        <a:solidFill>
-          <a:schemeClr val="phClr"/>
-        </a:solidFill>
-        <a:gradFill rotWithShape="1">
-          <a:gsLst>
-            <a:gs pos="0">
-              <a:schemeClr val="phClr">
-                <a:tint val="40000"/>
-                <a:satMod val="350000"/>
-              </a:schemeClr>
-            </a:gs>
-            <a:gs pos="40000">
-              <a:schemeClr val="phClr">
-                <a:tint val="45000"/>
-                <a:shade val="99000"/>
-                <a:satMod val="350000"/>
-              </a:schemeClr>
-            </a:gs>
-            <a:gs pos="100000">
-              <a:schemeClr val="phClr">
-                <a:shade val="20000"/>
-                <a:satMod val="255000"/>
-              </a:schemeClr>
-            </a:gs>
-          </a:gsLst>
-          <a:path path="circle">
-            <a:fillToRect l="50000" t="-80000" r="50000" b="180000"/>
-          </a:path>
-        </a:gradFill>
-        <a:gradFill rotWithShape="1">
-          <a:gsLst>
-            <a:gs pos="0">
-              <a:schemeClr val="phClr">
-                <a:tint val="80000"/>
-                <a:satMod val="300000"/>
-              </a:schemeClr>
-            </a:gs>
-            <a:gs pos="100000">
-              <a:schemeClr val="phClr">
-                <a:shade val="30000"/>
-                <a:satMod val="200000"/>
-              </a:schemeClr>
-            </a:gs>
-          </a:gsLst>
-          <a:path path="circle">
-            <a:fillToRect l="50000" t="50000" r="50000" b="50000"/>
-          </a:path>
-        </a:gradFill>
-      </a:bgFillStyleLst>
-    </a:fmtScheme>
-  </a:themeElements>
-</a:theme>
 </file>
</xml_diff>

<commit_message>
Updated architecture diagram - removed rclcpp and added micro-ROS arduino
Signed-off-by: Ralph Lange <ralph.lange@de.bosch.com>
</commit_message>
<xml_diff>
--- a/img/micro-ROS_architecture.pptx
+++ b/img/micro-ROS_architecture.pptx
@@ -258,7 +258,7 @@
       </p15:sldGuideLst>
     </p:ext>
     <p:ext uri="http://customooxmlschemas.google.com/">
-      <go:slidesCustomData xmlns="" xmlns:mc="http://schemas.openxmlformats.org/markup-compatibility/2006" xmlns:mv="urn:schemas-microsoft-com:mac:vml" xmlns:c="http://schemas.openxmlformats.org/drawingml/2006/chart" xmlns:dgm="http://schemas.openxmlformats.org/drawingml/2006/diagram" xmlns:o="urn:schemas-microsoft-com:office:office" xmlns:v="urn:schemas-microsoft-com:vml" xmlns:pvml="urn:schemas-microsoft-com:office:powerpoint" xmlns:com="http://schemas.openxmlformats.org/drawingml/2006/compatibility" xmlns:p14="http://schemas.microsoft.com/office/powerpoint/2010/main" xmlns:p15="http://schemas.microsoft.com/office/powerpoint/2012/main" xmlns:go="http://customooxmlschemas.google.com/" r:id="rId8" roundtripDataSignature="AMtx7mjNETZj+lx0k8yFdZdgchI5QEOMEw=="/>
+      <go:slidesCustomData xmlns:go="http://customooxmlschemas.google.com/" xmlns:p15="http://schemas.microsoft.com/office/powerpoint/2012/main" xmlns:p14="http://schemas.microsoft.com/office/powerpoint/2010/main" xmlns:com="http://schemas.openxmlformats.org/drawingml/2006/compatibility" xmlns:pvml="urn:schemas-microsoft-com:office:powerpoint" xmlns:v="urn:schemas-microsoft-com:vml" xmlns:o="urn:schemas-microsoft-com:office:office" xmlns:dgm="http://schemas.openxmlformats.org/drawingml/2006/diagram" xmlns:c="http://schemas.openxmlformats.org/drawingml/2006/chart" xmlns:mv="urn:schemas-microsoft-com:mac:vml" xmlns:mc="http://schemas.openxmlformats.org/markup-compatibility/2006" xmlns="" r:id="rId8" roundtripDataSignature="AMtx7mjNETZj+lx0k8yFdZdgchI5QEOMEw=="/>
     </p:ext>
   </p:extLst>
 </p:presentation>
@@ -14632,252 +14632,20 @@
       </p:grpSpPr>
       <p:sp>
         <p:nvSpPr>
-          <p:cNvPr id="102" name="Google Shape;102;p1"/>
-          <p:cNvSpPr txBox="1"/>
-          <p:nvPr/>
-        </p:nvSpPr>
-        <p:spPr>
-          <a:xfrm rot="-5400000">
-            <a:off x="8483930" y="4823835"/>
-            <a:ext cx="876455" cy="594583"/>
-          </a:xfrm>
-          <a:prstGeom prst="rect">
-            <a:avLst/>
-          </a:prstGeom>
-          <a:noFill/>
-          <a:ln>
-            <a:noFill/>
-          </a:ln>
-        </p:spPr>
-        <p:txBody>
-          <a:bodyPr spcFirstLastPara="1" wrap="none" lIns="72000" tIns="0" rIns="0" bIns="0" anchor="t" anchorCtr="0">
-            <a:noAutofit/>
-          </a:bodyPr>
-          <a:lstStyle/>
-          <a:p>
-            <a:pPr marL="0" marR="0" lvl="0" indent="0" algn="ctr" rtl="0">
-              <a:lnSpc>
-                <a:spcPct val="90000"/>
-              </a:lnSpc>
-              <a:spcBef>
-                <a:spcPts val="0"/>
-              </a:spcBef>
-              <a:spcAft>
-                <a:spcPts val="0"/>
-              </a:spcAft>
-              <a:buClr>
-                <a:srgbClr val="000000"/>
-              </a:buClr>
-              <a:buSzPts val="1800"/>
-              <a:buFont typeface="Arial"/>
-              <a:buNone/>
-            </a:pPr>
-            <a:r>
-              <a:rPr lang="en-US" sz="2000" b="1" i="0" u="none" strike="noStrike" cap="none" dirty="0">
-                <a:solidFill>
-                  <a:schemeClr val="dk1"/>
-                </a:solidFill>
-                <a:latin typeface="Calibri"/>
-                <a:ea typeface="Calibri"/>
-                <a:cs typeface="Calibri"/>
-                <a:sym typeface="Calibri"/>
-              </a:rPr>
-              <a:t>RTOS</a:t>
-            </a:r>
-            <a:endParaRPr sz="2000" b="1" i="0" u="none" strike="noStrike" cap="none" dirty="0">
-              <a:solidFill>
-                <a:srgbClr val="000000"/>
-              </a:solidFill>
-              <a:sym typeface="Arial"/>
-            </a:endParaRPr>
-          </a:p>
-        </p:txBody>
-      </p:sp>
-      <p:sp>
-        <p:nvSpPr>
-          <p:cNvPr id="103" name="Google Shape;103;p1"/>
-          <p:cNvSpPr txBox="1"/>
-          <p:nvPr/>
-        </p:nvSpPr>
-        <p:spPr>
-          <a:xfrm rot="-5400000">
-            <a:off x="8351987" y="2494260"/>
-            <a:ext cx="1140344" cy="594583"/>
-          </a:xfrm>
-          <a:prstGeom prst="rect">
-            <a:avLst/>
-          </a:prstGeom>
-          <a:noFill/>
-          <a:ln>
-            <a:noFill/>
-          </a:ln>
-        </p:spPr>
-        <p:txBody>
-          <a:bodyPr spcFirstLastPara="1" wrap="none" lIns="72000" tIns="0" rIns="0" bIns="0" anchor="t" anchorCtr="0">
-            <a:noAutofit/>
-          </a:bodyPr>
-          <a:lstStyle/>
-          <a:p>
-            <a:pPr marL="0" marR="0" lvl="0" indent="0" algn="ctr" rtl="0">
-              <a:lnSpc>
-                <a:spcPct val="90000"/>
-              </a:lnSpc>
-              <a:spcBef>
-                <a:spcPts val="0"/>
-              </a:spcBef>
-              <a:spcAft>
-                <a:spcPts val="0"/>
-              </a:spcAft>
-              <a:buClr>
-                <a:srgbClr val="000000"/>
-              </a:buClr>
-              <a:buSzPts val="1800"/>
-              <a:buFont typeface="Arial"/>
-              <a:buNone/>
-            </a:pPr>
-            <a:r>
-              <a:rPr lang="en-US" sz="2000" b="1" i="0" u="none" strike="noStrike" cap="none" dirty="0">
-                <a:solidFill>
-                  <a:schemeClr val="dk1"/>
-                </a:solidFill>
-                <a:latin typeface="Calibri"/>
-                <a:ea typeface="Calibri"/>
-                <a:cs typeface="Calibri"/>
-                <a:sym typeface="Calibri"/>
-              </a:rPr>
-              <a:t>Client</a:t>
-            </a:r>
-            <a:br>
-              <a:rPr lang="en-US" sz="2000" b="1" i="0" u="none" strike="noStrike" cap="none" dirty="0">
-                <a:solidFill>
-                  <a:schemeClr val="dk1"/>
-                </a:solidFill>
-                <a:latin typeface="Calibri"/>
-                <a:ea typeface="Calibri"/>
-                <a:cs typeface="Calibri"/>
-                <a:sym typeface="Calibri"/>
-              </a:rPr>
-            </a:br>
-            <a:r>
-              <a:rPr lang="en-US" sz="2000" b="1" i="0" u="none" strike="noStrike" cap="none" dirty="0">
-                <a:solidFill>
-                  <a:schemeClr val="dk1"/>
-                </a:solidFill>
-                <a:latin typeface="Calibri"/>
-                <a:ea typeface="Calibri"/>
-                <a:cs typeface="Calibri"/>
-                <a:sym typeface="Calibri"/>
-              </a:rPr>
-              <a:t>library</a:t>
-            </a:r>
-            <a:endParaRPr sz="2000" b="1" i="0" u="none" strike="noStrike" cap="none" dirty="0">
-              <a:solidFill>
-                <a:srgbClr val="000000"/>
-              </a:solidFill>
-              <a:sym typeface="Arial"/>
-            </a:endParaRPr>
-          </a:p>
-        </p:txBody>
-      </p:sp>
-      <p:sp>
-        <p:nvSpPr>
-          <p:cNvPr id="104" name="Google Shape;104;p1"/>
-          <p:cNvSpPr txBox="1"/>
-          <p:nvPr/>
-        </p:nvSpPr>
-        <p:spPr>
-          <a:xfrm rot="-5400000">
-            <a:off x="8483933" y="3725020"/>
-            <a:ext cx="876452" cy="594583"/>
-          </a:xfrm>
-          <a:prstGeom prst="rect">
-            <a:avLst/>
-          </a:prstGeom>
-          <a:noFill/>
-          <a:ln>
-            <a:noFill/>
-          </a:ln>
-        </p:spPr>
-        <p:txBody>
-          <a:bodyPr spcFirstLastPara="1" wrap="none" lIns="72000" tIns="0" rIns="0" bIns="0" anchor="t" anchorCtr="0">
-            <a:noAutofit/>
-          </a:bodyPr>
-          <a:lstStyle/>
-          <a:p>
-            <a:pPr marL="0" marR="0" lvl="0" indent="0" algn="ctr" rtl="0">
-              <a:lnSpc>
-                <a:spcPct val="90000"/>
-              </a:lnSpc>
-              <a:spcBef>
-                <a:spcPts val="0"/>
-              </a:spcBef>
-              <a:spcAft>
-                <a:spcPts val="0"/>
-              </a:spcAft>
-              <a:buClr>
-                <a:srgbClr val="000000"/>
-              </a:buClr>
-              <a:buSzPts val="1800"/>
-              <a:buFont typeface="Arial"/>
-              <a:buNone/>
-            </a:pPr>
-            <a:r>
-              <a:rPr lang="en-US" sz="2000" b="1" i="0" u="none" strike="noStrike" cap="none" dirty="0">
-                <a:solidFill>
-                  <a:schemeClr val="dk1"/>
-                </a:solidFill>
-                <a:latin typeface="Calibri"/>
-                <a:ea typeface="Calibri"/>
-                <a:cs typeface="Calibri"/>
-                <a:sym typeface="Calibri"/>
-              </a:rPr>
-              <a:t>Middle-</a:t>
-            </a:r>
-            <a:br>
-              <a:rPr lang="en-US" sz="2000" b="1" i="0" u="none" strike="noStrike" cap="none" dirty="0">
-                <a:solidFill>
-                  <a:schemeClr val="dk1"/>
-                </a:solidFill>
-                <a:latin typeface="Calibri"/>
-                <a:ea typeface="Calibri"/>
-                <a:cs typeface="Calibri"/>
-                <a:sym typeface="Calibri"/>
-              </a:rPr>
-            </a:br>
-            <a:r>
-              <a:rPr lang="en-US" sz="2000" b="1" i="0" u="none" strike="noStrike" cap="none" dirty="0">
-                <a:solidFill>
-                  <a:schemeClr val="dk1"/>
-                </a:solidFill>
-                <a:latin typeface="Calibri"/>
-                <a:ea typeface="Calibri"/>
-                <a:cs typeface="Calibri"/>
-                <a:sym typeface="Calibri"/>
-              </a:rPr>
-              <a:t>ware</a:t>
-            </a:r>
-            <a:endParaRPr sz="2000" b="1" i="0" u="none" strike="noStrike" cap="none" dirty="0">
-              <a:solidFill>
-                <a:schemeClr val="dk1"/>
-              </a:solidFill>
-              <a:latin typeface="Calibri"/>
-              <a:ea typeface="Calibri"/>
-              <a:cs typeface="Calibri"/>
-              <a:sym typeface="Calibri"/>
-            </a:endParaRPr>
-          </a:p>
-        </p:txBody>
-      </p:sp>
-      <p:sp>
-        <p:nvSpPr>
-          <p:cNvPr id="120" name="Freeform 119"/>
+          <p:cNvPr id="61" name="Freeform 52">
+            <a:extLst>
+              <a:ext uri="{FF2B5EF4-FFF2-40B4-BE49-F238E27FC236}">
+                <a16:creationId xmlns:a16="http://schemas.microsoft.com/office/drawing/2014/main" id="{C3991965-0826-48A7-96F8-0BEDB50B15EA}"/>
+              </a:ext>
+            </a:extLst>
+          </p:cNvPr>
           <p:cNvSpPr/>
           <p:nvPr/>
         </p:nvSpPr>
         <p:spPr>
           <a:xfrm>
-            <a:off x="4169269" y="4108697"/>
-            <a:ext cx="733299" cy="198417"/>
+            <a:off x="3791590" y="3676996"/>
+            <a:ext cx="659778" cy="178524"/>
           </a:xfrm>
           <a:custGeom>
             <a:avLst/>
@@ -15077,13 +14845,13 @@
             </a:lvl9pPr>
           </a:lstStyle>
           <a:p>
-            <a:pPr algn="ctr">
+            <a:pPr algn="ctr" defTabSz="822564">
               <a:buClrTx/>
               <a:buFontTx/>
               <a:buNone/>
               <a:defRPr/>
             </a:pPr>
-            <a:endParaRPr lang="en-US" sz="2400">
+            <a:endParaRPr lang="en-US" sz="2159">
               <a:solidFill>
                 <a:srgbClr val="FFFFFF"/>
               </a:solidFill>
@@ -15094,10 +14862,10 @@
       </p:sp>
       <p:sp>
         <p:nvSpPr>
-          <p:cNvPr id="121" name="Rectangle 120">
+          <p:cNvPr id="62" name="Rectangle 61">
             <a:extLst>
               <a:ext uri="{FF2B5EF4-FFF2-40B4-BE49-F238E27FC236}">
-                <a16:creationId xmlns:a16="http://schemas.microsoft.com/office/drawing/2014/main" id="{FA7E4AC6-D8B6-4618-852A-ED30B3CBBDC5}"/>
+                <a16:creationId xmlns:a16="http://schemas.microsoft.com/office/drawing/2014/main" id="{B760893C-FECE-4C45-AFA5-CCE2E549942C}"/>
               </a:ext>
             </a:extLst>
           </p:cNvPr>
@@ -15106,526 +14874,8 @@
         </p:nvSpPr>
         <p:spPr>
           <a:xfrm>
-            <a:off x="4906823" y="4682901"/>
-            <a:ext cx="3640217" cy="876454"/>
-          </a:xfrm>
-          <a:prstGeom prst="rect">
-            <a:avLst/>
-          </a:prstGeom>
-          <a:solidFill>
-            <a:srgbClr val="438CC6"/>
-          </a:solidFill>
-          <a:ln w="19050" cap="flat" cmpd="sng" algn="ctr">
-            <a:solidFill>
-              <a:srgbClr val="324D7A"/>
-            </a:solidFill>
-            <a:prstDash val="solid"/>
-            <a:miter lim="800000"/>
-          </a:ln>
-          <a:effectLst/>
-        </p:spPr>
-        <p:txBody>
-          <a:bodyPr rtlCol="0" anchor="ctr"/>
-          <a:lstStyle>
-            <a:defPPr>
-              <a:defRPr lang="en-US"/>
-            </a:defPPr>
-            <a:lvl1pPr marL="0" algn="l" defTabSz="914400" rtl="0" eaLnBrk="1" latinLnBrk="0" hangingPunct="1">
-              <a:defRPr sz="1800" kern="1200">
-                <a:solidFill>
-                  <a:schemeClr val="tx1"/>
-                </a:solidFill>
-                <a:latin typeface="+mn-lt"/>
-                <a:ea typeface="+mn-ea"/>
-                <a:cs typeface="+mn-cs"/>
-              </a:defRPr>
-            </a:lvl1pPr>
-            <a:lvl2pPr marL="457200" algn="l" defTabSz="914400" rtl="0" eaLnBrk="1" latinLnBrk="0" hangingPunct="1">
-              <a:defRPr sz="1800" kern="1200">
-                <a:solidFill>
-                  <a:schemeClr val="tx1"/>
-                </a:solidFill>
-                <a:latin typeface="+mn-lt"/>
-                <a:ea typeface="+mn-ea"/>
-                <a:cs typeface="+mn-cs"/>
-              </a:defRPr>
-            </a:lvl2pPr>
-            <a:lvl3pPr marL="914400" algn="l" defTabSz="914400" rtl="0" eaLnBrk="1" latinLnBrk="0" hangingPunct="1">
-              <a:defRPr sz="1800" kern="1200">
-                <a:solidFill>
-                  <a:schemeClr val="tx1"/>
-                </a:solidFill>
-                <a:latin typeface="+mn-lt"/>
-                <a:ea typeface="+mn-ea"/>
-                <a:cs typeface="+mn-cs"/>
-              </a:defRPr>
-            </a:lvl3pPr>
-            <a:lvl4pPr marL="1371600" algn="l" defTabSz="914400" rtl="0" eaLnBrk="1" latinLnBrk="0" hangingPunct="1">
-              <a:defRPr sz="1800" kern="1200">
-                <a:solidFill>
-                  <a:schemeClr val="tx1"/>
-                </a:solidFill>
-                <a:latin typeface="+mn-lt"/>
-                <a:ea typeface="+mn-ea"/>
-                <a:cs typeface="+mn-cs"/>
-              </a:defRPr>
-            </a:lvl4pPr>
-            <a:lvl5pPr marL="1828800" algn="l" defTabSz="914400" rtl="0" eaLnBrk="1" latinLnBrk="0" hangingPunct="1">
-              <a:defRPr sz="1800" kern="1200">
-                <a:solidFill>
-                  <a:schemeClr val="tx1"/>
-                </a:solidFill>
-                <a:latin typeface="+mn-lt"/>
-                <a:ea typeface="+mn-ea"/>
-                <a:cs typeface="+mn-cs"/>
-              </a:defRPr>
-            </a:lvl5pPr>
-            <a:lvl6pPr marL="2286000" algn="l" defTabSz="914400" rtl="0" eaLnBrk="1" latinLnBrk="0" hangingPunct="1">
-              <a:defRPr sz="1800" kern="1200">
-                <a:solidFill>
-                  <a:schemeClr val="tx1"/>
-                </a:solidFill>
-                <a:latin typeface="+mn-lt"/>
-                <a:ea typeface="+mn-ea"/>
-                <a:cs typeface="+mn-cs"/>
-              </a:defRPr>
-            </a:lvl6pPr>
-            <a:lvl7pPr marL="2743200" algn="l" defTabSz="914400" rtl="0" eaLnBrk="1" latinLnBrk="0" hangingPunct="1">
-              <a:defRPr sz="1800" kern="1200">
-                <a:solidFill>
-                  <a:schemeClr val="tx1"/>
-                </a:solidFill>
-                <a:latin typeface="+mn-lt"/>
-                <a:ea typeface="+mn-ea"/>
-                <a:cs typeface="+mn-cs"/>
-              </a:defRPr>
-            </a:lvl7pPr>
-            <a:lvl8pPr marL="3200400" algn="l" defTabSz="914400" rtl="0" eaLnBrk="1" latinLnBrk="0" hangingPunct="1">
-              <a:defRPr sz="1800" kern="1200">
-                <a:solidFill>
-                  <a:schemeClr val="tx1"/>
-                </a:solidFill>
-                <a:latin typeface="+mn-lt"/>
-                <a:ea typeface="+mn-ea"/>
-                <a:cs typeface="+mn-cs"/>
-              </a:defRPr>
-            </a:lvl8pPr>
-            <a:lvl9pPr marL="3657600" algn="l" defTabSz="914400" rtl="0" eaLnBrk="1" latinLnBrk="0" hangingPunct="1">
-              <a:defRPr sz="1800" kern="1200">
-                <a:solidFill>
-                  <a:schemeClr val="tx1"/>
-                </a:solidFill>
-                <a:latin typeface="+mn-lt"/>
-                <a:ea typeface="+mn-ea"/>
-                <a:cs typeface="+mn-cs"/>
-              </a:defRPr>
-            </a:lvl9pPr>
-          </a:lstStyle>
-          <a:p>
-            <a:pPr marL="90488">
-              <a:buClrTx/>
-              <a:buFontTx/>
-              <a:buNone/>
-              <a:defRPr/>
-            </a:pPr>
-            <a:r>
-              <a:rPr lang="en-US" kern="0" dirty="0">
-                <a:solidFill>
-                  <a:prstClr val="white"/>
-                </a:solidFill>
-                <a:latin typeface="Calibri" panose="020F0502020204030204"/>
-              </a:rPr>
-              <a:t> </a:t>
-            </a:r>
-            <a:br>
-              <a:rPr lang="en-US" kern="0" dirty="0">
-                <a:solidFill>
-                  <a:prstClr val="white"/>
-                </a:solidFill>
-                <a:latin typeface="Calibri" panose="020F0502020204030204"/>
-              </a:rPr>
-            </a:br>
-            <a:r>
-              <a:rPr lang="en-US" kern="0" dirty="0">
-                <a:solidFill>
-                  <a:prstClr val="white"/>
-                </a:solidFill>
-                <a:latin typeface="Calibri" panose="020F0502020204030204"/>
-              </a:rPr>
-              <a:t> Zephyr, </a:t>
-            </a:r>
-            <a:r>
-              <a:rPr lang="en-US" kern="0" dirty="0" err="1">
-                <a:solidFill>
-                  <a:prstClr val="white"/>
-                </a:solidFill>
-                <a:latin typeface="Calibri" panose="020F0502020204030204"/>
-              </a:rPr>
-              <a:t>FreeRTOS</a:t>
-            </a:r>
-            <a:r>
-              <a:rPr lang="en-US" kern="0" dirty="0">
-                <a:solidFill>
-                  <a:prstClr val="white"/>
-                </a:solidFill>
-                <a:latin typeface="Calibri" panose="020F0502020204030204"/>
-              </a:rPr>
-              <a:t>, </a:t>
-            </a:r>
-            <a:r>
-              <a:rPr lang="en-US" kern="0" dirty="0" err="1">
-                <a:solidFill>
-                  <a:prstClr val="white"/>
-                </a:solidFill>
-                <a:latin typeface="Calibri" panose="020F0502020204030204"/>
-              </a:rPr>
-              <a:t>NuttX</a:t>
-            </a:r>
-            <a:endParaRPr lang="en-US" kern="0" dirty="0">
-              <a:solidFill>
-                <a:prstClr val="white"/>
-              </a:solidFill>
-              <a:latin typeface="Calibri" panose="020F0502020204030204"/>
-            </a:endParaRPr>
-          </a:p>
-        </p:txBody>
-      </p:sp>
-      <p:sp>
-        <p:nvSpPr>
-          <p:cNvPr id="122" name="Rectangle 121">
-            <a:extLst>
-              <a:ext uri="{FF2B5EF4-FFF2-40B4-BE49-F238E27FC236}">
-                <a16:creationId xmlns:a16="http://schemas.microsoft.com/office/drawing/2014/main" id="{FB42C7E3-28CC-4426-948E-9C4CE7BE27A1}"/>
-              </a:ext>
-            </a:extLst>
-          </p:cNvPr>
-          <p:cNvSpPr/>
-          <p:nvPr/>
-        </p:nvSpPr>
-        <p:spPr>
-          <a:xfrm>
-            <a:off x="7642159" y="5044942"/>
-            <a:ext cx="811333" cy="434344"/>
-          </a:xfrm>
-          <a:prstGeom prst="rect">
-            <a:avLst/>
-          </a:prstGeom>
-          <a:solidFill>
-            <a:srgbClr val="324D7A"/>
-          </a:solidFill>
-          <a:ln w="19050" cap="flat" cmpd="sng" algn="ctr">
-            <a:solidFill>
-              <a:srgbClr val="1F314F"/>
-            </a:solidFill>
-            <a:prstDash val="solid"/>
-            <a:miter lim="800000"/>
-          </a:ln>
-          <a:effectLst/>
-        </p:spPr>
-        <p:txBody>
-          <a:bodyPr wrap="none" lIns="0" tIns="0" rIns="0" bIns="0" rtlCol="0" anchor="ctr"/>
-          <a:lstStyle>
-            <a:defPPr>
-              <a:defRPr lang="en-US"/>
-            </a:defPPr>
-            <a:lvl1pPr marL="0" algn="l" defTabSz="914400" rtl="0" eaLnBrk="1" latinLnBrk="0" hangingPunct="1">
-              <a:defRPr sz="1800" kern="1200">
-                <a:solidFill>
-                  <a:schemeClr val="tx1"/>
-                </a:solidFill>
-                <a:latin typeface="+mn-lt"/>
-                <a:ea typeface="+mn-ea"/>
-                <a:cs typeface="+mn-cs"/>
-              </a:defRPr>
-            </a:lvl1pPr>
-            <a:lvl2pPr marL="457200" algn="l" defTabSz="914400" rtl="0" eaLnBrk="1" latinLnBrk="0" hangingPunct="1">
-              <a:defRPr sz="1800" kern="1200">
-                <a:solidFill>
-                  <a:schemeClr val="tx1"/>
-                </a:solidFill>
-                <a:latin typeface="+mn-lt"/>
-                <a:ea typeface="+mn-ea"/>
-                <a:cs typeface="+mn-cs"/>
-              </a:defRPr>
-            </a:lvl2pPr>
-            <a:lvl3pPr marL="914400" algn="l" defTabSz="914400" rtl="0" eaLnBrk="1" latinLnBrk="0" hangingPunct="1">
-              <a:defRPr sz="1800" kern="1200">
-                <a:solidFill>
-                  <a:schemeClr val="tx1"/>
-                </a:solidFill>
-                <a:latin typeface="+mn-lt"/>
-                <a:ea typeface="+mn-ea"/>
-                <a:cs typeface="+mn-cs"/>
-              </a:defRPr>
-            </a:lvl3pPr>
-            <a:lvl4pPr marL="1371600" algn="l" defTabSz="914400" rtl="0" eaLnBrk="1" latinLnBrk="0" hangingPunct="1">
-              <a:defRPr sz="1800" kern="1200">
-                <a:solidFill>
-                  <a:schemeClr val="tx1"/>
-                </a:solidFill>
-                <a:latin typeface="+mn-lt"/>
-                <a:ea typeface="+mn-ea"/>
-                <a:cs typeface="+mn-cs"/>
-              </a:defRPr>
-            </a:lvl4pPr>
-            <a:lvl5pPr marL="1828800" algn="l" defTabSz="914400" rtl="0" eaLnBrk="1" latinLnBrk="0" hangingPunct="1">
-              <a:defRPr sz="1800" kern="1200">
-                <a:solidFill>
-                  <a:schemeClr val="tx1"/>
-                </a:solidFill>
-                <a:latin typeface="+mn-lt"/>
-                <a:ea typeface="+mn-ea"/>
-                <a:cs typeface="+mn-cs"/>
-              </a:defRPr>
-            </a:lvl5pPr>
-            <a:lvl6pPr marL="2286000" algn="l" defTabSz="914400" rtl="0" eaLnBrk="1" latinLnBrk="0" hangingPunct="1">
-              <a:defRPr sz="1800" kern="1200">
-                <a:solidFill>
-                  <a:schemeClr val="tx1"/>
-                </a:solidFill>
-                <a:latin typeface="+mn-lt"/>
-                <a:ea typeface="+mn-ea"/>
-                <a:cs typeface="+mn-cs"/>
-              </a:defRPr>
-            </a:lvl6pPr>
-            <a:lvl7pPr marL="2743200" algn="l" defTabSz="914400" rtl="0" eaLnBrk="1" latinLnBrk="0" hangingPunct="1">
-              <a:defRPr sz="1800" kern="1200">
-                <a:solidFill>
-                  <a:schemeClr val="tx1"/>
-                </a:solidFill>
-                <a:latin typeface="+mn-lt"/>
-                <a:ea typeface="+mn-ea"/>
-                <a:cs typeface="+mn-cs"/>
-              </a:defRPr>
-            </a:lvl7pPr>
-            <a:lvl8pPr marL="3200400" algn="l" defTabSz="914400" rtl="0" eaLnBrk="1" latinLnBrk="0" hangingPunct="1">
-              <a:defRPr sz="1800" kern="1200">
-                <a:solidFill>
-                  <a:schemeClr val="tx1"/>
-                </a:solidFill>
-                <a:latin typeface="+mn-lt"/>
-                <a:ea typeface="+mn-ea"/>
-                <a:cs typeface="+mn-cs"/>
-              </a:defRPr>
-            </a:lvl8pPr>
-            <a:lvl9pPr marL="3657600" algn="l" defTabSz="914400" rtl="0" eaLnBrk="1" latinLnBrk="0" hangingPunct="1">
-              <a:defRPr sz="1800" kern="1200">
-                <a:solidFill>
-                  <a:schemeClr val="tx1"/>
-                </a:solidFill>
-                <a:latin typeface="+mn-lt"/>
-                <a:ea typeface="+mn-ea"/>
-                <a:cs typeface="+mn-cs"/>
-              </a:defRPr>
-            </a:lvl9pPr>
-          </a:lstStyle>
-          <a:p>
-            <a:pPr algn="ctr">
-              <a:buClrTx/>
-              <a:buFontTx/>
-              <a:buNone/>
-              <a:defRPr/>
-            </a:pPr>
-            <a:r>
-              <a:rPr lang="en-US" sz="1100" kern="0" dirty="0" smtClean="0">
-                <a:solidFill>
-                  <a:prstClr val="white"/>
-                </a:solidFill>
-                <a:latin typeface="Calibri" panose="020F0502020204030204"/>
-              </a:rPr>
-              <a:t>Additional</a:t>
-            </a:r>
-            <a:br>
-              <a:rPr lang="en-US" sz="1100" kern="0" dirty="0" smtClean="0">
-                <a:solidFill>
-                  <a:prstClr val="white"/>
-                </a:solidFill>
-                <a:latin typeface="Calibri" panose="020F0502020204030204"/>
-              </a:rPr>
-            </a:br>
-            <a:r>
-              <a:rPr lang="en-US" sz="1100" kern="0" dirty="0" smtClean="0">
-                <a:solidFill>
-                  <a:prstClr val="white"/>
-                </a:solidFill>
-                <a:latin typeface="Calibri" panose="020F0502020204030204"/>
-              </a:rPr>
-              <a:t>drivers, …</a:t>
-            </a:r>
-            <a:endParaRPr lang="en-US" sz="1100" kern="0" dirty="0">
-              <a:solidFill>
-                <a:prstClr val="white"/>
-              </a:solidFill>
-              <a:latin typeface="Calibri" panose="020F0502020204030204"/>
-            </a:endParaRPr>
-          </a:p>
-        </p:txBody>
-      </p:sp>
-      <p:sp>
-        <p:nvSpPr>
-          <p:cNvPr id="123" name="Rectangle 122">
-            <a:extLst>
-              <a:ext uri="{FF2B5EF4-FFF2-40B4-BE49-F238E27FC236}">
-                <a16:creationId xmlns:a16="http://schemas.microsoft.com/office/drawing/2014/main" id="{1AAE08D4-F722-4386-B2CD-86730DB7CF1B}"/>
-              </a:ext>
-            </a:extLst>
-          </p:cNvPr>
-          <p:cNvSpPr/>
-          <p:nvPr/>
-        </p:nvSpPr>
-        <p:spPr>
-          <a:xfrm>
-            <a:off x="4906823" y="4682901"/>
-            <a:ext cx="1911547" cy="268880"/>
-          </a:xfrm>
-          <a:prstGeom prst="rect">
-            <a:avLst/>
-          </a:prstGeom>
-          <a:noFill/>
-          <a:ln w="19050" cap="flat" cmpd="sng" algn="ctr">
-            <a:noFill/>
-            <a:prstDash val="solid"/>
-            <a:miter lim="800000"/>
-          </a:ln>
-          <a:effectLst/>
-        </p:spPr>
-        <p:txBody>
-          <a:bodyPr rtlCol="0" anchor="ctr"/>
-          <a:lstStyle>
-            <a:defPPr>
-              <a:defRPr lang="en-US"/>
-            </a:defPPr>
-            <a:lvl1pPr marL="0" algn="l" defTabSz="914400" rtl="0" eaLnBrk="1" latinLnBrk="0" hangingPunct="1">
-              <a:defRPr sz="1800" kern="1200">
-                <a:solidFill>
-                  <a:schemeClr val="tx1"/>
-                </a:solidFill>
-                <a:latin typeface="+mn-lt"/>
-                <a:ea typeface="+mn-ea"/>
-                <a:cs typeface="+mn-cs"/>
-              </a:defRPr>
-            </a:lvl1pPr>
-            <a:lvl2pPr marL="457200" algn="l" defTabSz="914400" rtl="0" eaLnBrk="1" latinLnBrk="0" hangingPunct="1">
-              <a:defRPr sz="1800" kern="1200">
-                <a:solidFill>
-                  <a:schemeClr val="tx1"/>
-                </a:solidFill>
-                <a:latin typeface="+mn-lt"/>
-                <a:ea typeface="+mn-ea"/>
-                <a:cs typeface="+mn-cs"/>
-              </a:defRPr>
-            </a:lvl2pPr>
-            <a:lvl3pPr marL="914400" algn="l" defTabSz="914400" rtl="0" eaLnBrk="1" latinLnBrk="0" hangingPunct="1">
-              <a:defRPr sz="1800" kern="1200">
-                <a:solidFill>
-                  <a:schemeClr val="tx1"/>
-                </a:solidFill>
-                <a:latin typeface="+mn-lt"/>
-                <a:ea typeface="+mn-ea"/>
-                <a:cs typeface="+mn-cs"/>
-              </a:defRPr>
-            </a:lvl3pPr>
-            <a:lvl4pPr marL="1371600" algn="l" defTabSz="914400" rtl="0" eaLnBrk="1" latinLnBrk="0" hangingPunct="1">
-              <a:defRPr sz="1800" kern="1200">
-                <a:solidFill>
-                  <a:schemeClr val="tx1"/>
-                </a:solidFill>
-                <a:latin typeface="+mn-lt"/>
-                <a:ea typeface="+mn-ea"/>
-                <a:cs typeface="+mn-cs"/>
-              </a:defRPr>
-            </a:lvl4pPr>
-            <a:lvl5pPr marL="1828800" algn="l" defTabSz="914400" rtl="0" eaLnBrk="1" latinLnBrk="0" hangingPunct="1">
-              <a:defRPr sz="1800" kern="1200">
-                <a:solidFill>
-                  <a:schemeClr val="tx1"/>
-                </a:solidFill>
-                <a:latin typeface="+mn-lt"/>
-                <a:ea typeface="+mn-ea"/>
-                <a:cs typeface="+mn-cs"/>
-              </a:defRPr>
-            </a:lvl5pPr>
-            <a:lvl6pPr marL="2286000" algn="l" defTabSz="914400" rtl="0" eaLnBrk="1" latinLnBrk="0" hangingPunct="1">
-              <a:defRPr sz="1800" kern="1200">
-                <a:solidFill>
-                  <a:schemeClr val="tx1"/>
-                </a:solidFill>
-                <a:latin typeface="+mn-lt"/>
-                <a:ea typeface="+mn-ea"/>
-                <a:cs typeface="+mn-cs"/>
-              </a:defRPr>
-            </a:lvl6pPr>
-            <a:lvl7pPr marL="2743200" algn="l" defTabSz="914400" rtl="0" eaLnBrk="1" latinLnBrk="0" hangingPunct="1">
-              <a:defRPr sz="1800" kern="1200">
-                <a:solidFill>
-                  <a:schemeClr val="tx1"/>
-                </a:solidFill>
-                <a:latin typeface="+mn-lt"/>
-                <a:ea typeface="+mn-ea"/>
-                <a:cs typeface="+mn-cs"/>
-              </a:defRPr>
-            </a:lvl7pPr>
-            <a:lvl8pPr marL="3200400" algn="l" defTabSz="914400" rtl="0" eaLnBrk="1" latinLnBrk="0" hangingPunct="1">
-              <a:defRPr sz="1800" kern="1200">
-                <a:solidFill>
-                  <a:schemeClr val="tx1"/>
-                </a:solidFill>
-                <a:latin typeface="+mn-lt"/>
-                <a:ea typeface="+mn-ea"/>
-                <a:cs typeface="+mn-cs"/>
-              </a:defRPr>
-            </a:lvl8pPr>
-            <a:lvl9pPr marL="3657600" algn="l" defTabSz="914400" rtl="0" eaLnBrk="1" latinLnBrk="0" hangingPunct="1">
-              <a:defRPr sz="1800" kern="1200">
-                <a:solidFill>
-                  <a:schemeClr val="tx1"/>
-                </a:solidFill>
-                <a:latin typeface="+mn-lt"/>
-                <a:ea typeface="+mn-ea"/>
-                <a:cs typeface="+mn-cs"/>
-              </a:defRPr>
-            </a:lvl9pPr>
-          </a:lstStyle>
-          <a:p>
-            <a:pPr algn="ctr">
-              <a:buClrTx/>
-              <a:buFontTx/>
-              <a:buNone/>
-            </a:pPr>
-            <a:r>
-              <a:rPr lang="en-US" kern="0" dirty="0" smtClean="0">
-                <a:solidFill>
-                  <a:prstClr val="white"/>
-                </a:solidFill>
-                <a:latin typeface="Calibri" panose="020F0502020204030204"/>
-              </a:rPr>
-              <a:t>POSIX</a:t>
-            </a:r>
-            <a:endParaRPr lang="en-US" kern="0" dirty="0">
-              <a:solidFill>
-                <a:prstClr val="white"/>
-              </a:solidFill>
-              <a:latin typeface="Calibri" panose="020F0502020204030204"/>
-            </a:endParaRPr>
-          </a:p>
-        </p:txBody>
-      </p:sp>
-      <p:sp>
-        <p:nvSpPr>
-          <p:cNvPr id="124" name="Rectangle 123">
-            <a:extLst>
-              <a:ext uri="{FF2B5EF4-FFF2-40B4-BE49-F238E27FC236}">
-                <a16:creationId xmlns:a16="http://schemas.microsoft.com/office/drawing/2014/main" id="{E6882ED3-6F9D-441B-92B3-B9CB4E3A27F0}"/>
-              </a:ext>
-            </a:extLst>
-          </p:cNvPr>
-          <p:cNvSpPr/>
-          <p:nvPr/>
-        </p:nvSpPr>
-        <p:spPr>
-          <a:xfrm>
-            <a:off x="4906823" y="3922780"/>
-            <a:ext cx="3640217" cy="537759"/>
+            <a:off x="6686446" y="4219703"/>
+            <a:ext cx="1044000" cy="776048"/>
           </a:xfrm>
           <a:prstGeom prst="rect">
             <a:avLst/>
@@ -15746,23 +14996,46 @@
               <a:buNone/>
             </a:pPr>
             <a:r>
-              <a:rPr lang="en-US" kern="0" dirty="0">
+              <a:rPr lang="en-US" sz="1600" kern="0" dirty="0">
                 <a:solidFill>
                   <a:prstClr val="white"/>
                 </a:solidFill>
                 <a:latin typeface="Calibri" panose="020F0502020204030204"/>
               </a:rPr>
-              <a:t>Micro XRCE-DDS Client</a:t>
+              <a:t>micro-ROS</a:t>
             </a:r>
+            <a:br>
+              <a:rPr lang="en-US" sz="1600" kern="0" dirty="0">
+                <a:solidFill>
+                  <a:prstClr val="white"/>
+                </a:solidFill>
+                <a:latin typeface="Calibri" panose="020F0502020204030204"/>
+              </a:rPr>
+            </a:br>
+            <a:r>
+              <a:rPr lang="en-US" sz="1600" kern="0" dirty="0" err="1">
+                <a:solidFill>
+                  <a:prstClr val="white"/>
+                </a:solidFill>
+                <a:latin typeface="Calibri" panose="020F0502020204030204"/>
+              </a:rPr>
+              <a:t>arduino</a:t>
+            </a:r>
+            <a:endParaRPr lang="en-US" sz="1600" kern="0" dirty="0">
+              <a:solidFill>
+                <a:prstClr val="white"/>
+              </a:solidFill>
+              <a:latin typeface="Calibri" panose="020F0502020204030204"/>
+            </a:endParaRPr>
           </a:p>
         </p:txBody>
       </p:sp>
       <p:sp>
         <p:nvSpPr>
-          <p:cNvPr id="125" name="Rectangle 124">
+          <p:cNvPr id="63" name="Rectangle 62">
             <a:extLst>
               <a:ext uri="{FF2B5EF4-FFF2-40B4-BE49-F238E27FC236}">
-                <a16:creationId xmlns:a16="http://schemas.microsoft.com/office/drawing/2014/main" id="{43814742-EAFD-498E-A7B9-3AE25386FA4C}"/>
+                <a16:creationId xmlns:a16="http://schemas.microsoft.com/office/drawing/2014/main" id="{D997BD25-904F-446E-9068-4484D1A9670D}"/>
               </a:ext>
             </a:extLst>
           </p:cNvPr>
@@ -15771,8 +15044,155 @@
         </p:nvSpPr>
         <p:spPr>
           <a:xfrm>
-            <a:off x="4906823" y="2823966"/>
-            <a:ext cx="3640217" cy="537759"/>
+            <a:off x="4455199" y="3257322"/>
+            <a:ext cx="3275249" cy="180000"/>
+          </a:xfrm>
+          <a:prstGeom prst="rect">
+            <a:avLst/>
+          </a:prstGeom>
+          <a:solidFill>
+            <a:srgbClr val="324D7A"/>
+          </a:solidFill>
+          <a:ln w="19050" cap="flat" cmpd="sng" algn="ctr">
+            <a:solidFill>
+              <a:srgbClr val="1F314F"/>
+            </a:solidFill>
+            <a:prstDash val="solid"/>
+            <a:miter lim="800000"/>
+          </a:ln>
+          <a:effectLst/>
+        </p:spPr>
+        <p:txBody>
+          <a:bodyPr lIns="0" tIns="0" rIns="0" bIns="0" rtlCol="0" anchor="ctr"/>
+          <a:lstStyle>
+            <a:defPPr>
+              <a:defRPr lang="en-US"/>
+            </a:defPPr>
+            <a:lvl1pPr marL="0" algn="l" defTabSz="914400" rtl="0" eaLnBrk="1" latinLnBrk="0" hangingPunct="1">
+              <a:defRPr sz="1800" kern="1200">
+                <a:solidFill>
+                  <a:schemeClr val="tx1"/>
+                </a:solidFill>
+                <a:latin typeface="+mn-lt"/>
+                <a:ea typeface="+mn-ea"/>
+                <a:cs typeface="+mn-cs"/>
+              </a:defRPr>
+            </a:lvl1pPr>
+            <a:lvl2pPr marL="457200" algn="l" defTabSz="914400" rtl="0" eaLnBrk="1" latinLnBrk="0" hangingPunct="1">
+              <a:defRPr sz="1800" kern="1200">
+                <a:solidFill>
+                  <a:schemeClr val="tx1"/>
+                </a:solidFill>
+                <a:latin typeface="+mn-lt"/>
+                <a:ea typeface="+mn-ea"/>
+                <a:cs typeface="+mn-cs"/>
+              </a:defRPr>
+            </a:lvl2pPr>
+            <a:lvl3pPr marL="914400" algn="l" defTabSz="914400" rtl="0" eaLnBrk="1" latinLnBrk="0" hangingPunct="1">
+              <a:defRPr sz="1800" kern="1200">
+                <a:solidFill>
+                  <a:schemeClr val="tx1"/>
+                </a:solidFill>
+                <a:latin typeface="+mn-lt"/>
+                <a:ea typeface="+mn-ea"/>
+                <a:cs typeface="+mn-cs"/>
+              </a:defRPr>
+            </a:lvl3pPr>
+            <a:lvl4pPr marL="1371600" algn="l" defTabSz="914400" rtl="0" eaLnBrk="1" latinLnBrk="0" hangingPunct="1">
+              <a:defRPr sz="1800" kern="1200">
+                <a:solidFill>
+                  <a:schemeClr val="tx1"/>
+                </a:solidFill>
+                <a:latin typeface="+mn-lt"/>
+                <a:ea typeface="+mn-ea"/>
+                <a:cs typeface="+mn-cs"/>
+              </a:defRPr>
+            </a:lvl4pPr>
+            <a:lvl5pPr marL="1828800" algn="l" defTabSz="914400" rtl="0" eaLnBrk="1" latinLnBrk="0" hangingPunct="1">
+              <a:defRPr sz="1800" kern="1200">
+                <a:solidFill>
+                  <a:schemeClr val="tx1"/>
+                </a:solidFill>
+                <a:latin typeface="+mn-lt"/>
+                <a:ea typeface="+mn-ea"/>
+                <a:cs typeface="+mn-cs"/>
+              </a:defRPr>
+            </a:lvl5pPr>
+            <a:lvl6pPr marL="2286000" algn="l" defTabSz="914400" rtl="0" eaLnBrk="1" latinLnBrk="0" hangingPunct="1">
+              <a:defRPr sz="1800" kern="1200">
+                <a:solidFill>
+                  <a:schemeClr val="tx1"/>
+                </a:solidFill>
+                <a:latin typeface="+mn-lt"/>
+                <a:ea typeface="+mn-ea"/>
+                <a:cs typeface="+mn-cs"/>
+              </a:defRPr>
+            </a:lvl6pPr>
+            <a:lvl7pPr marL="2743200" algn="l" defTabSz="914400" rtl="0" eaLnBrk="1" latinLnBrk="0" hangingPunct="1">
+              <a:defRPr sz="1800" kern="1200">
+                <a:solidFill>
+                  <a:schemeClr val="tx1"/>
+                </a:solidFill>
+                <a:latin typeface="+mn-lt"/>
+                <a:ea typeface="+mn-ea"/>
+                <a:cs typeface="+mn-cs"/>
+              </a:defRPr>
+            </a:lvl7pPr>
+            <a:lvl8pPr marL="3200400" algn="l" defTabSz="914400" rtl="0" eaLnBrk="1" latinLnBrk="0" hangingPunct="1">
+              <a:defRPr sz="1800" kern="1200">
+                <a:solidFill>
+                  <a:schemeClr val="tx1"/>
+                </a:solidFill>
+                <a:latin typeface="+mn-lt"/>
+                <a:ea typeface="+mn-ea"/>
+                <a:cs typeface="+mn-cs"/>
+              </a:defRPr>
+            </a:lvl8pPr>
+            <a:lvl9pPr marL="3657600" algn="l" defTabSz="914400" rtl="0" eaLnBrk="1" latinLnBrk="0" hangingPunct="1">
+              <a:defRPr sz="1800" kern="1200">
+                <a:solidFill>
+                  <a:schemeClr val="tx1"/>
+                </a:solidFill>
+                <a:latin typeface="+mn-lt"/>
+                <a:ea typeface="+mn-ea"/>
+                <a:cs typeface="+mn-cs"/>
+              </a:defRPr>
+            </a:lvl9pPr>
+          </a:lstStyle>
+          <a:p>
+            <a:pPr algn="ctr">
+              <a:buClrTx/>
+              <a:buFontTx/>
+              <a:buNone/>
+            </a:pPr>
+            <a:r>
+              <a:rPr lang="en-US" sz="1200" kern="0" dirty="0">
+                <a:solidFill>
+                  <a:prstClr val="white"/>
+                </a:solidFill>
+                <a:latin typeface="Calibri" panose="020F0502020204030204"/>
+              </a:rPr>
+              <a:t>Micro XRCE-DDS Adapter</a:t>
+            </a:r>
+          </a:p>
+        </p:txBody>
+      </p:sp>
+      <p:sp>
+        <p:nvSpPr>
+          <p:cNvPr id="64" name="Rectangle 63">
+            <a:extLst>
+              <a:ext uri="{FF2B5EF4-FFF2-40B4-BE49-F238E27FC236}">
+                <a16:creationId xmlns:a16="http://schemas.microsoft.com/office/drawing/2014/main" id="{9D5EC50C-F348-4912-8C40-BB3E8165B03D}"/>
+              </a:ext>
+            </a:extLst>
+          </p:cNvPr>
+          <p:cNvSpPr/>
+          <p:nvPr/>
+        </p:nvSpPr>
+        <p:spPr>
+          <a:xfrm>
+            <a:off x="4455199" y="2294747"/>
+            <a:ext cx="3275247" cy="540000"/>
           </a:xfrm>
           <a:prstGeom prst="rect">
             <a:avLst/>
@@ -15790,7 +15210,7 @@
           <a:effectLst/>
         </p:spPr>
         <p:txBody>
-          <a:bodyPr wrap="none" lIns="72000" tIns="0" rIns="0" bIns="0" rtlCol="0" anchor="ctr" anchorCtr="0"/>
+          <a:bodyPr wrap="none" lIns="64781" tIns="0" rIns="0" bIns="0" rtlCol="0" anchor="ctr" anchorCtr="0"/>
           <a:lstStyle>
             <a:defPPr>
               <a:defRPr lang="en-US"/>
@@ -15894,25 +15314,16 @@
               <a:defRPr/>
             </a:pPr>
             <a:r>
-              <a:rPr lang="en-US" b="1" kern="0" dirty="0" smtClean="0">
+              <a:rPr lang="en-US" sz="1600" kern="0" dirty="0">
                 <a:solidFill>
                   <a:prstClr val="white"/>
                 </a:solidFill>
                 <a:latin typeface="Calibri" panose="020F0502020204030204"/>
               </a:rPr>
-              <a:t>C API</a:t>
-            </a:r>
-            <a:r>
-              <a:rPr lang="en-US" kern="0" dirty="0" smtClean="0">
-                <a:solidFill>
-                  <a:prstClr val="white"/>
-                </a:solidFill>
-                <a:latin typeface="Calibri" panose="020F0502020204030204"/>
-              </a:rPr>
-              <a:t/>
+              <a:t>ROS API</a:t>
             </a:r>
             <a:br>
-              <a:rPr lang="en-US" kern="0" dirty="0" smtClean="0">
+              <a:rPr lang="en-US" sz="1600" kern="0" dirty="0">
                 <a:solidFill>
                   <a:prstClr val="white"/>
                 </a:solidFill>
@@ -15920,50 +15331,23 @@
               </a:rPr>
             </a:br>
             <a:r>
-              <a:rPr lang="en-US" kern="0" dirty="0" smtClean="0">
+              <a:rPr lang="en-US" sz="1600" kern="0" dirty="0">
                 <a:solidFill>
                   <a:prstClr val="white"/>
                 </a:solidFill>
                 <a:latin typeface="Calibri" panose="020F0502020204030204"/>
               </a:rPr>
-              <a:t>ROS Client Support Lib </a:t>
-            </a:r>
-            <a:r>
-              <a:rPr lang="en-US" kern="0" dirty="0">
-                <a:solidFill>
-                  <a:prstClr val="white"/>
-                </a:solidFill>
-                <a:latin typeface="Calibri" panose="020F0502020204030204"/>
-              </a:rPr>
-              <a:t>(</a:t>
-            </a:r>
-            <a:r>
-              <a:rPr lang="en-US" kern="0" dirty="0" err="1">
-                <a:solidFill>
-                  <a:prstClr val="white"/>
-                </a:solidFill>
-                <a:latin typeface="Calibri" panose="020F0502020204030204"/>
-              </a:rPr>
-              <a:t>rcl</a:t>
-            </a:r>
-            <a:r>
-              <a:rPr lang="en-US" kern="0" dirty="0">
-                <a:solidFill>
-                  <a:prstClr val="white"/>
-                </a:solidFill>
-                <a:latin typeface="Calibri" panose="020F0502020204030204"/>
-              </a:rPr>
-              <a:t>)</a:t>
+              <a:t>in C language</a:t>
             </a:r>
           </a:p>
         </p:txBody>
       </p:sp>
       <p:sp>
         <p:nvSpPr>
-          <p:cNvPr id="126" name="Rectangle 125">
+          <p:cNvPr id="65" name="Rectangle 64">
             <a:extLst>
               <a:ext uri="{FF2B5EF4-FFF2-40B4-BE49-F238E27FC236}">
-                <a16:creationId xmlns:a16="http://schemas.microsoft.com/office/drawing/2014/main" id="{82178F51-028C-4184-9F8B-01114BBC2DFE}"/>
+                <a16:creationId xmlns:a16="http://schemas.microsoft.com/office/drawing/2014/main" id="{4F6C2E19-72BA-4B3B-8FF2-60F75CFE1779}"/>
               </a:ext>
             </a:extLst>
           </p:cNvPr>
@@ -15972,8 +15356,8 @@
         </p:nvSpPr>
         <p:spPr>
           <a:xfrm>
-            <a:off x="3289290" y="2221380"/>
-            <a:ext cx="709842" cy="3337975"/>
+            <a:off x="2999840" y="2288489"/>
+            <a:ext cx="638673" cy="2707262"/>
           </a:xfrm>
           <a:prstGeom prst="rect">
             <a:avLst/>
@@ -15995,7 +15379,7 @@
           <a:effectLst/>
         </p:spPr>
         <p:txBody>
-          <a:bodyPr vert="horz" wrap="none" bIns="36000" rtlCol="0" anchor="b"/>
+          <a:bodyPr vert="horz" wrap="none" bIns="32391" rtlCol="0" anchor="b"/>
           <a:lstStyle>
             <a:defPPr>
               <a:defRPr lang="en-US"/>
@@ -16092,7 +15476,7 @@
             </a:lvl9pPr>
           </a:lstStyle>
           <a:p>
-            <a:pPr marL="0" marR="0" lvl="0" indent="0" algn="ctr" defTabSz="914400" rtl="0" eaLnBrk="1" fontAlgn="auto" latinLnBrk="0" hangingPunct="1">
+            <a:pPr marL="0" marR="0" lvl="0" indent="0" algn="ctr" defTabSz="822564" rtl="0" eaLnBrk="1" fontAlgn="auto" latinLnBrk="0" hangingPunct="1">
               <a:lnSpc>
                 <a:spcPct val="100000"/>
               </a:lnSpc>
@@ -16110,7 +15494,7 @@
               <a:defRPr/>
             </a:pPr>
             <a:r>
-              <a:rPr kumimoji="0" lang="en-US" sz="1800" b="0" i="0" u="none" strike="noStrike" kern="0" cap="none" spc="0" normalizeH="0" baseline="0" noProof="0" dirty="0" smtClean="0">
+              <a:rPr kumimoji="0" lang="en-US" sz="1600" b="0" i="0" u="none" strike="noStrike" kern="0" cap="none" spc="0" normalizeH="0" baseline="0" noProof="0" dirty="0">
                 <a:ln>
                   <a:noFill/>
                 </a:ln>
@@ -16128,7 +15512,7 @@
             </a:r>
           </a:p>
           <a:p>
-            <a:pPr marL="0" marR="0" lvl="0" indent="0" algn="ctr" defTabSz="914400" rtl="0" eaLnBrk="1" fontAlgn="auto" latinLnBrk="0" hangingPunct="1">
+            <a:pPr marL="0" marR="0" lvl="0" indent="0" algn="ctr" defTabSz="822564" rtl="0" eaLnBrk="1" fontAlgn="auto" latinLnBrk="0" hangingPunct="1">
               <a:lnSpc>
                 <a:spcPct val="100000"/>
               </a:lnSpc>
@@ -16146,7 +15530,7 @@
               <a:defRPr/>
             </a:pPr>
             <a:r>
-              <a:rPr kumimoji="0" lang="en-US" sz="1800" b="0" i="0" u="none" strike="noStrike" kern="0" cap="none" spc="0" normalizeH="0" baseline="0" noProof="0" dirty="0" smtClean="0">
+              <a:rPr kumimoji="0" lang="en-US" sz="1600" b="0" i="0" u="none" strike="noStrike" kern="0" cap="none" spc="0" normalizeH="0" baseline="0" noProof="0" dirty="0">
                 <a:ln>
                   <a:noFill/>
                 </a:ln>
@@ -16162,7 +15546,26 @@
               </a:rPr>
               <a:t>stack</a:t>
             </a:r>
-            <a:endParaRPr kumimoji="0" lang="en-US" sz="1800" b="0" i="0" u="none" strike="noStrike" kern="0" cap="none" spc="0" normalizeH="0" baseline="0" noProof="0" dirty="0">
+          </a:p>
+          <a:p>
+            <a:pPr marL="0" marR="0" lvl="0" indent="0" algn="ctr" defTabSz="822564" rtl="0" eaLnBrk="1" fontAlgn="auto" latinLnBrk="0" hangingPunct="1">
+              <a:lnSpc>
+                <a:spcPct val="100000"/>
+              </a:lnSpc>
+              <a:spcBef>
+                <a:spcPts val="0"/>
+              </a:spcBef>
+              <a:spcAft>
+                <a:spcPts val="0"/>
+              </a:spcAft>
+              <a:buClrTx/>
+              <a:buSzTx/>
+              <a:buFontTx/>
+              <a:buNone/>
+              <a:tabLst/>
+              <a:defRPr/>
+            </a:pPr>
+            <a:endParaRPr kumimoji="0" lang="en-US" sz="1600" b="0" i="0" u="none" strike="noStrike" kern="0" cap="none" spc="0" normalizeH="0" baseline="0" noProof="0" dirty="0">
               <a:ln>
                 <a:noFill/>
               </a:ln>
@@ -16178,7 +15581,7 @@
             </a:endParaRPr>
           </a:p>
           <a:p>
-            <a:pPr marL="0" marR="0" lvl="0" indent="0" algn="ctr" defTabSz="914400" rtl="0" eaLnBrk="1" fontAlgn="auto" latinLnBrk="0" hangingPunct="1">
+            <a:pPr marL="0" marR="0" lvl="0" indent="0" algn="ctr" defTabSz="822564" rtl="0" eaLnBrk="1" fontAlgn="auto" latinLnBrk="0" hangingPunct="1">
               <a:lnSpc>
                 <a:spcPct val="100000"/>
               </a:lnSpc>
@@ -16195,7 +15598,7 @@
               <a:tabLst/>
               <a:defRPr/>
             </a:pPr>
-            <a:endParaRPr kumimoji="0" lang="en-US" sz="1800" b="0" i="0" u="none" strike="noStrike" kern="0" cap="none" spc="0" normalizeH="0" baseline="0" noProof="0" dirty="0" smtClean="0">
+            <a:endParaRPr kumimoji="0" lang="en-US" sz="1600" b="0" i="0" u="none" strike="noStrike" kern="0" cap="none" spc="0" normalizeH="0" baseline="0" noProof="0" dirty="0">
               <a:ln>
                 <a:noFill/>
               </a:ln>
@@ -16211,7 +15614,7 @@
             </a:endParaRPr>
           </a:p>
           <a:p>
-            <a:pPr marL="0" marR="0" lvl="0" indent="0" algn="ctr" defTabSz="914400" rtl="0" eaLnBrk="1" fontAlgn="auto" latinLnBrk="0" hangingPunct="1">
+            <a:pPr marL="0" marR="0" lvl="0" indent="0" algn="ctr" defTabSz="822564" rtl="0" eaLnBrk="1" fontAlgn="auto" latinLnBrk="0" hangingPunct="1">
               <a:lnSpc>
                 <a:spcPct val="100000"/>
               </a:lnSpc>
@@ -16228,7 +15631,7 @@
               <a:tabLst/>
               <a:defRPr/>
             </a:pPr>
-            <a:endParaRPr kumimoji="0" lang="en-US" sz="1800" b="0" i="0" u="none" strike="noStrike" kern="0" cap="none" spc="0" normalizeH="0" baseline="0" noProof="0" dirty="0">
+            <a:endParaRPr kumimoji="0" lang="en-US" sz="1600" b="0" i="0" u="none" strike="noStrike" kern="0" cap="none" spc="0" normalizeH="0" baseline="0" noProof="0" dirty="0">
               <a:ln>
                 <a:noFill/>
               </a:ln>
@@ -16244,7 +15647,7 @@
             </a:endParaRPr>
           </a:p>
           <a:p>
-            <a:pPr marL="0" marR="0" lvl="0" indent="0" algn="ctr" defTabSz="914400" rtl="0" eaLnBrk="1" fontAlgn="auto" latinLnBrk="0" hangingPunct="1">
+            <a:pPr marL="0" marR="0" lvl="0" indent="0" algn="ctr" defTabSz="822564" rtl="0" eaLnBrk="1" fontAlgn="auto" latinLnBrk="0" hangingPunct="1">
               <a:lnSpc>
                 <a:spcPct val="100000"/>
               </a:lnSpc>
@@ -16261,7 +15664,7 @@
               <a:tabLst/>
               <a:defRPr/>
             </a:pPr>
-            <a:endParaRPr kumimoji="0" lang="en-US" sz="1800" b="0" i="0" u="none" strike="noStrike" kern="0" cap="none" spc="0" normalizeH="0" baseline="0" noProof="0" dirty="0" smtClean="0">
+            <a:endParaRPr kumimoji="0" lang="en-US" sz="1600" b="0" i="0" u="none" strike="noStrike" kern="0" cap="none" spc="0" normalizeH="0" baseline="0" noProof="0" dirty="0">
               <a:ln>
                 <a:noFill/>
               </a:ln>
@@ -16277,7 +15680,7 @@
             </a:endParaRPr>
           </a:p>
           <a:p>
-            <a:pPr marL="0" marR="0" lvl="0" indent="0" algn="ctr" defTabSz="914400" rtl="0" eaLnBrk="1" fontAlgn="auto" latinLnBrk="0" hangingPunct="1">
+            <a:pPr marL="0" marR="0" lvl="0" indent="0" algn="ctr" defTabSz="822564" rtl="0" eaLnBrk="1" fontAlgn="auto" latinLnBrk="0" hangingPunct="1">
               <a:lnSpc>
                 <a:spcPct val="100000"/>
               </a:lnSpc>
@@ -16294,7 +15697,7 @@
               <a:tabLst/>
               <a:defRPr/>
             </a:pPr>
-            <a:endParaRPr kumimoji="0" lang="en-US" sz="1800" b="0" i="0" u="none" strike="noStrike" kern="0" cap="none" spc="0" normalizeH="0" baseline="0" noProof="0" dirty="0">
+            <a:endParaRPr kumimoji="0" lang="en-US" sz="1600" b="0" i="0" u="none" strike="noStrike" kern="0" cap="none" spc="0" normalizeH="0" baseline="0" noProof="0" dirty="0">
               <a:ln>
                 <a:noFill/>
               </a:ln>
@@ -16310,7 +15713,7 @@
             </a:endParaRPr>
           </a:p>
           <a:p>
-            <a:pPr marL="0" marR="0" lvl="0" indent="0" algn="ctr" defTabSz="914400" rtl="0" eaLnBrk="1" fontAlgn="auto" latinLnBrk="0" hangingPunct="1">
+            <a:pPr marL="0" marR="0" lvl="0" indent="0" algn="ctr" defTabSz="822564" rtl="0" eaLnBrk="1" fontAlgn="auto" latinLnBrk="0" hangingPunct="1">
               <a:lnSpc>
                 <a:spcPct val="100000"/>
               </a:lnSpc>
@@ -16327,7 +15730,7 @@
               <a:tabLst/>
               <a:defRPr/>
             </a:pPr>
-            <a:endParaRPr kumimoji="0" lang="en-US" sz="1800" b="0" i="0" u="none" strike="noStrike" kern="0" cap="none" spc="0" normalizeH="0" baseline="0" noProof="0" dirty="0" smtClean="0">
+            <a:endParaRPr kumimoji="0" lang="en-US" sz="1600" b="0" i="0" u="none" strike="noStrike" kern="0" cap="none" spc="0" normalizeH="0" baseline="0" noProof="0" dirty="0">
               <a:ln>
                 <a:noFill/>
               </a:ln>
@@ -16343,7 +15746,7 @@
             </a:endParaRPr>
           </a:p>
           <a:p>
-            <a:pPr marL="0" marR="0" lvl="0" indent="0" algn="ctr" defTabSz="914400" rtl="0" eaLnBrk="1" fontAlgn="auto" latinLnBrk="0" hangingPunct="1">
+            <a:pPr marL="0" marR="0" lvl="0" indent="0" algn="ctr" defTabSz="822564" rtl="0" eaLnBrk="1" fontAlgn="auto" latinLnBrk="0" hangingPunct="1">
               <a:lnSpc>
                 <a:spcPct val="100000"/>
               </a:lnSpc>
@@ -16360,41 +15763,8 @@
               <a:tabLst/>
               <a:defRPr/>
             </a:pPr>
-            <a:endParaRPr kumimoji="0" lang="en-US" sz="1800" b="0" i="0" u="none" strike="noStrike" kern="0" cap="none" spc="0" normalizeH="0" baseline="0" noProof="0" dirty="0">
-              <a:ln>
-                <a:noFill/>
-              </a:ln>
-              <a:solidFill>
-                <a:prstClr val="white"/>
-              </a:solidFill>
-              <a:effectLst/>
-              <a:uLnTx/>
-              <a:uFillTx/>
-              <a:latin typeface="Calibri" panose="020F0502020204030204"/>
-              <a:ea typeface="+mn-ea"/>
-              <a:cs typeface="+mn-cs"/>
-            </a:endParaRPr>
-          </a:p>
-          <a:p>
-            <a:pPr marL="0" marR="0" lvl="0" indent="0" algn="ctr" defTabSz="914400" rtl="0" eaLnBrk="1" fontAlgn="auto" latinLnBrk="0" hangingPunct="1">
-              <a:lnSpc>
-                <a:spcPct val="100000"/>
-              </a:lnSpc>
-              <a:spcBef>
-                <a:spcPts val="0"/>
-              </a:spcBef>
-              <a:spcAft>
-                <a:spcPts val="0"/>
-              </a:spcAft>
-              <a:buClrTx/>
-              <a:buSzTx/>
-              <a:buFontTx/>
-              <a:buNone/>
-              <a:tabLst/>
-              <a:defRPr/>
-            </a:pPr>
             <a:r>
-              <a:rPr kumimoji="0" lang="en-US" sz="1800" b="0" i="0" u="none" strike="noStrike" kern="0" cap="none" spc="0" normalizeH="0" baseline="0" noProof="0" dirty="0" smtClean="0">
+              <a:rPr kumimoji="0" lang="en-US" sz="1600" b="0" i="0" u="none" strike="noStrike" kern="0" cap="none" spc="0" normalizeH="0" baseline="0" noProof="0" dirty="0">
                 <a:ln>
                   <a:noFill/>
                 </a:ln>
@@ -16411,7 +15781,7 @@
               <a:t>on a</a:t>
             </a:r>
             <a:br>
-              <a:rPr kumimoji="0" lang="en-US" sz="1800" b="0" i="0" u="none" strike="noStrike" kern="0" cap="none" spc="0" normalizeH="0" baseline="0" noProof="0" dirty="0" smtClean="0">
+              <a:rPr kumimoji="0" lang="en-US" sz="1600" b="0" i="0" u="none" strike="noStrike" kern="0" cap="none" spc="0" normalizeH="0" baseline="0" noProof="0" dirty="0">
                 <a:ln>
                   <a:noFill/>
                 </a:ln>
@@ -16427,7 +15797,7 @@
               </a:rPr>
             </a:br>
             <a:r>
-              <a:rPr kumimoji="0" lang="en-US" sz="1800" b="0" i="0" u="none" strike="noStrike" kern="0" cap="none" spc="0" normalizeH="0" baseline="0" noProof="0" dirty="0" smtClean="0">
+              <a:rPr kumimoji="0" lang="en-US" sz="1600" b="0" i="0" u="none" strike="noStrike" kern="0" cap="none" spc="0" normalizeH="0" baseline="0" noProof="0" dirty="0">
                 <a:ln>
                   <a:noFill/>
                 </a:ln>
@@ -16444,7 +15814,7 @@
               <a:t>normal</a:t>
             </a:r>
             <a:br>
-              <a:rPr kumimoji="0" lang="en-US" sz="1800" b="0" i="0" u="none" strike="noStrike" kern="0" cap="none" spc="0" normalizeH="0" baseline="0" noProof="0" dirty="0" smtClean="0">
+              <a:rPr kumimoji="0" lang="en-US" sz="1600" b="0" i="0" u="none" strike="noStrike" kern="0" cap="none" spc="0" normalizeH="0" baseline="0" noProof="0" dirty="0">
                 <a:ln>
                   <a:noFill/>
                 </a:ln>
@@ -16460,7 +15830,7 @@
               </a:rPr>
             </a:br>
             <a:r>
-              <a:rPr kumimoji="0" lang="en-US" sz="1800" b="0" i="0" u="none" strike="noStrike" kern="0" cap="none" spc="0" normalizeH="0" baseline="0" noProof="0" dirty="0" smtClean="0">
+              <a:rPr kumimoji="0" lang="en-US" sz="1600" b="0" i="0" u="none" strike="noStrike" kern="0" cap="none" spc="0" normalizeH="0" baseline="0" noProof="0" dirty="0">
                 <a:ln>
                   <a:noFill/>
                 </a:ln>
@@ -16476,29 +15846,15 @@
               </a:rPr>
               <a:t>OS</a:t>
             </a:r>
-            <a:endParaRPr kumimoji="0" lang="en-US" sz="1800" b="0" i="0" u="none" strike="noStrike" kern="0" cap="none" spc="0" normalizeH="0" baseline="0" noProof="0" dirty="0">
-              <a:ln>
-                <a:noFill/>
-              </a:ln>
-              <a:solidFill>
-                <a:prstClr val="white"/>
-              </a:solidFill>
-              <a:effectLst/>
-              <a:uLnTx/>
-              <a:uFillTx/>
-              <a:latin typeface="Calibri" panose="020F0502020204030204"/>
-              <a:ea typeface="+mn-ea"/>
-              <a:cs typeface="+mn-cs"/>
-            </a:endParaRPr>
           </a:p>
         </p:txBody>
       </p:sp>
       <p:sp>
         <p:nvSpPr>
-          <p:cNvPr id="127" name="Rectangle 126">
+          <p:cNvPr id="66" name="Rectangle 65">
             <a:extLst>
               <a:ext uri="{FF2B5EF4-FFF2-40B4-BE49-F238E27FC236}">
-                <a16:creationId xmlns:a16="http://schemas.microsoft.com/office/drawing/2014/main" id="{73FC8B1B-4F7C-4CC0-AEA7-71B140296DB4}"/>
+                <a16:creationId xmlns:a16="http://schemas.microsoft.com/office/drawing/2014/main" id="{5807495D-5F2E-42C5-9A29-12C3F092267D}"/>
               </a:ext>
             </a:extLst>
           </p:cNvPr>
@@ -16507,8 +15863,8 @@
         </p:nvSpPr>
         <p:spPr>
           <a:xfrm rot="16200000">
-            <a:off x="7586477" y="3484196"/>
-            <a:ext cx="4595048" cy="537759"/>
+            <a:off x="6868316" y="3286307"/>
+            <a:ext cx="3848094" cy="483843"/>
           </a:xfrm>
           <a:prstGeom prst="rect">
             <a:avLst/>
@@ -16630,7 +15986,7 @@
               <a:defRPr/>
             </a:pPr>
             <a:r>
-              <a:rPr lang="en-US" kern="0" dirty="0">
+              <a:rPr lang="en-US" sz="1600" kern="0" dirty="0">
                 <a:solidFill>
                   <a:prstClr val="white"/>
                 </a:solidFill>
@@ -16643,10 +15999,10 @@
       </p:sp>
       <p:sp>
         <p:nvSpPr>
-          <p:cNvPr id="128" name="Rectangle 127">
+          <p:cNvPr id="67" name="Rectangle 66">
             <a:extLst>
               <a:ext uri="{FF2B5EF4-FFF2-40B4-BE49-F238E27FC236}">
-                <a16:creationId xmlns:a16="http://schemas.microsoft.com/office/drawing/2014/main" id="{68C637CA-E15F-4BDE-A708-CE02ABFED94B}"/>
+                <a16:creationId xmlns:a16="http://schemas.microsoft.com/office/drawing/2014/main" id="{2D9B57BA-67F9-4291-9F36-6890B535B65F}"/>
               </a:ext>
             </a:extLst>
           </p:cNvPr>
@@ -16655,8 +16011,8 @@
         </p:nvSpPr>
         <p:spPr>
           <a:xfrm>
-            <a:off x="3289290" y="1455551"/>
-            <a:ext cx="1075519" cy="537759"/>
+            <a:off x="2999840" y="1604182"/>
+            <a:ext cx="967687" cy="483843"/>
           </a:xfrm>
           <a:prstGeom prst="rect">
             <a:avLst/>
@@ -16775,7 +16131,7 @@
             </a:lvl9pPr>
           </a:lstStyle>
           <a:p>
-            <a:pPr marL="0" marR="0" lvl="0" indent="0" algn="ctr" defTabSz="914400" rtl="0" eaLnBrk="1" fontAlgn="auto" latinLnBrk="0" hangingPunct="1">
+            <a:pPr marL="0" marR="0" lvl="0" indent="0" algn="ctr" defTabSz="822564" rtl="0" eaLnBrk="1" fontAlgn="auto" latinLnBrk="0" hangingPunct="1">
               <a:lnSpc>
                 <a:spcPct val="100000"/>
               </a:lnSpc>
@@ -16793,7 +16149,7 @@
               <a:defRPr/>
             </a:pPr>
             <a:r>
-              <a:rPr kumimoji="0" lang="en-US" sz="1600" b="0" i="0" u="none" strike="noStrike" kern="0" cap="none" spc="0" normalizeH="0" baseline="0" noProof="0" dirty="0">
+              <a:rPr kumimoji="0" lang="en-US" sz="1400" b="0" i="0" u="none" strike="noStrike" kern="0" cap="none" spc="0" normalizeH="0" baseline="0" noProof="0" dirty="0">
                 <a:ln>
                   <a:noFill/>
                 </a:ln>
@@ -16810,7 +16166,7 @@
               <a:t>Application</a:t>
             </a:r>
             <a:br>
-              <a:rPr kumimoji="0" lang="en-US" sz="1600" b="0" i="0" u="none" strike="noStrike" kern="0" cap="none" spc="0" normalizeH="0" baseline="0" noProof="0" dirty="0">
+              <a:rPr kumimoji="0" lang="en-US" sz="1400" b="0" i="0" u="none" strike="noStrike" kern="0" cap="none" spc="0" normalizeH="0" baseline="0" noProof="0" dirty="0">
                 <a:ln>
                   <a:noFill/>
                 </a:ln>
@@ -16826,7 +16182,7 @@
               </a:rPr>
             </a:br>
             <a:r>
-              <a:rPr kumimoji="0" lang="en-US" sz="1600" b="0" i="0" u="none" strike="noStrike" kern="0" cap="none" spc="0" normalizeH="0" baseline="0" noProof="0" dirty="0">
+              <a:rPr kumimoji="0" lang="en-US" sz="1400" b="0" i="0" u="none" strike="noStrike" kern="0" cap="none" spc="0" normalizeH="0" baseline="0" noProof="0" dirty="0">
                 <a:ln>
                   <a:noFill/>
                 </a:ln>
@@ -16847,10 +16203,10 @@
       </p:sp>
       <p:sp>
         <p:nvSpPr>
-          <p:cNvPr id="129" name="Rectangle 128">
+          <p:cNvPr id="68" name="Rectangle 67">
             <a:extLst>
               <a:ext uri="{FF2B5EF4-FFF2-40B4-BE49-F238E27FC236}">
-                <a16:creationId xmlns:a16="http://schemas.microsoft.com/office/drawing/2014/main" id="{43814742-EAFD-498E-A7B9-3AE25386FA4C}"/>
+                <a16:creationId xmlns:a16="http://schemas.microsoft.com/office/drawing/2014/main" id="{9236F9F5-F0A1-491C-BF58-05DA60E06DED}"/>
               </a:ext>
             </a:extLst>
           </p:cNvPr>
@@ -16859,8 +16215,8 @@
         </p:nvSpPr>
         <p:spPr>
           <a:xfrm>
-            <a:off x="4906823" y="3584086"/>
-            <a:ext cx="3640217" cy="268880"/>
+            <a:off x="4455198" y="3021276"/>
+            <a:ext cx="3275249" cy="180000"/>
           </a:xfrm>
           <a:prstGeom prst="rect">
             <a:avLst/>
@@ -16982,7 +16338,7 @@
               <a:defRPr/>
             </a:pPr>
             <a:r>
-              <a:rPr lang="en-US" kern="0" dirty="0">
+              <a:rPr lang="en-US" sz="1200" kern="0" dirty="0">
                 <a:solidFill>
                   <a:prstClr val="white"/>
                 </a:solidFill>
@@ -16991,7 +16347,7 @@
               <a:t>ROS Middleware Interface (</a:t>
             </a:r>
             <a:r>
-              <a:rPr lang="en-US" kern="0" dirty="0" err="1">
+              <a:rPr lang="en-US" sz="1200" kern="0" dirty="0" err="1">
                 <a:solidFill>
                   <a:prstClr val="white"/>
                 </a:solidFill>
@@ -17000,7 +16356,7 @@
               <a:t>rmw</a:t>
             </a:r>
             <a:r>
-              <a:rPr lang="en-US" kern="0" dirty="0">
+              <a:rPr lang="en-US" sz="1200" kern="0" dirty="0">
                 <a:solidFill>
                   <a:prstClr val="white"/>
                 </a:solidFill>
@@ -17013,10 +16369,10 @@
       </p:sp>
       <p:sp>
         <p:nvSpPr>
-          <p:cNvPr id="130" name="Rectangle 129">
+          <p:cNvPr id="69" name="Rectangle 68">
             <a:extLst>
               <a:ext uri="{FF2B5EF4-FFF2-40B4-BE49-F238E27FC236}">
-                <a16:creationId xmlns:a16="http://schemas.microsoft.com/office/drawing/2014/main" id="{1AAE08D4-F722-4386-B2CD-86730DB7CF1B}"/>
+                <a16:creationId xmlns:a16="http://schemas.microsoft.com/office/drawing/2014/main" id="{78C9C233-0E65-43FB-9245-BCF709A49596}"/>
               </a:ext>
             </a:extLst>
           </p:cNvPr>
@@ -17025,8 +16381,8 @@
         </p:nvSpPr>
         <p:spPr>
           <a:xfrm>
-            <a:off x="4906823" y="3431539"/>
-            <a:ext cx="3640217" cy="82732"/>
+            <a:off x="4455199" y="2890793"/>
+            <a:ext cx="3275247" cy="74437"/>
           </a:xfrm>
           <a:prstGeom prst="rect">
             <a:avLst/>
@@ -17143,7 +16499,7 @@
               <a:buNone/>
               <a:defRPr/>
             </a:pPr>
-            <a:endParaRPr lang="en-US" sz="800" kern="0" dirty="0">
+            <a:endParaRPr lang="en-US" sz="720" kern="0" dirty="0">
               <a:solidFill>
                 <a:srgbClr val="FFFFFF"/>
               </a:solidFill>
@@ -17154,10 +16510,10 @@
       </p:sp>
       <p:sp>
         <p:nvSpPr>
-          <p:cNvPr id="131" name="Rectangle 130">
+          <p:cNvPr id="70" name="Rectangle 69">
             <a:extLst>
               <a:ext uri="{FF2B5EF4-FFF2-40B4-BE49-F238E27FC236}">
-                <a16:creationId xmlns:a16="http://schemas.microsoft.com/office/drawing/2014/main" id="{1AAE08D4-F722-4386-B2CD-86730DB7CF1B}"/>
+                <a16:creationId xmlns:a16="http://schemas.microsoft.com/office/drawing/2014/main" id="{C2C98A88-5EFF-4672-9FAC-D159C26DF5A0}"/>
               </a:ext>
             </a:extLst>
           </p:cNvPr>
@@ -17166,8 +16522,8 @@
         </p:nvSpPr>
         <p:spPr>
           <a:xfrm>
-            <a:off x="4906823" y="2063365"/>
-            <a:ext cx="3640217" cy="82732"/>
+            <a:off x="4455199" y="2151054"/>
+            <a:ext cx="3275247" cy="74437"/>
           </a:xfrm>
           <a:prstGeom prst="rect">
             <a:avLst/>
@@ -17284,7 +16640,7 @@
               <a:buNone/>
               <a:defRPr/>
             </a:pPr>
-            <a:endParaRPr lang="en-US" sz="800" kern="0" dirty="0">
+            <a:endParaRPr lang="en-US" sz="720" kern="0" dirty="0">
               <a:solidFill>
                 <a:srgbClr val="FFFFFF"/>
               </a:solidFill>
@@ -17295,10 +16651,10 @@
       </p:sp>
       <p:sp>
         <p:nvSpPr>
-          <p:cNvPr id="132" name="Rectangle 131">
+          <p:cNvPr id="71" name="Rectangle 70">
             <a:extLst>
               <a:ext uri="{FF2B5EF4-FFF2-40B4-BE49-F238E27FC236}">
-                <a16:creationId xmlns:a16="http://schemas.microsoft.com/office/drawing/2014/main" id="{1AAE08D4-F722-4386-B2CD-86730DB7CF1B}"/>
+                <a16:creationId xmlns:a16="http://schemas.microsoft.com/office/drawing/2014/main" id="{6E3EA35A-3628-4EE1-9D14-D2B2EC236B41}"/>
               </a:ext>
             </a:extLst>
           </p:cNvPr>
@@ -17307,8 +16663,8 @@
         </p:nvSpPr>
         <p:spPr>
           <a:xfrm>
-            <a:off x="4906823" y="5629169"/>
-            <a:ext cx="3640217" cy="82732"/>
+            <a:off x="4455199" y="5051797"/>
+            <a:ext cx="3275247" cy="74437"/>
           </a:xfrm>
           <a:prstGeom prst="rect">
             <a:avLst/>
@@ -17425,7 +16781,7 @@
               <a:buNone/>
               <a:defRPr/>
             </a:pPr>
-            <a:endParaRPr lang="en-US" sz="800" kern="0" dirty="0">
+            <a:endParaRPr lang="en-US" sz="720" kern="0" dirty="0">
               <a:solidFill>
                 <a:srgbClr val="FFFFFF"/>
               </a:solidFill>
@@ -17436,10 +16792,10 @@
       </p:sp>
       <p:sp>
         <p:nvSpPr>
-          <p:cNvPr id="133" name="Rectangle 132">
+          <p:cNvPr id="72" name="Rectangle 71">
             <a:extLst>
               <a:ext uri="{FF2B5EF4-FFF2-40B4-BE49-F238E27FC236}">
-                <a16:creationId xmlns:a16="http://schemas.microsoft.com/office/drawing/2014/main" id="{1AAE08D4-F722-4386-B2CD-86730DB7CF1B}"/>
+                <a16:creationId xmlns:a16="http://schemas.microsoft.com/office/drawing/2014/main" id="{5352D8F1-5445-4E9E-81C8-E85C7ACC363A}"/>
               </a:ext>
             </a:extLst>
           </p:cNvPr>
@@ -17448,8 +16804,8 @@
         </p:nvSpPr>
         <p:spPr>
           <a:xfrm>
-            <a:off x="4906823" y="4530354"/>
-            <a:ext cx="3640217" cy="82732"/>
+            <a:off x="4455199" y="4089222"/>
+            <a:ext cx="3275247" cy="74437"/>
           </a:xfrm>
           <a:prstGeom prst="rect">
             <a:avLst/>
@@ -17566,7 +16922,7 @@
               <a:buNone/>
               <a:defRPr/>
             </a:pPr>
-            <a:endParaRPr lang="en-US" sz="800" kern="0" dirty="0">
+            <a:endParaRPr lang="en-US" sz="720" kern="0" dirty="0">
               <a:solidFill>
                 <a:srgbClr val="FFFFFF"/>
               </a:solidFill>
@@ -17577,10 +16933,10 @@
       </p:sp>
       <p:sp>
         <p:nvSpPr>
-          <p:cNvPr id="134" name="Rectangle 133">
+          <p:cNvPr id="73" name="Rectangle 72">
             <a:extLst>
               <a:ext uri="{FF2B5EF4-FFF2-40B4-BE49-F238E27FC236}">
-                <a16:creationId xmlns:a16="http://schemas.microsoft.com/office/drawing/2014/main" id="{1AAE08D4-F722-4386-B2CD-86730DB7CF1B}"/>
+                <a16:creationId xmlns:a16="http://schemas.microsoft.com/office/drawing/2014/main" id="{7EECA7C5-F8EF-46BD-ABE7-231A18D37741}"/>
               </a:ext>
             </a:extLst>
           </p:cNvPr>
@@ -17589,553 +16945,8 @@
         </p:nvSpPr>
         <p:spPr>
           <a:xfrm>
-            <a:off x="6818370" y="4682901"/>
-            <a:ext cx="1728669" cy="268880"/>
-          </a:xfrm>
-          <a:prstGeom prst="rect">
-            <a:avLst/>
-          </a:prstGeom>
-          <a:solidFill>
-            <a:srgbClr val="324D7A"/>
-          </a:solidFill>
-          <a:ln w="19050" cap="flat" cmpd="sng" algn="ctr">
-            <a:solidFill>
-              <a:srgbClr val="1F314F"/>
-            </a:solidFill>
-            <a:prstDash val="solid"/>
-            <a:miter lim="800000"/>
-          </a:ln>
-          <a:effectLst/>
-        </p:spPr>
-        <p:txBody>
-          <a:bodyPr wrap="none" lIns="0" tIns="0" rIns="0" bIns="0" rtlCol="0" anchor="ctr"/>
-          <a:lstStyle>
-            <a:defPPr>
-              <a:defRPr lang="en-US"/>
-            </a:defPPr>
-            <a:lvl1pPr marL="0" algn="l" defTabSz="914400" rtl="0" eaLnBrk="1" latinLnBrk="0" hangingPunct="1">
-              <a:defRPr sz="1800" kern="1200">
-                <a:solidFill>
-                  <a:schemeClr val="tx1"/>
-                </a:solidFill>
-                <a:latin typeface="+mn-lt"/>
-                <a:ea typeface="+mn-ea"/>
-                <a:cs typeface="+mn-cs"/>
-              </a:defRPr>
-            </a:lvl1pPr>
-            <a:lvl2pPr marL="457200" algn="l" defTabSz="914400" rtl="0" eaLnBrk="1" latinLnBrk="0" hangingPunct="1">
-              <a:defRPr sz="1800" kern="1200">
-                <a:solidFill>
-                  <a:schemeClr val="tx1"/>
-                </a:solidFill>
-                <a:latin typeface="+mn-lt"/>
-                <a:ea typeface="+mn-ea"/>
-                <a:cs typeface="+mn-cs"/>
-              </a:defRPr>
-            </a:lvl2pPr>
-            <a:lvl3pPr marL="914400" algn="l" defTabSz="914400" rtl="0" eaLnBrk="1" latinLnBrk="0" hangingPunct="1">
-              <a:defRPr sz="1800" kern="1200">
-                <a:solidFill>
-                  <a:schemeClr val="tx1"/>
-                </a:solidFill>
-                <a:latin typeface="+mn-lt"/>
-                <a:ea typeface="+mn-ea"/>
-                <a:cs typeface="+mn-cs"/>
-              </a:defRPr>
-            </a:lvl3pPr>
-            <a:lvl4pPr marL="1371600" algn="l" defTabSz="914400" rtl="0" eaLnBrk="1" latinLnBrk="0" hangingPunct="1">
-              <a:defRPr sz="1800" kern="1200">
-                <a:solidFill>
-                  <a:schemeClr val="tx1"/>
-                </a:solidFill>
-                <a:latin typeface="+mn-lt"/>
-                <a:ea typeface="+mn-ea"/>
-                <a:cs typeface="+mn-cs"/>
-              </a:defRPr>
-            </a:lvl4pPr>
-            <a:lvl5pPr marL="1828800" algn="l" defTabSz="914400" rtl="0" eaLnBrk="1" latinLnBrk="0" hangingPunct="1">
-              <a:defRPr sz="1800" kern="1200">
-                <a:solidFill>
-                  <a:schemeClr val="tx1"/>
-                </a:solidFill>
-                <a:latin typeface="+mn-lt"/>
-                <a:ea typeface="+mn-ea"/>
-                <a:cs typeface="+mn-cs"/>
-              </a:defRPr>
-            </a:lvl5pPr>
-            <a:lvl6pPr marL="2286000" algn="l" defTabSz="914400" rtl="0" eaLnBrk="1" latinLnBrk="0" hangingPunct="1">
-              <a:defRPr sz="1800" kern="1200">
-                <a:solidFill>
-                  <a:schemeClr val="tx1"/>
-                </a:solidFill>
-                <a:latin typeface="+mn-lt"/>
-                <a:ea typeface="+mn-ea"/>
-                <a:cs typeface="+mn-cs"/>
-              </a:defRPr>
-            </a:lvl6pPr>
-            <a:lvl7pPr marL="2743200" algn="l" defTabSz="914400" rtl="0" eaLnBrk="1" latinLnBrk="0" hangingPunct="1">
-              <a:defRPr sz="1800" kern="1200">
-                <a:solidFill>
-                  <a:schemeClr val="tx1"/>
-                </a:solidFill>
-                <a:latin typeface="+mn-lt"/>
-                <a:ea typeface="+mn-ea"/>
-                <a:cs typeface="+mn-cs"/>
-              </a:defRPr>
-            </a:lvl7pPr>
-            <a:lvl8pPr marL="3200400" algn="l" defTabSz="914400" rtl="0" eaLnBrk="1" latinLnBrk="0" hangingPunct="1">
-              <a:defRPr sz="1800" kern="1200">
-                <a:solidFill>
-                  <a:schemeClr val="tx1"/>
-                </a:solidFill>
-                <a:latin typeface="+mn-lt"/>
-                <a:ea typeface="+mn-ea"/>
-                <a:cs typeface="+mn-cs"/>
-              </a:defRPr>
-            </a:lvl8pPr>
-            <a:lvl9pPr marL="3657600" algn="l" defTabSz="914400" rtl="0" eaLnBrk="1" latinLnBrk="0" hangingPunct="1">
-              <a:defRPr sz="1800" kern="1200">
-                <a:solidFill>
-                  <a:schemeClr val="tx1"/>
-                </a:solidFill>
-                <a:latin typeface="+mn-lt"/>
-                <a:ea typeface="+mn-ea"/>
-                <a:cs typeface="+mn-cs"/>
-              </a:defRPr>
-            </a:lvl9pPr>
-          </a:lstStyle>
-          <a:p>
-            <a:pPr algn="ctr">
-              <a:buClrTx/>
-              <a:buFontTx/>
-              <a:buNone/>
-            </a:pPr>
-            <a:r>
-              <a:rPr lang="en-US" sz="1100" kern="0" dirty="0" smtClean="0">
-                <a:solidFill>
-                  <a:prstClr val="white"/>
-                </a:solidFill>
-                <a:latin typeface="Calibri" panose="020F0502020204030204"/>
-              </a:rPr>
-              <a:t>+ Additional abstractions</a:t>
-            </a:r>
-            <a:endParaRPr lang="en-US" sz="1100" kern="0" dirty="0">
-              <a:solidFill>
-                <a:prstClr val="white"/>
-              </a:solidFill>
-              <a:latin typeface="Calibri" panose="020F0502020204030204"/>
-            </a:endParaRPr>
-          </a:p>
-        </p:txBody>
-      </p:sp>
-      <p:cxnSp>
-        <p:nvCxnSpPr>
-          <p:cNvPr id="135" name="Straight Connector 134"/>
-          <p:cNvCxnSpPr/>
-          <p:nvPr/>
-        </p:nvCxnSpPr>
-        <p:spPr>
-          <a:xfrm flipH="1">
-            <a:off x="4913514" y="4951121"/>
-            <a:ext cx="1874294" cy="0"/>
-          </a:xfrm>
-          <a:prstGeom prst="line">
-            <a:avLst/>
-          </a:prstGeom>
-          <a:solidFill>
-            <a:srgbClr val="0E78C5">
-              <a:lumMod val="60000"/>
-              <a:lumOff val="40000"/>
-            </a:srgbClr>
-          </a:solidFill>
-          <a:ln w="19050" cap="flat" cmpd="sng" algn="ctr">
-            <a:solidFill>
-              <a:srgbClr val="1F314F"/>
-            </a:solidFill>
-            <a:prstDash val="sysDot"/>
-            <a:miter lim="800000"/>
-          </a:ln>
-          <a:effectLst/>
-        </p:spPr>
-      </p:cxnSp>
-      <p:sp>
-        <p:nvSpPr>
-          <p:cNvPr id="136" name="Rectangle 135">
-            <a:extLst>
-              <a:ext uri="{FF2B5EF4-FFF2-40B4-BE49-F238E27FC236}">
-                <a16:creationId xmlns:a16="http://schemas.microsoft.com/office/drawing/2014/main" id="{07A06EC4-A794-4103-8F67-DF3DD33340F0}"/>
-              </a:ext>
-            </a:extLst>
-          </p:cNvPr>
-          <p:cNvSpPr/>
-          <p:nvPr/>
-        </p:nvSpPr>
-        <p:spPr>
-          <a:xfrm>
-            <a:off x="7791634" y="2906698"/>
-            <a:ext cx="661731" cy="372295"/>
-          </a:xfrm>
-          <a:prstGeom prst="rect">
-            <a:avLst/>
-          </a:prstGeom>
-          <a:solidFill>
-            <a:srgbClr val="324D7A"/>
-          </a:solidFill>
-          <a:ln w="19050" cap="flat" cmpd="sng" algn="ctr">
-            <a:solidFill>
-              <a:srgbClr val="1F314F"/>
-            </a:solidFill>
-            <a:prstDash val="solid"/>
-            <a:miter lim="800000"/>
-          </a:ln>
-          <a:effectLst/>
-        </p:spPr>
-        <p:txBody>
-          <a:bodyPr wrap="none" lIns="0" tIns="0" rIns="0" bIns="0" rtlCol="0" anchor="ctr"/>
-          <a:lstStyle>
-            <a:defPPr>
-              <a:defRPr lang="en-US"/>
-            </a:defPPr>
-            <a:lvl1pPr marL="0" algn="l" defTabSz="914400" rtl="0" eaLnBrk="1" latinLnBrk="0" hangingPunct="1">
-              <a:defRPr sz="1800" kern="1200">
-                <a:solidFill>
-                  <a:schemeClr val="tx1"/>
-                </a:solidFill>
-                <a:latin typeface="+mn-lt"/>
-                <a:ea typeface="+mn-ea"/>
-                <a:cs typeface="+mn-cs"/>
-              </a:defRPr>
-            </a:lvl1pPr>
-            <a:lvl2pPr marL="457200" algn="l" defTabSz="914400" rtl="0" eaLnBrk="1" latinLnBrk="0" hangingPunct="1">
-              <a:defRPr sz="1800" kern="1200">
-                <a:solidFill>
-                  <a:schemeClr val="tx1"/>
-                </a:solidFill>
-                <a:latin typeface="+mn-lt"/>
-                <a:ea typeface="+mn-ea"/>
-                <a:cs typeface="+mn-cs"/>
-              </a:defRPr>
-            </a:lvl2pPr>
-            <a:lvl3pPr marL="914400" algn="l" defTabSz="914400" rtl="0" eaLnBrk="1" latinLnBrk="0" hangingPunct="1">
-              <a:defRPr sz="1800" kern="1200">
-                <a:solidFill>
-                  <a:schemeClr val="tx1"/>
-                </a:solidFill>
-                <a:latin typeface="+mn-lt"/>
-                <a:ea typeface="+mn-ea"/>
-                <a:cs typeface="+mn-cs"/>
-              </a:defRPr>
-            </a:lvl3pPr>
-            <a:lvl4pPr marL="1371600" algn="l" defTabSz="914400" rtl="0" eaLnBrk="1" latinLnBrk="0" hangingPunct="1">
-              <a:defRPr sz="1800" kern="1200">
-                <a:solidFill>
-                  <a:schemeClr val="tx1"/>
-                </a:solidFill>
-                <a:latin typeface="+mn-lt"/>
-                <a:ea typeface="+mn-ea"/>
-                <a:cs typeface="+mn-cs"/>
-              </a:defRPr>
-            </a:lvl4pPr>
-            <a:lvl5pPr marL="1828800" algn="l" defTabSz="914400" rtl="0" eaLnBrk="1" latinLnBrk="0" hangingPunct="1">
-              <a:defRPr sz="1800" kern="1200">
-                <a:solidFill>
-                  <a:schemeClr val="tx1"/>
-                </a:solidFill>
-                <a:latin typeface="+mn-lt"/>
-                <a:ea typeface="+mn-ea"/>
-                <a:cs typeface="+mn-cs"/>
-              </a:defRPr>
-            </a:lvl5pPr>
-            <a:lvl6pPr marL="2286000" algn="l" defTabSz="914400" rtl="0" eaLnBrk="1" latinLnBrk="0" hangingPunct="1">
-              <a:defRPr sz="1800" kern="1200">
-                <a:solidFill>
-                  <a:schemeClr val="tx1"/>
-                </a:solidFill>
-                <a:latin typeface="+mn-lt"/>
-                <a:ea typeface="+mn-ea"/>
-                <a:cs typeface="+mn-cs"/>
-              </a:defRPr>
-            </a:lvl6pPr>
-            <a:lvl7pPr marL="2743200" algn="l" defTabSz="914400" rtl="0" eaLnBrk="1" latinLnBrk="0" hangingPunct="1">
-              <a:defRPr sz="1800" kern="1200">
-                <a:solidFill>
-                  <a:schemeClr val="tx1"/>
-                </a:solidFill>
-                <a:latin typeface="+mn-lt"/>
-                <a:ea typeface="+mn-ea"/>
-                <a:cs typeface="+mn-cs"/>
-              </a:defRPr>
-            </a:lvl7pPr>
-            <a:lvl8pPr marL="3200400" algn="l" defTabSz="914400" rtl="0" eaLnBrk="1" latinLnBrk="0" hangingPunct="1">
-              <a:defRPr sz="1800" kern="1200">
-                <a:solidFill>
-                  <a:schemeClr val="tx1"/>
-                </a:solidFill>
-                <a:latin typeface="+mn-lt"/>
-                <a:ea typeface="+mn-ea"/>
-                <a:cs typeface="+mn-cs"/>
-              </a:defRPr>
-            </a:lvl8pPr>
-            <a:lvl9pPr marL="3657600" algn="l" defTabSz="914400" rtl="0" eaLnBrk="1" latinLnBrk="0" hangingPunct="1">
-              <a:defRPr sz="1800" kern="1200">
-                <a:solidFill>
-                  <a:schemeClr val="tx1"/>
-                </a:solidFill>
-                <a:latin typeface="+mn-lt"/>
-                <a:ea typeface="+mn-ea"/>
-                <a:cs typeface="+mn-cs"/>
-              </a:defRPr>
-            </a:lvl9pPr>
-          </a:lstStyle>
-          <a:p>
-            <a:pPr algn="ctr">
-              <a:buClrTx/>
-              <a:buFontTx/>
-              <a:buNone/>
-              <a:defRPr/>
-            </a:pPr>
-            <a:r>
-              <a:rPr lang="en-US" sz="1100" kern="0" dirty="0" smtClean="0">
-                <a:solidFill>
-                  <a:prstClr val="white"/>
-                </a:solidFill>
-                <a:latin typeface="Calibri" panose="020F0502020204030204"/>
-              </a:rPr>
-              <a:t>Predictable</a:t>
-            </a:r>
-            <a:br>
-              <a:rPr lang="en-US" sz="1100" kern="0" dirty="0" smtClean="0">
-                <a:solidFill>
-                  <a:prstClr val="white"/>
-                </a:solidFill>
-                <a:latin typeface="Calibri" panose="020F0502020204030204"/>
-              </a:rPr>
-            </a:br>
-            <a:r>
-              <a:rPr lang="en-US" sz="1100" kern="0" dirty="0" smtClean="0">
-                <a:solidFill>
-                  <a:prstClr val="white"/>
-                </a:solidFill>
-                <a:latin typeface="Calibri" panose="020F0502020204030204"/>
-              </a:rPr>
-              <a:t>execution</a:t>
-            </a:r>
-            <a:endParaRPr lang="en-US" sz="1100" kern="0" dirty="0">
-              <a:solidFill>
-                <a:prstClr val="white"/>
-              </a:solidFill>
-              <a:latin typeface="Calibri" panose="020F0502020204030204"/>
-            </a:endParaRPr>
-          </a:p>
-        </p:txBody>
-      </p:sp>
-      <p:sp>
-        <p:nvSpPr>
-          <p:cNvPr id="137" name="Rectangle 136">
-            <a:extLst>
-              <a:ext uri="{FF2B5EF4-FFF2-40B4-BE49-F238E27FC236}">
-                <a16:creationId xmlns:a16="http://schemas.microsoft.com/office/drawing/2014/main" id="{7036F706-440E-4331-86C8-24346D7D4BD7}"/>
-              </a:ext>
-            </a:extLst>
-          </p:cNvPr>
-          <p:cNvSpPr/>
-          <p:nvPr/>
-        </p:nvSpPr>
-        <p:spPr>
-          <a:xfrm>
-            <a:off x="6073146" y="2221380"/>
-            <a:ext cx="2473893" cy="537759"/>
-          </a:xfrm>
-          <a:prstGeom prst="rect">
-            <a:avLst/>
-          </a:prstGeom>
-          <a:solidFill>
-            <a:srgbClr val="438CC6"/>
-          </a:solidFill>
-          <a:ln w="19050" cap="flat" cmpd="sng" algn="ctr">
-            <a:solidFill>
-              <a:srgbClr val="324D7A"/>
-            </a:solidFill>
-            <a:prstDash val="solid"/>
-            <a:miter lim="800000"/>
-          </a:ln>
-          <a:effectLst/>
-        </p:spPr>
-        <p:txBody>
-          <a:bodyPr wrap="none" lIns="72000" tIns="0" rIns="0" bIns="0" rtlCol="0" anchor="ctr" anchorCtr="0"/>
-          <a:lstStyle>
-            <a:defPPr>
-              <a:defRPr lang="en-US"/>
-            </a:defPPr>
-            <a:lvl1pPr marL="0" algn="l" defTabSz="914400" rtl="0" eaLnBrk="1" latinLnBrk="0" hangingPunct="1">
-              <a:defRPr sz="1800" kern="1200">
-                <a:solidFill>
-                  <a:schemeClr val="tx1"/>
-                </a:solidFill>
-                <a:latin typeface="+mn-lt"/>
-                <a:ea typeface="+mn-ea"/>
-                <a:cs typeface="+mn-cs"/>
-              </a:defRPr>
-            </a:lvl1pPr>
-            <a:lvl2pPr marL="457200" algn="l" defTabSz="914400" rtl="0" eaLnBrk="1" latinLnBrk="0" hangingPunct="1">
-              <a:defRPr sz="1800" kern="1200">
-                <a:solidFill>
-                  <a:schemeClr val="tx1"/>
-                </a:solidFill>
-                <a:latin typeface="+mn-lt"/>
-                <a:ea typeface="+mn-ea"/>
-                <a:cs typeface="+mn-cs"/>
-              </a:defRPr>
-            </a:lvl2pPr>
-            <a:lvl3pPr marL="914400" algn="l" defTabSz="914400" rtl="0" eaLnBrk="1" latinLnBrk="0" hangingPunct="1">
-              <a:defRPr sz="1800" kern="1200">
-                <a:solidFill>
-                  <a:schemeClr val="tx1"/>
-                </a:solidFill>
-                <a:latin typeface="+mn-lt"/>
-                <a:ea typeface="+mn-ea"/>
-                <a:cs typeface="+mn-cs"/>
-              </a:defRPr>
-            </a:lvl3pPr>
-            <a:lvl4pPr marL="1371600" algn="l" defTabSz="914400" rtl="0" eaLnBrk="1" latinLnBrk="0" hangingPunct="1">
-              <a:defRPr sz="1800" kern="1200">
-                <a:solidFill>
-                  <a:schemeClr val="tx1"/>
-                </a:solidFill>
-                <a:latin typeface="+mn-lt"/>
-                <a:ea typeface="+mn-ea"/>
-                <a:cs typeface="+mn-cs"/>
-              </a:defRPr>
-            </a:lvl4pPr>
-            <a:lvl5pPr marL="1828800" algn="l" defTabSz="914400" rtl="0" eaLnBrk="1" latinLnBrk="0" hangingPunct="1">
-              <a:defRPr sz="1800" kern="1200">
-                <a:solidFill>
-                  <a:schemeClr val="tx1"/>
-                </a:solidFill>
-                <a:latin typeface="+mn-lt"/>
-                <a:ea typeface="+mn-ea"/>
-                <a:cs typeface="+mn-cs"/>
-              </a:defRPr>
-            </a:lvl5pPr>
-            <a:lvl6pPr marL="2286000" algn="l" defTabSz="914400" rtl="0" eaLnBrk="1" latinLnBrk="0" hangingPunct="1">
-              <a:defRPr sz="1800" kern="1200">
-                <a:solidFill>
-                  <a:schemeClr val="tx1"/>
-                </a:solidFill>
-                <a:latin typeface="+mn-lt"/>
-                <a:ea typeface="+mn-ea"/>
-                <a:cs typeface="+mn-cs"/>
-              </a:defRPr>
-            </a:lvl6pPr>
-            <a:lvl7pPr marL="2743200" algn="l" defTabSz="914400" rtl="0" eaLnBrk="1" latinLnBrk="0" hangingPunct="1">
-              <a:defRPr sz="1800" kern="1200">
-                <a:solidFill>
-                  <a:schemeClr val="tx1"/>
-                </a:solidFill>
-                <a:latin typeface="+mn-lt"/>
-                <a:ea typeface="+mn-ea"/>
-                <a:cs typeface="+mn-cs"/>
-              </a:defRPr>
-            </a:lvl7pPr>
-            <a:lvl8pPr marL="3200400" algn="l" defTabSz="914400" rtl="0" eaLnBrk="1" latinLnBrk="0" hangingPunct="1">
-              <a:defRPr sz="1800" kern="1200">
-                <a:solidFill>
-                  <a:schemeClr val="tx1"/>
-                </a:solidFill>
-                <a:latin typeface="+mn-lt"/>
-                <a:ea typeface="+mn-ea"/>
-                <a:cs typeface="+mn-cs"/>
-              </a:defRPr>
-            </a:lvl8pPr>
-            <a:lvl9pPr marL="3657600" algn="l" defTabSz="914400" rtl="0" eaLnBrk="1" latinLnBrk="0" hangingPunct="1">
-              <a:defRPr sz="1800" kern="1200">
-                <a:solidFill>
-                  <a:schemeClr val="tx1"/>
-                </a:solidFill>
-                <a:latin typeface="+mn-lt"/>
-                <a:ea typeface="+mn-ea"/>
-                <a:cs typeface="+mn-cs"/>
-              </a:defRPr>
-            </a:lvl9pPr>
-          </a:lstStyle>
-          <a:p>
-            <a:pPr>
-              <a:buClrTx/>
-              <a:buFontTx/>
-              <a:buNone/>
-            </a:pPr>
-            <a:r>
-              <a:rPr lang="en-US" b="1" kern="0" dirty="0">
-                <a:solidFill>
-                  <a:prstClr val="white"/>
-                </a:solidFill>
-                <a:latin typeface="Calibri" panose="020F0502020204030204"/>
-              </a:rPr>
-              <a:t>C++ API</a:t>
-            </a:r>
-            <a:r>
-              <a:rPr lang="en-US" kern="0" dirty="0">
-                <a:solidFill>
-                  <a:prstClr val="white"/>
-                </a:solidFill>
-                <a:latin typeface="Calibri" panose="020F0502020204030204"/>
-              </a:rPr>
-              <a:t/>
-            </a:r>
-            <a:br>
-              <a:rPr lang="en-US" kern="0" dirty="0">
-                <a:solidFill>
-                  <a:prstClr val="white"/>
-                </a:solidFill>
-                <a:latin typeface="Calibri" panose="020F0502020204030204"/>
-              </a:rPr>
-            </a:br>
-            <a:r>
-              <a:rPr lang="en-US" kern="0" dirty="0">
-                <a:solidFill>
-                  <a:prstClr val="white"/>
-                </a:solidFill>
-                <a:latin typeface="Calibri" panose="020F0502020204030204"/>
-              </a:rPr>
-              <a:t>(</a:t>
-            </a:r>
-            <a:r>
-              <a:rPr lang="en-US" kern="0" dirty="0" err="1">
-                <a:solidFill>
-                  <a:prstClr val="white"/>
-                </a:solidFill>
-                <a:latin typeface="Calibri" panose="020F0502020204030204"/>
-              </a:rPr>
-              <a:t>rclcpp</a:t>
-            </a:r>
-            <a:r>
-              <a:rPr lang="en-US" kern="0" dirty="0">
-                <a:solidFill>
-                  <a:prstClr val="white"/>
-                </a:solidFill>
-                <a:latin typeface="Calibri" panose="020F0502020204030204"/>
-              </a:rPr>
-              <a:t>)</a:t>
-            </a:r>
-          </a:p>
-        </p:txBody>
-      </p:sp>
-      <p:sp>
-        <p:nvSpPr>
-          <p:cNvPr id="138" name="Rectangle 137">
-            <a:extLst>
-              <a:ext uri="{FF2B5EF4-FFF2-40B4-BE49-F238E27FC236}">
-                <a16:creationId xmlns:a16="http://schemas.microsoft.com/office/drawing/2014/main" id="{F3FF6FA8-BE1D-467A-BE04-8FFD8DA52E69}"/>
-              </a:ext>
-            </a:extLst>
-          </p:cNvPr>
-          <p:cNvSpPr/>
-          <p:nvPr/>
-        </p:nvSpPr>
-        <p:spPr>
-          <a:xfrm>
-            <a:off x="3289290" y="5781717"/>
-            <a:ext cx="709842" cy="268880"/>
+            <a:off x="2999840" y="5182278"/>
+            <a:ext cx="638673" cy="270000"/>
           </a:xfrm>
           <a:prstGeom prst="rect">
             <a:avLst/>
@@ -18254,7 +17065,7 @@
             </a:lvl9pPr>
           </a:lstStyle>
           <a:p>
-            <a:pPr marL="0" marR="0" lvl="0" indent="0" algn="ctr" defTabSz="914400" rtl="0" eaLnBrk="1" fontAlgn="auto" latinLnBrk="0" hangingPunct="1">
+            <a:pPr marL="0" marR="0" lvl="0" indent="0" algn="ctr" defTabSz="822564" rtl="0" eaLnBrk="1" fontAlgn="auto" latinLnBrk="0" hangingPunct="1">
               <a:lnSpc>
                 <a:spcPct val="100000"/>
               </a:lnSpc>
@@ -18272,7 +17083,7 @@
               <a:defRPr/>
             </a:pPr>
             <a:r>
-              <a:rPr kumimoji="0" lang="en-US" sz="1800" b="0" i="0" u="none" strike="noStrike" kern="0" cap="none" spc="0" normalizeH="0" baseline="0" noProof="0" dirty="0" err="1" smtClean="0">
+              <a:rPr kumimoji="0" lang="en-US" sz="1600" b="0" i="0" u="none" strike="noStrike" kern="0" cap="none" spc="0" normalizeH="0" baseline="0" noProof="0" dirty="0" err="1">
                 <a:ln>
                   <a:noFill/>
                 </a:ln>
@@ -18288,7 +17099,7 @@
               </a:rPr>
               <a:t>uP</a:t>
             </a:r>
-            <a:endParaRPr kumimoji="0" lang="en-US" sz="1800" b="0" i="0" u="none" strike="noStrike" kern="0" cap="none" spc="0" normalizeH="0" baseline="0" noProof="0" dirty="0">
+            <a:endParaRPr kumimoji="0" lang="en-US" sz="1600" b="0" i="0" u="none" strike="noStrike" kern="0" cap="none" spc="0" normalizeH="0" baseline="0" noProof="0" dirty="0">
               <a:ln>
                 <a:noFill/>
               </a:ln>
@@ -18307,155 +17118,10 @@
       </p:sp>
       <p:sp>
         <p:nvSpPr>
-          <p:cNvPr id="139" name="TextBox 72">
+          <p:cNvPr id="74" name="Rectangle 73">
             <a:extLst>
               <a:ext uri="{FF2B5EF4-FFF2-40B4-BE49-F238E27FC236}">
-                <a16:creationId xmlns:a16="http://schemas.microsoft.com/office/drawing/2014/main" id="{17915CCF-6F0D-4EFC-AD45-B648779CF69C}"/>
-              </a:ext>
-            </a:extLst>
-          </p:cNvPr>
-          <p:cNvSpPr txBox="1"/>
-          <p:nvPr/>
-        </p:nvSpPr>
-        <p:spPr>
-          <a:xfrm>
-            <a:off x="4374186" y="1551689"/>
-            <a:ext cx="529730" cy="461665"/>
-          </a:xfrm>
-          <a:prstGeom prst="rect">
-            <a:avLst/>
-          </a:prstGeom>
-          <a:solidFill>
-            <a:scrgbClr r="0" g="0" b="0">
-              <a:alpha val="0"/>
-            </a:scrgbClr>
-          </a:solidFill>
-        </p:spPr>
-        <p:txBody>
-          <a:bodyPr wrap="square" rtlCol="0">
-            <a:spAutoFit/>
-          </a:bodyPr>
-          <a:lstStyle>
-            <a:defPPr>
-              <a:defRPr lang="en-US"/>
-            </a:defPPr>
-            <a:lvl1pPr marL="0" algn="l" defTabSz="914400" rtl="0" eaLnBrk="1" latinLnBrk="0" hangingPunct="1">
-              <a:defRPr sz="1800" kern="1200">
-                <a:solidFill>
-                  <a:schemeClr val="tx1"/>
-                </a:solidFill>
-                <a:latin typeface="+mn-lt"/>
-                <a:ea typeface="+mn-ea"/>
-                <a:cs typeface="+mn-cs"/>
-              </a:defRPr>
-            </a:lvl1pPr>
-            <a:lvl2pPr marL="457200" algn="l" defTabSz="914400" rtl="0" eaLnBrk="1" latinLnBrk="0" hangingPunct="1">
-              <a:defRPr sz="1800" kern="1200">
-                <a:solidFill>
-                  <a:schemeClr val="tx1"/>
-                </a:solidFill>
-                <a:latin typeface="+mn-lt"/>
-                <a:ea typeface="+mn-ea"/>
-                <a:cs typeface="+mn-cs"/>
-              </a:defRPr>
-            </a:lvl2pPr>
-            <a:lvl3pPr marL="914400" algn="l" defTabSz="914400" rtl="0" eaLnBrk="1" latinLnBrk="0" hangingPunct="1">
-              <a:defRPr sz="1800" kern="1200">
-                <a:solidFill>
-                  <a:schemeClr val="tx1"/>
-                </a:solidFill>
-                <a:latin typeface="+mn-lt"/>
-                <a:ea typeface="+mn-ea"/>
-                <a:cs typeface="+mn-cs"/>
-              </a:defRPr>
-            </a:lvl3pPr>
-            <a:lvl4pPr marL="1371600" algn="l" defTabSz="914400" rtl="0" eaLnBrk="1" latinLnBrk="0" hangingPunct="1">
-              <a:defRPr sz="1800" kern="1200">
-                <a:solidFill>
-                  <a:schemeClr val="tx1"/>
-                </a:solidFill>
-                <a:latin typeface="+mn-lt"/>
-                <a:ea typeface="+mn-ea"/>
-                <a:cs typeface="+mn-cs"/>
-              </a:defRPr>
-            </a:lvl4pPr>
-            <a:lvl5pPr marL="1828800" algn="l" defTabSz="914400" rtl="0" eaLnBrk="1" latinLnBrk="0" hangingPunct="1">
-              <a:defRPr sz="1800" kern="1200">
-                <a:solidFill>
-                  <a:schemeClr val="tx1"/>
-                </a:solidFill>
-                <a:latin typeface="+mn-lt"/>
-                <a:ea typeface="+mn-ea"/>
-                <a:cs typeface="+mn-cs"/>
-              </a:defRPr>
-            </a:lvl5pPr>
-            <a:lvl6pPr marL="2286000" algn="l" defTabSz="914400" rtl="0" eaLnBrk="1" latinLnBrk="0" hangingPunct="1">
-              <a:defRPr sz="1800" kern="1200">
-                <a:solidFill>
-                  <a:schemeClr val="tx1"/>
-                </a:solidFill>
-                <a:latin typeface="+mn-lt"/>
-                <a:ea typeface="+mn-ea"/>
-                <a:cs typeface="+mn-cs"/>
-              </a:defRPr>
-            </a:lvl6pPr>
-            <a:lvl7pPr marL="2743200" algn="l" defTabSz="914400" rtl="0" eaLnBrk="1" latinLnBrk="0" hangingPunct="1">
-              <a:defRPr sz="1800" kern="1200">
-                <a:solidFill>
-                  <a:schemeClr val="tx1"/>
-                </a:solidFill>
-                <a:latin typeface="+mn-lt"/>
-                <a:ea typeface="+mn-ea"/>
-                <a:cs typeface="+mn-cs"/>
-              </a:defRPr>
-            </a:lvl7pPr>
-            <a:lvl8pPr marL="3200400" algn="l" defTabSz="914400" rtl="0" eaLnBrk="1" latinLnBrk="0" hangingPunct="1">
-              <a:defRPr sz="1800" kern="1200">
-                <a:solidFill>
-                  <a:schemeClr val="tx1"/>
-                </a:solidFill>
-                <a:latin typeface="+mn-lt"/>
-                <a:ea typeface="+mn-ea"/>
-                <a:cs typeface="+mn-cs"/>
-              </a:defRPr>
-            </a:lvl8pPr>
-            <a:lvl9pPr marL="3657600" algn="l" defTabSz="914400" rtl="0" eaLnBrk="1" latinLnBrk="0" hangingPunct="1">
-              <a:defRPr sz="1800" kern="1200">
-                <a:solidFill>
-                  <a:schemeClr val="tx1"/>
-                </a:solidFill>
-                <a:latin typeface="+mn-lt"/>
-                <a:ea typeface="+mn-ea"/>
-                <a:cs typeface="+mn-cs"/>
-              </a:defRPr>
-            </a:lvl9pPr>
-          </a:lstStyle>
-          <a:p>
-            <a:pPr>
-              <a:buClrTx/>
-              <a:buFontTx/>
-              <a:buNone/>
-            </a:pPr>
-            <a:r>
-              <a:rPr lang="en-US" sz="2400" dirty="0">
-                <a:solidFill>
-                  <a:prstClr val="white">
-                    <a:lumMod val="65000"/>
-                  </a:prstClr>
-                </a:solidFill>
-                <a:latin typeface="Calibri" panose="020F0502020204030204"/>
-              </a:rPr>
-              <a:t>…</a:t>
-            </a:r>
-          </a:p>
-        </p:txBody>
-      </p:sp>
-      <p:sp>
-        <p:nvSpPr>
-          <p:cNvPr id="140" name="Rectangle 139">
-            <a:extLst>
-              <a:ext uri="{FF2B5EF4-FFF2-40B4-BE49-F238E27FC236}">
-                <a16:creationId xmlns:a16="http://schemas.microsoft.com/office/drawing/2014/main" id="{68C637CA-E15F-4BDE-A708-CE02ABFED94B}"/>
+                <a16:creationId xmlns:a16="http://schemas.microsoft.com/office/drawing/2014/main" id="{A52CACA2-FA7F-4BFD-BA45-101D93070FF8}"/>
               </a:ext>
             </a:extLst>
           </p:cNvPr>
@@ -18464,8 +17130,8 @@
         </p:nvSpPr>
         <p:spPr>
           <a:xfrm>
-            <a:off x="6073146" y="1455551"/>
-            <a:ext cx="1075519" cy="537759"/>
+            <a:off x="6468923" y="1604182"/>
+            <a:ext cx="967687" cy="483843"/>
           </a:xfrm>
           <a:prstGeom prst="rect">
             <a:avLst/>
@@ -18584,7 +17250,7 @@
             </a:lvl9pPr>
           </a:lstStyle>
           <a:p>
-            <a:pPr marL="0" marR="0" lvl="0" indent="0" algn="ctr" defTabSz="914400" rtl="0" eaLnBrk="1" fontAlgn="auto" latinLnBrk="0" hangingPunct="1">
+            <a:pPr marL="0" marR="0" lvl="0" indent="0" algn="ctr" defTabSz="822564" rtl="0" eaLnBrk="1" fontAlgn="auto" latinLnBrk="0" hangingPunct="1">
               <a:lnSpc>
                 <a:spcPct val="100000"/>
               </a:lnSpc>
@@ -18602,7 +17268,7 @@
               <a:defRPr/>
             </a:pPr>
             <a:r>
-              <a:rPr kumimoji="0" lang="en-US" sz="1600" b="0" i="0" u="none" strike="noStrike" kern="0" cap="none" spc="0" normalizeH="0" baseline="0" noProof="0" dirty="0">
+              <a:rPr kumimoji="0" lang="en-US" sz="1400" b="0" i="0" u="none" strike="noStrike" kern="0" cap="none" spc="0" normalizeH="0" baseline="0" noProof="0" dirty="0">
                 <a:ln>
                   <a:noFill/>
                 </a:ln>
@@ -18619,7 +17285,7 @@
               <a:t>Application</a:t>
             </a:r>
             <a:br>
-              <a:rPr kumimoji="0" lang="en-US" sz="1600" b="0" i="0" u="none" strike="noStrike" kern="0" cap="none" spc="0" normalizeH="0" baseline="0" noProof="0" dirty="0">
+              <a:rPr kumimoji="0" lang="en-US" sz="1400" b="0" i="0" u="none" strike="noStrike" kern="0" cap="none" spc="0" normalizeH="0" baseline="0" noProof="0" dirty="0">
                 <a:ln>
                   <a:noFill/>
                 </a:ln>
@@ -18635,7 +17301,7 @@
               </a:rPr>
             </a:br>
             <a:r>
-              <a:rPr kumimoji="0" lang="en-US" sz="1600" b="0" i="0" u="none" strike="noStrike" kern="0" cap="none" spc="0" normalizeH="0" baseline="0" noProof="0" dirty="0">
+              <a:rPr kumimoji="0" lang="en-US" sz="1400" b="0" i="0" u="none" strike="noStrike" kern="0" cap="none" spc="0" normalizeH="0" baseline="0" noProof="0" dirty="0">
                 <a:ln>
                   <a:noFill/>
                 </a:ln>
@@ -18656,10 +17322,10 @@
       </p:sp>
       <p:sp>
         <p:nvSpPr>
-          <p:cNvPr id="141" name="Rectangle 140">
+          <p:cNvPr id="75" name="Rectangle 74">
             <a:extLst>
               <a:ext uri="{FF2B5EF4-FFF2-40B4-BE49-F238E27FC236}">
-                <a16:creationId xmlns:a16="http://schemas.microsoft.com/office/drawing/2014/main" id="{82178F51-028C-4184-9F8B-01114BBC2DFE}"/>
+                <a16:creationId xmlns:a16="http://schemas.microsoft.com/office/drawing/2014/main" id="{86BD70AF-B75A-431B-9171-0B2643DAAC35}"/>
               </a:ext>
             </a:extLst>
           </p:cNvPr>
@@ -18668,8 +17334,8 @@
         </p:nvSpPr>
         <p:spPr>
           <a:xfrm>
-            <a:off x="3464214" y="3922780"/>
-            <a:ext cx="703224" cy="537759"/>
+            <a:off x="3157224" y="3509721"/>
+            <a:ext cx="632718" cy="483843"/>
           </a:xfrm>
           <a:prstGeom prst="rect">
             <a:avLst/>
@@ -18790,7 +17456,7 @@
               <a:buNone/>
             </a:pPr>
             <a:r>
-              <a:rPr lang="en-US" kern="0" dirty="0">
+              <a:rPr lang="en-US" sz="1600" kern="0" dirty="0">
                 <a:solidFill>
                   <a:prstClr val="white"/>
                 </a:solidFill>
@@ -18806,7 +17472,7 @@
               <a:buNone/>
             </a:pPr>
             <a:r>
-              <a:rPr lang="en-US" kern="0" dirty="0">
+              <a:rPr lang="en-US" sz="1600" kern="0" dirty="0">
                 <a:solidFill>
                   <a:prstClr val="white"/>
                 </a:solidFill>
@@ -18819,14 +17485,20 @@
       </p:sp>
       <p:sp>
         <p:nvSpPr>
-          <p:cNvPr id="142" name="TextBox 78"/>
+          <p:cNvPr id="76" name="TextBox 78">
+            <a:extLst>
+              <a:ext uri="{FF2B5EF4-FFF2-40B4-BE49-F238E27FC236}">
+                <a16:creationId xmlns:a16="http://schemas.microsoft.com/office/drawing/2014/main" id="{7397B02E-5C68-4DF9-B83C-84914DABD04D}"/>
+              </a:ext>
+            </a:extLst>
+          </p:cNvPr>
           <p:cNvSpPr txBox="1"/>
           <p:nvPr/>
         </p:nvSpPr>
         <p:spPr>
           <a:xfrm>
-            <a:off x="4137419" y="4257950"/>
-            <a:ext cx="787395" cy="600164"/>
+            <a:off x="3793414" y="3818904"/>
+            <a:ext cx="681597" cy="507831"/>
           </a:xfrm>
           <a:prstGeom prst="rect">
             <a:avLst/>
@@ -18939,7 +17611,7 @@
               <a:buNone/>
             </a:pPr>
             <a:r>
-              <a:rPr lang="en-US" sz="1100" dirty="0" smtClean="0">
+              <a:rPr lang="en-US" sz="900" dirty="0">
                 <a:solidFill>
                   <a:srgbClr val="000000"/>
                 </a:solidFill>
@@ -18948,7 +17620,7 @@
               <a:t>Ethernet,</a:t>
             </a:r>
             <a:br>
-              <a:rPr lang="en-US" sz="1100" dirty="0" smtClean="0">
+              <a:rPr lang="en-US" sz="900" dirty="0">
                 <a:solidFill>
                   <a:srgbClr val="000000"/>
                 </a:solidFill>
@@ -18956,7 +17628,7 @@
               </a:rPr>
             </a:br>
             <a:r>
-              <a:rPr lang="en-US" sz="1100" dirty="0" smtClean="0">
+              <a:rPr lang="en-US" sz="900" dirty="0">
                 <a:solidFill>
                   <a:srgbClr val="000000"/>
                 </a:solidFill>
@@ -18965,7 +17637,7 @@
               <a:t>Bluetooth,</a:t>
             </a:r>
             <a:br>
-              <a:rPr lang="en-US" sz="1100" dirty="0" smtClean="0">
+              <a:rPr lang="en-US" sz="900" dirty="0">
                 <a:solidFill>
                   <a:srgbClr val="000000"/>
                 </a:solidFill>
@@ -18973,7 +17645,7 @@
               </a:rPr>
             </a:br>
             <a:r>
-              <a:rPr lang="en-US" sz="1100" dirty="0" smtClean="0">
+              <a:rPr lang="en-US" sz="900" dirty="0">
                 <a:solidFill>
                   <a:srgbClr val="000000"/>
                 </a:solidFill>
@@ -18981,21 +17653,15 @@
               </a:rPr>
               <a:t>Serial</a:t>
             </a:r>
-            <a:endParaRPr lang="en-US" sz="1100" dirty="0">
-              <a:solidFill>
-                <a:srgbClr val="000000"/>
-              </a:solidFill>
-              <a:latin typeface="Calibri" panose="020F0502020204030204"/>
-            </a:endParaRPr>
           </a:p>
         </p:txBody>
       </p:sp>
       <p:sp>
         <p:nvSpPr>
-          <p:cNvPr id="143" name="Rectangle 142">
+          <p:cNvPr id="77" name="Rectangle 76">
             <a:extLst>
               <a:ext uri="{FF2B5EF4-FFF2-40B4-BE49-F238E27FC236}">
-                <a16:creationId xmlns:a16="http://schemas.microsoft.com/office/drawing/2014/main" id="{68C637CA-E15F-4BDE-A708-CE02ABFED94B}"/>
+                <a16:creationId xmlns:a16="http://schemas.microsoft.com/office/drawing/2014/main" id="{EC94755B-40E1-4312-9C03-54841E7F26FE}"/>
               </a:ext>
             </a:extLst>
           </p:cNvPr>
@@ -19004,8 +17670,8 @@
         </p:nvSpPr>
         <p:spPr>
           <a:xfrm>
-            <a:off x="4906823" y="1455551"/>
-            <a:ext cx="1075519" cy="537759"/>
+            <a:off x="4669669" y="1604182"/>
+            <a:ext cx="967687" cy="483843"/>
           </a:xfrm>
           <a:prstGeom prst="rect">
             <a:avLst/>
@@ -19124,7 +17790,7 @@
             </a:lvl9pPr>
           </a:lstStyle>
           <a:p>
-            <a:pPr marL="0" marR="0" lvl="0" indent="0" algn="ctr" defTabSz="914400" rtl="0" eaLnBrk="1" fontAlgn="auto" latinLnBrk="0" hangingPunct="1">
+            <a:pPr marL="0" marR="0" lvl="0" indent="0" algn="ctr" defTabSz="822564" rtl="0" eaLnBrk="1" fontAlgn="auto" latinLnBrk="0" hangingPunct="1">
               <a:lnSpc>
                 <a:spcPct val="100000"/>
               </a:lnSpc>
@@ -19142,7 +17808,7 @@
               <a:defRPr/>
             </a:pPr>
             <a:r>
-              <a:rPr kumimoji="0" lang="en-US" sz="1600" b="0" i="0" u="none" strike="noStrike" kern="0" cap="none" spc="0" normalizeH="0" baseline="0" noProof="0" dirty="0">
+              <a:rPr kumimoji="0" lang="en-US" sz="1400" b="0" i="0" u="none" strike="noStrike" kern="0" cap="none" spc="0" normalizeH="0" baseline="0" noProof="0" dirty="0">
                 <a:ln>
                   <a:noFill/>
                 </a:ln>
@@ -19159,7 +17825,7 @@
               <a:t>Application</a:t>
             </a:r>
             <a:br>
-              <a:rPr kumimoji="0" lang="en-US" sz="1600" b="0" i="0" u="none" strike="noStrike" kern="0" cap="none" spc="0" normalizeH="0" baseline="0" noProof="0" dirty="0">
+              <a:rPr kumimoji="0" lang="en-US" sz="1400" b="0" i="0" u="none" strike="noStrike" kern="0" cap="none" spc="0" normalizeH="0" baseline="0" noProof="0" dirty="0">
                 <a:ln>
                   <a:noFill/>
                 </a:ln>
@@ -19175,7 +17841,7 @@
               </a:rPr>
             </a:br>
             <a:r>
-              <a:rPr kumimoji="0" lang="en-US" sz="1600" b="0" i="0" u="none" strike="noStrike" kern="0" cap="none" spc="0" normalizeH="0" baseline="0" noProof="0" dirty="0">
+              <a:rPr kumimoji="0" lang="en-US" sz="1400" b="0" i="0" u="none" strike="noStrike" kern="0" cap="none" spc="0" normalizeH="0" baseline="0" noProof="0" dirty="0">
                 <a:ln>
                   <a:noFill/>
                 </a:ln>
@@ -19196,10 +17862,10 @@
       </p:sp>
       <p:sp>
         <p:nvSpPr>
-          <p:cNvPr id="144" name="TextBox 81">
+          <p:cNvPr id="78" name="TextBox 81">
             <a:extLst>
               <a:ext uri="{FF2B5EF4-FFF2-40B4-BE49-F238E27FC236}">
-                <a16:creationId xmlns:a16="http://schemas.microsoft.com/office/drawing/2014/main" id="{17915CCF-6F0D-4EFC-AD45-B648779CF69C}"/>
+                <a16:creationId xmlns:a16="http://schemas.microsoft.com/office/drawing/2014/main" id="{18EC6DDC-7EAD-4B6B-A4A0-5225A79CEE7C}"/>
               </a:ext>
             </a:extLst>
           </p:cNvPr>
@@ -19208,8 +17874,8 @@
         </p:nvSpPr>
         <p:spPr>
           <a:xfrm>
-            <a:off x="7152975" y="1551689"/>
-            <a:ext cx="529730" cy="461665"/>
+            <a:off x="5637355" y="1519829"/>
+            <a:ext cx="831567" cy="523220"/>
           </a:xfrm>
           <a:prstGeom prst="rect">
             <a:avLst/>
@@ -19320,13 +17986,13 @@
             </a:lvl9pPr>
           </a:lstStyle>
           <a:p>
-            <a:pPr>
+            <a:pPr algn="ctr">
               <a:buClrTx/>
               <a:buFontTx/>
               <a:buNone/>
             </a:pPr>
             <a:r>
-              <a:rPr lang="en-US" sz="2400" dirty="0">
+              <a:rPr lang="en-US" sz="2800" dirty="0">
                 <a:solidFill>
                   <a:prstClr val="white">
                     <a:lumMod val="65000"/>
@@ -19341,10 +18007,10 @@
       </p:sp>
       <p:sp>
         <p:nvSpPr>
-          <p:cNvPr id="145" name="Rectangle 144">
+          <p:cNvPr id="79" name="Rectangle 78">
             <a:extLst>
               <a:ext uri="{FF2B5EF4-FFF2-40B4-BE49-F238E27FC236}">
-                <a16:creationId xmlns:a16="http://schemas.microsoft.com/office/drawing/2014/main" id="{07844580-9613-44A2-B61D-85F8FEF78C5C}"/>
+                <a16:creationId xmlns:a16="http://schemas.microsoft.com/office/drawing/2014/main" id="{45D31222-DADC-41B7-8639-73EDE27C3682}"/>
               </a:ext>
             </a:extLst>
           </p:cNvPr>
@@ -19353,321 +18019,8 @@
         </p:nvSpPr>
         <p:spPr>
           <a:xfrm>
-            <a:off x="7791634" y="2304112"/>
-            <a:ext cx="661858" cy="372295"/>
-          </a:xfrm>
-          <a:prstGeom prst="rect">
-            <a:avLst/>
-          </a:prstGeom>
-          <a:solidFill>
-            <a:srgbClr val="324D7A"/>
-          </a:solidFill>
-          <a:ln w="19050" cap="flat" cmpd="sng" algn="ctr">
-            <a:solidFill>
-              <a:srgbClr val="1F314F"/>
-            </a:solidFill>
-            <a:prstDash val="solid"/>
-            <a:miter lim="800000"/>
-          </a:ln>
-          <a:effectLst/>
-        </p:spPr>
-        <p:txBody>
-          <a:bodyPr lIns="0" tIns="0" rIns="0" bIns="0" rtlCol="0" anchor="ctr"/>
-          <a:lstStyle>
-            <a:defPPr>
-              <a:defRPr lang="en-US"/>
-            </a:defPPr>
-            <a:lvl1pPr marL="0" algn="l" defTabSz="914400" rtl="0" eaLnBrk="1" latinLnBrk="0" hangingPunct="1">
-              <a:defRPr sz="1800" kern="1200">
-                <a:solidFill>
-                  <a:schemeClr val="tx1"/>
-                </a:solidFill>
-                <a:latin typeface="+mn-lt"/>
-                <a:ea typeface="+mn-ea"/>
-                <a:cs typeface="+mn-cs"/>
-              </a:defRPr>
-            </a:lvl1pPr>
-            <a:lvl2pPr marL="457200" algn="l" defTabSz="914400" rtl="0" eaLnBrk="1" latinLnBrk="0" hangingPunct="1">
-              <a:defRPr sz="1800" kern="1200">
-                <a:solidFill>
-                  <a:schemeClr val="tx1"/>
-                </a:solidFill>
-                <a:latin typeface="+mn-lt"/>
-                <a:ea typeface="+mn-ea"/>
-                <a:cs typeface="+mn-cs"/>
-              </a:defRPr>
-            </a:lvl2pPr>
-            <a:lvl3pPr marL="914400" algn="l" defTabSz="914400" rtl="0" eaLnBrk="1" latinLnBrk="0" hangingPunct="1">
-              <a:defRPr sz="1800" kern="1200">
-                <a:solidFill>
-                  <a:schemeClr val="tx1"/>
-                </a:solidFill>
-                <a:latin typeface="+mn-lt"/>
-                <a:ea typeface="+mn-ea"/>
-                <a:cs typeface="+mn-cs"/>
-              </a:defRPr>
-            </a:lvl3pPr>
-            <a:lvl4pPr marL="1371600" algn="l" defTabSz="914400" rtl="0" eaLnBrk="1" latinLnBrk="0" hangingPunct="1">
-              <a:defRPr sz="1800" kern="1200">
-                <a:solidFill>
-                  <a:schemeClr val="tx1"/>
-                </a:solidFill>
-                <a:latin typeface="+mn-lt"/>
-                <a:ea typeface="+mn-ea"/>
-                <a:cs typeface="+mn-cs"/>
-              </a:defRPr>
-            </a:lvl4pPr>
-            <a:lvl5pPr marL="1828800" algn="l" defTabSz="914400" rtl="0" eaLnBrk="1" latinLnBrk="0" hangingPunct="1">
-              <a:defRPr sz="1800" kern="1200">
-                <a:solidFill>
-                  <a:schemeClr val="tx1"/>
-                </a:solidFill>
-                <a:latin typeface="+mn-lt"/>
-                <a:ea typeface="+mn-ea"/>
-                <a:cs typeface="+mn-cs"/>
-              </a:defRPr>
-            </a:lvl5pPr>
-            <a:lvl6pPr marL="2286000" algn="l" defTabSz="914400" rtl="0" eaLnBrk="1" latinLnBrk="0" hangingPunct="1">
-              <a:defRPr sz="1800" kern="1200">
-                <a:solidFill>
-                  <a:schemeClr val="tx1"/>
-                </a:solidFill>
-                <a:latin typeface="+mn-lt"/>
-                <a:ea typeface="+mn-ea"/>
-                <a:cs typeface="+mn-cs"/>
-              </a:defRPr>
-            </a:lvl6pPr>
-            <a:lvl7pPr marL="2743200" algn="l" defTabSz="914400" rtl="0" eaLnBrk="1" latinLnBrk="0" hangingPunct="1">
-              <a:defRPr sz="1800" kern="1200">
-                <a:solidFill>
-                  <a:schemeClr val="tx1"/>
-                </a:solidFill>
-                <a:latin typeface="+mn-lt"/>
-                <a:ea typeface="+mn-ea"/>
-                <a:cs typeface="+mn-cs"/>
-              </a:defRPr>
-            </a:lvl7pPr>
-            <a:lvl8pPr marL="3200400" algn="l" defTabSz="914400" rtl="0" eaLnBrk="1" latinLnBrk="0" hangingPunct="1">
-              <a:defRPr sz="1800" kern="1200">
-                <a:solidFill>
-                  <a:schemeClr val="tx1"/>
-                </a:solidFill>
-                <a:latin typeface="+mn-lt"/>
-                <a:ea typeface="+mn-ea"/>
-                <a:cs typeface="+mn-cs"/>
-              </a:defRPr>
-            </a:lvl8pPr>
-            <a:lvl9pPr marL="3657600" algn="l" defTabSz="914400" rtl="0" eaLnBrk="1" latinLnBrk="0" hangingPunct="1">
-              <a:defRPr sz="1800" kern="1200">
-                <a:solidFill>
-                  <a:schemeClr val="tx1"/>
-                </a:solidFill>
-                <a:latin typeface="+mn-lt"/>
-                <a:ea typeface="+mn-ea"/>
-                <a:cs typeface="+mn-cs"/>
-              </a:defRPr>
-            </a:lvl9pPr>
-          </a:lstStyle>
-          <a:p>
-            <a:pPr algn="ctr">
-              <a:buClrTx/>
-              <a:buFontTx/>
-              <a:buNone/>
-              <a:defRPr/>
-            </a:pPr>
-            <a:r>
-              <a:rPr lang="en-US" sz="1100" kern="0" dirty="0">
-                <a:solidFill>
-                  <a:prstClr val="white"/>
-                </a:solidFill>
-                <a:latin typeface="Calibri" panose="020F0502020204030204"/>
-              </a:rPr>
-              <a:t>Embedded transform</a:t>
-            </a:r>
-          </a:p>
-        </p:txBody>
-      </p:sp>
-      <p:sp>
-        <p:nvSpPr>
-          <p:cNvPr id="146" name="Rectangle 145">
-            <a:extLst>
-              <a:ext uri="{FF2B5EF4-FFF2-40B4-BE49-F238E27FC236}">
-                <a16:creationId xmlns:a16="http://schemas.microsoft.com/office/drawing/2014/main" id="{C1A990AF-7589-4F79-A243-C61573776F09}"/>
-              </a:ext>
-            </a:extLst>
-          </p:cNvPr>
-          <p:cNvSpPr/>
-          <p:nvPr/>
-        </p:nvSpPr>
-        <p:spPr>
-          <a:xfrm>
-            <a:off x="7040042" y="2304112"/>
-            <a:ext cx="661858" cy="372295"/>
-          </a:xfrm>
-          <a:prstGeom prst="rect">
-            <a:avLst/>
-          </a:prstGeom>
-          <a:solidFill>
-            <a:srgbClr val="324D7A"/>
-          </a:solidFill>
-          <a:ln w="19050" cap="flat" cmpd="sng" algn="ctr">
-            <a:solidFill>
-              <a:srgbClr val="1F314F"/>
-            </a:solidFill>
-            <a:prstDash val="solid"/>
-            <a:miter lim="800000"/>
-          </a:ln>
-          <a:effectLst/>
-        </p:spPr>
-        <p:txBody>
-          <a:bodyPr lIns="0" tIns="0" rIns="0" bIns="0" rtlCol="0" anchor="ctr"/>
-          <a:lstStyle>
-            <a:defPPr>
-              <a:defRPr lang="en-US"/>
-            </a:defPPr>
-            <a:lvl1pPr marL="0" algn="l" defTabSz="914400" rtl="0" eaLnBrk="1" latinLnBrk="0" hangingPunct="1">
-              <a:defRPr sz="1800" kern="1200">
-                <a:solidFill>
-                  <a:schemeClr val="tx1"/>
-                </a:solidFill>
-                <a:latin typeface="+mn-lt"/>
-                <a:ea typeface="+mn-ea"/>
-                <a:cs typeface="+mn-cs"/>
-              </a:defRPr>
-            </a:lvl1pPr>
-            <a:lvl2pPr marL="457200" algn="l" defTabSz="914400" rtl="0" eaLnBrk="1" latinLnBrk="0" hangingPunct="1">
-              <a:defRPr sz="1800" kern="1200">
-                <a:solidFill>
-                  <a:schemeClr val="tx1"/>
-                </a:solidFill>
-                <a:latin typeface="+mn-lt"/>
-                <a:ea typeface="+mn-ea"/>
-                <a:cs typeface="+mn-cs"/>
-              </a:defRPr>
-            </a:lvl2pPr>
-            <a:lvl3pPr marL="914400" algn="l" defTabSz="914400" rtl="0" eaLnBrk="1" latinLnBrk="0" hangingPunct="1">
-              <a:defRPr sz="1800" kern="1200">
-                <a:solidFill>
-                  <a:schemeClr val="tx1"/>
-                </a:solidFill>
-                <a:latin typeface="+mn-lt"/>
-                <a:ea typeface="+mn-ea"/>
-                <a:cs typeface="+mn-cs"/>
-              </a:defRPr>
-            </a:lvl3pPr>
-            <a:lvl4pPr marL="1371600" algn="l" defTabSz="914400" rtl="0" eaLnBrk="1" latinLnBrk="0" hangingPunct="1">
-              <a:defRPr sz="1800" kern="1200">
-                <a:solidFill>
-                  <a:schemeClr val="tx1"/>
-                </a:solidFill>
-                <a:latin typeface="+mn-lt"/>
-                <a:ea typeface="+mn-ea"/>
-                <a:cs typeface="+mn-cs"/>
-              </a:defRPr>
-            </a:lvl4pPr>
-            <a:lvl5pPr marL="1828800" algn="l" defTabSz="914400" rtl="0" eaLnBrk="1" latinLnBrk="0" hangingPunct="1">
-              <a:defRPr sz="1800" kern="1200">
-                <a:solidFill>
-                  <a:schemeClr val="tx1"/>
-                </a:solidFill>
-                <a:latin typeface="+mn-lt"/>
-                <a:ea typeface="+mn-ea"/>
-                <a:cs typeface="+mn-cs"/>
-              </a:defRPr>
-            </a:lvl5pPr>
-            <a:lvl6pPr marL="2286000" algn="l" defTabSz="914400" rtl="0" eaLnBrk="1" latinLnBrk="0" hangingPunct="1">
-              <a:defRPr sz="1800" kern="1200">
-                <a:solidFill>
-                  <a:schemeClr val="tx1"/>
-                </a:solidFill>
-                <a:latin typeface="+mn-lt"/>
-                <a:ea typeface="+mn-ea"/>
-                <a:cs typeface="+mn-cs"/>
-              </a:defRPr>
-            </a:lvl6pPr>
-            <a:lvl7pPr marL="2743200" algn="l" defTabSz="914400" rtl="0" eaLnBrk="1" latinLnBrk="0" hangingPunct="1">
-              <a:defRPr sz="1800" kern="1200">
-                <a:solidFill>
-                  <a:schemeClr val="tx1"/>
-                </a:solidFill>
-                <a:latin typeface="+mn-lt"/>
-                <a:ea typeface="+mn-ea"/>
-                <a:cs typeface="+mn-cs"/>
-              </a:defRPr>
-            </a:lvl7pPr>
-            <a:lvl8pPr marL="3200400" algn="l" defTabSz="914400" rtl="0" eaLnBrk="1" latinLnBrk="0" hangingPunct="1">
-              <a:defRPr sz="1800" kern="1200">
-                <a:solidFill>
-                  <a:schemeClr val="tx1"/>
-                </a:solidFill>
-                <a:latin typeface="+mn-lt"/>
-                <a:ea typeface="+mn-ea"/>
-                <a:cs typeface="+mn-cs"/>
-              </a:defRPr>
-            </a:lvl8pPr>
-            <a:lvl9pPr marL="3657600" algn="l" defTabSz="914400" rtl="0" eaLnBrk="1" latinLnBrk="0" hangingPunct="1">
-              <a:defRPr sz="1800" kern="1200">
-                <a:solidFill>
-                  <a:schemeClr val="tx1"/>
-                </a:solidFill>
-                <a:latin typeface="+mn-lt"/>
-                <a:ea typeface="+mn-ea"/>
-                <a:cs typeface="+mn-cs"/>
-              </a:defRPr>
-            </a:lvl9pPr>
-          </a:lstStyle>
-          <a:p>
-            <a:pPr algn="ctr">
-              <a:buClrTx/>
-              <a:buFontTx/>
-              <a:buNone/>
-              <a:defRPr/>
-            </a:pPr>
-            <a:r>
-              <a:rPr lang="en-US" sz="1100" kern="0" dirty="0">
-                <a:solidFill>
-                  <a:prstClr val="white"/>
-                </a:solidFill>
-                <a:latin typeface="Calibri" panose="020F0502020204030204"/>
-              </a:rPr>
-              <a:t>System</a:t>
-            </a:r>
-            <a:br>
-              <a:rPr lang="en-US" sz="1100" kern="0" dirty="0">
-                <a:solidFill>
-                  <a:prstClr val="white"/>
-                </a:solidFill>
-                <a:latin typeface="Calibri" panose="020F0502020204030204"/>
-              </a:rPr>
-            </a:br>
-            <a:r>
-              <a:rPr lang="en-US" sz="1100" kern="0" dirty="0">
-                <a:solidFill>
-                  <a:prstClr val="white"/>
-                </a:solidFill>
-                <a:latin typeface="Calibri" panose="020F0502020204030204"/>
-              </a:rPr>
-              <a:t>modes</a:t>
-            </a:r>
-          </a:p>
-        </p:txBody>
-      </p:sp>
-      <p:sp>
-        <p:nvSpPr>
-          <p:cNvPr id="147" name="Rectangle 146">
-            <a:extLst>
-              <a:ext uri="{FF2B5EF4-FFF2-40B4-BE49-F238E27FC236}">
-                <a16:creationId xmlns:a16="http://schemas.microsoft.com/office/drawing/2014/main" id="{F3FF6FA8-BE1D-467A-BE04-8FFD8DA52E69}"/>
-              </a:ext>
-            </a:extLst>
-          </p:cNvPr>
-          <p:cNvSpPr/>
-          <p:nvPr/>
-        </p:nvSpPr>
-        <p:spPr>
-          <a:xfrm>
-            <a:off x="4906823" y="5781717"/>
-            <a:ext cx="3640217" cy="268880"/>
+            <a:off x="4455199" y="5182278"/>
+            <a:ext cx="3275247" cy="270000"/>
           </a:xfrm>
           <a:prstGeom prst="rect">
             <a:avLst/>
@@ -19786,7 +18139,7 @@
             </a:lvl9pPr>
           </a:lstStyle>
           <a:p>
-            <a:pPr marL="0" marR="0" lvl="0" indent="0" algn="ctr" defTabSz="914400" rtl="0" eaLnBrk="1" fontAlgn="auto" latinLnBrk="0" hangingPunct="1">
+            <a:pPr marL="0" marR="0" lvl="0" indent="0" algn="ctr" defTabSz="822564" rtl="0" eaLnBrk="1" fontAlgn="auto" latinLnBrk="0" hangingPunct="1">
               <a:lnSpc>
                 <a:spcPct val="100000"/>
               </a:lnSpc>
@@ -19804,7 +18157,7 @@
               <a:defRPr/>
             </a:pPr>
             <a:r>
-              <a:rPr kumimoji="0" lang="en-US" sz="1800" b="0" i="0" u="none" strike="noStrike" kern="0" cap="none" spc="0" normalizeH="0" baseline="0" noProof="0" dirty="0" smtClean="0">
+              <a:rPr kumimoji="0" lang="en-US" sz="1600" b="0" i="0" u="none" strike="noStrike" kern="0" cap="none" spc="0" normalizeH="0" baseline="0" noProof="0" dirty="0">
                 <a:ln>
                   <a:noFill/>
                 </a:ln>
@@ -19818,22 +18171,1124 @@
                 <a:ea typeface="+mn-ea"/>
                 <a:cs typeface="+mn-cs"/>
               </a:rPr>
-              <a:t>microcontroller</a:t>
+              <a:t>Microcontroller</a:t>
             </a:r>
-            <a:endParaRPr kumimoji="0" lang="en-US" sz="1800" b="0" i="0" u="none" strike="noStrike" kern="0" cap="none" spc="0" normalizeH="0" baseline="0" noProof="0" dirty="0">
-              <a:ln>
-                <a:noFill/>
-              </a:ln>
+          </a:p>
+        </p:txBody>
+      </p:sp>
+      <p:sp>
+        <p:nvSpPr>
+          <p:cNvPr id="80" name="Rectangle 79">
+            <a:extLst>
+              <a:ext uri="{FF2B5EF4-FFF2-40B4-BE49-F238E27FC236}">
+                <a16:creationId xmlns:a16="http://schemas.microsoft.com/office/drawing/2014/main" id="{84EA5251-ED6D-4A79-9963-0DD2B82EE58F}"/>
+              </a:ext>
+            </a:extLst>
+          </p:cNvPr>
+          <p:cNvSpPr/>
+          <p:nvPr/>
+        </p:nvSpPr>
+        <p:spPr>
+          <a:xfrm>
+            <a:off x="6091091" y="2294747"/>
+            <a:ext cx="1639356" cy="360000"/>
+          </a:xfrm>
+          <a:prstGeom prst="rect">
+            <a:avLst/>
+          </a:prstGeom>
+          <a:solidFill>
+            <a:srgbClr val="324D7A"/>
+          </a:solidFill>
+          <a:ln w="19050" cap="flat" cmpd="sng" algn="ctr">
+            <a:solidFill>
+              <a:srgbClr val="1F314F"/>
+            </a:solidFill>
+            <a:prstDash val="solid"/>
+            <a:miter lim="800000"/>
+          </a:ln>
+          <a:effectLst/>
+        </p:spPr>
+        <p:txBody>
+          <a:bodyPr wrap="none" lIns="0" tIns="0" rIns="0" bIns="0" rtlCol="0" anchor="ctr"/>
+          <a:lstStyle>
+            <a:defPPr>
+              <a:defRPr lang="en-US"/>
+            </a:defPPr>
+            <a:lvl1pPr marL="0" algn="l" defTabSz="914400" rtl="0" eaLnBrk="1" latinLnBrk="0" hangingPunct="1">
+              <a:defRPr sz="1800" kern="1200">
+                <a:solidFill>
+                  <a:schemeClr val="tx1"/>
+                </a:solidFill>
+                <a:latin typeface="+mn-lt"/>
+                <a:ea typeface="+mn-ea"/>
+                <a:cs typeface="+mn-cs"/>
+              </a:defRPr>
+            </a:lvl1pPr>
+            <a:lvl2pPr marL="457200" algn="l" defTabSz="914400" rtl="0" eaLnBrk="1" latinLnBrk="0" hangingPunct="1">
+              <a:defRPr sz="1800" kern="1200">
+                <a:solidFill>
+                  <a:schemeClr val="tx1"/>
+                </a:solidFill>
+                <a:latin typeface="+mn-lt"/>
+                <a:ea typeface="+mn-ea"/>
+                <a:cs typeface="+mn-cs"/>
+              </a:defRPr>
+            </a:lvl2pPr>
+            <a:lvl3pPr marL="914400" algn="l" defTabSz="914400" rtl="0" eaLnBrk="1" latinLnBrk="0" hangingPunct="1">
+              <a:defRPr sz="1800" kern="1200">
+                <a:solidFill>
+                  <a:schemeClr val="tx1"/>
+                </a:solidFill>
+                <a:latin typeface="+mn-lt"/>
+                <a:ea typeface="+mn-ea"/>
+                <a:cs typeface="+mn-cs"/>
+              </a:defRPr>
+            </a:lvl3pPr>
+            <a:lvl4pPr marL="1371600" algn="l" defTabSz="914400" rtl="0" eaLnBrk="1" latinLnBrk="0" hangingPunct="1">
+              <a:defRPr sz="1800" kern="1200">
+                <a:solidFill>
+                  <a:schemeClr val="tx1"/>
+                </a:solidFill>
+                <a:latin typeface="+mn-lt"/>
+                <a:ea typeface="+mn-ea"/>
+                <a:cs typeface="+mn-cs"/>
+              </a:defRPr>
+            </a:lvl4pPr>
+            <a:lvl5pPr marL="1828800" algn="l" defTabSz="914400" rtl="0" eaLnBrk="1" latinLnBrk="0" hangingPunct="1">
+              <a:defRPr sz="1800" kern="1200">
+                <a:solidFill>
+                  <a:schemeClr val="tx1"/>
+                </a:solidFill>
+                <a:latin typeface="+mn-lt"/>
+                <a:ea typeface="+mn-ea"/>
+                <a:cs typeface="+mn-cs"/>
+              </a:defRPr>
+            </a:lvl5pPr>
+            <a:lvl6pPr marL="2286000" algn="l" defTabSz="914400" rtl="0" eaLnBrk="1" latinLnBrk="0" hangingPunct="1">
+              <a:defRPr sz="1800" kern="1200">
+                <a:solidFill>
+                  <a:schemeClr val="tx1"/>
+                </a:solidFill>
+                <a:latin typeface="+mn-lt"/>
+                <a:ea typeface="+mn-ea"/>
+                <a:cs typeface="+mn-cs"/>
+              </a:defRPr>
+            </a:lvl6pPr>
+            <a:lvl7pPr marL="2743200" algn="l" defTabSz="914400" rtl="0" eaLnBrk="1" latinLnBrk="0" hangingPunct="1">
+              <a:defRPr sz="1800" kern="1200">
+                <a:solidFill>
+                  <a:schemeClr val="tx1"/>
+                </a:solidFill>
+                <a:latin typeface="+mn-lt"/>
+                <a:ea typeface="+mn-ea"/>
+                <a:cs typeface="+mn-cs"/>
+              </a:defRPr>
+            </a:lvl7pPr>
+            <a:lvl8pPr marL="3200400" algn="l" defTabSz="914400" rtl="0" eaLnBrk="1" latinLnBrk="0" hangingPunct="1">
+              <a:defRPr sz="1800" kern="1200">
+                <a:solidFill>
+                  <a:schemeClr val="tx1"/>
+                </a:solidFill>
+                <a:latin typeface="+mn-lt"/>
+                <a:ea typeface="+mn-ea"/>
+                <a:cs typeface="+mn-cs"/>
+              </a:defRPr>
+            </a:lvl8pPr>
+            <a:lvl9pPr marL="3657600" algn="l" defTabSz="914400" rtl="0" eaLnBrk="1" latinLnBrk="0" hangingPunct="1">
+              <a:defRPr sz="1800" kern="1200">
+                <a:solidFill>
+                  <a:schemeClr val="tx1"/>
+                </a:solidFill>
+                <a:latin typeface="+mn-lt"/>
+                <a:ea typeface="+mn-ea"/>
+                <a:cs typeface="+mn-cs"/>
+              </a:defRPr>
+            </a:lvl9pPr>
+          </a:lstStyle>
+          <a:p>
+            <a:pPr marL="447675">
+              <a:lnSpc>
+                <a:spcPct val="85000"/>
+              </a:lnSpc>
+              <a:buClrTx/>
+              <a:buFontTx/>
+              <a:buNone/>
+              <a:defRPr/>
+            </a:pPr>
+            <a:r>
+              <a:rPr lang="en-US" sz="900" kern="0" dirty="0">
+                <a:solidFill>
+                  <a:prstClr val="white"/>
+                </a:solidFill>
+                <a:latin typeface="Calibri" panose="020F0502020204030204"/>
+              </a:rPr>
+              <a:t>Convenience functions,</a:t>
+            </a:r>
+            <a:br>
+              <a:rPr lang="en-US" sz="900" kern="0" dirty="0">
+                <a:solidFill>
+                  <a:prstClr val="white"/>
+                </a:solidFill>
+                <a:latin typeface="Calibri" panose="020F0502020204030204"/>
+              </a:rPr>
+            </a:br>
+            <a:r>
+              <a:rPr lang="en-US" sz="900" kern="0" dirty="0">
+                <a:solidFill>
+                  <a:prstClr val="white"/>
+                </a:solidFill>
+                <a:latin typeface="Calibri" panose="020F0502020204030204"/>
+              </a:rPr>
+              <a:t>executor, node graph, …</a:t>
+            </a:r>
+          </a:p>
+        </p:txBody>
+      </p:sp>
+      <p:sp>
+        <p:nvSpPr>
+          <p:cNvPr id="81" name="Rectangle 80">
+            <a:extLst>
+              <a:ext uri="{FF2B5EF4-FFF2-40B4-BE49-F238E27FC236}">
+                <a16:creationId xmlns:a16="http://schemas.microsoft.com/office/drawing/2014/main" id="{52FEB82C-F028-4D62-9084-8C9EA8025F8D}"/>
+              </a:ext>
+            </a:extLst>
+          </p:cNvPr>
+          <p:cNvSpPr/>
+          <p:nvPr/>
+        </p:nvSpPr>
+        <p:spPr>
+          <a:xfrm>
+            <a:off x="5683378" y="2287571"/>
+            <a:ext cx="922171" cy="304450"/>
+          </a:xfrm>
+          <a:prstGeom prst="rect">
+            <a:avLst/>
+          </a:prstGeom>
+        </p:spPr>
+        <p:txBody>
+          <a:bodyPr wrap="none" lIns="36000" anchor="ctr" anchorCtr="0">
+            <a:noAutofit/>
+          </a:bodyPr>
+          <a:lstStyle/>
+          <a:p>
+            <a:pPr defTabSz="457200">
+              <a:buClrTx/>
+              <a:buFontTx/>
+              <a:buNone/>
+            </a:pPr>
+            <a:r>
+              <a:rPr lang="en-US" sz="1600" dirty="0" err="1">
+                <a:solidFill>
+                  <a:prstClr val="white"/>
+                </a:solidFill>
+                <a:latin typeface="Calibri" panose="020F0502020204030204"/>
+                <a:ea typeface="+mn-ea"/>
+                <a:cs typeface="+mn-cs"/>
+              </a:rPr>
+              <a:t>rcl</a:t>
+            </a:r>
+            <a:r>
+              <a:rPr lang="en-US" sz="1600" dirty="0">
+                <a:solidFill>
+                  <a:prstClr val="white"/>
+                </a:solidFill>
+                <a:latin typeface="Calibri" panose="020F0502020204030204"/>
+                <a:ea typeface="+mn-ea"/>
+                <a:cs typeface="+mn-cs"/>
+              </a:rPr>
+              <a:t> + </a:t>
+            </a:r>
+            <a:r>
+              <a:rPr lang="en-US" sz="1600" dirty="0" err="1">
+                <a:solidFill>
+                  <a:prstClr val="white"/>
+                </a:solidFill>
+                <a:latin typeface="Calibri" panose="020F0502020204030204"/>
+                <a:ea typeface="+mn-ea"/>
+                <a:cs typeface="+mn-cs"/>
+              </a:rPr>
+              <a:t>rclc</a:t>
+            </a:r>
+            <a:r>
+              <a:rPr lang="en-US" sz="1600" dirty="0">
+                <a:solidFill>
+                  <a:prstClr val="white"/>
+                </a:solidFill>
+                <a:latin typeface="Calibri" panose="020F0502020204030204"/>
+                <a:ea typeface="+mn-ea"/>
+                <a:cs typeface="+mn-cs"/>
+              </a:rPr>
+              <a:t>: </a:t>
+            </a:r>
+            <a:endParaRPr lang="en-US" sz="1600" kern="1200" dirty="0">
               <a:solidFill>
-                <a:prstClr val="white"/>
+                <a:prstClr val="black"/>
               </a:solidFill>
-              <a:effectLst/>
-              <a:uLnTx/>
-              <a:uFillTx/>
               <a:latin typeface="Calibri" panose="020F0502020204030204"/>
               <a:ea typeface="+mn-ea"/>
               <a:cs typeface="+mn-cs"/>
             </a:endParaRPr>
+          </a:p>
+        </p:txBody>
+      </p:sp>
+      <p:sp>
+        <p:nvSpPr>
+          <p:cNvPr id="82" name="TextBox 81">
+            <a:extLst>
+              <a:ext uri="{FF2B5EF4-FFF2-40B4-BE49-F238E27FC236}">
+                <a16:creationId xmlns:a16="http://schemas.microsoft.com/office/drawing/2014/main" id="{E24D0DDD-28D2-4F04-963F-BB9676562CAF}"/>
+              </a:ext>
+            </a:extLst>
+          </p:cNvPr>
+          <p:cNvSpPr txBox="1"/>
+          <p:nvPr/>
+        </p:nvSpPr>
+        <p:spPr>
+          <a:xfrm rot="16200000">
+            <a:off x="7654799" y="4436911"/>
+            <a:ext cx="776046" cy="341632"/>
+          </a:xfrm>
+          <a:prstGeom prst="rect">
+            <a:avLst/>
+          </a:prstGeom>
+          <a:noFill/>
+        </p:spPr>
+        <p:txBody>
+          <a:bodyPr wrap="none" lIns="0" tIns="0" rIns="0" bIns="0" rtlCol="0">
+            <a:noAutofit/>
+          </a:bodyPr>
+          <a:lstStyle/>
+          <a:p>
+            <a:pPr algn="ctr" defTabSz="457200">
+              <a:lnSpc>
+                <a:spcPct val="80000"/>
+              </a:lnSpc>
+              <a:buClrTx/>
+              <a:buFontTx/>
+              <a:buNone/>
+            </a:pPr>
+            <a:r>
+              <a:rPr lang="en-US" sz="1800" b="1" kern="1200" dirty="0">
+                <a:solidFill>
+                  <a:prstClr val="black"/>
+                </a:solidFill>
+                <a:latin typeface="Calibri" panose="020F0502020204030204"/>
+                <a:ea typeface="+mn-ea"/>
+                <a:cs typeface="+mn-cs"/>
+              </a:rPr>
+              <a:t>RTOS</a:t>
+            </a:r>
+          </a:p>
+        </p:txBody>
+      </p:sp>
+      <p:sp>
+        <p:nvSpPr>
+          <p:cNvPr id="83" name="TextBox 82">
+            <a:extLst>
+              <a:ext uri="{FF2B5EF4-FFF2-40B4-BE49-F238E27FC236}">
+                <a16:creationId xmlns:a16="http://schemas.microsoft.com/office/drawing/2014/main" id="{6427F8AA-BA25-4FE4-94B2-51D75E8B4ECA}"/>
+              </a:ext>
+            </a:extLst>
+          </p:cNvPr>
+          <p:cNvSpPr txBox="1"/>
+          <p:nvPr/>
+        </p:nvSpPr>
+        <p:spPr>
+          <a:xfrm rot="16200000">
+            <a:off x="7607979" y="3285302"/>
+            <a:ext cx="1011899" cy="483844"/>
+          </a:xfrm>
+          <a:prstGeom prst="rect">
+            <a:avLst/>
+          </a:prstGeom>
+          <a:noFill/>
+        </p:spPr>
+        <p:txBody>
+          <a:bodyPr wrap="none" lIns="0" tIns="0" rIns="0" bIns="0" rtlCol="0">
+            <a:noAutofit/>
+          </a:bodyPr>
+          <a:lstStyle/>
+          <a:p>
+            <a:pPr algn="ctr" defTabSz="457200">
+              <a:lnSpc>
+                <a:spcPct val="80000"/>
+              </a:lnSpc>
+              <a:buClrTx/>
+              <a:buFontTx/>
+              <a:buNone/>
+            </a:pPr>
+            <a:r>
+              <a:rPr lang="en-US" sz="1800" b="1" kern="1200" dirty="0">
+                <a:solidFill>
+                  <a:prstClr val="black"/>
+                </a:solidFill>
+                <a:latin typeface="Calibri" panose="020F0502020204030204"/>
+                <a:ea typeface="+mn-ea"/>
+                <a:cs typeface="+mn-cs"/>
+              </a:rPr>
+              <a:t>Middle-</a:t>
+            </a:r>
+            <a:br>
+              <a:rPr lang="en-US" sz="1800" b="1" kern="1200" dirty="0">
+                <a:solidFill>
+                  <a:prstClr val="black"/>
+                </a:solidFill>
+                <a:latin typeface="Calibri" panose="020F0502020204030204"/>
+                <a:ea typeface="+mn-ea"/>
+                <a:cs typeface="+mn-cs"/>
+              </a:rPr>
+            </a:br>
+            <a:r>
+              <a:rPr lang="en-US" sz="1800" b="1" kern="1200" dirty="0">
+                <a:solidFill>
+                  <a:prstClr val="black"/>
+                </a:solidFill>
+                <a:latin typeface="Calibri" panose="020F0502020204030204"/>
+                <a:ea typeface="+mn-ea"/>
+                <a:cs typeface="+mn-cs"/>
+              </a:rPr>
+              <a:t>ware</a:t>
+            </a:r>
+          </a:p>
+        </p:txBody>
+      </p:sp>
+      <p:sp>
+        <p:nvSpPr>
+          <p:cNvPr id="84" name="TextBox 83">
+            <a:extLst>
+              <a:ext uri="{FF2B5EF4-FFF2-40B4-BE49-F238E27FC236}">
+                <a16:creationId xmlns:a16="http://schemas.microsoft.com/office/drawing/2014/main" id="{C9044346-5F94-41DF-9C0A-B3B49BEE4425}"/>
+              </a:ext>
+            </a:extLst>
+          </p:cNvPr>
+          <p:cNvSpPr txBox="1"/>
+          <p:nvPr/>
+        </p:nvSpPr>
+        <p:spPr>
+          <a:xfrm rot="16200000">
+            <a:off x="7845765" y="2324657"/>
+            <a:ext cx="536334" cy="483846"/>
+          </a:xfrm>
+          <a:prstGeom prst="rect">
+            <a:avLst/>
+          </a:prstGeom>
+          <a:noFill/>
+        </p:spPr>
+        <p:txBody>
+          <a:bodyPr wrap="none" lIns="0" tIns="0" rIns="0" bIns="0" rtlCol="0">
+            <a:noAutofit/>
+          </a:bodyPr>
+          <a:lstStyle/>
+          <a:p>
+            <a:pPr algn="ctr" defTabSz="457200">
+              <a:lnSpc>
+                <a:spcPct val="80000"/>
+              </a:lnSpc>
+              <a:buClrTx/>
+              <a:buFontTx/>
+              <a:buNone/>
+            </a:pPr>
+            <a:r>
+              <a:rPr lang="en-US" sz="1800" b="1" kern="1200" dirty="0">
+                <a:solidFill>
+                  <a:prstClr val="black"/>
+                </a:solidFill>
+                <a:latin typeface="Calibri" panose="020F0502020204030204"/>
+                <a:ea typeface="+mn-ea"/>
+                <a:cs typeface="+mn-cs"/>
+              </a:rPr>
+              <a:t>Client</a:t>
+            </a:r>
+            <a:br>
+              <a:rPr lang="en-US" sz="1800" b="1" kern="1200" dirty="0">
+                <a:solidFill>
+                  <a:prstClr val="black"/>
+                </a:solidFill>
+                <a:latin typeface="Calibri" panose="020F0502020204030204"/>
+                <a:ea typeface="+mn-ea"/>
+                <a:cs typeface="+mn-cs"/>
+              </a:rPr>
+            </a:br>
+            <a:r>
+              <a:rPr lang="en-US" sz="1800" b="1" kern="1200" dirty="0">
+                <a:solidFill>
+                  <a:prstClr val="black"/>
+                </a:solidFill>
+                <a:latin typeface="Calibri" panose="020F0502020204030204"/>
+                <a:ea typeface="+mn-ea"/>
+                <a:cs typeface="+mn-cs"/>
+              </a:rPr>
+              <a:t>library</a:t>
+            </a:r>
+          </a:p>
+        </p:txBody>
+      </p:sp>
+      <p:sp>
+        <p:nvSpPr>
+          <p:cNvPr id="85" name="Rectangle 84">
+            <a:extLst>
+              <a:ext uri="{FF2B5EF4-FFF2-40B4-BE49-F238E27FC236}">
+                <a16:creationId xmlns:a16="http://schemas.microsoft.com/office/drawing/2014/main" id="{8A14384C-9C4D-4807-A68F-704340E505B1}"/>
+              </a:ext>
+            </a:extLst>
+          </p:cNvPr>
+          <p:cNvSpPr/>
+          <p:nvPr/>
+        </p:nvSpPr>
+        <p:spPr>
+          <a:xfrm>
+            <a:off x="4455199" y="4219705"/>
+            <a:ext cx="2151975" cy="180000"/>
+          </a:xfrm>
+          <a:prstGeom prst="rect">
+            <a:avLst/>
+          </a:prstGeom>
+          <a:solidFill>
+            <a:srgbClr val="438CC6"/>
+          </a:solidFill>
+          <a:ln w="19050" cap="flat" cmpd="sng" algn="ctr">
+            <a:solidFill>
+              <a:srgbClr val="324D7A"/>
+            </a:solidFill>
+            <a:prstDash val="solid"/>
+            <a:miter lim="800000"/>
+          </a:ln>
+          <a:effectLst/>
+        </p:spPr>
+        <p:txBody>
+          <a:bodyPr wrap="none" lIns="0" tIns="0" rIns="0" bIns="0" rtlCol="0" anchor="ctr" anchorCtr="0"/>
+          <a:lstStyle>
+            <a:defPPr>
+              <a:defRPr lang="en-US"/>
+            </a:defPPr>
+            <a:lvl1pPr marL="0" algn="l" defTabSz="914400" rtl="0" eaLnBrk="1" latinLnBrk="0" hangingPunct="1">
+              <a:defRPr sz="1800" kern="1200">
+                <a:solidFill>
+                  <a:schemeClr val="tx1"/>
+                </a:solidFill>
+                <a:latin typeface="+mn-lt"/>
+                <a:ea typeface="+mn-ea"/>
+                <a:cs typeface="+mn-cs"/>
+              </a:defRPr>
+            </a:lvl1pPr>
+            <a:lvl2pPr marL="457200" algn="l" defTabSz="914400" rtl="0" eaLnBrk="1" latinLnBrk="0" hangingPunct="1">
+              <a:defRPr sz="1800" kern="1200">
+                <a:solidFill>
+                  <a:schemeClr val="tx1"/>
+                </a:solidFill>
+                <a:latin typeface="+mn-lt"/>
+                <a:ea typeface="+mn-ea"/>
+                <a:cs typeface="+mn-cs"/>
+              </a:defRPr>
+            </a:lvl2pPr>
+            <a:lvl3pPr marL="914400" algn="l" defTabSz="914400" rtl="0" eaLnBrk="1" latinLnBrk="0" hangingPunct="1">
+              <a:defRPr sz="1800" kern="1200">
+                <a:solidFill>
+                  <a:schemeClr val="tx1"/>
+                </a:solidFill>
+                <a:latin typeface="+mn-lt"/>
+                <a:ea typeface="+mn-ea"/>
+                <a:cs typeface="+mn-cs"/>
+              </a:defRPr>
+            </a:lvl3pPr>
+            <a:lvl4pPr marL="1371600" algn="l" defTabSz="914400" rtl="0" eaLnBrk="1" latinLnBrk="0" hangingPunct="1">
+              <a:defRPr sz="1800" kern="1200">
+                <a:solidFill>
+                  <a:schemeClr val="tx1"/>
+                </a:solidFill>
+                <a:latin typeface="+mn-lt"/>
+                <a:ea typeface="+mn-ea"/>
+                <a:cs typeface="+mn-cs"/>
+              </a:defRPr>
+            </a:lvl4pPr>
+            <a:lvl5pPr marL="1828800" algn="l" defTabSz="914400" rtl="0" eaLnBrk="1" latinLnBrk="0" hangingPunct="1">
+              <a:defRPr sz="1800" kern="1200">
+                <a:solidFill>
+                  <a:schemeClr val="tx1"/>
+                </a:solidFill>
+                <a:latin typeface="+mn-lt"/>
+                <a:ea typeface="+mn-ea"/>
+                <a:cs typeface="+mn-cs"/>
+              </a:defRPr>
+            </a:lvl5pPr>
+            <a:lvl6pPr marL="2286000" algn="l" defTabSz="914400" rtl="0" eaLnBrk="1" latinLnBrk="0" hangingPunct="1">
+              <a:defRPr sz="1800" kern="1200">
+                <a:solidFill>
+                  <a:schemeClr val="tx1"/>
+                </a:solidFill>
+                <a:latin typeface="+mn-lt"/>
+                <a:ea typeface="+mn-ea"/>
+                <a:cs typeface="+mn-cs"/>
+              </a:defRPr>
+            </a:lvl6pPr>
+            <a:lvl7pPr marL="2743200" algn="l" defTabSz="914400" rtl="0" eaLnBrk="1" latinLnBrk="0" hangingPunct="1">
+              <a:defRPr sz="1800" kern="1200">
+                <a:solidFill>
+                  <a:schemeClr val="tx1"/>
+                </a:solidFill>
+                <a:latin typeface="+mn-lt"/>
+                <a:ea typeface="+mn-ea"/>
+                <a:cs typeface="+mn-cs"/>
+              </a:defRPr>
+            </a:lvl7pPr>
+            <a:lvl8pPr marL="3200400" algn="l" defTabSz="914400" rtl="0" eaLnBrk="1" latinLnBrk="0" hangingPunct="1">
+              <a:defRPr sz="1800" kern="1200">
+                <a:solidFill>
+                  <a:schemeClr val="tx1"/>
+                </a:solidFill>
+                <a:latin typeface="+mn-lt"/>
+                <a:ea typeface="+mn-ea"/>
+                <a:cs typeface="+mn-cs"/>
+              </a:defRPr>
+            </a:lvl8pPr>
+            <a:lvl9pPr marL="3657600" algn="l" defTabSz="914400" rtl="0" eaLnBrk="1" latinLnBrk="0" hangingPunct="1">
+              <a:defRPr sz="1800" kern="1200">
+                <a:solidFill>
+                  <a:schemeClr val="tx1"/>
+                </a:solidFill>
+                <a:latin typeface="+mn-lt"/>
+                <a:ea typeface="+mn-ea"/>
+                <a:cs typeface="+mn-cs"/>
+              </a:defRPr>
+            </a:lvl9pPr>
+          </a:lstStyle>
+          <a:p>
+            <a:pPr algn="ctr">
+              <a:buClrTx/>
+              <a:buFontTx/>
+              <a:buNone/>
+              <a:defRPr/>
+            </a:pPr>
+            <a:r>
+              <a:rPr lang="en-US" sz="1200" kern="0" dirty="0">
+                <a:solidFill>
+                  <a:prstClr val="white"/>
+                </a:solidFill>
+                <a:latin typeface="Calibri" panose="020F0502020204030204"/>
+              </a:rPr>
+              <a:t>POSIX</a:t>
+            </a:r>
+          </a:p>
+        </p:txBody>
+      </p:sp>
+      <p:sp>
+        <p:nvSpPr>
+          <p:cNvPr id="86" name="Rectangle 85">
+            <a:extLst>
+              <a:ext uri="{FF2B5EF4-FFF2-40B4-BE49-F238E27FC236}">
+                <a16:creationId xmlns:a16="http://schemas.microsoft.com/office/drawing/2014/main" id="{64FD0CD8-5167-4C92-889C-AE0FCE286585}"/>
+              </a:ext>
+            </a:extLst>
+          </p:cNvPr>
+          <p:cNvSpPr/>
+          <p:nvPr/>
+        </p:nvSpPr>
+        <p:spPr>
+          <a:xfrm>
+            <a:off x="4448190" y="4455751"/>
+            <a:ext cx="2158984" cy="540000"/>
+          </a:xfrm>
+          <a:prstGeom prst="rect">
+            <a:avLst/>
+          </a:prstGeom>
+          <a:solidFill>
+            <a:srgbClr val="438CC6"/>
+          </a:solidFill>
+          <a:ln w="19050" cap="flat" cmpd="sng" algn="ctr">
+            <a:solidFill>
+              <a:srgbClr val="324D7A"/>
+            </a:solidFill>
+            <a:prstDash val="solid"/>
+            <a:miter lim="800000"/>
+          </a:ln>
+          <a:effectLst/>
+        </p:spPr>
+        <p:txBody>
+          <a:bodyPr wrap="none" lIns="0" tIns="0" rIns="0" bIns="0" rtlCol="0" anchor="ctr"/>
+          <a:lstStyle>
+            <a:defPPr>
+              <a:defRPr lang="en-US"/>
+            </a:defPPr>
+            <a:lvl1pPr marL="0" algn="l" defTabSz="914400" rtl="0" eaLnBrk="1" latinLnBrk="0" hangingPunct="1">
+              <a:defRPr sz="1800" kern="1200">
+                <a:solidFill>
+                  <a:schemeClr val="tx1"/>
+                </a:solidFill>
+                <a:latin typeface="+mn-lt"/>
+                <a:ea typeface="+mn-ea"/>
+                <a:cs typeface="+mn-cs"/>
+              </a:defRPr>
+            </a:lvl1pPr>
+            <a:lvl2pPr marL="457200" algn="l" defTabSz="914400" rtl="0" eaLnBrk="1" latinLnBrk="0" hangingPunct="1">
+              <a:defRPr sz="1800" kern="1200">
+                <a:solidFill>
+                  <a:schemeClr val="tx1"/>
+                </a:solidFill>
+                <a:latin typeface="+mn-lt"/>
+                <a:ea typeface="+mn-ea"/>
+                <a:cs typeface="+mn-cs"/>
+              </a:defRPr>
+            </a:lvl2pPr>
+            <a:lvl3pPr marL="914400" algn="l" defTabSz="914400" rtl="0" eaLnBrk="1" latinLnBrk="0" hangingPunct="1">
+              <a:defRPr sz="1800" kern="1200">
+                <a:solidFill>
+                  <a:schemeClr val="tx1"/>
+                </a:solidFill>
+                <a:latin typeface="+mn-lt"/>
+                <a:ea typeface="+mn-ea"/>
+                <a:cs typeface="+mn-cs"/>
+              </a:defRPr>
+            </a:lvl3pPr>
+            <a:lvl4pPr marL="1371600" algn="l" defTabSz="914400" rtl="0" eaLnBrk="1" latinLnBrk="0" hangingPunct="1">
+              <a:defRPr sz="1800" kern="1200">
+                <a:solidFill>
+                  <a:schemeClr val="tx1"/>
+                </a:solidFill>
+                <a:latin typeface="+mn-lt"/>
+                <a:ea typeface="+mn-ea"/>
+                <a:cs typeface="+mn-cs"/>
+              </a:defRPr>
+            </a:lvl4pPr>
+            <a:lvl5pPr marL="1828800" algn="l" defTabSz="914400" rtl="0" eaLnBrk="1" latinLnBrk="0" hangingPunct="1">
+              <a:defRPr sz="1800" kern="1200">
+                <a:solidFill>
+                  <a:schemeClr val="tx1"/>
+                </a:solidFill>
+                <a:latin typeface="+mn-lt"/>
+                <a:ea typeface="+mn-ea"/>
+                <a:cs typeface="+mn-cs"/>
+              </a:defRPr>
+            </a:lvl5pPr>
+            <a:lvl6pPr marL="2286000" algn="l" defTabSz="914400" rtl="0" eaLnBrk="1" latinLnBrk="0" hangingPunct="1">
+              <a:defRPr sz="1800" kern="1200">
+                <a:solidFill>
+                  <a:schemeClr val="tx1"/>
+                </a:solidFill>
+                <a:latin typeface="+mn-lt"/>
+                <a:ea typeface="+mn-ea"/>
+                <a:cs typeface="+mn-cs"/>
+              </a:defRPr>
+            </a:lvl6pPr>
+            <a:lvl7pPr marL="2743200" algn="l" defTabSz="914400" rtl="0" eaLnBrk="1" latinLnBrk="0" hangingPunct="1">
+              <a:defRPr sz="1800" kern="1200">
+                <a:solidFill>
+                  <a:schemeClr val="tx1"/>
+                </a:solidFill>
+                <a:latin typeface="+mn-lt"/>
+                <a:ea typeface="+mn-ea"/>
+                <a:cs typeface="+mn-cs"/>
+              </a:defRPr>
+            </a:lvl7pPr>
+            <a:lvl8pPr marL="3200400" algn="l" defTabSz="914400" rtl="0" eaLnBrk="1" latinLnBrk="0" hangingPunct="1">
+              <a:defRPr sz="1800" kern="1200">
+                <a:solidFill>
+                  <a:schemeClr val="tx1"/>
+                </a:solidFill>
+                <a:latin typeface="+mn-lt"/>
+                <a:ea typeface="+mn-ea"/>
+                <a:cs typeface="+mn-cs"/>
+              </a:defRPr>
+            </a:lvl8pPr>
+            <a:lvl9pPr marL="3657600" algn="l" defTabSz="914400" rtl="0" eaLnBrk="1" latinLnBrk="0" hangingPunct="1">
+              <a:defRPr sz="1800" kern="1200">
+                <a:solidFill>
+                  <a:schemeClr val="tx1"/>
+                </a:solidFill>
+                <a:latin typeface="+mn-lt"/>
+                <a:ea typeface="+mn-ea"/>
+                <a:cs typeface="+mn-cs"/>
+              </a:defRPr>
+            </a:lvl9pPr>
+          </a:lstStyle>
+          <a:p>
+            <a:pPr algn="ctr">
+              <a:buClrTx/>
+              <a:buFontTx/>
+              <a:buNone/>
+              <a:defRPr/>
+            </a:pPr>
+            <a:r>
+              <a:rPr lang="en-US" sz="1600" kern="0" dirty="0">
+                <a:solidFill>
+                  <a:prstClr val="white"/>
+                </a:solidFill>
+                <a:latin typeface="Calibri" panose="020F0502020204030204"/>
+              </a:rPr>
+              <a:t>Zephyr</a:t>
+            </a:r>
+            <a:r>
+              <a:rPr lang="en-US" sz="800" kern="0" dirty="0">
+                <a:solidFill>
+                  <a:prstClr val="white"/>
+                </a:solidFill>
+                <a:latin typeface="Calibri" panose="020F0502020204030204"/>
+              </a:rPr>
+              <a:t> </a:t>
+            </a:r>
+            <a:r>
+              <a:rPr lang="en-US" sz="1600" kern="0" dirty="0">
+                <a:solidFill>
+                  <a:prstClr val="white"/>
+                </a:solidFill>
+                <a:latin typeface="Calibri" panose="020F0502020204030204"/>
+              </a:rPr>
+              <a:t>/</a:t>
+            </a:r>
+            <a:r>
+              <a:rPr lang="en-US" sz="800" kern="0" dirty="0">
+                <a:solidFill>
+                  <a:prstClr val="white"/>
+                </a:solidFill>
+                <a:latin typeface="Calibri" panose="020F0502020204030204"/>
+              </a:rPr>
+              <a:t> </a:t>
+            </a:r>
+            <a:r>
+              <a:rPr lang="en-US" sz="1600" kern="0" dirty="0" err="1">
+                <a:solidFill>
+                  <a:prstClr val="white"/>
+                </a:solidFill>
+                <a:latin typeface="Calibri" panose="020F0502020204030204"/>
+              </a:rPr>
+              <a:t>FreeRTOS</a:t>
+            </a:r>
+            <a:r>
+              <a:rPr lang="en-US" sz="800" kern="0" dirty="0">
+                <a:solidFill>
+                  <a:prstClr val="white"/>
+                </a:solidFill>
+                <a:latin typeface="Calibri" panose="020F0502020204030204"/>
+              </a:rPr>
+              <a:t> </a:t>
+            </a:r>
+            <a:r>
+              <a:rPr lang="en-US" sz="1600" kern="0" dirty="0">
+                <a:solidFill>
+                  <a:prstClr val="white"/>
+                </a:solidFill>
+                <a:latin typeface="Calibri" panose="020F0502020204030204"/>
+              </a:rPr>
+              <a:t>/</a:t>
+            </a:r>
+            <a:r>
+              <a:rPr lang="en-US" sz="400" kern="0" dirty="0">
+                <a:solidFill>
+                  <a:prstClr val="white"/>
+                </a:solidFill>
+                <a:latin typeface="Calibri" panose="020F0502020204030204"/>
+              </a:rPr>
+              <a:t> </a:t>
+            </a:r>
+            <a:r>
+              <a:rPr lang="en-US" sz="1600" kern="0" dirty="0" err="1">
+                <a:solidFill>
+                  <a:prstClr val="white"/>
+                </a:solidFill>
+                <a:latin typeface="Calibri" panose="020F0502020204030204"/>
+              </a:rPr>
+              <a:t>NuttX</a:t>
+            </a:r>
+            <a:endParaRPr lang="en-US" sz="1600" kern="0" dirty="0">
+              <a:solidFill>
+                <a:prstClr val="white"/>
+              </a:solidFill>
+              <a:latin typeface="Calibri" panose="020F0502020204030204"/>
+            </a:endParaRPr>
+          </a:p>
+        </p:txBody>
+      </p:sp>
+      <p:sp>
+        <p:nvSpPr>
+          <p:cNvPr id="87" name="Rectangle 86">
+            <a:extLst>
+              <a:ext uri="{FF2B5EF4-FFF2-40B4-BE49-F238E27FC236}">
+                <a16:creationId xmlns:a16="http://schemas.microsoft.com/office/drawing/2014/main" id="{61A12595-BB68-4783-86C8-EA8F88CEC3A2}"/>
+              </a:ext>
+            </a:extLst>
+          </p:cNvPr>
+          <p:cNvSpPr/>
+          <p:nvPr/>
+        </p:nvSpPr>
+        <p:spPr>
+          <a:xfrm>
+            <a:off x="4455199" y="3493368"/>
+            <a:ext cx="3275247" cy="539808"/>
+          </a:xfrm>
+          <a:prstGeom prst="rect">
+            <a:avLst/>
+          </a:prstGeom>
+          <a:solidFill>
+            <a:srgbClr val="324D7A"/>
+          </a:solidFill>
+          <a:ln w="19050" cap="flat" cmpd="sng" algn="ctr">
+            <a:solidFill>
+              <a:srgbClr val="1F314F"/>
+            </a:solidFill>
+            <a:prstDash val="solid"/>
+            <a:miter lim="800000"/>
+          </a:ln>
+          <a:effectLst/>
+        </p:spPr>
+        <p:txBody>
+          <a:bodyPr lIns="0" tIns="0" rIns="0" bIns="0" rtlCol="0" anchor="ctr"/>
+          <a:lstStyle>
+            <a:defPPr>
+              <a:defRPr lang="en-US"/>
+            </a:defPPr>
+            <a:lvl1pPr marL="0" algn="l" defTabSz="914400" rtl="0" eaLnBrk="1" latinLnBrk="0" hangingPunct="1">
+              <a:defRPr sz="1800" kern="1200">
+                <a:solidFill>
+                  <a:schemeClr val="tx1"/>
+                </a:solidFill>
+                <a:latin typeface="+mn-lt"/>
+                <a:ea typeface="+mn-ea"/>
+                <a:cs typeface="+mn-cs"/>
+              </a:defRPr>
+            </a:lvl1pPr>
+            <a:lvl2pPr marL="457200" algn="l" defTabSz="914400" rtl="0" eaLnBrk="1" latinLnBrk="0" hangingPunct="1">
+              <a:defRPr sz="1800" kern="1200">
+                <a:solidFill>
+                  <a:schemeClr val="tx1"/>
+                </a:solidFill>
+                <a:latin typeface="+mn-lt"/>
+                <a:ea typeface="+mn-ea"/>
+                <a:cs typeface="+mn-cs"/>
+              </a:defRPr>
+            </a:lvl2pPr>
+            <a:lvl3pPr marL="914400" algn="l" defTabSz="914400" rtl="0" eaLnBrk="1" latinLnBrk="0" hangingPunct="1">
+              <a:defRPr sz="1800" kern="1200">
+                <a:solidFill>
+                  <a:schemeClr val="tx1"/>
+                </a:solidFill>
+                <a:latin typeface="+mn-lt"/>
+                <a:ea typeface="+mn-ea"/>
+                <a:cs typeface="+mn-cs"/>
+              </a:defRPr>
+            </a:lvl3pPr>
+            <a:lvl4pPr marL="1371600" algn="l" defTabSz="914400" rtl="0" eaLnBrk="1" latinLnBrk="0" hangingPunct="1">
+              <a:defRPr sz="1800" kern="1200">
+                <a:solidFill>
+                  <a:schemeClr val="tx1"/>
+                </a:solidFill>
+                <a:latin typeface="+mn-lt"/>
+                <a:ea typeface="+mn-ea"/>
+                <a:cs typeface="+mn-cs"/>
+              </a:defRPr>
+            </a:lvl4pPr>
+            <a:lvl5pPr marL="1828800" algn="l" defTabSz="914400" rtl="0" eaLnBrk="1" latinLnBrk="0" hangingPunct="1">
+              <a:defRPr sz="1800" kern="1200">
+                <a:solidFill>
+                  <a:schemeClr val="tx1"/>
+                </a:solidFill>
+                <a:latin typeface="+mn-lt"/>
+                <a:ea typeface="+mn-ea"/>
+                <a:cs typeface="+mn-cs"/>
+              </a:defRPr>
+            </a:lvl5pPr>
+            <a:lvl6pPr marL="2286000" algn="l" defTabSz="914400" rtl="0" eaLnBrk="1" latinLnBrk="0" hangingPunct="1">
+              <a:defRPr sz="1800" kern="1200">
+                <a:solidFill>
+                  <a:schemeClr val="tx1"/>
+                </a:solidFill>
+                <a:latin typeface="+mn-lt"/>
+                <a:ea typeface="+mn-ea"/>
+                <a:cs typeface="+mn-cs"/>
+              </a:defRPr>
+            </a:lvl6pPr>
+            <a:lvl7pPr marL="2743200" algn="l" defTabSz="914400" rtl="0" eaLnBrk="1" latinLnBrk="0" hangingPunct="1">
+              <a:defRPr sz="1800" kern="1200">
+                <a:solidFill>
+                  <a:schemeClr val="tx1"/>
+                </a:solidFill>
+                <a:latin typeface="+mn-lt"/>
+                <a:ea typeface="+mn-ea"/>
+                <a:cs typeface="+mn-cs"/>
+              </a:defRPr>
+            </a:lvl7pPr>
+            <a:lvl8pPr marL="3200400" algn="l" defTabSz="914400" rtl="0" eaLnBrk="1" latinLnBrk="0" hangingPunct="1">
+              <a:defRPr sz="1800" kern="1200">
+                <a:solidFill>
+                  <a:schemeClr val="tx1"/>
+                </a:solidFill>
+                <a:latin typeface="+mn-lt"/>
+                <a:ea typeface="+mn-ea"/>
+                <a:cs typeface="+mn-cs"/>
+              </a:defRPr>
+            </a:lvl8pPr>
+            <a:lvl9pPr marL="3657600" algn="l" defTabSz="914400" rtl="0" eaLnBrk="1" latinLnBrk="0" hangingPunct="1">
+              <a:defRPr sz="1800" kern="1200">
+                <a:solidFill>
+                  <a:schemeClr val="tx1"/>
+                </a:solidFill>
+                <a:latin typeface="+mn-lt"/>
+                <a:ea typeface="+mn-ea"/>
+                <a:cs typeface="+mn-cs"/>
+              </a:defRPr>
+            </a:lvl9pPr>
+          </a:lstStyle>
+          <a:p>
+            <a:pPr algn="ctr">
+              <a:buClrTx/>
+              <a:buFontTx/>
+              <a:buNone/>
+            </a:pPr>
+            <a:r>
+              <a:rPr lang="en-US" sz="1600" kern="0" dirty="0">
+                <a:solidFill>
+                  <a:prstClr val="white"/>
+                </a:solidFill>
+                <a:latin typeface="Calibri" panose="020F0502020204030204"/>
+              </a:rPr>
+              <a:t>Micro XRCE-DDS Client</a:t>
+            </a:r>
+          </a:p>
+        </p:txBody>
+      </p:sp>
+      <p:sp>
+        <p:nvSpPr>
+          <p:cNvPr id="88" name="Rectangle 87">
+            <a:extLst>
+              <a:ext uri="{FF2B5EF4-FFF2-40B4-BE49-F238E27FC236}">
+                <a16:creationId xmlns:a16="http://schemas.microsoft.com/office/drawing/2014/main" id="{FC07ED30-0BC8-46F1-98E9-63E6DEC35C91}"/>
+              </a:ext>
+            </a:extLst>
+          </p:cNvPr>
+          <p:cNvSpPr/>
+          <p:nvPr/>
+        </p:nvSpPr>
+        <p:spPr>
+          <a:xfrm>
+            <a:off x="5647531" y="4455751"/>
+            <a:ext cx="959643" cy="118800"/>
+          </a:xfrm>
+          <a:prstGeom prst="rect">
+            <a:avLst/>
+          </a:prstGeom>
+          <a:solidFill>
+            <a:srgbClr val="324D7A"/>
+          </a:solidFill>
+          <a:ln w="19050" cap="flat" cmpd="sng" algn="ctr">
+            <a:solidFill>
+              <a:srgbClr val="1F314F"/>
+            </a:solidFill>
+            <a:prstDash val="solid"/>
+            <a:miter lim="800000"/>
+          </a:ln>
+          <a:effectLst/>
+        </p:spPr>
+        <p:txBody>
+          <a:bodyPr wrap="none" lIns="0" tIns="0" rIns="0" bIns="0" rtlCol="0" anchor="ctr"/>
+          <a:lstStyle>
+            <a:defPPr>
+              <a:defRPr lang="en-US"/>
+            </a:defPPr>
+            <a:lvl1pPr marL="0" algn="l" defTabSz="914400" rtl="0" eaLnBrk="1" latinLnBrk="0" hangingPunct="1">
+              <a:defRPr sz="1800" kern="1200">
+                <a:solidFill>
+                  <a:schemeClr val="tx1"/>
+                </a:solidFill>
+                <a:latin typeface="+mn-lt"/>
+                <a:ea typeface="+mn-ea"/>
+                <a:cs typeface="+mn-cs"/>
+              </a:defRPr>
+            </a:lvl1pPr>
+            <a:lvl2pPr marL="457200" algn="l" defTabSz="914400" rtl="0" eaLnBrk="1" latinLnBrk="0" hangingPunct="1">
+              <a:defRPr sz="1800" kern="1200">
+                <a:solidFill>
+                  <a:schemeClr val="tx1"/>
+                </a:solidFill>
+                <a:latin typeface="+mn-lt"/>
+                <a:ea typeface="+mn-ea"/>
+                <a:cs typeface="+mn-cs"/>
+              </a:defRPr>
+            </a:lvl2pPr>
+            <a:lvl3pPr marL="914400" algn="l" defTabSz="914400" rtl="0" eaLnBrk="1" latinLnBrk="0" hangingPunct="1">
+              <a:defRPr sz="1800" kern="1200">
+                <a:solidFill>
+                  <a:schemeClr val="tx1"/>
+                </a:solidFill>
+                <a:latin typeface="+mn-lt"/>
+                <a:ea typeface="+mn-ea"/>
+                <a:cs typeface="+mn-cs"/>
+              </a:defRPr>
+            </a:lvl3pPr>
+            <a:lvl4pPr marL="1371600" algn="l" defTabSz="914400" rtl="0" eaLnBrk="1" latinLnBrk="0" hangingPunct="1">
+              <a:defRPr sz="1800" kern="1200">
+                <a:solidFill>
+                  <a:schemeClr val="tx1"/>
+                </a:solidFill>
+                <a:latin typeface="+mn-lt"/>
+                <a:ea typeface="+mn-ea"/>
+                <a:cs typeface="+mn-cs"/>
+              </a:defRPr>
+            </a:lvl4pPr>
+            <a:lvl5pPr marL="1828800" algn="l" defTabSz="914400" rtl="0" eaLnBrk="1" latinLnBrk="0" hangingPunct="1">
+              <a:defRPr sz="1800" kern="1200">
+                <a:solidFill>
+                  <a:schemeClr val="tx1"/>
+                </a:solidFill>
+                <a:latin typeface="+mn-lt"/>
+                <a:ea typeface="+mn-ea"/>
+                <a:cs typeface="+mn-cs"/>
+              </a:defRPr>
+            </a:lvl5pPr>
+            <a:lvl6pPr marL="2286000" algn="l" defTabSz="914400" rtl="0" eaLnBrk="1" latinLnBrk="0" hangingPunct="1">
+              <a:defRPr sz="1800" kern="1200">
+                <a:solidFill>
+                  <a:schemeClr val="tx1"/>
+                </a:solidFill>
+                <a:latin typeface="+mn-lt"/>
+                <a:ea typeface="+mn-ea"/>
+                <a:cs typeface="+mn-cs"/>
+              </a:defRPr>
+            </a:lvl6pPr>
+            <a:lvl7pPr marL="2743200" algn="l" defTabSz="914400" rtl="0" eaLnBrk="1" latinLnBrk="0" hangingPunct="1">
+              <a:defRPr sz="1800" kern="1200">
+                <a:solidFill>
+                  <a:schemeClr val="tx1"/>
+                </a:solidFill>
+                <a:latin typeface="+mn-lt"/>
+                <a:ea typeface="+mn-ea"/>
+                <a:cs typeface="+mn-cs"/>
+              </a:defRPr>
+            </a:lvl7pPr>
+            <a:lvl8pPr marL="3200400" algn="l" defTabSz="914400" rtl="0" eaLnBrk="1" latinLnBrk="0" hangingPunct="1">
+              <a:defRPr sz="1800" kern="1200">
+                <a:solidFill>
+                  <a:schemeClr val="tx1"/>
+                </a:solidFill>
+                <a:latin typeface="+mn-lt"/>
+                <a:ea typeface="+mn-ea"/>
+                <a:cs typeface="+mn-cs"/>
+              </a:defRPr>
+            </a:lvl8pPr>
+            <a:lvl9pPr marL="3657600" algn="l" defTabSz="914400" rtl="0" eaLnBrk="1" latinLnBrk="0" hangingPunct="1">
+              <a:defRPr sz="1800" kern="1200">
+                <a:solidFill>
+                  <a:schemeClr val="tx1"/>
+                </a:solidFill>
+                <a:latin typeface="+mn-lt"/>
+                <a:ea typeface="+mn-ea"/>
+                <a:cs typeface="+mn-cs"/>
+              </a:defRPr>
+            </a:lvl9pPr>
+          </a:lstStyle>
+          <a:p>
+            <a:pPr algn="ctr">
+              <a:buClrTx/>
+              <a:buFontTx/>
+              <a:buNone/>
+              <a:defRPr/>
+            </a:pPr>
+            <a:r>
+              <a:rPr lang="en-US" sz="900" kern="0" dirty="0">
+                <a:solidFill>
+                  <a:prstClr val="white"/>
+                </a:solidFill>
+                <a:latin typeface="Calibri" panose="020F0502020204030204"/>
+              </a:rPr>
+              <a:t>Additional drivers</a:t>
+            </a:r>
           </a:p>
         </p:txBody>
       </p:sp>
@@ -19842,13 +19297,6 @@
   <p:clrMapOvr>
     <a:masterClrMapping/>
   </p:clrMapOvr>
-  <p:timing>
-    <p:tnLst>
-      <p:par>
-        <p:cTn id="1" dur="indefinite" restart="never" nodeType="tmRoot"/>
-      </p:par>
-    </p:tnLst>
-  </p:timing>
 </p:sld>
 </file>
 
@@ -22303,18 +21751,6 @@
               </a:rPr>
               <a:t>C API</a:t>
             </a:r>
-            <a:r>
-              <a:rPr lang="en-US">
-                <a:solidFill>
-                  <a:schemeClr val="lt1"/>
-                </a:solidFill>
-                <a:latin typeface="Calibri"/>
-                <a:ea typeface="Calibri"/>
-                <a:cs typeface="Calibri"/>
-                <a:sym typeface="Calibri"/>
-              </a:rPr>
-              <a:t/>
-            </a:r>
             <a:br>
               <a:rPr lang="en-US">
                 <a:solidFill>
@@ -23093,13 +22529,6 @@
   <p:clrMapOvr>
     <a:masterClrMapping/>
   </p:clrMapOvr>
-  <p:timing>
-    <p:tnLst>
-      <p:par>
-        <p:cTn id="1" dur="indefinite" restart="never" nodeType="tmRoot"/>
-      </p:par>
-    </p:tnLst>
-  </p:timing>
 </p:sld>
 </file>
 

</xml_diff>

<commit_message>
Updated architecture diagram - removed rclcpp and added micro-ROS arduino (#231)
Signed-off-by: Ralph Lange <ralph.lange@de.bosch.com>
</commit_message>
<xml_diff>
--- a/img/micro-ROS_architecture.pptx
+++ b/img/micro-ROS_architecture.pptx
@@ -258,7 +258,7 @@
       </p15:sldGuideLst>
     </p:ext>
     <p:ext uri="http://customooxmlschemas.google.com/">
-      <go:slidesCustomData xmlns="" xmlns:mc="http://schemas.openxmlformats.org/markup-compatibility/2006" xmlns:mv="urn:schemas-microsoft-com:mac:vml" xmlns:c="http://schemas.openxmlformats.org/drawingml/2006/chart" xmlns:dgm="http://schemas.openxmlformats.org/drawingml/2006/diagram" xmlns:o="urn:schemas-microsoft-com:office:office" xmlns:v="urn:schemas-microsoft-com:vml" xmlns:pvml="urn:schemas-microsoft-com:office:powerpoint" xmlns:com="http://schemas.openxmlformats.org/drawingml/2006/compatibility" xmlns:p14="http://schemas.microsoft.com/office/powerpoint/2010/main" xmlns:p15="http://schemas.microsoft.com/office/powerpoint/2012/main" xmlns:go="http://customooxmlschemas.google.com/" r:id="rId8" roundtripDataSignature="AMtx7mjNETZj+lx0k8yFdZdgchI5QEOMEw=="/>
+      <go:slidesCustomData xmlns:go="http://customooxmlschemas.google.com/" xmlns:p15="http://schemas.microsoft.com/office/powerpoint/2012/main" xmlns:p14="http://schemas.microsoft.com/office/powerpoint/2010/main" xmlns:com="http://schemas.openxmlformats.org/drawingml/2006/compatibility" xmlns:pvml="urn:schemas-microsoft-com:office:powerpoint" xmlns:v="urn:schemas-microsoft-com:vml" xmlns:o="urn:schemas-microsoft-com:office:office" xmlns:dgm="http://schemas.openxmlformats.org/drawingml/2006/diagram" xmlns:c="http://schemas.openxmlformats.org/drawingml/2006/chart" xmlns:mv="urn:schemas-microsoft-com:mac:vml" xmlns:mc="http://schemas.openxmlformats.org/markup-compatibility/2006" xmlns="" r:id="rId8" roundtripDataSignature="AMtx7mjNETZj+lx0k8yFdZdgchI5QEOMEw=="/>
     </p:ext>
   </p:extLst>
 </p:presentation>
@@ -14632,252 +14632,20 @@
       </p:grpSpPr>
       <p:sp>
         <p:nvSpPr>
-          <p:cNvPr id="102" name="Google Shape;102;p1"/>
-          <p:cNvSpPr txBox="1"/>
-          <p:nvPr/>
-        </p:nvSpPr>
-        <p:spPr>
-          <a:xfrm rot="-5400000">
-            <a:off x="8483930" y="4823835"/>
-            <a:ext cx="876455" cy="594583"/>
-          </a:xfrm>
-          <a:prstGeom prst="rect">
-            <a:avLst/>
-          </a:prstGeom>
-          <a:noFill/>
-          <a:ln>
-            <a:noFill/>
-          </a:ln>
-        </p:spPr>
-        <p:txBody>
-          <a:bodyPr spcFirstLastPara="1" wrap="none" lIns="72000" tIns="0" rIns="0" bIns="0" anchor="t" anchorCtr="0">
-            <a:noAutofit/>
-          </a:bodyPr>
-          <a:lstStyle/>
-          <a:p>
-            <a:pPr marL="0" marR="0" lvl="0" indent="0" algn="ctr" rtl="0">
-              <a:lnSpc>
-                <a:spcPct val="90000"/>
-              </a:lnSpc>
-              <a:spcBef>
-                <a:spcPts val="0"/>
-              </a:spcBef>
-              <a:spcAft>
-                <a:spcPts val="0"/>
-              </a:spcAft>
-              <a:buClr>
-                <a:srgbClr val="000000"/>
-              </a:buClr>
-              <a:buSzPts val="1800"/>
-              <a:buFont typeface="Arial"/>
-              <a:buNone/>
-            </a:pPr>
-            <a:r>
-              <a:rPr lang="en-US" sz="2000" b="1" i="0" u="none" strike="noStrike" cap="none" dirty="0">
-                <a:solidFill>
-                  <a:schemeClr val="dk1"/>
-                </a:solidFill>
-                <a:latin typeface="Calibri"/>
-                <a:ea typeface="Calibri"/>
-                <a:cs typeface="Calibri"/>
-                <a:sym typeface="Calibri"/>
-              </a:rPr>
-              <a:t>RTOS</a:t>
-            </a:r>
-            <a:endParaRPr sz="2000" b="1" i="0" u="none" strike="noStrike" cap="none" dirty="0">
-              <a:solidFill>
-                <a:srgbClr val="000000"/>
-              </a:solidFill>
-              <a:sym typeface="Arial"/>
-            </a:endParaRPr>
-          </a:p>
-        </p:txBody>
-      </p:sp>
-      <p:sp>
-        <p:nvSpPr>
-          <p:cNvPr id="103" name="Google Shape;103;p1"/>
-          <p:cNvSpPr txBox="1"/>
-          <p:nvPr/>
-        </p:nvSpPr>
-        <p:spPr>
-          <a:xfrm rot="-5400000">
-            <a:off x="8351987" y="2494260"/>
-            <a:ext cx="1140344" cy="594583"/>
-          </a:xfrm>
-          <a:prstGeom prst="rect">
-            <a:avLst/>
-          </a:prstGeom>
-          <a:noFill/>
-          <a:ln>
-            <a:noFill/>
-          </a:ln>
-        </p:spPr>
-        <p:txBody>
-          <a:bodyPr spcFirstLastPara="1" wrap="none" lIns="72000" tIns="0" rIns="0" bIns="0" anchor="t" anchorCtr="0">
-            <a:noAutofit/>
-          </a:bodyPr>
-          <a:lstStyle/>
-          <a:p>
-            <a:pPr marL="0" marR="0" lvl="0" indent="0" algn="ctr" rtl="0">
-              <a:lnSpc>
-                <a:spcPct val="90000"/>
-              </a:lnSpc>
-              <a:spcBef>
-                <a:spcPts val="0"/>
-              </a:spcBef>
-              <a:spcAft>
-                <a:spcPts val="0"/>
-              </a:spcAft>
-              <a:buClr>
-                <a:srgbClr val="000000"/>
-              </a:buClr>
-              <a:buSzPts val="1800"/>
-              <a:buFont typeface="Arial"/>
-              <a:buNone/>
-            </a:pPr>
-            <a:r>
-              <a:rPr lang="en-US" sz="2000" b="1" i="0" u="none" strike="noStrike" cap="none" dirty="0">
-                <a:solidFill>
-                  <a:schemeClr val="dk1"/>
-                </a:solidFill>
-                <a:latin typeface="Calibri"/>
-                <a:ea typeface="Calibri"/>
-                <a:cs typeface="Calibri"/>
-                <a:sym typeface="Calibri"/>
-              </a:rPr>
-              <a:t>Client</a:t>
-            </a:r>
-            <a:br>
-              <a:rPr lang="en-US" sz="2000" b="1" i="0" u="none" strike="noStrike" cap="none" dirty="0">
-                <a:solidFill>
-                  <a:schemeClr val="dk1"/>
-                </a:solidFill>
-                <a:latin typeface="Calibri"/>
-                <a:ea typeface="Calibri"/>
-                <a:cs typeface="Calibri"/>
-                <a:sym typeface="Calibri"/>
-              </a:rPr>
-            </a:br>
-            <a:r>
-              <a:rPr lang="en-US" sz="2000" b="1" i="0" u="none" strike="noStrike" cap="none" dirty="0">
-                <a:solidFill>
-                  <a:schemeClr val="dk1"/>
-                </a:solidFill>
-                <a:latin typeface="Calibri"/>
-                <a:ea typeface="Calibri"/>
-                <a:cs typeface="Calibri"/>
-                <a:sym typeface="Calibri"/>
-              </a:rPr>
-              <a:t>library</a:t>
-            </a:r>
-            <a:endParaRPr sz="2000" b="1" i="0" u="none" strike="noStrike" cap="none" dirty="0">
-              <a:solidFill>
-                <a:srgbClr val="000000"/>
-              </a:solidFill>
-              <a:sym typeface="Arial"/>
-            </a:endParaRPr>
-          </a:p>
-        </p:txBody>
-      </p:sp>
-      <p:sp>
-        <p:nvSpPr>
-          <p:cNvPr id="104" name="Google Shape;104;p1"/>
-          <p:cNvSpPr txBox="1"/>
-          <p:nvPr/>
-        </p:nvSpPr>
-        <p:spPr>
-          <a:xfrm rot="-5400000">
-            <a:off x="8483933" y="3725020"/>
-            <a:ext cx="876452" cy="594583"/>
-          </a:xfrm>
-          <a:prstGeom prst="rect">
-            <a:avLst/>
-          </a:prstGeom>
-          <a:noFill/>
-          <a:ln>
-            <a:noFill/>
-          </a:ln>
-        </p:spPr>
-        <p:txBody>
-          <a:bodyPr spcFirstLastPara="1" wrap="none" lIns="72000" tIns="0" rIns="0" bIns="0" anchor="t" anchorCtr="0">
-            <a:noAutofit/>
-          </a:bodyPr>
-          <a:lstStyle/>
-          <a:p>
-            <a:pPr marL="0" marR="0" lvl="0" indent="0" algn="ctr" rtl="0">
-              <a:lnSpc>
-                <a:spcPct val="90000"/>
-              </a:lnSpc>
-              <a:spcBef>
-                <a:spcPts val="0"/>
-              </a:spcBef>
-              <a:spcAft>
-                <a:spcPts val="0"/>
-              </a:spcAft>
-              <a:buClr>
-                <a:srgbClr val="000000"/>
-              </a:buClr>
-              <a:buSzPts val="1800"/>
-              <a:buFont typeface="Arial"/>
-              <a:buNone/>
-            </a:pPr>
-            <a:r>
-              <a:rPr lang="en-US" sz="2000" b="1" i="0" u="none" strike="noStrike" cap="none" dirty="0">
-                <a:solidFill>
-                  <a:schemeClr val="dk1"/>
-                </a:solidFill>
-                <a:latin typeface="Calibri"/>
-                <a:ea typeface="Calibri"/>
-                <a:cs typeface="Calibri"/>
-                <a:sym typeface="Calibri"/>
-              </a:rPr>
-              <a:t>Middle-</a:t>
-            </a:r>
-            <a:br>
-              <a:rPr lang="en-US" sz="2000" b="1" i="0" u="none" strike="noStrike" cap="none" dirty="0">
-                <a:solidFill>
-                  <a:schemeClr val="dk1"/>
-                </a:solidFill>
-                <a:latin typeface="Calibri"/>
-                <a:ea typeface="Calibri"/>
-                <a:cs typeface="Calibri"/>
-                <a:sym typeface="Calibri"/>
-              </a:rPr>
-            </a:br>
-            <a:r>
-              <a:rPr lang="en-US" sz="2000" b="1" i="0" u="none" strike="noStrike" cap="none" dirty="0">
-                <a:solidFill>
-                  <a:schemeClr val="dk1"/>
-                </a:solidFill>
-                <a:latin typeface="Calibri"/>
-                <a:ea typeface="Calibri"/>
-                <a:cs typeface="Calibri"/>
-                <a:sym typeface="Calibri"/>
-              </a:rPr>
-              <a:t>ware</a:t>
-            </a:r>
-            <a:endParaRPr sz="2000" b="1" i="0" u="none" strike="noStrike" cap="none" dirty="0">
-              <a:solidFill>
-                <a:schemeClr val="dk1"/>
-              </a:solidFill>
-              <a:latin typeface="Calibri"/>
-              <a:ea typeface="Calibri"/>
-              <a:cs typeface="Calibri"/>
-              <a:sym typeface="Calibri"/>
-            </a:endParaRPr>
-          </a:p>
-        </p:txBody>
-      </p:sp>
-      <p:sp>
-        <p:nvSpPr>
-          <p:cNvPr id="120" name="Freeform 119"/>
+          <p:cNvPr id="61" name="Freeform 52">
+            <a:extLst>
+              <a:ext uri="{FF2B5EF4-FFF2-40B4-BE49-F238E27FC236}">
+                <a16:creationId xmlns:a16="http://schemas.microsoft.com/office/drawing/2014/main" id="{C3991965-0826-48A7-96F8-0BEDB50B15EA}"/>
+              </a:ext>
+            </a:extLst>
+          </p:cNvPr>
           <p:cNvSpPr/>
           <p:nvPr/>
         </p:nvSpPr>
         <p:spPr>
           <a:xfrm>
-            <a:off x="4169269" y="4108697"/>
-            <a:ext cx="733299" cy="198417"/>
+            <a:off x="3791590" y="3676996"/>
+            <a:ext cx="659778" cy="178524"/>
           </a:xfrm>
           <a:custGeom>
             <a:avLst/>
@@ -15077,13 +14845,13 @@
             </a:lvl9pPr>
           </a:lstStyle>
           <a:p>
-            <a:pPr algn="ctr">
+            <a:pPr algn="ctr" defTabSz="822564">
               <a:buClrTx/>
               <a:buFontTx/>
               <a:buNone/>
               <a:defRPr/>
             </a:pPr>
-            <a:endParaRPr lang="en-US" sz="2400">
+            <a:endParaRPr lang="en-US" sz="2159">
               <a:solidFill>
                 <a:srgbClr val="FFFFFF"/>
               </a:solidFill>
@@ -15094,10 +14862,10 @@
       </p:sp>
       <p:sp>
         <p:nvSpPr>
-          <p:cNvPr id="121" name="Rectangle 120">
+          <p:cNvPr id="62" name="Rectangle 61">
             <a:extLst>
               <a:ext uri="{FF2B5EF4-FFF2-40B4-BE49-F238E27FC236}">
-                <a16:creationId xmlns:a16="http://schemas.microsoft.com/office/drawing/2014/main" id="{FA7E4AC6-D8B6-4618-852A-ED30B3CBBDC5}"/>
+                <a16:creationId xmlns:a16="http://schemas.microsoft.com/office/drawing/2014/main" id="{B760893C-FECE-4C45-AFA5-CCE2E549942C}"/>
               </a:ext>
             </a:extLst>
           </p:cNvPr>
@@ -15106,526 +14874,8 @@
         </p:nvSpPr>
         <p:spPr>
           <a:xfrm>
-            <a:off x="4906823" y="4682901"/>
-            <a:ext cx="3640217" cy="876454"/>
-          </a:xfrm>
-          <a:prstGeom prst="rect">
-            <a:avLst/>
-          </a:prstGeom>
-          <a:solidFill>
-            <a:srgbClr val="438CC6"/>
-          </a:solidFill>
-          <a:ln w="19050" cap="flat" cmpd="sng" algn="ctr">
-            <a:solidFill>
-              <a:srgbClr val="324D7A"/>
-            </a:solidFill>
-            <a:prstDash val="solid"/>
-            <a:miter lim="800000"/>
-          </a:ln>
-          <a:effectLst/>
-        </p:spPr>
-        <p:txBody>
-          <a:bodyPr rtlCol="0" anchor="ctr"/>
-          <a:lstStyle>
-            <a:defPPr>
-              <a:defRPr lang="en-US"/>
-            </a:defPPr>
-            <a:lvl1pPr marL="0" algn="l" defTabSz="914400" rtl="0" eaLnBrk="1" latinLnBrk="0" hangingPunct="1">
-              <a:defRPr sz="1800" kern="1200">
-                <a:solidFill>
-                  <a:schemeClr val="tx1"/>
-                </a:solidFill>
-                <a:latin typeface="+mn-lt"/>
-                <a:ea typeface="+mn-ea"/>
-                <a:cs typeface="+mn-cs"/>
-              </a:defRPr>
-            </a:lvl1pPr>
-            <a:lvl2pPr marL="457200" algn="l" defTabSz="914400" rtl="0" eaLnBrk="1" latinLnBrk="0" hangingPunct="1">
-              <a:defRPr sz="1800" kern="1200">
-                <a:solidFill>
-                  <a:schemeClr val="tx1"/>
-                </a:solidFill>
-                <a:latin typeface="+mn-lt"/>
-                <a:ea typeface="+mn-ea"/>
-                <a:cs typeface="+mn-cs"/>
-              </a:defRPr>
-            </a:lvl2pPr>
-            <a:lvl3pPr marL="914400" algn="l" defTabSz="914400" rtl="0" eaLnBrk="1" latinLnBrk="0" hangingPunct="1">
-              <a:defRPr sz="1800" kern="1200">
-                <a:solidFill>
-                  <a:schemeClr val="tx1"/>
-                </a:solidFill>
-                <a:latin typeface="+mn-lt"/>
-                <a:ea typeface="+mn-ea"/>
-                <a:cs typeface="+mn-cs"/>
-              </a:defRPr>
-            </a:lvl3pPr>
-            <a:lvl4pPr marL="1371600" algn="l" defTabSz="914400" rtl="0" eaLnBrk="1" latinLnBrk="0" hangingPunct="1">
-              <a:defRPr sz="1800" kern="1200">
-                <a:solidFill>
-                  <a:schemeClr val="tx1"/>
-                </a:solidFill>
-                <a:latin typeface="+mn-lt"/>
-                <a:ea typeface="+mn-ea"/>
-                <a:cs typeface="+mn-cs"/>
-              </a:defRPr>
-            </a:lvl4pPr>
-            <a:lvl5pPr marL="1828800" algn="l" defTabSz="914400" rtl="0" eaLnBrk="1" latinLnBrk="0" hangingPunct="1">
-              <a:defRPr sz="1800" kern="1200">
-                <a:solidFill>
-                  <a:schemeClr val="tx1"/>
-                </a:solidFill>
-                <a:latin typeface="+mn-lt"/>
-                <a:ea typeface="+mn-ea"/>
-                <a:cs typeface="+mn-cs"/>
-              </a:defRPr>
-            </a:lvl5pPr>
-            <a:lvl6pPr marL="2286000" algn="l" defTabSz="914400" rtl="0" eaLnBrk="1" latinLnBrk="0" hangingPunct="1">
-              <a:defRPr sz="1800" kern="1200">
-                <a:solidFill>
-                  <a:schemeClr val="tx1"/>
-                </a:solidFill>
-                <a:latin typeface="+mn-lt"/>
-                <a:ea typeface="+mn-ea"/>
-                <a:cs typeface="+mn-cs"/>
-              </a:defRPr>
-            </a:lvl6pPr>
-            <a:lvl7pPr marL="2743200" algn="l" defTabSz="914400" rtl="0" eaLnBrk="1" latinLnBrk="0" hangingPunct="1">
-              <a:defRPr sz="1800" kern="1200">
-                <a:solidFill>
-                  <a:schemeClr val="tx1"/>
-                </a:solidFill>
-                <a:latin typeface="+mn-lt"/>
-                <a:ea typeface="+mn-ea"/>
-                <a:cs typeface="+mn-cs"/>
-              </a:defRPr>
-            </a:lvl7pPr>
-            <a:lvl8pPr marL="3200400" algn="l" defTabSz="914400" rtl="0" eaLnBrk="1" latinLnBrk="0" hangingPunct="1">
-              <a:defRPr sz="1800" kern="1200">
-                <a:solidFill>
-                  <a:schemeClr val="tx1"/>
-                </a:solidFill>
-                <a:latin typeface="+mn-lt"/>
-                <a:ea typeface="+mn-ea"/>
-                <a:cs typeface="+mn-cs"/>
-              </a:defRPr>
-            </a:lvl8pPr>
-            <a:lvl9pPr marL="3657600" algn="l" defTabSz="914400" rtl="0" eaLnBrk="1" latinLnBrk="0" hangingPunct="1">
-              <a:defRPr sz="1800" kern="1200">
-                <a:solidFill>
-                  <a:schemeClr val="tx1"/>
-                </a:solidFill>
-                <a:latin typeface="+mn-lt"/>
-                <a:ea typeface="+mn-ea"/>
-                <a:cs typeface="+mn-cs"/>
-              </a:defRPr>
-            </a:lvl9pPr>
-          </a:lstStyle>
-          <a:p>
-            <a:pPr marL="90488">
-              <a:buClrTx/>
-              <a:buFontTx/>
-              <a:buNone/>
-              <a:defRPr/>
-            </a:pPr>
-            <a:r>
-              <a:rPr lang="en-US" kern="0" dirty="0">
-                <a:solidFill>
-                  <a:prstClr val="white"/>
-                </a:solidFill>
-                <a:latin typeface="Calibri" panose="020F0502020204030204"/>
-              </a:rPr>
-              <a:t> </a:t>
-            </a:r>
-            <a:br>
-              <a:rPr lang="en-US" kern="0" dirty="0">
-                <a:solidFill>
-                  <a:prstClr val="white"/>
-                </a:solidFill>
-                <a:latin typeface="Calibri" panose="020F0502020204030204"/>
-              </a:rPr>
-            </a:br>
-            <a:r>
-              <a:rPr lang="en-US" kern="0" dirty="0">
-                <a:solidFill>
-                  <a:prstClr val="white"/>
-                </a:solidFill>
-                <a:latin typeface="Calibri" panose="020F0502020204030204"/>
-              </a:rPr>
-              <a:t> Zephyr, </a:t>
-            </a:r>
-            <a:r>
-              <a:rPr lang="en-US" kern="0" dirty="0" err="1">
-                <a:solidFill>
-                  <a:prstClr val="white"/>
-                </a:solidFill>
-                <a:latin typeface="Calibri" panose="020F0502020204030204"/>
-              </a:rPr>
-              <a:t>FreeRTOS</a:t>
-            </a:r>
-            <a:r>
-              <a:rPr lang="en-US" kern="0" dirty="0">
-                <a:solidFill>
-                  <a:prstClr val="white"/>
-                </a:solidFill>
-                <a:latin typeface="Calibri" panose="020F0502020204030204"/>
-              </a:rPr>
-              <a:t>, </a:t>
-            </a:r>
-            <a:r>
-              <a:rPr lang="en-US" kern="0" dirty="0" err="1">
-                <a:solidFill>
-                  <a:prstClr val="white"/>
-                </a:solidFill>
-                <a:latin typeface="Calibri" panose="020F0502020204030204"/>
-              </a:rPr>
-              <a:t>NuttX</a:t>
-            </a:r>
-            <a:endParaRPr lang="en-US" kern="0" dirty="0">
-              <a:solidFill>
-                <a:prstClr val="white"/>
-              </a:solidFill>
-              <a:latin typeface="Calibri" panose="020F0502020204030204"/>
-            </a:endParaRPr>
-          </a:p>
-        </p:txBody>
-      </p:sp>
-      <p:sp>
-        <p:nvSpPr>
-          <p:cNvPr id="122" name="Rectangle 121">
-            <a:extLst>
-              <a:ext uri="{FF2B5EF4-FFF2-40B4-BE49-F238E27FC236}">
-                <a16:creationId xmlns:a16="http://schemas.microsoft.com/office/drawing/2014/main" id="{FB42C7E3-28CC-4426-948E-9C4CE7BE27A1}"/>
-              </a:ext>
-            </a:extLst>
-          </p:cNvPr>
-          <p:cNvSpPr/>
-          <p:nvPr/>
-        </p:nvSpPr>
-        <p:spPr>
-          <a:xfrm>
-            <a:off x="7642159" y="5044942"/>
-            <a:ext cx="811333" cy="434344"/>
-          </a:xfrm>
-          <a:prstGeom prst="rect">
-            <a:avLst/>
-          </a:prstGeom>
-          <a:solidFill>
-            <a:srgbClr val="324D7A"/>
-          </a:solidFill>
-          <a:ln w="19050" cap="flat" cmpd="sng" algn="ctr">
-            <a:solidFill>
-              <a:srgbClr val="1F314F"/>
-            </a:solidFill>
-            <a:prstDash val="solid"/>
-            <a:miter lim="800000"/>
-          </a:ln>
-          <a:effectLst/>
-        </p:spPr>
-        <p:txBody>
-          <a:bodyPr wrap="none" lIns="0" tIns="0" rIns="0" bIns="0" rtlCol="0" anchor="ctr"/>
-          <a:lstStyle>
-            <a:defPPr>
-              <a:defRPr lang="en-US"/>
-            </a:defPPr>
-            <a:lvl1pPr marL="0" algn="l" defTabSz="914400" rtl="0" eaLnBrk="1" latinLnBrk="0" hangingPunct="1">
-              <a:defRPr sz="1800" kern="1200">
-                <a:solidFill>
-                  <a:schemeClr val="tx1"/>
-                </a:solidFill>
-                <a:latin typeface="+mn-lt"/>
-                <a:ea typeface="+mn-ea"/>
-                <a:cs typeface="+mn-cs"/>
-              </a:defRPr>
-            </a:lvl1pPr>
-            <a:lvl2pPr marL="457200" algn="l" defTabSz="914400" rtl="0" eaLnBrk="1" latinLnBrk="0" hangingPunct="1">
-              <a:defRPr sz="1800" kern="1200">
-                <a:solidFill>
-                  <a:schemeClr val="tx1"/>
-                </a:solidFill>
-                <a:latin typeface="+mn-lt"/>
-                <a:ea typeface="+mn-ea"/>
-                <a:cs typeface="+mn-cs"/>
-              </a:defRPr>
-            </a:lvl2pPr>
-            <a:lvl3pPr marL="914400" algn="l" defTabSz="914400" rtl="0" eaLnBrk="1" latinLnBrk="0" hangingPunct="1">
-              <a:defRPr sz="1800" kern="1200">
-                <a:solidFill>
-                  <a:schemeClr val="tx1"/>
-                </a:solidFill>
-                <a:latin typeface="+mn-lt"/>
-                <a:ea typeface="+mn-ea"/>
-                <a:cs typeface="+mn-cs"/>
-              </a:defRPr>
-            </a:lvl3pPr>
-            <a:lvl4pPr marL="1371600" algn="l" defTabSz="914400" rtl="0" eaLnBrk="1" latinLnBrk="0" hangingPunct="1">
-              <a:defRPr sz="1800" kern="1200">
-                <a:solidFill>
-                  <a:schemeClr val="tx1"/>
-                </a:solidFill>
-                <a:latin typeface="+mn-lt"/>
-                <a:ea typeface="+mn-ea"/>
-                <a:cs typeface="+mn-cs"/>
-              </a:defRPr>
-            </a:lvl4pPr>
-            <a:lvl5pPr marL="1828800" algn="l" defTabSz="914400" rtl="0" eaLnBrk="1" latinLnBrk="0" hangingPunct="1">
-              <a:defRPr sz="1800" kern="1200">
-                <a:solidFill>
-                  <a:schemeClr val="tx1"/>
-                </a:solidFill>
-                <a:latin typeface="+mn-lt"/>
-                <a:ea typeface="+mn-ea"/>
-                <a:cs typeface="+mn-cs"/>
-              </a:defRPr>
-            </a:lvl5pPr>
-            <a:lvl6pPr marL="2286000" algn="l" defTabSz="914400" rtl="0" eaLnBrk="1" latinLnBrk="0" hangingPunct="1">
-              <a:defRPr sz="1800" kern="1200">
-                <a:solidFill>
-                  <a:schemeClr val="tx1"/>
-                </a:solidFill>
-                <a:latin typeface="+mn-lt"/>
-                <a:ea typeface="+mn-ea"/>
-                <a:cs typeface="+mn-cs"/>
-              </a:defRPr>
-            </a:lvl6pPr>
-            <a:lvl7pPr marL="2743200" algn="l" defTabSz="914400" rtl="0" eaLnBrk="1" latinLnBrk="0" hangingPunct="1">
-              <a:defRPr sz="1800" kern="1200">
-                <a:solidFill>
-                  <a:schemeClr val="tx1"/>
-                </a:solidFill>
-                <a:latin typeface="+mn-lt"/>
-                <a:ea typeface="+mn-ea"/>
-                <a:cs typeface="+mn-cs"/>
-              </a:defRPr>
-            </a:lvl7pPr>
-            <a:lvl8pPr marL="3200400" algn="l" defTabSz="914400" rtl="0" eaLnBrk="1" latinLnBrk="0" hangingPunct="1">
-              <a:defRPr sz="1800" kern="1200">
-                <a:solidFill>
-                  <a:schemeClr val="tx1"/>
-                </a:solidFill>
-                <a:latin typeface="+mn-lt"/>
-                <a:ea typeface="+mn-ea"/>
-                <a:cs typeface="+mn-cs"/>
-              </a:defRPr>
-            </a:lvl8pPr>
-            <a:lvl9pPr marL="3657600" algn="l" defTabSz="914400" rtl="0" eaLnBrk="1" latinLnBrk="0" hangingPunct="1">
-              <a:defRPr sz="1800" kern="1200">
-                <a:solidFill>
-                  <a:schemeClr val="tx1"/>
-                </a:solidFill>
-                <a:latin typeface="+mn-lt"/>
-                <a:ea typeface="+mn-ea"/>
-                <a:cs typeface="+mn-cs"/>
-              </a:defRPr>
-            </a:lvl9pPr>
-          </a:lstStyle>
-          <a:p>
-            <a:pPr algn="ctr">
-              <a:buClrTx/>
-              <a:buFontTx/>
-              <a:buNone/>
-              <a:defRPr/>
-            </a:pPr>
-            <a:r>
-              <a:rPr lang="en-US" sz="1100" kern="0" dirty="0" smtClean="0">
-                <a:solidFill>
-                  <a:prstClr val="white"/>
-                </a:solidFill>
-                <a:latin typeface="Calibri" panose="020F0502020204030204"/>
-              </a:rPr>
-              <a:t>Additional</a:t>
-            </a:r>
-            <a:br>
-              <a:rPr lang="en-US" sz="1100" kern="0" dirty="0" smtClean="0">
-                <a:solidFill>
-                  <a:prstClr val="white"/>
-                </a:solidFill>
-                <a:latin typeface="Calibri" panose="020F0502020204030204"/>
-              </a:rPr>
-            </a:br>
-            <a:r>
-              <a:rPr lang="en-US" sz="1100" kern="0" dirty="0" smtClean="0">
-                <a:solidFill>
-                  <a:prstClr val="white"/>
-                </a:solidFill>
-                <a:latin typeface="Calibri" panose="020F0502020204030204"/>
-              </a:rPr>
-              <a:t>drivers, …</a:t>
-            </a:r>
-            <a:endParaRPr lang="en-US" sz="1100" kern="0" dirty="0">
-              <a:solidFill>
-                <a:prstClr val="white"/>
-              </a:solidFill>
-              <a:latin typeface="Calibri" panose="020F0502020204030204"/>
-            </a:endParaRPr>
-          </a:p>
-        </p:txBody>
-      </p:sp>
-      <p:sp>
-        <p:nvSpPr>
-          <p:cNvPr id="123" name="Rectangle 122">
-            <a:extLst>
-              <a:ext uri="{FF2B5EF4-FFF2-40B4-BE49-F238E27FC236}">
-                <a16:creationId xmlns:a16="http://schemas.microsoft.com/office/drawing/2014/main" id="{1AAE08D4-F722-4386-B2CD-86730DB7CF1B}"/>
-              </a:ext>
-            </a:extLst>
-          </p:cNvPr>
-          <p:cNvSpPr/>
-          <p:nvPr/>
-        </p:nvSpPr>
-        <p:spPr>
-          <a:xfrm>
-            <a:off x="4906823" y="4682901"/>
-            <a:ext cx="1911547" cy="268880"/>
-          </a:xfrm>
-          <a:prstGeom prst="rect">
-            <a:avLst/>
-          </a:prstGeom>
-          <a:noFill/>
-          <a:ln w="19050" cap="flat" cmpd="sng" algn="ctr">
-            <a:noFill/>
-            <a:prstDash val="solid"/>
-            <a:miter lim="800000"/>
-          </a:ln>
-          <a:effectLst/>
-        </p:spPr>
-        <p:txBody>
-          <a:bodyPr rtlCol="0" anchor="ctr"/>
-          <a:lstStyle>
-            <a:defPPr>
-              <a:defRPr lang="en-US"/>
-            </a:defPPr>
-            <a:lvl1pPr marL="0" algn="l" defTabSz="914400" rtl="0" eaLnBrk="1" latinLnBrk="0" hangingPunct="1">
-              <a:defRPr sz="1800" kern="1200">
-                <a:solidFill>
-                  <a:schemeClr val="tx1"/>
-                </a:solidFill>
-                <a:latin typeface="+mn-lt"/>
-                <a:ea typeface="+mn-ea"/>
-                <a:cs typeface="+mn-cs"/>
-              </a:defRPr>
-            </a:lvl1pPr>
-            <a:lvl2pPr marL="457200" algn="l" defTabSz="914400" rtl="0" eaLnBrk="1" latinLnBrk="0" hangingPunct="1">
-              <a:defRPr sz="1800" kern="1200">
-                <a:solidFill>
-                  <a:schemeClr val="tx1"/>
-                </a:solidFill>
-                <a:latin typeface="+mn-lt"/>
-                <a:ea typeface="+mn-ea"/>
-                <a:cs typeface="+mn-cs"/>
-              </a:defRPr>
-            </a:lvl2pPr>
-            <a:lvl3pPr marL="914400" algn="l" defTabSz="914400" rtl="0" eaLnBrk="1" latinLnBrk="0" hangingPunct="1">
-              <a:defRPr sz="1800" kern="1200">
-                <a:solidFill>
-                  <a:schemeClr val="tx1"/>
-                </a:solidFill>
-                <a:latin typeface="+mn-lt"/>
-                <a:ea typeface="+mn-ea"/>
-                <a:cs typeface="+mn-cs"/>
-              </a:defRPr>
-            </a:lvl3pPr>
-            <a:lvl4pPr marL="1371600" algn="l" defTabSz="914400" rtl="0" eaLnBrk="1" latinLnBrk="0" hangingPunct="1">
-              <a:defRPr sz="1800" kern="1200">
-                <a:solidFill>
-                  <a:schemeClr val="tx1"/>
-                </a:solidFill>
-                <a:latin typeface="+mn-lt"/>
-                <a:ea typeface="+mn-ea"/>
-                <a:cs typeface="+mn-cs"/>
-              </a:defRPr>
-            </a:lvl4pPr>
-            <a:lvl5pPr marL="1828800" algn="l" defTabSz="914400" rtl="0" eaLnBrk="1" latinLnBrk="0" hangingPunct="1">
-              <a:defRPr sz="1800" kern="1200">
-                <a:solidFill>
-                  <a:schemeClr val="tx1"/>
-                </a:solidFill>
-                <a:latin typeface="+mn-lt"/>
-                <a:ea typeface="+mn-ea"/>
-                <a:cs typeface="+mn-cs"/>
-              </a:defRPr>
-            </a:lvl5pPr>
-            <a:lvl6pPr marL="2286000" algn="l" defTabSz="914400" rtl="0" eaLnBrk="1" latinLnBrk="0" hangingPunct="1">
-              <a:defRPr sz="1800" kern="1200">
-                <a:solidFill>
-                  <a:schemeClr val="tx1"/>
-                </a:solidFill>
-                <a:latin typeface="+mn-lt"/>
-                <a:ea typeface="+mn-ea"/>
-                <a:cs typeface="+mn-cs"/>
-              </a:defRPr>
-            </a:lvl6pPr>
-            <a:lvl7pPr marL="2743200" algn="l" defTabSz="914400" rtl="0" eaLnBrk="1" latinLnBrk="0" hangingPunct="1">
-              <a:defRPr sz="1800" kern="1200">
-                <a:solidFill>
-                  <a:schemeClr val="tx1"/>
-                </a:solidFill>
-                <a:latin typeface="+mn-lt"/>
-                <a:ea typeface="+mn-ea"/>
-                <a:cs typeface="+mn-cs"/>
-              </a:defRPr>
-            </a:lvl7pPr>
-            <a:lvl8pPr marL="3200400" algn="l" defTabSz="914400" rtl="0" eaLnBrk="1" latinLnBrk="0" hangingPunct="1">
-              <a:defRPr sz="1800" kern="1200">
-                <a:solidFill>
-                  <a:schemeClr val="tx1"/>
-                </a:solidFill>
-                <a:latin typeface="+mn-lt"/>
-                <a:ea typeface="+mn-ea"/>
-                <a:cs typeface="+mn-cs"/>
-              </a:defRPr>
-            </a:lvl8pPr>
-            <a:lvl9pPr marL="3657600" algn="l" defTabSz="914400" rtl="0" eaLnBrk="1" latinLnBrk="0" hangingPunct="1">
-              <a:defRPr sz="1800" kern="1200">
-                <a:solidFill>
-                  <a:schemeClr val="tx1"/>
-                </a:solidFill>
-                <a:latin typeface="+mn-lt"/>
-                <a:ea typeface="+mn-ea"/>
-                <a:cs typeface="+mn-cs"/>
-              </a:defRPr>
-            </a:lvl9pPr>
-          </a:lstStyle>
-          <a:p>
-            <a:pPr algn="ctr">
-              <a:buClrTx/>
-              <a:buFontTx/>
-              <a:buNone/>
-            </a:pPr>
-            <a:r>
-              <a:rPr lang="en-US" kern="0" dirty="0" smtClean="0">
-                <a:solidFill>
-                  <a:prstClr val="white"/>
-                </a:solidFill>
-                <a:latin typeface="Calibri" panose="020F0502020204030204"/>
-              </a:rPr>
-              <a:t>POSIX</a:t>
-            </a:r>
-            <a:endParaRPr lang="en-US" kern="0" dirty="0">
-              <a:solidFill>
-                <a:prstClr val="white"/>
-              </a:solidFill>
-              <a:latin typeface="Calibri" panose="020F0502020204030204"/>
-            </a:endParaRPr>
-          </a:p>
-        </p:txBody>
-      </p:sp>
-      <p:sp>
-        <p:nvSpPr>
-          <p:cNvPr id="124" name="Rectangle 123">
-            <a:extLst>
-              <a:ext uri="{FF2B5EF4-FFF2-40B4-BE49-F238E27FC236}">
-                <a16:creationId xmlns:a16="http://schemas.microsoft.com/office/drawing/2014/main" id="{E6882ED3-6F9D-441B-92B3-B9CB4E3A27F0}"/>
-              </a:ext>
-            </a:extLst>
-          </p:cNvPr>
-          <p:cNvSpPr/>
-          <p:nvPr/>
-        </p:nvSpPr>
-        <p:spPr>
-          <a:xfrm>
-            <a:off x="4906823" y="3922780"/>
-            <a:ext cx="3640217" cy="537759"/>
+            <a:off x="6686446" y="4219703"/>
+            <a:ext cx="1044000" cy="776048"/>
           </a:xfrm>
           <a:prstGeom prst="rect">
             <a:avLst/>
@@ -15746,23 +14996,46 @@
               <a:buNone/>
             </a:pPr>
             <a:r>
-              <a:rPr lang="en-US" kern="0" dirty="0">
+              <a:rPr lang="en-US" sz="1600" kern="0" dirty="0">
                 <a:solidFill>
                   <a:prstClr val="white"/>
                 </a:solidFill>
                 <a:latin typeface="Calibri" panose="020F0502020204030204"/>
               </a:rPr>
-              <a:t>Micro XRCE-DDS Client</a:t>
+              <a:t>micro-ROS</a:t>
             </a:r>
+            <a:br>
+              <a:rPr lang="en-US" sz="1600" kern="0" dirty="0">
+                <a:solidFill>
+                  <a:prstClr val="white"/>
+                </a:solidFill>
+                <a:latin typeface="Calibri" panose="020F0502020204030204"/>
+              </a:rPr>
+            </a:br>
+            <a:r>
+              <a:rPr lang="en-US" sz="1600" kern="0" dirty="0" err="1">
+                <a:solidFill>
+                  <a:prstClr val="white"/>
+                </a:solidFill>
+                <a:latin typeface="Calibri" panose="020F0502020204030204"/>
+              </a:rPr>
+              <a:t>arduino</a:t>
+            </a:r>
+            <a:endParaRPr lang="en-US" sz="1600" kern="0" dirty="0">
+              <a:solidFill>
+                <a:prstClr val="white"/>
+              </a:solidFill>
+              <a:latin typeface="Calibri" panose="020F0502020204030204"/>
+            </a:endParaRPr>
           </a:p>
         </p:txBody>
       </p:sp>
       <p:sp>
         <p:nvSpPr>
-          <p:cNvPr id="125" name="Rectangle 124">
+          <p:cNvPr id="63" name="Rectangle 62">
             <a:extLst>
               <a:ext uri="{FF2B5EF4-FFF2-40B4-BE49-F238E27FC236}">
-                <a16:creationId xmlns:a16="http://schemas.microsoft.com/office/drawing/2014/main" id="{43814742-EAFD-498E-A7B9-3AE25386FA4C}"/>
+                <a16:creationId xmlns:a16="http://schemas.microsoft.com/office/drawing/2014/main" id="{D997BD25-904F-446E-9068-4484D1A9670D}"/>
               </a:ext>
             </a:extLst>
           </p:cNvPr>
@@ -15771,8 +15044,155 @@
         </p:nvSpPr>
         <p:spPr>
           <a:xfrm>
-            <a:off x="4906823" y="2823966"/>
-            <a:ext cx="3640217" cy="537759"/>
+            <a:off x="4455199" y="3257322"/>
+            <a:ext cx="3275249" cy="180000"/>
+          </a:xfrm>
+          <a:prstGeom prst="rect">
+            <a:avLst/>
+          </a:prstGeom>
+          <a:solidFill>
+            <a:srgbClr val="324D7A"/>
+          </a:solidFill>
+          <a:ln w="19050" cap="flat" cmpd="sng" algn="ctr">
+            <a:solidFill>
+              <a:srgbClr val="1F314F"/>
+            </a:solidFill>
+            <a:prstDash val="solid"/>
+            <a:miter lim="800000"/>
+          </a:ln>
+          <a:effectLst/>
+        </p:spPr>
+        <p:txBody>
+          <a:bodyPr lIns="0" tIns="0" rIns="0" bIns="0" rtlCol="0" anchor="ctr"/>
+          <a:lstStyle>
+            <a:defPPr>
+              <a:defRPr lang="en-US"/>
+            </a:defPPr>
+            <a:lvl1pPr marL="0" algn="l" defTabSz="914400" rtl="0" eaLnBrk="1" latinLnBrk="0" hangingPunct="1">
+              <a:defRPr sz="1800" kern="1200">
+                <a:solidFill>
+                  <a:schemeClr val="tx1"/>
+                </a:solidFill>
+                <a:latin typeface="+mn-lt"/>
+                <a:ea typeface="+mn-ea"/>
+                <a:cs typeface="+mn-cs"/>
+              </a:defRPr>
+            </a:lvl1pPr>
+            <a:lvl2pPr marL="457200" algn="l" defTabSz="914400" rtl="0" eaLnBrk="1" latinLnBrk="0" hangingPunct="1">
+              <a:defRPr sz="1800" kern="1200">
+                <a:solidFill>
+                  <a:schemeClr val="tx1"/>
+                </a:solidFill>
+                <a:latin typeface="+mn-lt"/>
+                <a:ea typeface="+mn-ea"/>
+                <a:cs typeface="+mn-cs"/>
+              </a:defRPr>
+            </a:lvl2pPr>
+            <a:lvl3pPr marL="914400" algn="l" defTabSz="914400" rtl="0" eaLnBrk="1" latinLnBrk="0" hangingPunct="1">
+              <a:defRPr sz="1800" kern="1200">
+                <a:solidFill>
+                  <a:schemeClr val="tx1"/>
+                </a:solidFill>
+                <a:latin typeface="+mn-lt"/>
+                <a:ea typeface="+mn-ea"/>
+                <a:cs typeface="+mn-cs"/>
+              </a:defRPr>
+            </a:lvl3pPr>
+            <a:lvl4pPr marL="1371600" algn="l" defTabSz="914400" rtl="0" eaLnBrk="1" latinLnBrk="0" hangingPunct="1">
+              <a:defRPr sz="1800" kern="1200">
+                <a:solidFill>
+                  <a:schemeClr val="tx1"/>
+                </a:solidFill>
+                <a:latin typeface="+mn-lt"/>
+                <a:ea typeface="+mn-ea"/>
+                <a:cs typeface="+mn-cs"/>
+              </a:defRPr>
+            </a:lvl4pPr>
+            <a:lvl5pPr marL="1828800" algn="l" defTabSz="914400" rtl="0" eaLnBrk="1" latinLnBrk="0" hangingPunct="1">
+              <a:defRPr sz="1800" kern="1200">
+                <a:solidFill>
+                  <a:schemeClr val="tx1"/>
+                </a:solidFill>
+                <a:latin typeface="+mn-lt"/>
+                <a:ea typeface="+mn-ea"/>
+                <a:cs typeface="+mn-cs"/>
+              </a:defRPr>
+            </a:lvl5pPr>
+            <a:lvl6pPr marL="2286000" algn="l" defTabSz="914400" rtl="0" eaLnBrk="1" latinLnBrk="0" hangingPunct="1">
+              <a:defRPr sz="1800" kern="1200">
+                <a:solidFill>
+                  <a:schemeClr val="tx1"/>
+                </a:solidFill>
+                <a:latin typeface="+mn-lt"/>
+                <a:ea typeface="+mn-ea"/>
+                <a:cs typeface="+mn-cs"/>
+              </a:defRPr>
+            </a:lvl6pPr>
+            <a:lvl7pPr marL="2743200" algn="l" defTabSz="914400" rtl="0" eaLnBrk="1" latinLnBrk="0" hangingPunct="1">
+              <a:defRPr sz="1800" kern="1200">
+                <a:solidFill>
+                  <a:schemeClr val="tx1"/>
+                </a:solidFill>
+                <a:latin typeface="+mn-lt"/>
+                <a:ea typeface="+mn-ea"/>
+                <a:cs typeface="+mn-cs"/>
+              </a:defRPr>
+            </a:lvl7pPr>
+            <a:lvl8pPr marL="3200400" algn="l" defTabSz="914400" rtl="0" eaLnBrk="1" latinLnBrk="0" hangingPunct="1">
+              <a:defRPr sz="1800" kern="1200">
+                <a:solidFill>
+                  <a:schemeClr val="tx1"/>
+                </a:solidFill>
+                <a:latin typeface="+mn-lt"/>
+                <a:ea typeface="+mn-ea"/>
+                <a:cs typeface="+mn-cs"/>
+              </a:defRPr>
+            </a:lvl8pPr>
+            <a:lvl9pPr marL="3657600" algn="l" defTabSz="914400" rtl="0" eaLnBrk="1" latinLnBrk="0" hangingPunct="1">
+              <a:defRPr sz="1800" kern="1200">
+                <a:solidFill>
+                  <a:schemeClr val="tx1"/>
+                </a:solidFill>
+                <a:latin typeface="+mn-lt"/>
+                <a:ea typeface="+mn-ea"/>
+                <a:cs typeface="+mn-cs"/>
+              </a:defRPr>
+            </a:lvl9pPr>
+          </a:lstStyle>
+          <a:p>
+            <a:pPr algn="ctr">
+              <a:buClrTx/>
+              <a:buFontTx/>
+              <a:buNone/>
+            </a:pPr>
+            <a:r>
+              <a:rPr lang="en-US" sz="1200" kern="0" dirty="0">
+                <a:solidFill>
+                  <a:prstClr val="white"/>
+                </a:solidFill>
+                <a:latin typeface="Calibri" panose="020F0502020204030204"/>
+              </a:rPr>
+              <a:t>Micro XRCE-DDS Adapter</a:t>
+            </a:r>
+          </a:p>
+        </p:txBody>
+      </p:sp>
+      <p:sp>
+        <p:nvSpPr>
+          <p:cNvPr id="64" name="Rectangle 63">
+            <a:extLst>
+              <a:ext uri="{FF2B5EF4-FFF2-40B4-BE49-F238E27FC236}">
+                <a16:creationId xmlns:a16="http://schemas.microsoft.com/office/drawing/2014/main" id="{9D5EC50C-F348-4912-8C40-BB3E8165B03D}"/>
+              </a:ext>
+            </a:extLst>
+          </p:cNvPr>
+          <p:cNvSpPr/>
+          <p:nvPr/>
+        </p:nvSpPr>
+        <p:spPr>
+          <a:xfrm>
+            <a:off x="4455199" y="2294747"/>
+            <a:ext cx="3275247" cy="540000"/>
           </a:xfrm>
           <a:prstGeom prst="rect">
             <a:avLst/>
@@ -15790,7 +15210,7 @@
           <a:effectLst/>
         </p:spPr>
         <p:txBody>
-          <a:bodyPr wrap="none" lIns="72000" tIns="0" rIns="0" bIns="0" rtlCol="0" anchor="ctr" anchorCtr="0"/>
+          <a:bodyPr wrap="none" lIns="64781" tIns="0" rIns="0" bIns="0" rtlCol="0" anchor="ctr" anchorCtr="0"/>
           <a:lstStyle>
             <a:defPPr>
               <a:defRPr lang="en-US"/>
@@ -15894,25 +15314,16 @@
               <a:defRPr/>
             </a:pPr>
             <a:r>
-              <a:rPr lang="en-US" b="1" kern="0" dirty="0" smtClean="0">
+              <a:rPr lang="en-US" sz="1600" kern="0" dirty="0">
                 <a:solidFill>
                   <a:prstClr val="white"/>
                 </a:solidFill>
                 <a:latin typeface="Calibri" panose="020F0502020204030204"/>
               </a:rPr>
-              <a:t>C API</a:t>
-            </a:r>
-            <a:r>
-              <a:rPr lang="en-US" kern="0" dirty="0" smtClean="0">
-                <a:solidFill>
-                  <a:prstClr val="white"/>
-                </a:solidFill>
-                <a:latin typeface="Calibri" panose="020F0502020204030204"/>
-              </a:rPr>
-              <a:t/>
+              <a:t>ROS API</a:t>
             </a:r>
             <a:br>
-              <a:rPr lang="en-US" kern="0" dirty="0" smtClean="0">
+              <a:rPr lang="en-US" sz="1600" kern="0" dirty="0">
                 <a:solidFill>
                   <a:prstClr val="white"/>
                 </a:solidFill>
@@ -15920,50 +15331,23 @@
               </a:rPr>
             </a:br>
             <a:r>
-              <a:rPr lang="en-US" kern="0" dirty="0" smtClean="0">
+              <a:rPr lang="en-US" sz="1600" kern="0" dirty="0">
                 <a:solidFill>
                   <a:prstClr val="white"/>
                 </a:solidFill>
                 <a:latin typeface="Calibri" panose="020F0502020204030204"/>
               </a:rPr>
-              <a:t>ROS Client Support Lib </a:t>
-            </a:r>
-            <a:r>
-              <a:rPr lang="en-US" kern="0" dirty="0">
-                <a:solidFill>
-                  <a:prstClr val="white"/>
-                </a:solidFill>
-                <a:latin typeface="Calibri" panose="020F0502020204030204"/>
-              </a:rPr>
-              <a:t>(</a:t>
-            </a:r>
-            <a:r>
-              <a:rPr lang="en-US" kern="0" dirty="0" err="1">
-                <a:solidFill>
-                  <a:prstClr val="white"/>
-                </a:solidFill>
-                <a:latin typeface="Calibri" panose="020F0502020204030204"/>
-              </a:rPr>
-              <a:t>rcl</a:t>
-            </a:r>
-            <a:r>
-              <a:rPr lang="en-US" kern="0" dirty="0">
-                <a:solidFill>
-                  <a:prstClr val="white"/>
-                </a:solidFill>
-                <a:latin typeface="Calibri" panose="020F0502020204030204"/>
-              </a:rPr>
-              <a:t>)</a:t>
+              <a:t>in C language</a:t>
             </a:r>
           </a:p>
         </p:txBody>
       </p:sp>
       <p:sp>
         <p:nvSpPr>
-          <p:cNvPr id="126" name="Rectangle 125">
+          <p:cNvPr id="65" name="Rectangle 64">
             <a:extLst>
               <a:ext uri="{FF2B5EF4-FFF2-40B4-BE49-F238E27FC236}">
-                <a16:creationId xmlns:a16="http://schemas.microsoft.com/office/drawing/2014/main" id="{82178F51-028C-4184-9F8B-01114BBC2DFE}"/>
+                <a16:creationId xmlns:a16="http://schemas.microsoft.com/office/drawing/2014/main" id="{4F6C2E19-72BA-4B3B-8FF2-60F75CFE1779}"/>
               </a:ext>
             </a:extLst>
           </p:cNvPr>
@@ -15972,8 +15356,8 @@
         </p:nvSpPr>
         <p:spPr>
           <a:xfrm>
-            <a:off x="3289290" y="2221380"/>
-            <a:ext cx="709842" cy="3337975"/>
+            <a:off x="2999840" y="2288489"/>
+            <a:ext cx="638673" cy="2707262"/>
           </a:xfrm>
           <a:prstGeom prst="rect">
             <a:avLst/>
@@ -15995,7 +15379,7 @@
           <a:effectLst/>
         </p:spPr>
         <p:txBody>
-          <a:bodyPr vert="horz" wrap="none" bIns="36000" rtlCol="0" anchor="b"/>
+          <a:bodyPr vert="horz" wrap="none" bIns="32391" rtlCol="0" anchor="b"/>
           <a:lstStyle>
             <a:defPPr>
               <a:defRPr lang="en-US"/>
@@ -16092,7 +15476,7 @@
             </a:lvl9pPr>
           </a:lstStyle>
           <a:p>
-            <a:pPr marL="0" marR="0" lvl="0" indent="0" algn="ctr" defTabSz="914400" rtl="0" eaLnBrk="1" fontAlgn="auto" latinLnBrk="0" hangingPunct="1">
+            <a:pPr marL="0" marR="0" lvl="0" indent="0" algn="ctr" defTabSz="822564" rtl="0" eaLnBrk="1" fontAlgn="auto" latinLnBrk="0" hangingPunct="1">
               <a:lnSpc>
                 <a:spcPct val="100000"/>
               </a:lnSpc>
@@ -16110,7 +15494,7 @@
               <a:defRPr/>
             </a:pPr>
             <a:r>
-              <a:rPr kumimoji="0" lang="en-US" sz="1800" b="0" i="0" u="none" strike="noStrike" kern="0" cap="none" spc="0" normalizeH="0" baseline="0" noProof="0" dirty="0" smtClean="0">
+              <a:rPr kumimoji="0" lang="en-US" sz="1600" b="0" i="0" u="none" strike="noStrike" kern="0" cap="none" spc="0" normalizeH="0" baseline="0" noProof="0" dirty="0">
                 <a:ln>
                   <a:noFill/>
                 </a:ln>
@@ -16128,7 +15512,7 @@
             </a:r>
           </a:p>
           <a:p>
-            <a:pPr marL="0" marR="0" lvl="0" indent="0" algn="ctr" defTabSz="914400" rtl="0" eaLnBrk="1" fontAlgn="auto" latinLnBrk="0" hangingPunct="1">
+            <a:pPr marL="0" marR="0" lvl="0" indent="0" algn="ctr" defTabSz="822564" rtl="0" eaLnBrk="1" fontAlgn="auto" latinLnBrk="0" hangingPunct="1">
               <a:lnSpc>
                 <a:spcPct val="100000"/>
               </a:lnSpc>
@@ -16146,7 +15530,7 @@
               <a:defRPr/>
             </a:pPr>
             <a:r>
-              <a:rPr kumimoji="0" lang="en-US" sz="1800" b="0" i="0" u="none" strike="noStrike" kern="0" cap="none" spc="0" normalizeH="0" baseline="0" noProof="0" dirty="0" smtClean="0">
+              <a:rPr kumimoji="0" lang="en-US" sz="1600" b="0" i="0" u="none" strike="noStrike" kern="0" cap="none" spc="0" normalizeH="0" baseline="0" noProof="0" dirty="0">
                 <a:ln>
                   <a:noFill/>
                 </a:ln>
@@ -16162,7 +15546,26 @@
               </a:rPr>
               <a:t>stack</a:t>
             </a:r>
-            <a:endParaRPr kumimoji="0" lang="en-US" sz="1800" b="0" i="0" u="none" strike="noStrike" kern="0" cap="none" spc="0" normalizeH="0" baseline="0" noProof="0" dirty="0">
+          </a:p>
+          <a:p>
+            <a:pPr marL="0" marR="0" lvl="0" indent="0" algn="ctr" defTabSz="822564" rtl="0" eaLnBrk="1" fontAlgn="auto" latinLnBrk="0" hangingPunct="1">
+              <a:lnSpc>
+                <a:spcPct val="100000"/>
+              </a:lnSpc>
+              <a:spcBef>
+                <a:spcPts val="0"/>
+              </a:spcBef>
+              <a:spcAft>
+                <a:spcPts val="0"/>
+              </a:spcAft>
+              <a:buClrTx/>
+              <a:buSzTx/>
+              <a:buFontTx/>
+              <a:buNone/>
+              <a:tabLst/>
+              <a:defRPr/>
+            </a:pPr>
+            <a:endParaRPr kumimoji="0" lang="en-US" sz="1600" b="0" i="0" u="none" strike="noStrike" kern="0" cap="none" spc="0" normalizeH="0" baseline="0" noProof="0" dirty="0">
               <a:ln>
                 <a:noFill/>
               </a:ln>
@@ -16178,7 +15581,7 @@
             </a:endParaRPr>
           </a:p>
           <a:p>
-            <a:pPr marL="0" marR="0" lvl="0" indent="0" algn="ctr" defTabSz="914400" rtl="0" eaLnBrk="1" fontAlgn="auto" latinLnBrk="0" hangingPunct="1">
+            <a:pPr marL="0" marR="0" lvl="0" indent="0" algn="ctr" defTabSz="822564" rtl="0" eaLnBrk="1" fontAlgn="auto" latinLnBrk="0" hangingPunct="1">
               <a:lnSpc>
                 <a:spcPct val="100000"/>
               </a:lnSpc>
@@ -16195,7 +15598,7 @@
               <a:tabLst/>
               <a:defRPr/>
             </a:pPr>
-            <a:endParaRPr kumimoji="0" lang="en-US" sz="1800" b="0" i="0" u="none" strike="noStrike" kern="0" cap="none" spc="0" normalizeH="0" baseline="0" noProof="0" dirty="0" smtClean="0">
+            <a:endParaRPr kumimoji="0" lang="en-US" sz="1600" b="0" i="0" u="none" strike="noStrike" kern="0" cap="none" spc="0" normalizeH="0" baseline="0" noProof="0" dirty="0">
               <a:ln>
                 <a:noFill/>
               </a:ln>
@@ -16211,7 +15614,7 @@
             </a:endParaRPr>
           </a:p>
           <a:p>
-            <a:pPr marL="0" marR="0" lvl="0" indent="0" algn="ctr" defTabSz="914400" rtl="0" eaLnBrk="1" fontAlgn="auto" latinLnBrk="0" hangingPunct="1">
+            <a:pPr marL="0" marR="0" lvl="0" indent="0" algn="ctr" defTabSz="822564" rtl="0" eaLnBrk="1" fontAlgn="auto" latinLnBrk="0" hangingPunct="1">
               <a:lnSpc>
                 <a:spcPct val="100000"/>
               </a:lnSpc>
@@ -16228,7 +15631,7 @@
               <a:tabLst/>
               <a:defRPr/>
             </a:pPr>
-            <a:endParaRPr kumimoji="0" lang="en-US" sz="1800" b="0" i="0" u="none" strike="noStrike" kern="0" cap="none" spc="0" normalizeH="0" baseline="0" noProof="0" dirty="0">
+            <a:endParaRPr kumimoji="0" lang="en-US" sz="1600" b="0" i="0" u="none" strike="noStrike" kern="0" cap="none" spc="0" normalizeH="0" baseline="0" noProof="0" dirty="0">
               <a:ln>
                 <a:noFill/>
               </a:ln>
@@ -16244,7 +15647,7 @@
             </a:endParaRPr>
           </a:p>
           <a:p>
-            <a:pPr marL="0" marR="0" lvl="0" indent="0" algn="ctr" defTabSz="914400" rtl="0" eaLnBrk="1" fontAlgn="auto" latinLnBrk="0" hangingPunct="1">
+            <a:pPr marL="0" marR="0" lvl="0" indent="0" algn="ctr" defTabSz="822564" rtl="0" eaLnBrk="1" fontAlgn="auto" latinLnBrk="0" hangingPunct="1">
               <a:lnSpc>
                 <a:spcPct val="100000"/>
               </a:lnSpc>
@@ -16261,7 +15664,7 @@
               <a:tabLst/>
               <a:defRPr/>
             </a:pPr>
-            <a:endParaRPr kumimoji="0" lang="en-US" sz="1800" b="0" i="0" u="none" strike="noStrike" kern="0" cap="none" spc="0" normalizeH="0" baseline="0" noProof="0" dirty="0" smtClean="0">
+            <a:endParaRPr kumimoji="0" lang="en-US" sz="1600" b="0" i="0" u="none" strike="noStrike" kern="0" cap="none" spc="0" normalizeH="0" baseline="0" noProof="0" dirty="0">
               <a:ln>
                 <a:noFill/>
               </a:ln>
@@ -16277,7 +15680,7 @@
             </a:endParaRPr>
           </a:p>
           <a:p>
-            <a:pPr marL="0" marR="0" lvl="0" indent="0" algn="ctr" defTabSz="914400" rtl="0" eaLnBrk="1" fontAlgn="auto" latinLnBrk="0" hangingPunct="1">
+            <a:pPr marL="0" marR="0" lvl="0" indent="0" algn="ctr" defTabSz="822564" rtl="0" eaLnBrk="1" fontAlgn="auto" latinLnBrk="0" hangingPunct="1">
               <a:lnSpc>
                 <a:spcPct val="100000"/>
               </a:lnSpc>
@@ -16294,7 +15697,7 @@
               <a:tabLst/>
               <a:defRPr/>
             </a:pPr>
-            <a:endParaRPr kumimoji="0" lang="en-US" sz="1800" b="0" i="0" u="none" strike="noStrike" kern="0" cap="none" spc="0" normalizeH="0" baseline="0" noProof="0" dirty="0">
+            <a:endParaRPr kumimoji="0" lang="en-US" sz="1600" b="0" i="0" u="none" strike="noStrike" kern="0" cap="none" spc="0" normalizeH="0" baseline="0" noProof="0" dirty="0">
               <a:ln>
                 <a:noFill/>
               </a:ln>
@@ -16310,7 +15713,7 @@
             </a:endParaRPr>
           </a:p>
           <a:p>
-            <a:pPr marL="0" marR="0" lvl="0" indent="0" algn="ctr" defTabSz="914400" rtl="0" eaLnBrk="1" fontAlgn="auto" latinLnBrk="0" hangingPunct="1">
+            <a:pPr marL="0" marR="0" lvl="0" indent="0" algn="ctr" defTabSz="822564" rtl="0" eaLnBrk="1" fontAlgn="auto" latinLnBrk="0" hangingPunct="1">
               <a:lnSpc>
                 <a:spcPct val="100000"/>
               </a:lnSpc>
@@ -16327,7 +15730,7 @@
               <a:tabLst/>
               <a:defRPr/>
             </a:pPr>
-            <a:endParaRPr kumimoji="0" lang="en-US" sz="1800" b="0" i="0" u="none" strike="noStrike" kern="0" cap="none" spc="0" normalizeH="0" baseline="0" noProof="0" dirty="0" smtClean="0">
+            <a:endParaRPr kumimoji="0" lang="en-US" sz="1600" b="0" i="0" u="none" strike="noStrike" kern="0" cap="none" spc="0" normalizeH="0" baseline="0" noProof="0" dirty="0">
               <a:ln>
                 <a:noFill/>
               </a:ln>
@@ -16343,7 +15746,7 @@
             </a:endParaRPr>
           </a:p>
           <a:p>
-            <a:pPr marL="0" marR="0" lvl="0" indent="0" algn="ctr" defTabSz="914400" rtl="0" eaLnBrk="1" fontAlgn="auto" latinLnBrk="0" hangingPunct="1">
+            <a:pPr marL="0" marR="0" lvl="0" indent="0" algn="ctr" defTabSz="822564" rtl="0" eaLnBrk="1" fontAlgn="auto" latinLnBrk="0" hangingPunct="1">
               <a:lnSpc>
                 <a:spcPct val="100000"/>
               </a:lnSpc>
@@ -16360,41 +15763,8 @@
               <a:tabLst/>
               <a:defRPr/>
             </a:pPr>
-            <a:endParaRPr kumimoji="0" lang="en-US" sz="1800" b="0" i="0" u="none" strike="noStrike" kern="0" cap="none" spc="0" normalizeH="0" baseline="0" noProof="0" dirty="0">
-              <a:ln>
-                <a:noFill/>
-              </a:ln>
-              <a:solidFill>
-                <a:prstClr val="white"/>
-              </a:solidFill>
-              <a:effectLst/>
-              <a:uLnTx/>
-              <a:uFillTx/>
-              <a:latin typeface="Calibri" panose="020F0502020204030204"/>
-              <a:ea typeface="+mn-ea"/>
-              <a:cs typeface="+mn-cs"/>
-            </a:endParaRPr>
-          </a:p>
-          <a:p>
-            <a:pPr marL="0" marR="0" lvl="0" indent="0" algn="ctr" defTabSz="914400" rtl="0" eaLnBrk="1" fontAlgn="auto" latinLnBrk="0" hangingPunct="1">
-              <a:lnSpc>
-                <a:spcPct val="100000"/>
-              </a:lnSpc>
-              <a:spcBef>
-                <a:spcPts val="0"/>
-              </a:spcBef>
-              <a:spcAft>
-                <a:spcPts val="0"/>
-              </a:spcAft>
-              <a:buClrTx/>
-              <a:buSzTx/>
-              <a:buFontTx/>
-              <a:buNone/>
-              <a:tabLst/>
-              <a:defRPr/>
-            </a:pPr>
             <a:r>
-              <a:rPr kumimoji="0" lang="en-US" sz="1800" b="0" i="0" u="none" strike="noStrike" kern="0" cap="none" spc="0" normalizeH="0" baseline="0" noProof="0" dirty="0" smtClean="0">
+              <a:rPr kumimoji="0" lang="en-US" sz="1600" b="0" i="0" u="none" strike="noStrike" kern="0" cap="none" spc="0" normalizeH="0" baseline="0" noProof="0" dirty="0">
                 <a:ln>
                   <a:noFill/>
                 </a:ln>
@@ -16411,7 +15781,7 @@
               <a:t>on a</a:t>
             </a:r>
             <a:br>
-              <a:rPr kumimoji="0" lang="en-US" sz="1800" b="0" i="0" u="none" strike="noStrike" kern="0" cap="none" spc="0" normalizeH="0" baseline="0" noProof="0" dirty="0" smtClean="0">
+              <a:rPr kumimoji="0" lang="en-US" sz="1600" b="0" i="0" u="none" strike="noStrike" kern="0" cap="none" spc="0" normalizeH="0" baseline="0" noProof="0" dirty="0">
                 <a:ln>
                   <a:noFill/>
                 </a:ln>
@@ -16427,7 +15797,7 @@
               </a:rPr>
             </a:br>
             <a:r>
-              <a:rPr kumimoji="0" lang="en-US" sz="1800" b="0" i="0" u="none" strike="noStrike" kern="0" cap="none" spc="0" normalizeH="0" baseline="0" noProof="0" dirty="0" smtClean="0">
+              <a:rPr kumimoji="0" lang="en-US" sz="1600" b="0" i="0" u="none" strike="noStrike" kern="0" cap="none" spc="0" normalizeH="0" baseline="0" noProof="0" dirty="0">
                 <a:ln>
                   <a:noFill/>
                 </a:ln>
@@ -16444,7 +15814,7 @@
               <a:t>normal</a:t>
             </a:r>
             <a:br>
-              <a:rPr kumimoji="0" lang="en-US" sz="1800" b="0" i="0" u="none" strike="noStrike" kern="0" cap="none" spc="0" normalizeH="0" baseline="0" noProof="0" dirty="0" smtClean="0">
+              <a:rPr kumimoji="0" lang="en-US" sz="1600" b="0" i="0" u="none" strike="noStrike" kern="0" cap="none" spc="0" normalizeH="0" baseline="0" noProof="0" dirty="0">
                 <a:ln>
                   <a:noFill/>
                 </a:ln>
@@ -16460,7 +15830,7 @@
               </a:rPr>
             </a:br>
             <a:r>
-              <a:rPr kumimoji="0" lang="en-US" sz="1800" b="0" i="0" u="none" strike="noStrike" kern="0" cap="none" spc="0" normalizeH="0" baseline="0" noProof="0" dirty="0" smtClean="0">
+              <a:rPr kumimoji="0" lang="en-US" sz="1600" b="0" i="0" u="none" strike="noStrike" kern="0" cap="none" spc="0" normalizeH="0" baseline="0" noProof="0" dirty="0">
                 <a:ln>
                   <a:noFill/>
                 </a:ln>
@@ -16476,29 +15846,15 @@
               </a:rPr>
               <a:t>OS</a:t>
             </a:r>
-            <a:endParaRPr kumimoji="0" lang="en-US" sz="1800" b="0" i="0" u="none" strike="noStrike" kern="0" cap="none" spc="0" normalizeH="0" baseline="0" noProof="0" dirty="0">
-              <a:ln>
-                <a:noFill/>
-              </a:ln>
-              <a:solidFill>
-                <a:prstClr val="white"/>
-              </a:solidFill>
-              <a:effectLst/>
-              <a:uLnTx/>
-              <a:uFillTx/>
-              <a:latin typeface="Calibri" panose="020F0502020204030204"/>
-              <a:ea typeface="+mn-ea"/>
-              <a:cs typeface="+mn-cs"/>
-            </a:endParaRPr>
           </a:p>
         </p:txBody>
       </p:sp>
       <p:sp>
         <p:nvSpPr>
-          <p:cNvPr id="127" name="Rectangle 126">
+          <p:cNvPr id="66" name="Rectangle 65">
             <a:extLst>
               <a:ext uri="{FF2B5EF4-FFF2-40B4-BE49-F238E27FC236}">
-                <a16:creationId xmlns:a16="http://schemas.microsoft.com/office/drawing/2014/main" id="{73FC8B1B-4F7C-4CC0-AEA7-71B140296DB4}"/>
+                <a16:creationId xmlns:a16="http://schemas.microsoft.com/office/drawing/2014/main" id="{5807495D-5F2E-42C5-9A29-12C3F092267D}"/>
               </a:ext>
             </a:extLst>
           </p:cNvPr>
@@ -16507,8 +15863,8 @@
         </p:nvSpPr>
         <p:spPr>
           <a:xfrm rot="16200000">
-            <a:off x="7586477" y="3484196"/>
-            <a:ext cx="4595048" cy="537759"/>
+            <a:off x="6868316" y="3286307"/>
+            <a:ext cx="3848094" cy="483843"/>
           </a:xfrm>
           <a:prstGeom prst="rect">
             <a:avLst/>
@@ -16630,7 +15986,7 @@
               <a:defRPr/>
             </a:pPr>
             <a:r>
-              <a:rPr lang="en-US" kern="0" dirty="0">
+              <a:rPr lang="en-US" sz="1600" kern="0" dirty="0">
                 <a:solidFill>
                   <a:prstClr val="white"/>
                 </a:solidFill>
@@ -16643,10 +15999,10 @@
       </p:sp>
       <p:sp>
         <p:nvSpPr>
-          <p:cNvPr id="128" name="Rectangle 127">
+          <p:cNvPr id="67" name="Rectangle 66">
             <a:extLst>
               <a:ext uri="{FF2B5EF4-FFF2-40B4-BE49-F238E27FC236}">
-                <a16:creationId xmlns:a16="http://schemas.microsoft.com/office/drawing/2014/main" id="{68C637CA-E15F-4BDE-A708-CE02ABFED94B}"/>
+                <a16:creationId xmlns:a16="http://schemas.microsoft.com/office/drawing/2014/main" id="{2D9B57BA-67F9-4291-9F36-6890B535B65F}"/>
               </a:ext>
             </a:extLst>
           </p:cNvPr>
@@ -16655,8 +16011,8 @@
         </p:nvSpPr>
         <p:spPr>
           <a:xfrm>
-            <a:off x="3289290" y="1455551"/>
-            <a:ext cx="1075519" cy="537759"/>
+            <a:off x="2999840" y="1604182"/>
+            <a:ext cx="967687" cy="483843"/>
           </a:xfrm>
           <a:prstGeom prst="rect">
             <a:avLst/>
@@ -16775,7 +16131,7 @@
             </a:lvl9pPr>
           </a:lstStyle>
           <a:p>
-            <a:pPr marL="0" marR="0" lvl="0" indent="0" algn="ctr" defTabSz="914400" rtl="0" eaLnBrk="1" fontAlgn="auto" latinLnBrk="0" hangingPunct="1">
+            <a:pPr marL="0" marR="0" lvl="0" indent="0" algn="ctr" defTabSz="822564" rtl="0" eaLnBrk="1" fontAlgn="auto" latinLnBrk="0" hangingPunct="1">
               <a:lnSpc>
                 <a:spcPct val="100000"/>
               </a:lnSpc>
@@ -16793,7 +16149,7 @@
               <a:defRPr/>
             </a:pPr>
             <a:r>
-              <a:rPr kumimoji="0" lang="en-US" sz="1600" b="0" i="0" u="none" strike="noStrike" kern="0" cap="none" spc="0" normalizeH="0" baseline="0" noProof="0" dirty="0">
+              <a:rPr kumimoji="0" lang="en-US" sz="1400" b="0" i="0" u="none" strike="noStrike" kern="0" cap="none" spc="0" normalizeH="0" baseline="0" noProof="0" dirty="0">
                 <a:ln>
                   <a:noFill/>
                 </a:ln>
@@ -16810,7 +16166,7 @@
               <a:t>Application</a:t>
             </a:r>
             <a:br>
-              <a:rPr kumimoji="0" lang="en-US" sz="1600" b="0" i="0" u="none" strike="noStrike" kern="0" cap="none" spc="0" normalizeH="0" baseline="0" noProof="0" dirty="0">
+              <a:rPr kumimoji="0" lang="en-US" sz="1400" b="0" i="0" u="none" strike="noStrike" kern="0" cap="none" spc="0" normalizeH="0" baseline="0" noProof="0" dirty="0">
                 <a:ln>
                   <a:noFill/>
                 </a:ln>
@@ -16826,7 +16182,7 @@
               </a:rPr>
             </a:br>
             <a:r>
-              <a:rPr kumimoji="0" lang="en-US" sz="1600" b="0" i="0" u="none" strike="noStrike" kern="0" cap="none" spc="0" normalizeH="0" baseline="0" noProof="0" dirty="0">
+              <a:rPr kumimoji="0" lang="en-US" sz="1400" b="0" i="0" u="none" strike="noStrike" kern="0" cap="none" spc="0" normalizeH="0" baseline="0" noProof="0" dirty="0">
                 <a:ln>
                   <a:noFill/>
                 </a:ln>
@@ -16847,10 +16203,10 @@
       </p:sp>
       <p:sp>
         <p:nvSpPr>
-          <p:cNvPr id="129" name="Rectangle 128">
+          <p:cNvPr id="68" name="Rectangle 67">
             <a:extLst>
               <a:ext uri="{FF2B5EF4-FFF2-40B4-BE49-F238E27FC236}">
-                <a16:creationId xmlns:a16="http://schemas.microsoft.com/office/drawing/2014/main" id="{43814742-EAFD-498E-A7B9-3AE25386FA4C}"/>
+                <a16:creationId xmlns:a16="http://schemas.microsoft.com/office/drawing/2014/main" id="{9236F9F5-F0A1-491C-BF58-05DA60E06DED}"/>
               </a:ext>
             </a:extLst>
           </p:cNvPr>
@@ -16859,8 +16215,8 @@
         </p:nvSpPr>
         <p:spPr>
           <a:xfrm>
-            <a:off x="4906823" y="3584086"/>
-            <a:ext cx="3640217" cy="268880"/>
+            <a:off x="4455198" y="3021276"/>
+            <a:ext cx="3275249" cy="180000"/>
           </a:xfrm>
           <a:prstGeom prst="rect">
             <a:avLst/>
@@ -16982,7 +16338,7 @@
               <a:defRPr/>
             </a:pPr>
             <a:r>
-              <a:rPr lang="en-US" kern="0" dirty="0">
+              <a:rPr lang="en-US" sz="1200" kern="0" dirty="0">
                 <a:solidFill>
                   <a:prstClr val="white"/>
                 </a:solidFill>
@@ -16991,7 +16347,7 @@
               <a:t>ROS Middleware Interface (</a:t>
             </a:r>
             <a:r>
-              <a:rPr lang="en-US" kern="0" dirty="0" err="1">
+              <a:rPr lang="en-US" sz="1200" kern="0" dirty="0" err="1">
                 <a:solidFill>
                   <a:prstClr val="white"/>
                 </a:solidFill>
@@ -17000,7 +16356,7 @@
               <a:t>rmw</a:t>
             </a:r>
             <a:r>
-              <a:rPr lang="en-US" kern="0" dirty="0">
+              <a:rPr lang="en-US" sz="1200" kern="0" dirty="0">
                 <a:solidFill>
                   <a:prstClr val="white"/>
                 </a:solidFill>
@@ -17013,10 +16369,10 @@
       </p:sp>
       <p:sp>
         <p:nvSpPr>
-          <p:cNvPr id="130" name="Rectangle 129">
+          <p:cNvPr id="69" name="Rectangle 68">
             <a:extLst>
               <a:ext uri="{FF2B5EF4-FFF2-40B4-BE49-F238E27FC236}">
-                <a16:creationId xmlns:a16="http://schemas.microsoft.com/office/drawing/2014/main" id="{1AAE08D4-F722-4386-B2CD-86730DB7CF1B}"/>
+                <a16:creationId xmlns:a16="http://schemas.microsoft.com/office/drawing/2014/main" id="{78C9C233-0E65-43FB-9245-BCF709A49596}"/>
               </a:ext>
             </a:extLst>
           </p:cNvPr>
@@ -17025,8 +16381,8 @@
         </p:nvSpPr>
         <p:spPr>
           <a:xfrm>
-            <a:off x="4906823" y="3431539"/>
-            <a:ext cx="3640217" cy="82732"/>
+            <a:off x="4455199" y="2890793"/>
+            <a:ext cx="3275247" cy="74437"/>
           </a:xfrm>
           <a:prstGeom prst="rect">
             <a:avLst/>
@@ -17143,7 +16499,7 @@
               <a:buNone/>
               <a:defRPr/>
             </a:pPr>
-            <a:endParaRPr lang="en-US" sz="800" kern="0" dirty="0">
+            <a:endParaRPr lang="en-US" sz="720" kern="0" dirty="0">
               <a:solidFill>
                 <a:srgbClr val="FFFFFF"/>
               </a:solidFill>
@@ -17154,10 +16510,10 @@
       </p:sp>
       <p:sp>
         <p:nvSpPr>
-          <p:cNvPr id="131" name="Rectangle 130">
+          <p:cNvPr id="70" name="Rectangle 69">
             <a:extLst>
               <a:ext uri="{FF2B5EF4-FFF2-40B4-BE49-F238E27FC236}">
-                <a16:creationId xmlns:a16="http://schemas.microsoft.com/office/drawing/2014/main" id="{1AAE08D4-F722-4386-B2CD-86730DB7CF1B}"/>
+                <a16:creationId xmlns:a16="http://schemas.microsoft.com/office/drawing/2014/main" id="{C2C98A88-5EFF-4672-9FAC-D159C26DF5A0}"/>
               </a:ext>
             </a:extLst>
           </p:cNvPr>
@@ -17166,8 +16522,8 @@
         </p:nvSpPr>
         <p:spPr>
           <a:xfrm>
-            <a:off x="4906823" y="2063365"/>
-            <a:ext cx="3640217" cy="82732"/>
+            <a:off x="4455199" y="2151054"/>
+            <a:ext cx="3275247" cy="74437"/>
           </a:xfrm>
           <a:prstGeom prst="rect">
             <a:avLst/>
@@ -17284,7 +16640,7 @@
               <a:buNone/>
               <a:defRPr/>
             </a:pPr>
-            <a:endParaRPr lang="en-US" sz="800" kern="0" dirty="0">
+            <a:endParaRPr lang="en-US" sz="720" kern="0" dirty="0">
               <a:solidFill>
                 <a:srgbClr val="FFFFFF"/>
               </a:solidFill>
@@ -17295,10 +16651,10 @@
       </p:sp>
       <p:sp>
         <p:nvSpPr>
-          <p:cNvPr id="132" name="Rectangle 131">
+          <p:cNvPr id="71" name="Rectangle 70">
             <a:extLst>
               <a:ext uri="{FF2B5EF4-FFF2-40B4-BE49-F238E27FC236}">
-                <a16:creationId xmlns:a16="http://schemas.microsoft.com/office/drawing/2014/main" id="{1AAE08D4-F722-4386-B2CD-86730DB7CF1B}"/>
+                <a16:creationId xmlns:a16="http://schemas.microsoft.com/office/drawing/2014/main" id="{6E3EA35A-3628-4EE1-9D14-D2B2EC236B41}"/>
               </a:ext>
             </a:extLst>
           </p:cNvPr>
@@ -17307,8 +16663,8 @@
         </p:nvSpPr>
         <p:spPr>
           <a:xfrm>
-            <a:off x="4906823" y="5629169"/>
-            <a:ext cx="3640217" cy="82732"/>
+            <a:off x="4455199" y="5051797"/>
+            <a:ext cx="3275247" cy="74437"/>
           </a:xfrm>
           <a:prstGeom prst="rect">
             <a:avLst/>
@@ -17425,7 +16781,7 @@
               <a:buNone/>
               <a:defRPr/>
             </a:pPr>
-            <a:endParaRPr lang="en-US" sz="800" kern="0" dirty="0">
+            <a:endParaRPr lang="en-US" sz="720" kern="0" dirty="0">
               <a:solidFill>
                 <a:srgbClr val="FFFFFF"/>
               </a:solidFill>
@@ -17436,10 +16792,10 @@
       </p:sp>
       <p:sp>
         <p:nvSpPr>
-          <p:cNvPr id="133" name="Rectangle 132">
+          <p:cNvPr id="72" name="Rectangle 71">
             <a:extLst>
               <a:ext uri="{FF2B5EF4-FFF2-40B4-BE49-F238E27FC236}">
-                <a16:creationId xmlns:a16="http://schemas.microsoft.com/office/drawing/2014/main" id="{1AAE08D4-F722-4386-B2CD-86730DB7CF1B}"/>
+                <a16:creationId xmlns:a16="http://schemas.microsoft.com/office/drawing/2014/main" id="{5352D8F1-5445-4E9E-81C8-E85C7ACC363A}"/>
               </a:ext>
             </a:extLst>
           </p:cNvPr>
@@ -17448,8 +16804,8 @@
         </p:nvSpPr>
         <p:spPr>
           <a:xfrm>
-            <a:off x="4906823" y="4530354"/>
-            <a:ext cx="3640217" cy="82732"/>
+            <a:off x="4455199" y="4089222"/>
+            <a:ext cx="3275247" cy="74437"/>
           </a:xfrm>
           <a:prstGeom prst="rect">
             <a:avLst/>
@@ -17566,7 +16922,7 @@
               <a:buNone/>
               <a:defRPr/>
             </a:pPr>
-            <a:endParaRPr lang="en-US" sz="800" kern="0" dirty="0">
+            <a:endParaRPr lang="en-US" sz="720" kern="0" dirty="0">
               <a:solidFill>
                 <a:srgbClr val="FFFFFF"/>
               </a:solidFill>
@@ -17577,10 +16933,10 @@
       </p:sp>
       <p:sp>
         <p:nvSpPr>
-          <p:cNvPr id="134" name="Rectangle 133">
+          <p:cNvPr id="73" name="Rectangle 72">
             <a:extLst>
               <a:ext uri="{FF2B5EF4-FFF2-40B4-BE49-F238E27FC236}">
-                <a16:creationId xmlns:a16="http://schemas.microsoft.com/office/drawing/2014/main" id="{1AAE08D4-F722-4386-B2CD-86730DB7CF1B}"/>
+                <a16:creationId xmlns:a16="http://schemas.microsoft.com/office/drawing/2014/main" id="{7EECA7C5-F8EF-46BD-ABE7-231A18D37741}"/>
               </a:ext>
             </a:extLst>
           </p:cNvPr>
@@ -17589,553 +16945,8 @@
         </p:nvSpPr>
         <p:spPr>
           <a:xfrm>
-            <a:off x="6818370" y="4682901"/>
-            <a:ext cx="1728669" cy="268880"/>
-          </a:xfrm>
-          <a:prstGeom prst="rect">
-            <a:avLst/>
-          </a:prstGeom>
-          <a:solidFill>
-            <a:srgbClr val="324D7A"/>
-          </a:solidFill>
-          <a:ln w="19050" cap="flat" cmpd="sng" algn="ctr">
-            <a:solidFill>
-              <a:srgbClr val="1F314F"/>
-            </a:solidFill>
-            <a:prstDash val="solid"/>
-            <a:miter lim="800000"/>
-          </a:ln>
-          <a:effectLst/>
-        </p:spPr>
-        <p:txBody>
-          <a:bodyPr wrap="none" lIns="0" tIns="0" rIns="0" bIns="0" rtlCol="0" anchor="ctr"/>
-          <a:lstStyle>
-            <a:defPPr>
-              <a:defRPr lang="en-US"/>
-            </a:defPPr>
-            <a:lvl1pPr marL="0" algn="l" defTabSz="914400" rtl="0" eaLnBrk="1" latinLnBrk="0" hangingPunct="1">
-              <a:defRPr sz="1800" kern="1200">
-                <a:solidFill>
-                  <a:schemeClr val="tx1"/>
-                </a:solidFill>
-                <a:latin typeface="+mn-lt"/>
-                <a:ea typeface="+mn-ea"/>
-                <a:cs typeface="+mn-cs"/>
-              </a:defRPr>
-            </a:lvl1pPr>
-            <a:lvl2pPr marL="457200" algn="l" defTabSz="914400" rtl="0" eaLnBrk="1" latinLnBrk="0" hangingPunct="1">
-              <a:defRPr sz="1800" kern="1200">
-                <a:solidFill>
-                  <a:schemeClr val="tx1"/>
-                </a:solidFill>
-                <a:latin typeface="+mn-lt"/>
-                <a:ea typeface="+mn-ea"/>
-                <a:cs typeface="+mn-cs"/>
-              </a:defRPr>
-            </a:lvl2pPr>
-            <a:lvl3pPr marL="914400" algn="l" defTabSz="914400" rtl="0" eaLnBrk="1" latinLnBrk="0" hangingPunct="1">
-              <a:defRPr sz="1800" kern="1200">
-                <a:solidFill>
-                  <a:schemeClr val="tx1"/>
-                </a:solidFill>
-                <a:latin typeface="+mn-lt"/>
-                <a:ea typeface="+mn-ea"/>
-                <a:cs typeface="+mn-cs"/>
-              </a:defRPr>
-            </a:lvl3pPr>
-            <a:lvl4pPr marL="1371600" algn="l" defTabSz="914400" rtl="0" eaLnBrk="1" latinLnBrk="0" hangingPunct="1">
-              <a:defRPr sz="1800" kern="1200">
-                <a:solidFill>
-                  <a:schemeClr val="tx1"/>
-                </a:solidFill>
-                <a:latin typeface="+mn-lt"/>
-                <a:ea typeface="+mn-ea"/>
-                <a:cs typeface="+mn-cs"/>
-              </a:defRPr>
-            </a:lvl4pPr>
-            <a:lvl5pPr marL="1828800" algn="l" defTabSz="914400" rtl="0" eaLnBrk="1" latinLnBrk="0" hangingPunct="1">
-              <a:defRPr sz="1800" kern="1200">
-                <a:solidFill>
-                  <a:schemeClr val="tx1"/>
-                </a:solidFill>
-                <a:latin typeface="+mn-lt"/>
-                <a:ea typeface="+mn-ea"/>
-                <a:cs typeface="+mn-cs"/>
-              </a:defRPr>
-            </a:lvl5pPr>
-            <a:lvl6pPr marL="2286000" algn="l" defTabSz="914400" rtl="0" eaLnBrk="1" latinLnBrk="0" hangingPunct="1">
-              <a:defRPr sz="1800" kern="1200">
-                <a:solidFill>
-                  <a:schemeClr val="tx1"/>
-                </a:solidFill>
-                <a:latin typeface="+mn-lt"/>
-                <a:ea typeface="+mn-ea"/>
-                <a:cs typeface="+mn-cs"/>
-              </a:defRPr>
-            </a:lvl6pPr>
-            <a:lvl7pPr marL="2743200" algn="l" defTabSz="914400" rtl="0" eaLnBrk="1" latinLnBrk="0" hangingPunct="1">
-              <a:defRPr sz="1800" kern="1200">
-                <a:solidFill>
-                  <a:schemeClr val="tx1"/>
-                </a:solidFill>
-                <a:latin typeface="+mn-lt"/>
-                <a:ea typeface="+mn-ea"/>
-                <a:cs typeface="+mn-cs"/>
-              </a:defRPr>
-            </a:lvl7pPr>
-            <a:lvl8pPr marL="3200400" algn="l" defTabSz="914400" rtl="0" eaLnBrk="1" latinLnBrk="0" hangingPunct="1">
-              <a:defRPr sz="1800" kern="1200">
-                <a:solidFill>
-                  <a:schemeClr val="tx1"/>
-                </a:solidFill>
-                <a:latin typeface="+mn-lt"/>
-                <a:ea typeface="+mn-ea"/>
-                <a:cs typeface="+mn-cs"/>
-              </a:defRPr>
-            </a:lvl8pPr>
-            <a:lvl9pPr marL="3657600" algn="l" defTabSz="914400" rtl="0" eaLnBrk="1" latinLnBrk="0" hangingPunct="1">
-              <a:defRPr sz="1800" kern="1200">
-                <a:solidFill>
-                  <a:schemeClr val="tx1"/>
-                </a:solidFill>
-                <a:latin typeface="+mn-lt"/>
-                <a:ea typeface="+mn-ea"/>
-                <a:cs typeface="+mn-cs"/>
-              </a:defRPr>
-            </a:lvl9pPr>
-          </a:lstStyle>
-          <a:p>
-            <a:pPr algn="ctr">
-              <a:buClrTx/>
-              <a:buFontTx/>
-              <a:buNone/>
-            </a:pPr>
-            <a:r>
-              <a:rPr lang="en-US" sz="1100" kern="0" dirty="0" smtClean="0">
-                <a:solidFill>
-                  <a:prstClr val="white"/>
-                </a:solidFill>
-                <a:latin typeface="Calibri" panose="020F0502020204030204"/>
-              </a:rPr>
-              <a:t>+ Additional abstractions</a:t>
-            </a:r>
-            <a:endParaRPr lang="en-US" sz="1100" kern="0" dirty="0">
-              <a:solidFill>
-                <a:prstClr val="white"/>
-              </a:solidFill>
-              <a:latin typeface="Calibri" panose="020F0502020204030204"/>
-            </a:endParaRPr>
-          </a:p>
-        </p:txBody>
-      </p:sp>
-      <p:cxnSp>
-        <p:nvCxnSpPr>
-          <p:cNvPr id="135" name="Straight Connector 134"/>
-          <p:cNvCxnSpPr/>
-          <p:nvPr/>
-        </p:nvCxnSpPr>
-        <p:spPr>
-          <a:xfrm flipH="1">
-            <a:off x="4913514" y="4951121"/>
-            <a:ext cx="1874294" cy="0"/>
-          </a:xfrm>
-          <a:prstGeom prst="line">
-            <a:avLst/>
-          </a:prstGeom>
-          <a:solidFill>
-            <a:srgbClr val="0E78C5">
-              <a:lumMod val="60000"/>
-              <a:lumOff val="40000"/>
-            </a:srgbClr>
-          </a:solidFill>
-          <a:ln w="19050" cap="flat" cmpd="sng" algn="ctr">
-            <a:solidFill>
-              <a:srgbClr val="1F314F"/>
-            </a:solidFill>
-            <a:prstDash val="sysDot"/>
-            <a:miter lim="800000"/>
-          </a:ln>
-          <a:effectLst/>
-        </p:spPr>
-      </p:cxnSp>
-      <p:sp>
-        <p:nvSpPr>
-          <p:cNvPr id="136" name="Rectangle 135">
-            <a:extLst>
-              <a:ext uri="{FF2B5EF4-FFF2-40B4-BE49-F238E27FC236}">
-                <a16:creationId xmlns:a16="http://schemas.microsoft.com/office/drawing/2014/main" id="{07A06EC4-A794-4103-8F67-DF3DD33340F0}"/>
-              </a:ext>
-            </a:extLst>
-          </p:cNvPr>
-          <p:cNvSpPr/>
-          <p:nvPr/>
-        </p:nvSpPr>
-        <p:spPr>
-          <a:xfrm>
-            <a:off x="7791634" y="2906698"/>
-            <a:ext cx="661731" cy="372295"/>
-          </a:xfrm>
-          <a:prstGeom prst="rect">
-            <a:avLst/>
-          </a:prstGeom>
-          <a:solidFill>
-            <a:srgbClr val="324D7A"/>
-          </a:solidFill>
-          <a:ln w="19050" cap="flat" cmpd="sng" algn="ctr">
-            <a:solidFill>
-              <a:srgbClr val="1F314F"/>
-            </a:solidFill>
-            <a:prstDash val="solid"/>
-            <a:miter lim="800000"/>
-          </a:ln>
-          <a:effectLst/>
-        </p:spPr>
-        <p:txBody>
-          <a:bodyPr wrap="none" lIns="0" tIns="0" rIns="0" bIns="0" rtlCol="0" anchor="ctr"/>
-          <a:lstStyle>
-            <a:defPPr>
-              <a:defRPr lang="en-US"/>
-            </a:defPPr>
-            <a:lvl1pPr marL="0" algn="l" defTabSz="914400" rtl="0" eaLnBrk="1" latinLnBrk="0" hangingPunct="1">
-              <a:defRPr sz="1800" kern="1200">
-                <a:solidFill>
-                  <a:schemeClr val="tx1"/>
-                </a:solidFill>
-                <a:latin typeface="+mn-lt"/>
-                <a:ea typeface="+mn-ea"/>
-                <a:cs typeface="+mn-cs"/>
-              </a:defRPr>
-            </a:lvl1pPr>
-            <a:lvl2pPr marL="457200" algn="l" defTabSz="914400" rtl="0" eaLnBrk="1" latinLnBrk="0" hangingPunct="1">
-              <a:defRPr sz="1800" kern="1200">
-                <a:solidFill>
-                  <a:schemeClr val="tx1"/>
-                </a:solidFill>
-                <a:latin typeface="+mn-lt"/>
-                <a:ea typeface="+mn-ea"/>
-                <a:cs typeface="+mn-cs"/>
-              </a:defRPr>
-            </a:lvl2pPr>
-            <a:lvl3pPr marL="914400" algn="l" defTabSz="914400" rtl="0" eaLnBrk="1" latinLnBrk="0" hangingPunct="1">
-              <a:defRPr sz="1800" kern="1200">
-                <a:solidFill>
-                  <a:schemeClr val="tx1"/>
-                </a:solidFill>
-                <a:latin typeface="+mn-lt"/>
-                <a:ea typeface="+mn-ea"/>
-                <a:cs typeface="+mn-cs"/>
-              </a:defRPr>
-            </a:lvl3pPr>
-            <a:lvl4pPr marL="1371600" algn="l" defTabSz="914400" rtl="0" eaLnBrk="1" latinLnBrk="0" hangingPunct="1">
-              <a:defRPr sz="1800" kern="1200">
-                <a:solidFill>
-                  <a:schemeClr val="tx1"/>
-                </a:solidFill>
-                <a:latin typeface="+mn-lt"/>
-                <a:ea typeface="+mn-ea"/>
-                <a:cs typeface="+mn-cs"/>
-              </a:defRPr>
-            </a:lvl4pPr>
-            <a:lvl5pPr marL="1828800" algn="l" defTabSz="914400" rtl="0" eaLnBrk="1" latinLnBrk="0" hangingPunct="1">
-              <a:defRPr sz="1800" kern="1200">
-                <a:solidFill>
-                  <a:schemeClr val="tx1"/>
-                </a:solidFill>
-                <a:latin typeface="+mn-lt"/>
-                <a:ea typeface="+mn-ea"/>
-                <a:cs typeface="+mn-cs"/>
-              </a:defRPr>
-            </a:lvl5pPr>
-            <a:lvl6pPr marL="2286000" algn="l" defTabSz="914400" rtl="0" eaLnBrk="1" latinLnBrk="0" hangingPunct="1">
-              <a:defRPr sz="1800" kern="1200">
-                <a:solidFill>
-                  <a:schemeClr val="tx1"/>
-                </a:solidFill>
-                <a:latin typeface="+mn-lt"/>
-                <a:ea typeface="+mn-ea"/>
-                <a:cs typeface="+mn-cs"/>
-              </a:defRPr>
-            </a:lvl6pPr>
-            <a:lvl7pPr marL="2743200" algn="l" defTabSz="914400" rtl="0" eaLnBrk="1" latinLnBrk="0" hangingPunct="1">
-              <a:defRPr sz="1800" kern="1200">
-                <a:solidFill>
-                  <a:schemeClr val="tx1"/>
-                </a:solidFill>
-                <a:latin typeface="+mn-lt"/>
-                <a:ea typeface="+mn-ea"/>
-                <a:cs typeface="+mn-cs"/>
-              </a:defRPr>
-            </a:lvl7pPr>
-            <a:lvl8pPr marL="3200400" algn="l" defTabSz="914400" rtl="0" eaLnBrk="1" latinLnBrk="0" hangingPunct="1">
-              <a:defRPr sz="1800" kern="1200">
-                <a:solidFill>
-                  <a:schemeClr val="tx1"/>
-                </a:solidFill>
-                <a:latin typeface="+mn-lt"/>
-                <a:ea typeface="+mn-ea"/>
-                <a:cs typeface="+mn-cs"/>
-              </a:defRPr>
-            </a:lvl8pPr>
-            <a:lvl9pPr marL="3657600" algn="l" defTabSz="914400" rtl="0" eaLnBrk="1" latinLnBrk="0" hangingPunct="1">
-              <a:defRPr sz="1800" kern="1200">
-                <a:solidFill>
-                  <a:schemeClr val="tx1"/>
-                </a:solidFill>
-                <a:latin typeface="+mn-lt"/>
-                <a:ea typeface="+mn-ea"/>
-                <a:cs typeface="+mn-cs"/>
-              </a:defRPr>
-            </a:lvl9pPr>
-          </a:lstStyle>
-          <a:p>
-            <a:pPr algn="ctr">
-              <a:buClrTx/>
-              <a:buFontTx/>
-              <a:buNone/>
-              <a:defRPr/>
-            </a:pPr>
-            <a:r>
-              <a:rPr lang="en-US" sz="1100" kern="0" dirty="0" smtClean="0">
-                <a:solidFill>
-                  <a:prstClr val="white"/>
-                </a:solidFill>
-                <a:latin typeface="Calibri" panose="020F0502020204030204"/>
-              </a:rPr>
-              <a:t>Predictable</a:t>
-            </a:r>
-            <a:br>
-              <a:rPr lang="en-US" sz="1100" kern="0" dirty="0" smtClean="0">
-                <a:solidFill>
-                  <a:prstClr val="white"/>
-                </a:solidFill>
-                <a:latin typeface="Calibri" panose="020F0502020204030204"/>
-              </a:rPr>
-            </a:br>
-            <a:r>
-              <a:rPr lang="en-US" sz="1100" kern="0" dirty="0" smtClean="0">
-                <a:solidFill>
-                  <a:prstClr val="white"/>
-                </a:solidFill>
-                <a:latin typeface="Calibri" panose="020F0502020204030204"/>
-              </a:rPr>
-              <a:t>execution</a:t>
-            </a:r>
-            <a:endParaRPr lang="en-US" sz="1100" kern="0" dirty="0">
-              <a:solidFill>
-                <a:prstClr val="white"/>
-              </a:solidFill>
-              <a:latin typeface="Calibri" panose="020F0502020204030204"/>
-            </a:endParaRPr>
-          </a:p>
-        </p:txBody>
-      </p:sp>
-      <p:sp>
-        <p:nvSpPr>
-          <p:cNvPr id="137" name="Rectangle 136">
-            <a:extLst>
-              <a:ext uri="{FF2B5EF4-FFF2-40B4-BE49-F238E27FC236}">
-                <a16:creationId xmlns:a16="http://schemas.microsoft.com/office/drawing/2014/main" id="{7036F706-440E-4331-86C8-24346D7D4BD7}"/>
-              </a:ext>
-            </a:extLst>
-          </p:cNvPr>
-          <p:cNvSpPr/>
-          <p:nvPr/>
-        </p:nvSpPr>
-        <p:spPr>
-          <a:xfrm>
-            <a:off x="6073146" y="2221380"/>
-            <a:ext cx="2473893" cy="537759"/>
-          </a:xfrm>
-          <a:prstGeom prst="rect">
-            <a:avLst/>
-          </a:prstGeom>
-          <a:solidFill>
-            <a:srgbClr val="438CC6"/>
-          </a:solidFill>
-          <a:ln w="19050" cap="flat" cmpd="sng" algn="ctr">
-            <a:solidFill>
-              <a:srgbClr val="324D7A"/>
-            </a:solidFill>
-            <a:prstDash val="solid"/>
-            <a:miter lim="800000"/>
-          </a:ln>
-          <a:effectLst/>
-        </p:spPr>
-        <p:txBody>
-          <a:bodyPr wrap="none" lIns="72000" tIns="0" rIns="0" bIns="0" rtlCol="0" anchor="ctr" anchorCtr="0"/>
-          <a:lstStyle>
-            <a:defPPr>
-              <a:defRPr lang="en-US"/>
-            </a:defPPr>
-            <a:lvl1pPr marL="0" algn="l" defTabSz="914400" rtl="0" eaLnBrk="1" latinLnBrk="0" hangingPunct="1">
-              <a:defRPr sz="1800" kern="1200">
-                <a:solidFill>
-                  <a:schemeClr val="tx1"/>
-                </a:solidFill>
-                <a:latin typeface="+mn-lt"/>
-                <a:ea typeface="+mn-ea"/>
-                <a:cs typeface="+mn-cs"/>
-              </a:defRPr>
-            </a:lvl1pPr>
-            <a:lvl2pPr marL="457200" algn="l" defTabSz="914400" rtl="0" eaLnBrk="1" latinLnBrk="0" hangingPunct="1">
-              <a:defRPr sz="1800" kern="1200">
-                <a:solidFill>
-                  <a:schemeClr val="tx1"/>
-                </a:solidFill>
-                <a:latin typeface="+mn-lt"/>
-                <a:ea typeface="+mn-ea"/>
-                <a:cs typeface="+mn-cs"/>
-              </a:defRPr>
-            </a:lvl2pPr>
-            <a:lvl3pPr marL="914400" algn="l" defTabSz="914400" rtl="0" eaLnBrk="1" latinLnBrk="0" hangingPunct="1">
-              <a:defRPr sz="1800" kern="1200">
-                <a:solidFill>
-                  <a:schemeClr val="tx1"/>
-                </a:solidFill>
-                <a:latin typeface="+mn-lt"/>
-                <a:ea typeface="+mn-ea"/>
-                <a:cs typeface="+mn-cs"/>
-              </a:defRPr>
-            </a:lvl3pPr>
-            <a:lvl4pPr marL="1371600" algn="l" defTabSz="914400" rtl="0" eaLnBrk="1" latinLnBrk="0" hangingPunct="1">
-              <a:defRPr sz="1800" kern="1200">
-                <a:solidFill>
-                  <a:schemeClr val="tx1"/>
-                </a:solidFill>
-                <a:latin typeface="+mn-lt"/>
-                <a:ea typeface="+mn-ea"/>
-                <a:cs typeface="+mn-cs"/>
-              </a:defRPr>
-            </a:lvl4pPr>
-            <a:lvl5pPr marL="1828800" algn="l" defTabSz="914400" rtl="0" eaLnBrk="1" latinLnBrk="0" hangingPunct="1">
-              <a:defRPr sz="1800" kern="1200">
-                <a:solidFill>
-                  <a:schemeClr val="tx1"/>
-                </a:solidFill>
-                <a:latin typeface="+mn-lt"/>
-                <a:ea typeface="+mn-ea"/>
-                <a:cs typeface="+mn-cs"/>
-              </a:defRPr>
-            </a:lvl5pPr>
-            <a:lvl6pPr marL="2286000" algn="l" defTabSz="914400" rtl="0" eaLnBrk="1" latinLnBrk="0" hangingPunct="1">
-              <a:defRPr sz="1800" kern="1200">
-                <a:solidFill>
-                  <a:schemeClr val="tx1"/>
-                </a:solidFill>
-                <a:latin typeface="+mn-lt"/>
-                <a:ea typeface="+mn-ea"/>
-                <a:cs typeface="+mn-cs"/>
-              </a:defRPr>
-            </a:lvl6pPr>
-            <a:lvl7pPr marL="2743200" algn="l" defTabSz="914400" rtl="0" eaLnBrk="1" latinLnBrk="0" hangingPunct="1">
-              <a:defRPr sz="1800" kern="1200">
-                <a:solidFill>
-                  <a:schemeClr val="tx1"/>
-                </a:solidFill>
-                <a:latin typeface="+mn-lt"/>
-                <a:ea typeface="+mn-ea"/>
-                <a:cs typeface="+mn-cs"/>
-              </a:defRPr>
-            </a:lvl7pPr>
-            <a:lvl8pPr marL="3200400" algn="l" defTabSz="914400" rtl="0" eaLnBrk="1" latinLnBrk="0" hangingPunct="1">
-              <a:defRPr sz="1800" kern="1200">
-                <a:solidFill>
-                  <a:schemeClr val="tx1"/>
-                </a:solidFill>
-                <a:latin typeface="+mn-lt"/>
-                <a:ea typeface="+mn-ea"/>
-                <a:cs typeface="+mn-cs"/>
-              </a:defRPr>
-            </a:lvl8pPr>
-            <a:lvl9pPr marL="3657600" algn="l" defTabSz="914400" rtl="0" eaLnBrk="1" latinLnBrk="0" hangingPunct="1">
-              <a:defRPr sz="1800" kern="1200">
-                <a:solidFill>
-                  <a:schemeClr val="tx1"/>
-                </a:solidFill>
-                <a:latin typeface="+mn-lt"/>
-                <a:ea typeface="+mn-ea"/>
-                <a:cs typeface="+mn-cs"/>
-              </a:defRPr>
-            </a:lvl9pPr>
-          </a:lstStyle>
-          <a:p>
-            <a:pPr>
-              <a:buClrTx/>
-              <a:buFontTx/>
-              <a:buNone/>
-            </a:pPr>
-            <a:r>
-              <a:rPr lang="en-US" b="1" kern="0" dirty="0">
-                <a:solidFill>
-                  <a:prstClr val="white"/>
-                </a:solidFill>
-                <a:latin typeface="Calibri" panose="020F0502020204030204"/>
-              </a:rPr>
-              <a:t>C++ API</a:t>
-            </a:r>
-            <a:r>
-              <a:rPr lang="en-US" kern="0" dirty="0">
-                <a:solidFill>
-                  <a:prstClr val="white"/>
-                </a:solidFill>
-                <a:latin typeface="Calibri" panose="020F0502020204030204"/>
-              </a:rPr>
-              <a:t/>
-            </a:r>
-            <a:br>
-              <a:rPr lang="en-US" kern="0" dirty="0">
-                <a:solidFill>
-                  <a:prstClr val="white"/>
-                </a:solidFill>
-                <a:latin typeface="Calibri" panose="020F0502020204030204"/>
-              </a:rPr>
-            </a:br>
-            <a:r>
-              <a:rPr lang="en-US" kern="0" dirty="0">
-                <a:solidFill>
-                  <a:prstClr val="white"/>
-                </a:solidFill>
-                <a:latin typeface="Calibri" panose="020F0502020204030204"/>
-              </a:rPr>
-              <a:t>(</a:t>
-            </a:r>
-            <a:r>
-              <a:rPr lang="en-US" kern="0" dirty="0" err="1">
-                <a:solidFill>
-                  <a:prstClr val="white"/>
-                </a:solidFill>
-                <a:latin typeface="Calibri" panose="020F0502020204030204"/>
-              </a:rPr>
-              <a:t>rclcpp</a:t>
-            </a:r>
-            <a:r>
-              <a:rPr lang="en-US" kern="0" dirty="0">
-                <a:solidFill>
-                  <a:prstClr val="white"/>
-                </a:solidFill>
-                <a:latin typeface="Calibri" panose="020F0502020204030204"/>
-              </a:rPr>
-              <a:t>)</a:t>
-            </a:r>
-          </a:p>
-        </p:txBody>
-      </p:sp>
-      <p:sp>
-        <p:nvSpPr>
-          <p:cNvPr id="138" name="Rectangle 137">
-            <a:extLst>
-              <a:ext uri="{FF2B5EF4-FFF2-40B4-BE49-F238E27FC236}">
-                <a16:creationId xmlns:a16="http://schemas.microsoft.com/office/drawing/2014/main" id="{F3FF6FA8-BE1D-467A-BE04-8FFD8DA52E69}"/>
-              </a:ext>
-            </a:extLst>
-          </p:cNvPr>
-          <p:cNvSpPr/>
-          <p:nvPr/>
-        </p:nvSpPr>
-        <p:spPr>
-          <a:xfrm>
-            <a:off x="3289290" y="5781717"/>
-            <a:ext cx="709842" cy="268880"/>
+            <a:off x="2999840" y="5182278"/>
+            <a:ext cx="638673" cy="270000"/>
           </a:xfrm>
           <a:prstGeom prst="rect">
             <a:avLst/>
@@ -18254,7 +17065,7 @@
             </a:lvl9pPr>
           </a:lstStyle>
           <a:p>
-            <a:pPr marL="0" marR="0" lvl="0" indent="0" algn="ctr" defTabSz="914400" rtl="0" eaLnBrk="1" fontAlgn="auto" latinLnBrk="0" hangingPunct="1">
+            <a:pPr marL="0" marR="0" lvl="0" indent="0" algn="ctr" defTabSz="822564" rtl="0" eaLnBrk="1" fontAlgn="auto" latinLnBrk="0" hangingPunct="1">
               <a:lnSpc>
                 <a:spcPct val="100000"/>
               </a:lnSpc>
@@ -18272,7 +17083,7 @@
               <a:defRPr/>
             </a:pPr>
             <a:r>
-              <a:rPr kumimoji="0" lang="en-US" sz="1800" b="0" i="0" u="none" strike="noStrike" kern="0" cap="none" spc="0" normalizeH="0" baseline="0" noProof="0" dirty="0" err="1" smtClean="0">
+              <a:rPr kumimoji="0" lang="en-US" sz="1600" b="0" i="0" u="none" strike="noStrike" kern="0" cap="none" spc="0" normalizeH="0" baseline="0" noProof="0" dirty="0" err="1">
                 <a:ln>
                   <a:noFill/>
                 </a:ln>
@@ -18288,7 +17099,7 @@
               </a:rPr>
               <a:t>uP</a:t>
             </a:r>
-            <a:endParaRPr kumimoji="0" lang="en-US" sz="1800" b="0" i="0" u="none" strike="noStrike" kern="0" cap="none" spc="0" normalizeH="0" baseline="0" noProof="0" dirty="0">
+            <a:endParaRPr kumimoji="0" lang="en-US" sz="1600" b="0" i="0" u="none" strike="noStrike" kern="0" cap="none" spc="0" normalizeH="0" baseline="0" noProof="0" dirty="0">
               <a:ln>
                 <a:noFill/>
               </a:ln>
@@ -18307,155 +17118,10 @@
       </p:sp>
       <p:sp>
         <p:nvSpPr>
-          <p:cNvPr id="139" name="TextBox 72">
+          <p:cNvPr id="74" name="Rectangle 73">
             <a:extLst>
               <a:ext uri="{FF2B5EF4-FFF2-40B4-BE49-F238E27FC236}">
-                <a16:creationId xmlns:a16="http://schemas.microsoft.com/office/drawing/2014/main" id="{17915CCF-6F0D-4EFC-AD45-B648779CF69C}"/>
-              </a:ext>
-            </a:extLst>
-          </p:cNvPr>
-          <p:cNvSpPr txBox="1"/>
-          <p:nvPr/>
-        </p:nvSpPr>
-        <p:spPr>
-          <a:xfrm>
-            <a:off x="4374186" y="1551689"/>
-            <a:ext cx="529730" cy="461665"/>
-          </a:xfrm>
-          <a:prstGeom prst="rect">
-            <a:avLst/>
-          </a:prstGeom>
-          <a:solidFill>
-            <a:scrgbClr r="0" g="0" b="0">
-              <a:alpha val="0"/>
-            </a:scrgbClr>
-          </a:solidFill>
-        </p:spPr>
-        <p:txBody>
-          <a:bodyPr wrap="square" rtlCol="0">
-            <a:spAutoFit/>
-          </a:bodyPr>
-          <a:lstStyle>
-            <a:defPPr>
-              <a:defRPr lang="en-US"/>
-            </a:defPPr>
-            <a:lvl1pPr marL="0" algn="l" defTabSz="914400" rtl="0" eaLnBrk="1" latinLnBrk="0" hangingPunct="1">
-              <a:defRPr sz="1800" kern="1200">
-                <a:solidFill>
-                  <a:schemeClr val="tx1"/>
-                </a:solidFill>
-                <a:latin typeface="+mn-lt"/>
-                <a:ea typeface="+mn-ea"/>
-                <a:cs typeface="+mn-cs"/>
-              </a:defRPr>
-            </a:lvl1pPr>
-            <a:lvl2pPr marL="457200" algn="l" defTabSz="914400" rtl="0" eaLnBrk="1" latinLnBrk="0" hangingPunct="1">
-              <a:defRPr sz="1800" kern="1200">
-                <a:solidFill>
-                  <a:schemeClr val="tx1"/>
-                </a:solidFill>
-                <a:latin typeface="+mn-lt"/>
-                <a:ea typeface="+mn-ea"/>
-                <a:cs typeface="+mn-cs"/>
-              </a:defRPr>
-            </a:lvl2pPr>
-            <a:lvl3pPr marL="914400" algn="l" defTabSz="914400" rtl="0" eaLnBrk="1" latinLnBrk="0" hangingPunct="1">
-              <a:defRPr sz="1800" kern="1200">
-                <a:solidFill>
-                  <a:schemeClr val="tx1"/>
-                </a:solidFill>
-                <a:latin typeface="+mn-lt"/>
-                <a:ea typeface="+mn-ea"/>
-                <a:cs typeface="+mn-cs"/>
-              </a:defRPr>
-            </a:lvl3pPr>
-            <a:lvl4pPr marL="1371600" algn="l" defTabSz="914400" rtl="0" eaLnBrk="1" latinLnBrk="0" hangingPunct="1">
-              <a:defRPr sz="1800" kern="1200">
-                <a:solidFill>
-                  <a:schemeClr val="tx1"/>
-                </a:solidFill>
-                <a:latin typeface="+mn-lt"/>
-                <a:ea typeface="+mn-ea"/>
-                <a:cs typeface="+mn-cs"/>
-              </a:defRPr>
-            </a:lvl4pPr>
-            <a:lvl5pPr marL="1828800" algn="l" defTabSz="914400" rtl="0" eaLnBrk="1" latinLnBrk="0" hangingPunct="1">
-              <a:defRPr sz="1800" kern="1200">
-                <a:solidFill>
-                  <a:schemeClr val="tx1"/>
-                </a:solidFill>
-                <a:latin typeface="+mn-lt"/>
-                <a:ea typeface="+mn-ea"/>
-                <a:cs typeface="+mn-cs"/>
-              </a:defRPr>
-            </a:lvl5pPr>
-            <a:lvl6pPr marL="2286000" algn="l" defTabSz="914400" rtl="0" eaLnBrk="1" latinLnBrk="0" hangingPunct="1">
-              <a:defRPr sz="1800" kern="1200">
-                <a:solidFill>
-                  <a:schemeClr val="tx1"/>
-                </a:solidFill>
-                <a:latin typeface="+mn-lt"/>
-                <a:ea typeface="+mn-ea"/>
-                <a:cs typeface="+mn-cs"/>
-              </a:defRPr>
-            </a:lvl6pPr>
-            <a:lvl7pPr marL="2743200" algn="l" defTabSz="914400" rtl="0" eaLnBrk="1" latinLnBrk="0" hangingPunct="1">
-              <a:defRPr sz="1800" kern="1200">
-                <a:solidFill>
-                  <a:schemeClr val="tx1"/>
-                </a:solidFill>
-                <a:latin typeface="+mn-lt"/>
-                <a:ea typeface="+mn-ea"/>
-                <a:cs typeface="+mn-cs"/>
-              </a:defRPr>
-            </a:lvl7pPr>
-            <a:lvl8pPr marL="3200400" algn="l" defTabSz="914400" rtl="0" eaLnBrk="1" latinLnBrk="0" hangingPunct="1">
-              <a:defRPr sz="1800" kern="1200">
-                <a:solidFill>
-                  <a:schemeClr val="tx1"/>
-                </a:solidFill>
-                <a:latin typeface="+mn-lt"/>
-                <a:ea typeface="+mn-ea"/>
-                <a:cs typeface="+mn-cs"/>
-              </a:defRPr>
-            </a:lvl8pPr>
-            <a:lvl9pPr marL="3657600" algn="l" defTabSz="914400" rtl="0" eaLnBrk="1" latinLnBrk="0" hangingPunct="1">
-              <a:defRPr sz="1800" kern="1200">
-                <a:solidFill>
-                  <a:schemeClr val="tx1"/>
-                </a:solidFill>
-                <a:latin typeface="+mn-lt"/>
-                <a:ea typeface="+mn-ea"/>
-                <a:cs typeface="+mn-cs"/>
-              </a:defRPr>
-            </a:lvl9pPr>
-          </a:lstStyle>
-          <a:p>
-            <a:pPr>
-              <a:buClrTx/>
-              <a:buFontTx/>
-              <a:buNone/>
-            </a:pPr>
-            <a:r>
-              <a:rPr lang="en-US" sz="2400" dirty="0">
-                <a:solidFill>
-                  <a:prstClr val="white">
-                    <a:lumMod val="65000"/>
-                  </a:prstClr>
-                </a:solidFill>
-                <a:latin typeface="Calibri" panose="020F0502020204030204"/>
-              </a:rPr>
-              <a:t>…</a:t>
-            </a:r>
-          </a:p>
-        </p:txBody>
-      </p:sp>
-      <p:sp>
-        <p:nvSpPr>
-          <p:cNvPr id="140" name="Rectangle 139">
-            <a:extLst>
-              <a:ext uri="{FF2B5EF4-FFF2-40B4-BE49-F238E27FC236}">
-                <a16:creationId xmlns:a16="http://schemas.microsoft.com/office/drawing/2014/main" id="{68C637CA-E15F-4BDE-A708-CE02ABFED94B}"/>
+                <a16:creationId xmlns:a16="http://schemas.microsoft.com/office/drawing/2014/main" id="{A52CACA2-FA7F-4BFD-BA45-101D93070FF8}"/>
               </a:ext>
             </a:extLst>
           </p:cNvPr>
@@ -18464,8 +17130,8 @@
         </p:nvSpPr>
         <p:spPr>
           <a:xfrm>
-            <a:off x="6073146" y="1455551"/>
-            <a:ext cx="1075519" cy="537759"/>
+            <a:off x="6468923" y="1604182"/>
+            <a:ext cx="967687" cy="483843"/>
           </a:xfrm>
           <a:prstGeom prst="rect">
             <a:avLst/>
@@ -18584,7 +17250,7 @@
             </a:lvl9pPr>
           </a:lstStyle>
           <a:p>
-            <a:pPr marL="0" marR="0" lvl="0" indent="0" algn="ctr" defTabSz="914400" rtl="0" eaLnBrk="1" fontAlgn="auto" latinLnBrk="0" hangingPunct="1">
+            <a:pPr marL="0" marR="0" lvl="0" indent="0" algn="ctr" defTabSz="822564" rtl="0" eaLnBrk="1" fontAlgn="auto" latinLnBrk="0" hangingPunct="1">
               <a:lnSpc>
                 <a:spcPct val="100000"/>
               </a:lnSpc>
@@ -18602,7 +17268,7 @@
               <a:defRPr/>
             </a:pPr>
             <a:r>
-              <a:rPr kumimoji="0" lang="en-US" sz="1600" b="0" i="0" u="none" strike="noStrike" kern="0" cap="none" spc="0" normalizeH="0" baseline="0" noProof="0" dirty="0">
+              <a:rPr kumimoji="0" lang="en-US" sz="1400" b="0" i="0" u="none" strike="noStrike" kern="0" cap="none" spc="0" normalizeH="0" baseline="0" noProof="0" dirty="0">
                 <a:ln>
                   <a:noFill/>
                 </a:ln>
@@ -18619,7 +17285,7 @@
               <a:t>Application</a:t>
             </a:r>
             <a:br>
-              <a:rPr kumimoji="0" lang="en-US" sz="1600" b="0" i="0" u="none" strike="noStrike" kern="0" cap="none" spc="0" normalizeH="0" baseline="0" noProof="0" dirty="0">
+              <a:rPr kumimoji="0" lang="en-US" sz="1400" b="0" i="0" u="none" strike="noStrike" kern="0" cap="none" spc="0" normalizeH="0" baseline="0" noProof="0" dirty="0">
                 <a:ln>
                   <a:noFill/>
                 </a:ln>
@@ -18635,7 +17301,7 @@
               </a:rPr>
             </a:br>
             <a:r>
-              <a:rPr kumimoji="0" lang="en-US" sz="1600" b="0" i="0" u="none" strike="noStrike" kern="0" cap="none" spc="0" normalizeH="0" baseline="0" noProof="0" dirty="0">
+              <a:rPr kumimoji="0" lang="en-US" sz="1400" b="0" i="0" u="none" strike="noStrike" kern="0" cap="none" spc="0" normalizeH="0" baseline="0" noProof="0" dirty="0">
                 <a:ln>
                   <a:noFill/>
                 </a:ln>
@@ -18656,10 +17322,10 @@
       </p:sp>
       <p:sp>
         <p:nvSpPr>
-          <p:cNvPr id="141" name="Rectangle 140">
+          <p:cNvPr id="75" name="Rectangle 74">
             <a:extLst>
               <a:ext uri="{FF2B5EF4-FFF2-40B4-BE49-F238E27FC236}">
-                <a16:creationId xmlns:a16="http://schemas.microsoft.com/office/drawing/2014/main" id="{82178F51-028C-4184-9F8B-01114BBC2DFE}"/>
+                <a16:creationId xmlns:a16="http://schemas.microsoft.com/office/drawing/2014/main" id="{86BD70AF-B75A-431B-9171-0B2643DAAC35}"/>
               </a:ext>
             </a:extLst>
           </p:cNvPr>
@@ -18668,8 +17334,8 @@
         </p:nvSpPr>
         <p:spPr>
           <a:xfrm>
-            <a:off x="3464214" y="3922780"/>
-            <a:ext cx="703224" cy="537759"/>
+            <a:off x="3157224" y="3509721"/>
+            <a:ext cx="632718" cy="483843"/>
           </a:xfrm>
           <a:prstGeom prst="rect">
             <a:avLst/>
@@ -18790,7 +17456,7 @@
               <a:buNone/>
             </a:pPr>
             <a:r>
-              <a:rPr lang="en-US" kern="0" dirty="0">
+              <a:rPr lang="en-US" sz="1600" kern="0" dirty="0">
                 <a:solidFill>
                   <a:prstClr val="white"/>
                 </a:solidFill>
@@ -18806,7 +17472,7 @@
               <a:buNone/>
             </a:pPr>
             <a:r>
-              <a:rPr lang="en-US" kern="0" dirty="0">
+              <a:rPr lang="en-US" sz="1600" kern="0" dirty="0">
                 <a:solidFill>
                   <a:prstClr val="white"/>
                 </a:solidFill>
@@ -18819,14 +17485,20 @@
       </p:sp>
       <p:sp>
         <p:nvSpPr>
-          <p:cNvPr id="142" name="TextBox 78"/>
+          <p:cNvPr id="76" name="TextBox 78">
+            <a:extLst>
+              <a:ext uri="{FF2B5EF4-FFF2-40B4-BE49-F238E27FC236}">
+                <a16:creationId xmlns:a16="http://schemas.microsoft.com/office/drawing/2014/main" id="{7397B02E-5C68-4DF9-B83C-84914DABD04D}"/>
+              </a:ext>
+            </a:extLst>
+          </p:cNvPr>
           <p:cNvSpPr txBox="1"/>
           <p:nvPr/>
         </p:nvSpPr>
         <p:spPr>
           <a:xfrm>
-            <a:off x="4137419" y="4257950"/>
-            <a:ext cx="787395" cy="600164"/>
+            <a:off x="3793414" y="3818904"/>
+            <a:ext cx="681597" cy="507831"/>
           </a:xfrm>
           <a:prstGeom prst="rect">
             <a:avLst/>
@@ -18939,7 +17611,7 @@
               <a:buNone/>
             </a:pPr>
             <a:r>
-              <a:rPr lang="en-US" sz="1100" dirty="0" smtClean="0">
+              <a:rPr lang="en-US" sz="900" dirty="0">
                 <a:solidFill>
                   <a:srgbClr val="000000"/>
                 </a:solidFill>
@@ -18948,7 +17620,7 @@
               <a:t>Ethernet,</a:t>
             </a:r>
             <a:br>
-              <a:rPr lang="en-US" sz="1100" dirty="0" smtClean="0">
+              <a:rPr lang="en-US" sz="900" dirty="0">
                 <a:solidFill>
                   <a:srgbClr val="000000"/>
                 </a:solidFill>
@@ -18956,7 +17628,7 @@
               </a:rPr>
             </a:br>
             <a:r>
-              <a:rPr lang="en-US" sz="1100" dirty="0" smtClean="0">
+              <a:rPr lang="en-US" sz="900" dirty="0">
                 <a:solidFill>
                   <a:srgbClr val="000000"/>
                 </a:solidFill>
@@ -18965,7 +17637,7 @@
               <a:t>Bluetooth,</a:t>
             </a:r>
             <a:br>
-              <a:rPr lang="en-US" sz="1100" dirty="0" smtClean="0">
+              <a:rPr lang="en-US" sz="900" dirty="0">
                 <a:solidFill>
                   <a:srgbClr val="000000"/>
                 </a:solidFill>
@@ -18973,7 +17645,7 @@
               </a:rPr>
             </a:br>
             <a:r>
-              <a:rPr lang="en-US" sz="1100" dirty="0" smtClean="0">
+              <a:rPr lang="en-US" sz="900" dirty="0">
                 <a:solidFill>
                   <a:srgbClr val="000000"/>
                 </a:solidFill>
@@ -18981,21 +17653,15 @@
               </a:rPr>
               <a:t>Serial</a:t>
             </a:r>
-            <a:endParaRPr lang="en-US" sz="1100" dirty="0">
-              <a:solidFill>
-                <a:srgbClr val="000000"/>
-              </a:solidFill>
-              <a:latin typeface="Calibri" panose="020F0502020204030204"/>
-            </a:endParaRPr>
           </a:p>
         </p:txBody>
       </p:sp>
       <p:sp>
         <p:nvSpPr>
-          <p:cNvPr id="143" name="Rectangle 142">
+          <p:cNvPr id="77" name="Rectangle 76">
             <a:extLst>
               <a:ext uri="{FF2B5EF4-FFF2-40B4-BE49-F238E27FC236}">
-                <a16:creationId xmlns:a16="http://schemas.microsoft.com/office/drawing/2014/main" id="{68C637CA-E15F-4BDE-A708-CE02ABFED94B}"/>
+                <a16:creationId xmlns:a16="http://schemas.microsoft.com/office/drawing/2014/main" id="{EC94755B-40E1-4312-9C03-54841E7F26FE}"/>
               </a:ext>
             </a:extLst>
           </p:cNvPr>
@@ -19004,8 +17670,8 @@
         </p:nvSpPr>
         <p:spPr>
           <a:xfrm>
-            <a:off x="4906823" y="1455551"/>
-            <a:ext cx="1075519" cy="537759"/>
+            <a:off x="4669669" y="1604182"/>
+            <a:ext cx="967687" cy="483843"/>
           </a:xfrm>
           <a:prstGeom prst="rect">
             <a:avLst/>
@@ -19124,7 +17790,7 @@
             </a:lvl9pPr>
           </a:lstStyle>
           <a:p>
-            <a:pPr marL="0" marR="0" lvl="0" indent="0" algn="ctr" defTabSz="914400" rtl="0" eaLnBrk="1" fontAlgn="auto" latinLnBrk="0" hangingPunct="1">
+            <a:pPr marL="0" marR="0" lvl="0" indent="0" algn="ctr" defTabSz="822564" rtl="0" eaLnBrk="1" fontAlgn="auto" latinLnBrk="0" hangingPunct="1">
               <a:lnSpc>
                 <a:spcPct val="100000"/>
               </a:lnSpc>
@@ -19142,7 +17808,7 @@
               <a:defRPr/>
             </a:pPr>
             <a:r>
-              <a:rPr kumimoji="0" lang="en-US" sz="1600" b="0" i="0" u="none" strike="noStrike" kern="0" cap="none" spc="0" normalizeH="0" baseline="0" noProof="0" dirty="0">
+              <a:rPr kumimoji="0" lang="en-US" sz="1400" b="0" i="0" u="none" strike="noStrike" kern="0" cap="none" spc="0" normalizeH="0" baseline="0" noProof="0" dirty="0">
                 <a:ln>
                   <a:noFill/>
                 </a:ln>
@@ -19159,7 +17825,7 @@
               <a:t>Application</a:t>
             </a:r>
             <a:br>
-              <a:rPr kumimoji="0" lang="en-US" sz="1600" b="0" i="0" u="none" strike="noStrike" kern="0" cap="none" spc="0" normalizeH="0" baseline="0" noProof="0" dirty="0">
+              <a:rPr kumimoji="0" lang="en-US" sz="1400" b="0" i="0" u="none" strike="noStrike" kern="0" cap="none" spc="0" normalizeH="0" baseline="0" noProof="0" dirty="0">
                 <a:ln>
                   <a:noFill/>
                 </a:ln>
@@ -19175,7 +17841,7 @@
               </a:rPr>
             </a:br>
             <a:r>
-              <a:rPr kumimoji="0" lang="en-US" sz="1600" b="0" i="0" u="none" strike="noStrike" kern="0" cap="none" spc="0" normalizeH="0" baseline="0" noProof="0" dirty="0">
+              <a:rPr kumimoji="0" lang="en-US" sz="1400" b="0" i="0" u="none" strike="noStrike" kern="0" cap="none" spc="0" normalizeH="0" baseline="0" noProof="0" dirty="0">
                 <a:ln>
                   <a:noFill/>
                 </a:ln>
@@ -19196,10 +17862,10 @@
       </p:sp>
       <p:sp>
         <p:nvSpPr>
-          <p:cNvPr id="144" name="TextBox 81">
+          <p:cNvPr id="78" name="TextBox 81">
             <a:extLst>
               <a:ext uri="{FF2B5EF4-FFF2-40B4-BE49-F238E27FC236}">
-                <a16:creationId xmlns:a16="http://schemas.microsoft.com/office/drawing/2014/main" id="{17915CCF-6F0D-4EFC-AD45-B648779CF69C}"/>
+                <a16:creationId xmlns:a16="http://schemas.microsoft.com/office/drawing/2014/main" id="{18EC6DDC-7EAD-4B6B-A4A0-5225A79CEE7C}"/>
               </a:ext>
             </a:extLst>
           </p:cNvPr>
@@ -19208,8 +17874,8 @@
         </p:nvSpPr>
         <p:spPr>
           <a:xfrm>
-            <a:off x="7152975" y="1551689"/>
-            <a:ext cx="529730" cy="461665"/>
+            <a:off x="5637355" y="1519829"/>
+            <a:ext cx="831567" cy="523220"/>
           </a:xfrm>
           <a:prstGeom prst="rect">
             <a:avLst/>
@@ -19320,13 +17986,13 @@
             </a:lvl9pPr>
           </a:lstStyle>
           <a:p>
-            <a:pPr>
+            <a:pPr algn="ctr">
               <a:buClrTx/>
               <a:buFontTx/>
               <a:buNone/>
             </a:pPr>
             <a:r>
-              <a:rPr lang="en-US" sz="2400" dirty="0">
+              <a:rPr lang="en-US" sz="2800" dirty="0">
                 <a:solidFill>
                   <a:prstClr val="white">
                     <a:lumMod val="65000"/>
@@ -19341,10 +18007,10 @@
       </p:sp>
       <p:sp>
         <p:nvSpPr>
-          <p:cNvPr id="145" name="Rectangle 144">
+          <p:cNvPr id="79" name="Rectangle 78">
             <a:extLst>
               <a:ext uri="{FF2B5EF4-FFF2-40B4-BE49-F238E27FC236}">
-                <a16:creationId xmlns:a16="http://schemas.microsoft.com/office/drawing/2014/main" id="{07844580-9613-44A2-B61D-85F8FEF78C5C}"/>
+                <a16:creationId xmlns:a16="http://schemas.microsoft.com/office/drawing/2014/main" id="{45D31222-DADC-41B7-8639-73EDE27C3682}"/>
               </a:ext>
             </a:extLst>
           </p:cNvPr>
@@ -19353,321 +18019,8 @@
         </p:nvSpPr>
         <p:spPr>
           <a:xfrm>
-            <a:off x="7791634" y="2304112"/>
-            <a:ext cx="661858" cy="372295"/>
-          </a:xfrm>
-          <a:prstGeom prst="rect">
-            <a:avLst/>
-          </a:prstGeom>
-          <a:solidFill>
-            <a:srgbClr val="324D7A"/>
-          </a:solidFill>
-          <a:ln w="19050" cap="flat" cmpd="sng" algn="ctr">
-            <a:solidFill>
-              <a:srgbClr val="1F314F"/>
-            </a:solidFill>
-            <a:prstDash val="solid"/>
-            <a:miter lim="800000"/>
-          </a:ln>
-          <a:effectLst/>
-        </p:spPr>
-        <p:txBody>
-          <a:bodyPr lIns="0" tIns="0" rIns="0" bIns="0" rtlCol="0" anchor="ctr"/>
-          <a:lstStyle>
-            <a:defPPr>
-              <a:defRPr lang="en-US"/>
-            </a:defPPr>
-            <a:lvl1pPr marL="0" algn="l" defTabSz="914400" rtl="0" eaLnBrk="1" latinLnBrk="0" hangingPunct="1">
-              <a:defRPr sz="1800" kern="1200">
-                <a:solidFill>
-                  <a:schemeClr val="tx1"/>
-                </a:solidFill>
-                <a:latin typeface="+mn-lt"/>
-                <a:ea typeface="+mn-ea"/>
-                <a:cs typeface="+mn-cs"/>
-              </a:defRPr>
-            </a:lvl1pPr>
-            <a:lvl2pPr marL="457200" algn="l" defTabSz="914400" rtl="0" eaLnBrk="1" latinLnBrk="0" hangingPunct="1">
-              <a:defRPr sz="1800" kern="1200">
-                <a:solidFill>
-                  <a:schemeClr val="tx1"/>
-                </a:solidFill>
-                <a:latin typeface="+mn-lt"/>
-                <a:ea typeface="+mn-ea"/>
-                <a:cs typeface="+mn-cs"/>
-              </a:defRPr>
-            </a:lvl2pPr>
-            <a:lvl3pPr marL="914400" algn="l" defTabSz="914400" rtl="0" eaLnBrk="1" latinLnBrk="0" hangingPunct="1">
-              <a:defRPr sz="1800" kern="1200">
-                <a:solidFill>
-                  <a:schemeClr val="tx1"/>
-                </a:solidFill>
-                <a:latin typeface="+mn-lt"/>
-                <a:ea typeface="+mn-ea"/>
-                <a:cs typeface="+mn-cs"/>
-              </a:defRPr>
-            </a:lvl3pPr>
-            <a:lvl4pPr marL="1371600" algn="l" defTabSz="914400" rtl="0" eaLnBrk="1" latinLnBrk="0" hangingPunct="1">
-              <a:defRPr sz="1800" kern="1200">
-                <a:solidFill>
-                  <a:schemeClr val="tx1"/>
-                </a:solidFill>
-                <a:latin typeface="+mn-lt"/>
-                <a:ea typeface="+mn-ea"/>
-                <a:cs typeface="+mn-cs"/>
-              </a:defRPr>
-            </a:lvl4pPr>
-            <a:lvl5pPr marL="1828800" algn="l" defTabSz="914400" rtl="0" eaLnBrk="1" latinLnBrk="0" hangingPunct="1">
-              <a:defRPr sz="1800" kern="1200">
-                <a:solidFill>
-                  <a:schemeClr val="tx1"/>
-                </a:solidFill>
-                <a:latin typeface="+mn-lt"/>
-                <a:ea typeface="+mn-ea"/>
-                <a:cs typeface="+mn-cs"/>
-              </a:defRPr>
-            </a:lvl5pPr>
-            <a:lvl6pPr marL="2286000" algn="l" defTabSz="914400" rtl="0" eaLnBrk="1" latinLnBrk="0" hangingPunct="1">
-              <a:defRPr sz="1800" kern="1200">
-                <a:solidFill>
-                  <a:schemeClr val="tx1"/>
-                </a:solidFill>
-                <a:latin typeface="+mn-lt"/>
-                <a:ea typeface="+mn-ea"/>
-                <a:cs typeface="+mn-cs"/>
-              </a:defRPr>
-            </a:lvl6pPr>
-            <a:lvl7pPr marL="2743200" algn="l" defTabSz="914400" rtl="0" eaLnBrk="1" latinLnBrk="0" hangingPunct="1">
-              <a:defRPr sz="1800" kern="1200">
-                <a:solidFill>
-                  <a:schemeClr val="tx1"/>
-                </a:solidFill>
-                <a:latin typeface="+mn-lt"/>
-                <a:ea typeface="+mn-ea"/>
-                <a:cs typeface="+mn-cs"/>
-              </a:defRPr>
-            </a:lvl7pPr>
-            <a:lvl8pPr marL="3200400" algn="l" defTabSz="914400" rtl="0" eaLnBrk="1" latinLnBrk="0" hangingPunct="1">
-              <a:defRPr sz="1800" kern="1200">
-                <a:solidFill>
-                  <a:schemeClr val="tx1"/>
-                </a:solidFill>
-                <a:latin typeface="+mn-lt"/>
-                <a:ea typeface="+mn-ea"/>
-                <a:cs typeface="+mn-cs"/>
-              </a:defRPr>
-            </a:lvl8pPr>
-            <a:lvl9pPr marL="3657600" algn="l" defTabSz="914400" rtl="0" eaLnBrk="1" latinLnBrk="0" hangingPunct="1">
-              <a:defRPr sz="1800" kern="1200">
-                <a:solidFill>
-                  <a:schemeClr val="tx1"/>
-                </a:solidFill>
-                <a:latin typeface="+mn-lt"/>
-                <a:ea typeface="+mn-ea"/>
-                <a:cs typeface="+mn-cs"/>
-              </a:defRPr>
-            </a:lvl9pPr>
-          </a:lstStyle>
-          <a:p>
-            <a:pPr algn="ctr">
-              <a:buClrTx/>
-              <a:buFontTx/>
-              <a:buNone/>
-              <a:defRPr/>
-            </a:pPr>
-            <a:r>
-              <a:rPr lang="en-US" sz="1100" kern="0" dirty="0">
-                <a:solidFill>
-                  <a:prstClr val="white"/>
-                </a:solidFill>
-                <a:latin typeface="Calibri" panose="020F0502020204030204"/>
-              </a:rPr>
-              <a:t>Embedded transform</a:t>
-            </a:r>
-          </a:p>
-        </p:txBody>
-      </p:sp>
-      <p:sp>
-        <p:nvSpPr>
-          <p:cNvPr id="146" name="Rectangle 145">
-            <a:extLst>
-              <a:ext uri="{FF2B5EF4-FFF2-40B4-BE49-F238E27FC236}">
-                <a16:creationId xmlns:a16="http://schemas.microsoft.com/office/drawing/2014/main" id="{C1A990AF-7589-4F79-A243-C61573776F09}"/>
-              </a:ext>
-            </a:extLst>
-          </p:cNvPr>
-          <p:cNvSpPr/>
-          <p:nvPr/>
-        </p:nvSpPr>
-        <p:spPr>
-          <a:xfrm>
-            <a:off x="7040042" y="2304112"/>
-            <a:ext cx="661858" cy="372295"/>
-          </a:xfrm>
-          <a:prstGeom prst="rect">
-            <a:avLst/>
-          </a:prstGeom>
-          <a:solidFill>
-            <a:srgbClr val="324D7A"/>
-          </a:solidFill>
-          <a:ln w="19050" cap="flat" cmpd="sng" algn="ctr">
-            <a:solidFill>
-              <a:srgbClr val="1F314F"/>
-            </a:solidFill>
-            <a:prstDash val="solid"/>
-            <a:miter lim="800000"/>
-          </a:ln>
-          <a:effectLst/>
-        </p:spPr>
-        <p:txBody>
-          <a:bodyPr lIns="0" tIns="0" rIns="0" bIns="0" rtlCol="0" anchor="ctr"/>
-          <a:lstStyle>
-            <a:defPPr>
-              <a:defRPr lang="en-US"/>
-            </a:defPPr>
-            <a:lvl1pPr marL="0" algn="l" defTabSz="914400" rtl="0" eaLnBrk="1" latinLnBrk="0" hangingPunct="1">
-              <a:defRPr sz="1800" kern="1200">
-                <a:solidFill>
-                  <a:schemeClr val="tx1"/>
-                </a:solidFill>
-                <a:latin typeface="+mn-lt"/>
-                <a:ea typeface="+mn-ea"/>
-                <a:cs typeface="+mn-cs"/>
-              </a:defRPr>
-            </a:lvl1pPr>
-            <a:lvl2pPr marL="457200" algn="l" defTabSz="914400" rtl="0" eaLnBrk="1" latinLnBrk="0" hangingPunct="1">
-              <a:defRPr sz="1800" kern="1200">
-                <a:solidFill>
-                  <a:schemeClr val="tx1"/>
-                </a:solidFill>
-                <a:latin typeface="+mn-lt"/>
-                <a:ea typeface="+mn-ea"/>
-                <a:cs typeface="+mn-cs"/>
-              </a:defRPr>
-            </a:lvl2pPr>
-            <a:lvl3pPr marL="914400" algn="l" defTabSz="914400" rtl="0" eaLnBrk="1" latinLnBrk="0" hangingPunct="1">
-              <a:defRPr sz="1800" kern="1200">
-                <a:solidFill>
-                  <a:schemeClr val="tx1"/>
-                </a:solidFill>
-                <a:latin typeface="+mn-lt"/>
-                <a:ea typeface="+mn-ea"/>
-                <a:cs typeface="+mn-cs"/>
-              </a:defRPr>
-            </a:lvl3pPr>
-            <a:lvl4pPr marL="1371600" algn="l" defTabSz="914400" rtl="0" eaLnBrk="1" latinLnBrk="0" hangingPunct="1">
-              <a:defRPr sz="1800" kern="1200">
-                <a:solidFill>
-                  <a:schemeClr val="tx1"/>
-                </a:solidFill>
-                <a:latin typeface="+mn-lt"/>
-                <a:ea typeface="+mn-ea"/>
-                <a:cs typeface="+mn-cs"/>
-              </a:defRPr>
-            </a:lvl4pPr>
-            <a:lvl5pPr marL="1828800" algn="l" defTabSz="914400" rtl="0" eaLnBrk="1" latinLnBrk="0" hangingPunct="1">
-              <a:defRPr sz="1800" kern="1200">
-                <a:solidFill>
-                  <a:schemeClr val="tx1"/>
-                </a:solidFill>
-                <a:latin typeface="+mn-lt"/>
-                <a:ea typeface="+mn-ea"/>
-                <a:cs typeface="+mn-cs"/>
-              </a:defRPr>
-            </a:lvl5pPr>
-            <a:lvl6pPr marL="2286000" algn="l" defTabSz="914400" rtl="0" eaLnBrk="1" latinLnBrk="0" hangingPunct="1">
-              <a:defRPr sz="1800" kern="1200">
-                <a:solidFill>
-                  <a:schemeClr val="tx1"/>
-                </a:solidFill>
-                <a:latin typeface="+mn-lt"/>
-                <a:ea typeface="+mn-ea"/>
-                <a:cs typeface="+mn-cs"/>
-              </a:defRPr>
-            </a:lvl6pPr>
-            <a:lvl7pPr marL="2743200" algn="l" defTabSz="914400" rtl="0" eaLnBrk="1" latinLnBrk="0" hangingPunct="1">
-              <a:defRPr sz="1800" kern="1200">
-                <a:solidFill>
-                  <a:schemeClr val="tx1"/>
-                </a:solidFill>
-                <a:latin typeface="+mn-lt"/>
-                <a:ea typeface="+mn-ea"/>
-                <a:cs typeface="+mn-cs"/>
-              </a:defRPr>
-            </a:lvl7pPr>
-            <a:lvl8pPr marL="3200400" algn="l" defTabSz="914400" rtl="0" eaLnBrk="1" latinLnBrk="0" hangingPunct="1">
-              <a:defRPr sz="1800" kern="1200">
-                <a:solidFill>
-                  <a:schemeClr val="tx1"/>
-                </a:solidFill>
-                <a:latin typeface="+mn-lt"/>
-                <a:ea typeface="+mn-ea"/>
-                <a:cs typeface="+mn-cs"/>
-              </a:defRPr>
-            </a:lvl8pPr>
-            <a:lvl9pPr marL="3657600" algn="l" defTabSz="914400" rtl="0" eaLnBrk="1" latinLnBrk="0" hangingPunct="1">
-              <a:defRPr sz="1800" kern="1200">
-                <a:solidFill>
-                  <a:schemeClr val="tx1"/>
-                </a:solidFill>
-                <a:latin typeface="+mn-lt"/>
-                <a:ea typeface="+mn-ea"/>
-                <a:cs typeface="+mn-cs"/>
-              </a:defRPr>
-            </a:lvl9pPr>
-          </a:lstStyle>
-          <a:p>
-            <a:pPr algn="ctr">
-              <a:buClrTx/>
-              <a:buFontTx/>
-              <a:buNone/>
-              <a:defRPr/>
-            </a:pPr>
-            <a:r>
-              <a:rPr lang="en-US" sz="1100" kern="0" dirty="0">
-                <a:solidFill>
-                  <a:prstClr val="white"/>
-                </a:solidFill>
-                <a:latin typeface="Calibri" panose="020F0502020204030204"/>
-              </a:rPr>
-              <a:t>System</a:t>
-            </a:r>
-            <a:br>
-              <a:rPr lang="en-US" sz="1100" kern="0" dirty="0">
-                <a:solidFill>
-                  <a:prstClr val="white"/>
-                </a:solidFill>
-                <a:latin typeface="Calibri" panose="020F0502020204030204"/>
-              </a:rPr>
-            </a:br>
-            <a:r>
-              <a:rPr lang="en-US" sz="1100" kern="0" dirty="0">
-                <a:solidFill>
-                  <a:prstClr val="white"/>
-                </a:solidFill>
-                <a:latin typeface="Calibri" panose="020F0502020204030204"/>
-              </a:rPr>
-              <a:t>modes</a:t>
-            </a:r>
-          </a:p>
-        </p:txBody>
-      </p:sp>
-      <p:sp>
-        <p:nvSpPr>
-          <p:cNvPr id="147" name="Rectangle 146">
-            <a:extLst>
-              <a:ext uri="{FF2B5EF4-FFF2-40B4-BE49-F238E27FC236}">
-                <a16:creationId xmlns:a16="http://schemas.microsoft.com/office/drawing/2014/main" id="{F3FF6FA8-BE1D-467A-BE04-8FFD8DA52E69}"/>
-              </a:ext>
-            </a:extLst>
-          </p:cNvPr>
-          <p:cNvSpPr/>
-          <p:nvPr/>
-        </p:nvSpPr>
-        <p:spPr>
-          <a:xfrm>
-            <a:off x="4906823" y="5781717"/>
-            <a:ext cx="3640217" cy="268880"/>
+            <a:off x="4455199" y="5182278"/>
+            <a:ext cx="3275247" cy="270000"/>
           </a:xfrm>
           <a:prstGeom prst="rect">
             <a:avLst/>
@@ -19786,7 +18139,7 @@
             </a:lvl9pPr>
           </a:lstStyle>
           <a:p>
-            <a:pPr marL="0" marR="0" lvl="0" indent="0" algn="ctr" defTabSz="914400" rtl="0" eaLnBrk="1" fontAlgn="auto" latinLnBrk="0" hangingPunct="1">
+            <a:pPr marL="0" marR="0" lvl="0" indent="0" algn="ctr" defTabSz="822564" rtl="0" eaLnBrk="1" fontAlgn="auto" latinLnBrk="0" hangingPunct="1">
               <a:lnSpc>
                 <a:spcPct val="100000"/>
               </a:lnSpc>
@@ -19804,7 +18157,7 @@
               <a:defRPr/>
             </a:pPr>
             <a:r>
-              <a:rPr kumimoji="0" lang="en-US" sz="1800" b="0" i="0" u="none" strike="noStrike" kern="0" cap="none" spc="0" normalizeH="0" baseline="0" noProof="0" dirty="0" smtClean="0">
+              <a:rPr kumimoji="0" lang="en-US" sz="1600" b="0" i="0" u="none" strike="noStrike" kern="0" cap="none" spc="0" normalizeH="0" baseline="0" noProof="0" dirty="0">
                 <a:ln>
                   <a:noFill/>
                 </a:ln>
@@ -19818,22 +18171,1124 @@
                 <a:ea typeface="+mn-ea"/>
                 <a:cs typeface="+mn-cs"/>
               </a:rPr>
-              <a:t>microcontroller</a:t>
+              <a:t>Microcontroller</a:t>
             </a:r>
-            <a:endParaRPr kumimoji="0" lang="en-US" sz="1800" b="0" i="0" u="none" strike="noStrike" kern="0" cap="none" spc="0" normalizeH="0" baseline="0" noProof="0" dirty="0">
-              <a:ln>
-                <a:noFill/>
-              </a:ln>
+          </a:p>
+        </p:txBody>
+      </p:sp>
+      <p:sp>
+        <p:nvSpPr>
+          <p:cNvPr id="80" name="Rectangle 79">
+            <a:extLst>
+              <a:ext uri="{FF2B5EF4-FFF2-40B4-BE49-F238E27FC236}">
+                <a16:creationId xmlns:a16="http://schemas.microsoft.com/office/drawing/2014/main" id="{84EA5251-ED6D-4A79-9963-0DD2B82EE58F}"/>
+              </a:ext>
+            </a:extLst>
+          </p:cNvPr>
+          <p:cNvSpPr/>
+          <p:nvPr/>
+        </p:nvSpPr>
+        <p:spPr>
+          <a:xfrm>
+            <a:off x="6091091" y="2294747"/>
+            <a:ext cx="1639356" cy="360000"/>
+          </a:xfrm>
+          <a:prstGeom prst="rect">
+            <a:avLst/>
+          </a:prstGeom>
+          <a:solidFill>
+            <a:srgbClr val="324D7A"/>
+          </a:solidFill>
+          <a:ln w="19050" cap="flat" cmpd="sng" algn="ctr">
+            <a:solidFill>
+              <a:srgbClr val="1F314F"/>
+            </a:solidFill>
+            <a:prstDash val="solid"/>
+            <a:miter lim="800000"/>
+          </a:ln>
+          <a:effectLst/>
+        </p:spPr>
+        <p:txBody>
+          <a:bodyPr wrap="none" lIns="0" tIns="0" rIns="0" bIns="0" rtlCol="0" anchor="ctr"/>
+          <a:lstStyle>
+            <a:defPPr>
+              <a:defRPr lang="en-US"/>
+            </a:defPPr>
+            <a:lvl1pPr marL="0" algn="l" defTabSz="914400" rtl="0" eaLnBrk="1" latinLnBrk="0" hangingPunct="1">
+              <a:defRPr sz="1800" kern="1200">
+                <a:solidFill>
+                  <a:schemeClr val="tx1"/>
+                </a:solidFill>
+                <a:latin typeface="+mn-lt"/>
+                <a:ea typeface="+mn-ea"/>
+                <a:cs typeface="+mn-cs"/>
+              </a:defRPr>
+            </a:lvl1pPr>
+            <a:lvl2pPr marL="457200" algn="l" defTabSz="914400" rtl="0" eaLnBrk="1" latinLnBrk="0" hangingPunct="1">
+              <a:defRPr sz="1800" kern="1200">
+                <a:solidFill>
+                  <a:schemeClr val="tx1"/>
+                </a:solidFill>
+                <a:latin typeface="+mn-lt"/>
+                <a:ea typeface="+mn-ea"/>
+                <a:cs typeface="+mn-cs"/>
+              </a:defRPr>
+            </a:lvl2pPr>
+            <a:lvl3pPr marL="914400" algn="l" defTabSz="914400" rtl="0" eaLnBrk="1" latinLnBrk="0" hangingPunct="1">
+              <a:defRPr sz="1800" kern="1200">
+                <a:solidFill>
+                  <a:schemeClr val="tx1"/>
+                </a:solidFill>
+                <a:latin typeface="+mn-lt"/>
+                <a:ea typeface="+mn-ea"/>
+                <a:cs typeface="+mn-cs"/>
+              </a:defRPr>
+            </a:lvl3pPr>
+            <a:lvl4pPr marL="1371600" algn="l" defTabSz="914400" rtl="0" eaLnBrk="1" latinLnBrk="0" hangingPunct="1">
+              <a:defRPr sz="1800" kern="1200">
+                <a:solidFill>
+                  <a:schemeClr val="tx1"/>
+                </a:solidFill>
+                <a:latin typeface="+mn-lt"/>
+                <a:ea typeface="+mn-ea"/>
+                <a:cs typeface="+mn-cs"/>
+              </a:defRPr>
+            </a:lvl4pPr>
+            <a:lvl5pPr marL="1828800" algn="l" defTabSz="914400" rtl="0" eaLnBrk="1" latinLnBrk="0" hangingPunct="1">
+              <a:defRPr sz="1800" kern="1200">
+                <a:solidFill>
+                  <a:schemeClr val="tx1"/>
+                </a:solidFill>
+                <a:latin typeface="+mn-lt"/>
+                <a:ea typeface="+mn-ea"/>
+                <a:cs typeface="+mn-cs"/>
+              </a:defRPr>
+            </a:lvl5pPr>
+            <a:lvl6pPr marL="2286000" algn="l" defTabSz="914400" rtl="0" eaLnBrk="1" latinLnBrk="0" hangingPunct="1">
+              <a:defRPr sz="1800" kern="1200">
+                <a:solidFill>
+                  <a:schemeClr val="tx1"/>
+                </a:solidFill>
+                <a:latin typeface="+mn-lt"/>
+                <a:ea typeface="+mn-ea"/>
+                <a:cs typeface="+mn-cs"/>
+              </a:defRPr>
+            </a:lvl6pPr>
+            <a:lvl7pPr marL="2743200" algn="l" defTabSz="914400" rtl="0" eaLnBrk="1" latinLnBrk="0" hangingPunct="1">
+              <a:defRPr sz="1800" kern="1200">
+                <a:solidFill>
+                  <a:schemeClr val="tx1"/>
+                </a:solidFill>
+                <a:latin typeface="+mn-lt"/>
+                <a:ea typeface="+mn-ea"/>
+                <a:cs typeface="+mn-cs"/>
+              </a:defRPr>
+            </a:lvl7pPr>
+            <a:lvl8pPr marL="3200400" algn="l" defTabSz="914400" rtl="0" eaLnBrk="1" latinLnBrk="0" hangingPunct="1">
+              <a:defRPr sz="1800" kern="1200">
+                <a:solidFill>
+                  <a:schemeClr val="tx1"/>
+                </a:solidFill>
+                <a:latin typeface="+mn-lt"/>
+                <a:ea typeface="+mn-ea"/>
+                <a:cs typeface="+mn-cs"/>
+              </a:defRPr>
+            </a:lvl8pPr>
+            <a:lvl9pPr marL="3657600" algn="l" defTabSz="914400" rtl="0" eaLnBrk="1" latinLnBrk="0" hangingPunct="1">
+              <a:defRPr sz="1800" kern="1200">
+                <a:solidFill>
+                  <a:schemeClr val="tx1"/>
+                </a:solidFill>
+                <a:latin typeface="+mn-lt"/>
+                <a:ea typeface="+mn-ea"/>
+                <a:cs typeface="+mn-cs"/>
+              </a:defRPr>
+            </a:lvl9pPr>
+          </a:lstStyle>
+          <a:p>
+            <a:pPr marL="447675">
+              <a:lnSpc>
+                <a:spcPct val="85000"/>
+              </a:lnSpc>
+              <a:buClrTx/>
+              <a:buFontTx/>
+              <a:buNone/>
+              <a:defRPr/>
+            </a:pPr>
+            <a:r>
+              <a:rPr lang="en-US" sz="900" kern="0" dirty="0">
+                <a:solidFill>
+                  <a:prstClr val="white"/>
+                </a:solidFill>
+                <a:latin typeface="Calibri" panose="020F0502020204030204"/>
+              </a:rPr>
+              <a:t>Convenience functions,</a:t>
+            </a:r>
+            <a:br>
+              <a:rPr lang="en-US" sz="900" kern="0" dirty="0">
+                <a:solidFill>
+                  <a:prstClr val="white"/>
+                </a:solidFill>
+                <a:latin typeface="Calibri" panose="020F0502020204030204"/>
+              </a:rPr>
+            </a:br>
+            <a:r>
+              <a:rPr lang="en-US" sz="900" kern="0" dirty="0">
+                <a:solidFill>
+                  <a:prstClr val="white"/>
+                </a:solidFill>
+                <a:latin typeface="Calibri" panose="020F0502020204030204"/>
+              </a:rPr>
+              <a:t>executor, node graph, …</a:t>
+            </a:r>
+          </a:p>
+        </p:txBody>
+      </p:sp>
+      <p:sp>
+        <p:nvSpPr>
+          <p:cNvPr id="81" name="Rectangle 80">
+            <a:extLst>
+              <a:ext uri="{FF2B5EF4-FFF2-40B4-BE49-F238E27FC236}">
+                <a16:creationId xmlns:a16="http://schemas.microsoft.com/office/drawing/2014/main" id="{52FEB82C-F028-4D62-9084-8C9EA8025F8D}"/>
+              </a:ext>
+            </a:extLst>
+          </p:cNvPr>
+          <p:cNvSpPr/>
+          <p:nvPr/>
+        </p:nvSpPr>
+        <p:spPr>
+          <a:xfrm>
+            <a:off x="5683378" y="2287571"/>
+            <a:ext cx="922171" cy="304450"/>
+          </a:xfrm>
+          <a:prstGeom prst="rect">
+            <a:avLst/>
+          </a:prstGeom>
+        </p:spPr>
+        <p:txBody>
+          <a:bodyPr wrap="none" lIns="36000" anchor="ctr" anchorCtr="0">
+            <a:noAutofit/>
+          </a:bodyPr>
+          <a:lstStyle/>
+          <a:p>
+            <a:pPr defTabSz="457200">
+              <a:buClrTx/>
+              <a:buFontTx/>
+              <a:buNone/>
+            </a:pPr>
+            <a:r>
+              <a:rPr lang="en-US" sz="1600" dirty="0" err="1">
+                <a:solidFill>
+                  <a:prstClr val="white"/>
+                </a:solidFill>
+                <a:latin typeface="Calibri" panose="020F0502020204030204"/>
+                <a:ea typeface="+mn-ea"/>
+                <a:cs typeface="+mn-cs"/>
+              </a:rPr>
+              <a:t>rcl</a:t>
+            </a:r>
+            <a:r>
+              <a:rPr lang="en-US" sz="1600" dirty="0">
+                <a:solidFill>
+                  <a:prstClr val="white"/>
+                </a:solidFill>
+                <a:latin typeface="Calibri" panose="020F0502020204030204"/>
+                <a:ea typeface="+mn-ea"/>
+                <a:cs typeface="+mn-cs"/>
+              </a:rPr>
+              <a:t> + </a:t>
+            </a:r>
+            <a:r>
+              <a:rPr lang="en-US" sz="1600" dirty="0" err="1">
+                <a:solidFill>
+                  <a:prstClr val="white"/>
+                </a:solidFill>
+                <a:latin typeface="Calibri" panose="020F0502020204030204"/>
+                <a:ea typeface="+mn-ea"/>
+                <a:cs typeface="+mn-cs"/>
+              </a:rPr>
+              <a:t>rclc</a:t>
+            </a:r>
+            <a:r>
+              <a:rPr lang="en-US" sz="1600" dirty="0">
+                <a:solidFill>
+                  <a:prstClr val="white"/>
+                </a:solidFill>
+                <a:latin typeface="Calibri" panose="020F0502020204030204"/>
+                <a:ea typeface="+mn-ea"/>
+                <a:cs typeface="+mn-cs"/>
+              </a:rPr>
+              <a:t>: </a:t>
+            </a:r>
+            <a:endParaRPr lang="en-US" sz="1600" kern="1200" dirty="0">
               <a:solidFill>
-                <a:prstClr val="white"/>
+                <a:prstClr val="black"/>
               </a:solidFill>
-              <a:effectLst/>
-              <a:uLnTx/>
-              <a:uFillTx/>
               <a:latin typeface="Calibri" panose="020F0502020204030204"/>
               <a:ea typeface="+mn-ea"/>
               <a:cs typeface="+mn-cs"/>
             </a:endParaRPr>
+          </a:p>
+        </p:txBody>
+      </p:sp>
+      <p:sp>
+        <p:nvSpPr>
+          <p:cNvPr id="82" name="TextBox 81">
+            <a:extLst>
+              <a:ext uri="{FF2B5EF4-FFF2-40B4-BE49-F238E27FC236}">
+                <a16:creationId xmlns:a16="http://schemas.microsoft.com/office/drawing/2014/main" id="{E24D0DDD-28D2-4F04-963F-BB9676562CAF}"/>
+              </a:ext>
+            </a:extLst>
+          </p:cNvPr>
+          <p:cNvSpPr txBox="1"/>
+          <p:nvPr/>
+        </p:nvSpPr>
+        <p:spPr>
+          <a:xfrm rot="16200000">
+            <a:off x="7654799" y="4436911"/>
+            <a:ext cx="776046" cy="341632"/>
+          </a:xfrm>
+          <a:prstGeom prst="rect">
+            <a:avLst/>
+          </a:prstGeom>
+          <a:noFill/>
+        </p:spPr>
+        <p:txBody>
+          <a:bodyPr wrap="none" lIns="0" tIns="0" rIns="0" bIns="0" rtlCol="0">
+            <a:noAutofit/>
+          </a:bodyPr>
+          <a:lstStyle/>
+          <a:p>
+            <a:pPr algn="ctr" defTabSz="457200">
+              <a:lnSpc>
+                <a:spcPct val="80000"/>
+              </a:lnSpc>
+              <a:buClrTx/>
+              <a:buFontTx/>
+              <a:buNone/>
+            </a:pPr>
+            <a:r>
+              <a:rPr lang="en-US" sz="1800" b="1" kern="1200" dirty="0">
+                <a:solidFill>
+                  <a:prstClr val="black"/>
+                </a:solidFill>
+                <a:latin typeface="Calibri" panose="020F0502020204030204"/>
+                <a:ea typeface="+mn-ea"/>
+                <a:cs typeface="+mn-cs"/>
+              </a:rPr>
+              <a:t>RTOS</a:t>
+            </a:r>
+          </a:p>
+        </p:txBody>
+      </p:sp>
+      <p:sp>
+        <p:nvSpPr>
+          <p:cNvPr id="83" name="TextBox 82">
+            <a:extLst>
+              <a:ext uri="{FF2B5EF4-FFF2-40B4-BE49-F238E27FC236}">
+                <a16:creationId xmlns:a16="http://schemas.microsoft.com/office/drawing/2014/main" id="{6427F8AA-BA25-4FE4-94B2-51D75E8B4ECA}"/>
+              </a:ext>
+            </a:extLst>
+          </p:cNvPr>
+          <p:cNvSpPr txBox="1"/>
+          <p:nvPr/>
+        </p:nvSpPr>
+        <p:spPr>
+          <a:xfrm rot="16200000">
+            <a:off x="7607979" y="3285302"/>
+            <a:ext cx="1011899" cy="483844"/>
+          </a:xfrm>
+          <a:prstGeom prst="rect">
+            <a:avLst/>
+          </a:prstGeom>
+          <a:noFill/>
+        </p:spPr>
+        <p:txBody>
+          <a:bodyPr wrap="none" lIns="0" tIns="0" rIns="0" bIns="0" rtlCol="0">
+            <a:noAutofit/>
+          </a:bodyPr>
+          <a:lstStyle/>
+          <a:p>
+            <a:pPr algn="ctr" defTabSz="457200">
+              <a:lnSpc>
+                <a:spcPct val="80000"/>
+              </a:lnSpc>
+              <a:buClrTx/>
+              <a:buFontTx/>
+              <a:buNone/>
+            </a:pPr>
+            <a:r>
+              <a:rPr lang="en-US" sz="1800" b="1" kern="1200" dirty="0">
+                <a:solidFill>
+                  <a:prstClr val="black"/>
+                </a:solidFill>
+                <a:latin typeface="Calibri" panose="020F0502020204030204"/>
+                <a:ea typeface="+mn-ea"/>
+                <a:cs typeface="+mn-cs"/>
+              </a:rPr>
+              <a:t>Middle-</a:t>
+            </a:r>
+            <a:br>
+              <a:rPr lang="en-US" sz="1800" b="1" kern="1200" dirty="0">
+                <a:solidFill>
+                  <a:prstClr val="black"/>
+                </a:solidFill>
+                <a:latin typeface="Calibri" panose="020F0502020204030204"/>
+                <a:ea typeface="+mn-ea"/>
+                <a:cs typeface="+mn-cs"/>
+              </a:rPr>
+            </a:br>
+            <a:r>
+              <a:rPr lang="en-US" sz="1800" b="1" kern="1200" dirty="0">
+                <a:solidFill>
+                  <a:prstClr val="black"/>
+                </a:solidFill>
+                <a:latin typeface="Calibri" panose="020F0502020204030204"/>
+                <a:ea typeface="+mn-ea"/>
+                <a:cs typeface="+mn-cs"/>
+              </a:rPr>
+              <a:t>ware</a:t>
+            </a:r>
+          </a:p>
+        </p:txBody>
+      </p:sp>
+      <p:sp>
+        <p:nvSpPr>
+          <p:cNvPr id="84" name="TextBox 83">
+            <a:extLst>
+              <a:ext uri="{FF2B5EF4-FFF2-40B4-BE49-F238E27FC236}">
+                <a16:creationId xmlns:a16="http://schemas.microsoft.com/office/drawing/2014/main" id="{C9044346-5F94-41DF-9C0A-B3B49BEE4425}"/>
+              </a:ext>
+            </a:extLst>
+          </p:cNvPr>
+          <p:cNvSpPr txBox="1"/>
+          <p:nvPr/>
+        </p:nvSpPr>
+        <p:spPr>
+          <a:xfrm rot="16200000">
+            <a:off x="7845765" y="2324657"/>
+            <a:ext cx="536334" cy="483846"/>
+          </a:xfrm>
+          <a:prstGeom prst="rect">
+            <a:avLst/>
+          </a:prstGeom>
+          <a:noFill/>
+        </p:spPr>
+        <p:txBody>
+          <a:bodyPr wrap="none" lIns="0" tIns="0" rIns="0" bIns="0" rtlCol="0">
+            <a:noAutofit/>
+          </a:bodyPr>
+          <a:lstStyle/>
+          <a:p>
+            <a:pPr algn="ctr" defTabSz="457200">
+              <a:lnSpc>
+                <a:spcPct val="80000"/>
+              </a:lnSpc>
+              <a:buClrTx/>
+              <a:buFontTx/>
+              <a:buNone/>
+            </a:pPr>
+            <a:r>
+              <a:rPr lang="en-US" sz="1800" b="1" kern="1200" dirty="0">
+                <a:solidFill>
+                  <a:prstClr val="black"/>
+                </a:solidFill>
+                <a:latin typeface="Calibri" panose="020F0502020204030204"/>
+                <a:ea typeface="+mn-ea"/>
+                <a:cs typeface="+mn-cs"/>
+              </a:rPr>
+              <a:t>Client</a:t>
+            </a:r>
+            <a:br>
+              <a:rPr lang="en-US" sz="1800" b="1" kern="1200" dirty="0">
+                <a:solidFill>
+                  <a:prstClr val="black"/>
+                </a:solidFill>
+                <a:latin typeface="Calibri" panose="020F0502020204030204"/>
+                <a:ea typeface="+mn-ea"/>
+                <a:cs typeface="+mn-cs"/>
+              </a:rPr>
+            </a:br>
+            <a:r>
+              <a:rPr lang="en-US" sz="1800" b="1" kern="1200" dirty="0">
+                <a:solidFill>
+                  <a:prstClr val="black"/>
+                </a:solidFill>
+                <a:latin typeface="Calibri" panose="020F0502020204030204"/>
+                <a:ea typeface="+mn-ea"/>
+                <a:cs typeface="+mn-cs"/>
+              </a:rPr>
+              <a:t>library</a:t>
+            </a:r>
+          </a:p>
+        </p:txBody>
+      </p:sp>
+      <p:sp>
+        <p:nvSpPr>
+          <p:cNvPr id="85" name="Rectangle 84">
+            <a:extLst>
+              <a:ext uri="{FF2B5EF4-FFF2-40B4-BE49-F238E27FC236}">
+                <a16:creationId xmlns:a16="http://schemas.microsoft.com/office/drawing/2014/main" id="{8A14384C-9C4D-4807-A68F-704340E505B1}"/>
+              </a:ext>
+            </a:extLst>
+          </p:cNvPr>
+          <p:cNvSpPr/>
+          <p:nvPr/>
+        </p:nvSpPr>
+        <p:spPr>
+          <a:xfrm>
+            <a:off x="4455199" y="4219705"/>
+            <a:ext cx="2151975" cy="180000"/>
+          </a:xfrm>
+          <a:prstGeom prst="rect">
+            <a:avLst/>
+          </a:prstGeom>
+          <a:solidFill>
+            <a:srgbClr val="438CC6"/>
+          </a:solidFill>
+          <a:ln w="19050" cap="flat" cmpd="sng" algn="ctr">
+            <a:solidFill>
+              <a:srgbClr val="324D7A"/>
+            </a:solidFill>
+            <a:prstDash val="solid"/>
+            <a:miter lim="800000"/>
+          </a:ln>
+          <a:effectLst/>
+        </p:spPr>
+        <p:txBody>
+          <a:bodyPr wrap="none" lIns="0" tIns="0" rIns="0" bIns="0" rtlCol="0" anchor="ctr" anchorCtr="0"/>
+          <a:lstStyle>
+            <a:defPPr>
+              <a:defRPr lang="en-US"/>
+            </a:defPPr>
+            <a:lvl1pPr marL="0" algn="l" defTabSz="914400" rtl="0" eaLnBrk="1" latinLnBrk="0" hangingPunct="1">
+              <a:defRPr sz="1800" kern="1200">
+                <a:solidFill>
+                  <a:schemeClr val="tx1"/>
+                </a:solidFill>
+                <a:latin typeface="+mn-lt"/>
+                <a:ea typeface="+mn-ea"/>
+                <a:cs typeface="+mn-cs"/>
+              </a:defRPr>
+            </a:lvl1pPr>
+            <a:lvl2pPr marL="457200" algn="l" defTabSz="914400" rtl="0" eaLnBrk="1" latinLnBrk="0" hangingPunct="1">
+              <a:defRPr sz="1800" kern="1200">
+                <a:solidFill>
+                  <a:schemeClr val="tx1"/>
+                </a:solidFill>
+                <a:latin typeface="+mn-lt"/>
+                <a:ea typeface="+mn-ea"/>
+                <a:cs typeface="+mn-cs"/>
+              </a:defRPr>
+            </a:lvl2pPr>
+            <a:lvl3pPr marL="914400" algn="l" defTabSz="914400" rtl="0" eaLnBrk="1" latinLnBrk="0" hangingPunct="1">
+              <a:defRPr sz="1800" kern="1200">
+                <a:solidFill>
+                  <a:schemeClr val="tx1"/>
+                </a:solidFill>
+                <a:latin typeface="+mn-lt"/>
+                <a:ea typeface="+mn-ea"/>
+                <a:cs typeface="+mn-cs"/>
+              </a:defRPr>
+            </a:lvl3pPr>
+            <a:lvl4pPr marL="1371600" algn="l" defTabSz="914400" rtl="0" eaLnBrk="1" latinLnBrk="0" hangingPunct="1">
+              <a:defRPr sz="1800" kern="1200">
+                <a:solidFill>
+                  <a:schemeClr val="tx1"/>
+                </a:solidFill>
+                <a:latin typeface="+mn-lt"/>
+                <a:ea typeface="+mn-ea"/>
+                <a:cs typeface="+mn-cs"/>
+              </a:defRPr>
+            </a:lvl4pPr>
+            <a:lvl5pPr marL="1828800" algn="l" defTabSz="914400" rtl="0" eaLnBrk="1" latinLnBrk="0" hangingPunct="1">
+              <a:defRPr sz="1800" kern="1200">
+                <a:solidFill>
+                  <a:schemeClr val="tx1"/>
+                </a:solidFill>
+                <a:latin typeface="+mn-lt"/>
+                <a:ea typeface="+mn-ea"/>
+                <a:cs typeface="+mn-cs"/>
+              </a:defRPr>
+            </a:lvl5pPr>
+            <a:lvl6pPr marL="2286000" algn="l" defTabSz="914400" rtl="0" eaLnBrk="1" latinLnBrk="0" hangingPunct="1">
+              <a:defRPr sz="1800" kern="1200">
+                <a:solidFill>
+                  <a:schemeClr val="tx1"/>
+                </a:solidFill>
+                <a:latin typeface="+mn-lt"/>
+                <a:ea typeface="+mn-ea"/>
+                <a:cs typeface="+mn-cs"/>
+              </a:defRPr>
+            </a:lvl6pPr>
+            <a:lvl7pPr marL="2743200" algn="l" defTabSz="914400" rtl="0" eaLnBrk="1" latinLnBrk="0" hangingPunct="1">
+              <a:defRPr sz="1800" kern="1200">
+                <a:solidFill>
+                  <a:schemeClr val="tx1"/>
+                </a:solidFill>
+                <a:latin typeface="+mn-lt"/>
+                <a:ea typeface="+mn-ea"/>
+                <a:cs typeface="+mn-cs"/>
+              </a:defRPr>
+            </a:lvl7pPr>
+            <a:lvl8pPr marL="3200400" algn="l" defTabSz="914400" rtl="0" eaLnBrk="1" latinLnBrk="0" hangingPunct="1">
+              <a:defRPr sz="1800" kern="1200">
+                <a:solidFill>
+                  <a:schemeClr val="tx1"/>
+                </a:solidFill>
+                <a:latin typeface="+mn-lt"/>
+                <a:ea typeface="+mn-ea"/>
+                <a:cs typeface="+mn-cs"/>
+              </a:defRPr>
+            </a:lvl8pPr>
+            <a:lvl9pPr marL="3657600" algn="l" defTabSz="914400" rtl="0" eaLnBrk="1" latinLnBrk="0" hangingPunct="1">
+              <a:defRPr sz="1800" kern="1200">
+                <a:solidFill>
+                  <a:schemeClr val="tx1"/>
+                </a:solidFill>
+                <a:latin typeface="+mn-lt"/>
+                <a:ea typeface="+mn-ea"/>
+                <a:cs typeface="+mn-cs"/>
+              </a:defRPr>
+            </a:lvl9pPr>
+          </a:lstStyle>
+          <a:p>
+            <a:pPr algn="ctr">
+              <a:buClrTx/>
+              <a:buFontTx/>
+              <a:buNone/>
+              <a:defRPr/>
+            </a:pPr>
+            <a:r>
+              <a:rPr lang="en-US" sz="1200" kern="0" dirty="0">
+                <a:solidFill>
+                  <a:prstClr val="white"/>
+                </a:solidFill>
+                <a:latin typeface="Calibri" panose="020F0502020204030204"/>
+              </a:rPr>
+              <a:t>POSIX</a:t>
+            </a:r>
+          </a:p>
+        </p:txBody>
+      </p:sp>
+      <p:sp>
+        <p:nvSpPr>
+          <p:cNvPr id="86" name="Rectangle 85">
+            <a:extLst>
+              <a:ext uri="{FF2B5EF4-FFF2-40B4-BE49-F238E27FC236}">
+                <a16:creationId xmlns:a16="http://schemas.microsoft.com/office/drawing/2014/main" id="{64FD0CD8-5167-4C92-889C-AE0FCE286585}"/>
+              </a:ext>
+            </a:extLst>
+          </p:cNvPr>
+          <p:cNvSpPr/>
+          <p:nvPr/>
+        </p:nvSpPr>
+        <p:spPr>
+          <a:xfrm>
+            <a:off x="4448190" y="4455751"/>
+            <a:ext cx="2158984" cy="540000"/>
+          </a:xfrm>
+          <a:prstGeom prst="rect">
+            <a:avLst/>
+          </a:prstGeom>
+          <a:solidFill>
+            <a:srgbClr val="438CC6"/>
+          </a:solidFill>
+          <a:ln w="19050" cap="flat" cmpd="sng" algn="ctr">
+            <a:solidFill>
+              <a:srgbClr val="324D7A"/>
+            </a:solidFill>
+            <a:prstDash val="solid"/>
+            <a:miter lim="800000"/>
+          </a:ln>
+          <a:effectLst/>
+        </p:spPr>
+        <p:txBody>
+          <a:bodyPr wrap="none" lIns="0" tIns="0" rIns="0" bIns="0" rtlCol="0" anchor="ctr"/>
+          <a:lstStyle>
+            <a:defPPr>
+              <a:defRPr lang="en-US"/>
+            </a:defPPr>
+            <a:lvl1pPr marL="0" algn="l" defTabSz="914400" rtl="0" eaLnBrk="1" latinLnBrk="0" hangingPunct="1">
+              <a:defRPr sz="1800" kern="1200">
+                <a:solidFill>
+                  <a:schemeClr val="tx1"/>
+                </a:solidFill>
+                <a:latin typeface="+mn-lt"/>
+                <a:ea typeface="+mn-ea"/>
+                <a:cs typeface="+mn-cs"/>
+              </a:defRPr>
+            </a:lvl1pPr>
+            <a:lvl2pPr marL="457200" algn="l" defTabSz="914400" rtl="0" eaLnBrk="1" latinLnBrk="0" hangingPunct="1">
+              <a:defRPr sz="1800" kern="1200">
+                <a:solidFill>
+                  <a:schemeClr val="tx1"/>
+                </a:solidFill>
+                <a:latin typeface="+mn-lt"/>
+                <a:ea typeface="+mn-ea"/>
+                <a:cs typeface="+mn-cs"/>
+              </a:defRPr>
+            </a:lvl2pPr>
+            <a:lvl3pPr marL="914400" algn="l" defTabSz="914400" rtl="0" eaLnBrk="1" latinLnBrk="0" hangingPunct="1">
+              <a:defRPr sz="1800" kern="1200">
+                <a:solidFill>
+                  <a:schemeClr val="tx1"/>
+                </a:solidFill>
+                <a:latin typeface="+mn-lt"/>
+                <a:ea typeface="+mn-ea"/>
+                <a:cs typeface="+mn-cs"/>
+              </a:defRPr>
+            </a:lvl3pPr>
+            <a:lvl4pPr marL="1371600" algn="l" defTabSz="914400" rtl="0" eaLnBrk="1" latinLnBrk="0" hangingPunct="1">
+              <a:defRPr sz="1800" kern="1200">
+                <a:solidFill>
+                  <a:schemeClr val="tx1"/>
+                </a:solidFill>
+                <a:latin typeface="+mn-lt"/>
+                <a:ea typeface="+mn-ea"/>
+                <a:cs typeface="+mn-cs"/>
+              </a:defRPr>
+            </a:lvl4pPr>
+            <a:lvl5pPr marL="1828800" algn="l" defTabSz="914400" rtl="0" eaLnBrk="1" latinLnBrk="0" hangingPunct="1">
+              <a:defRPr sz="1800" kern="1200">
+                <a:solidFill>
+                  <a:schemeClr val="tx1"/>
+                </a:solidFill>
+                <a:latin typeface="+mn-lt"/>
+                <a:ea typeface="+mn-ea"/>
+                <a:cs typeface="+mn-cs"/>
+              </a:defRPr>
+            </a:lvl5pPr>
+            <a:lvl6pPr marL="2286000" algn="l" defTabSz="914400" rtl="0" eaLnBrk="1" latinLnBrk="0" hangingPunct="1">
+              <a:defRPr sz="1800" kern="1200">
+                <a:solidFill>
+                  <a:schemeClr val="tx1"/>
+                </a:solidFill>
+                <a:latin typeface="+mn-lt"/>
+                <a:ea typeface="+mn-ea"/>
+                <a:cs typeface="+mn-cs"/>
+              </a:defRPr>
+            </a:lvl6pPr>
+            <a:lvl7pPr marL="2743200" algn="l" defTabSz="914400" rtl="0" eaLnBrk="1" latinLnBrk="0" hangingPunct="1">
+              <a:defRPr sz="1800" kern="1200">
+                <a:solidFill>
+                  <a:schemeClr val="tx1"/>
+                </a:solidFill>
+                <a:latin typeface="+mn-lt"/>
+                <a:ea typeface="+mn-ea"/>
+                <a:cs typeface="+mn-cs"/>
+              </a:defRPr>
+            </a:lvl7pPr>
+            <a:lvl8pPr marL="3200400" algn="l" defTabSz="914400" rtl="0" eaLnBrk="1" latinLnBrk="0" hangingPunct="1">
+              <a:defRPr sz="1800" kern="1200">
+                <a:solidFill>
+                  <a:schemeClr val="tx1"/>
+                </a:solidFill>
+                <a:latin typeface="+mn-lt"/>
+                <a:ea typeface="+mn-ea"/>
+                <a:cs typeface="+mn-cs"/>
+              </a:defRPr>
+            </a:lvl8pPr>
+            <a:lvl9pPr marL="3657600" algn="l" defTabSz="914400" rtl="0" eaLnBrk="1" latinLnBrk="0" hangingPunct="1">
+              <a:defRPr sz="1800" kern="1200">
+                <a:solidFill>
+                  <a:schemeClr val="tx1"/>
+                </a:solidFill>
+                <a:latin typeface="+mn-lt"/>
+                <a:ea typeface="+mn-ea"/>
+                <a:cs typeface="+mn-cs"/>
+              </a:defRPr>
+            </a:lvl9pPr>
+          </a:lstStyle>
+          <a:p>
+            <a:pPr algn="ctr">
+              <a:buClrTx/>
+              <a:buFontTx/>
+              <a:buNone/>
+              <a:defRPr/>
+            </a:pPr>
+            <a:r>
+              <a:rPr lang="en-US" sz="1600" kern="0" dirty="0">
+                <a:solidFill>
+                  <a:prstClr val="white"/>
+                </a:solidFill>
+                <a:latin typeface="Calibri" panose="020F0502020204030204"/>
+              </a:rPr>
+              <a:t>Zephyr</a:t>
+            </a:r>
+            <a:r>
+              <a:rPr lang="en-US" sz="800" kern="0" dirty="0">
+                <a:solidFill>
+                  <a:prstClr val="white"/>
+                </a:solidFill>
+                <a:latin typeface="Calibri" panose="020F0502020204030204"/>
+              </a:rPr>
+              <a:t> </a:t>
+            </a:r>
+            <a:r>
+              <a:rPr lang="en-US" sz="1600" kern="0" dirty="0">
+                <a:solidFill>
+                  <a:prstClr val="white"/>
+                </a:solidFill>
+                <a:latin typeface="Calibri" panose="020F0502020204030204"/>
+              </a:rPr>
+              <a:t>/</a:t>
+            </a:r>
+            <a:r>
+              <a:rPr lang="en-US" sz="800" kern="0" dirty="0">
+                <a:solidFill>
+                  <a:prstClr val="white"/>
+                </a:solidFill>
+                <a:latin typeface="Calibri" panose="020F0502020204030204"/>
+              </a:rPr>
+              <a:t> </a:t>
+            </a:r>
+            <a:r>
+              <a:rPr lang="en-US" sz="1600" kern="0" dirty="0" err="1">
+                <a:solidFill>
+                  <a:prstClr val="white"/>
+                </a:solidFill>
+                <a:latin typeface="Calibri" panose="020F0502020204030204"/>
+              </a:rPr>
+              <a:t>FreeRTOS</a:t>
+            </a:r>
+            <a:r>
+              <a:rPr lang="en-US" sz="800" kern="0" dirty="0">
+                <a:solidFill>
+                  <a:prstClr val="white"/>
+                </a:solidFill>
+                <a:latin typeface="Calibri" panose="020F0502020204030204"/>
+              </a:rPr>
+              <a:t> </a:t>
+            </a:r>
+            <a:r>
+              <a:rPr lang="en-US" sz="1600" kern="0" dirty="0">
+                <a:solidFill>
+                  <a:prstClr val="white"/>
+                </a:solidFill>
+                <a:latin typeface="Calibri" panose="020F0502020204030204"/>
+              </a:rPr>
+              <a:t>/</a:t>
+            </a:r>
+            <a:r>
+              <a:rPr lang="en-US" sz="400" kern="0" dirty="0">
+                <a:solidFill>
+                  <a:prstClr val="white"/>
+                </a:solidFill>
+                <a:latin typeface="Calibri" panose="020F0502020204030204"/>
+              </a:rPr>
+              <a:t> </a:t>
+            </a:r>
+            <a:r>
+              <a:rPr lang="en-US" sz="1600" kern="0" dirty="0" err="1">
+                <a:solidFill>
+                  <a:prstClr val="white"/>
+                </a:solidFill>
+                <a:latin typeface="Calibri" panose="020F0502020204030204"/>
+              </a:rPr>
+              <a:t>NuttX</a:t>
+            </a:r>
+            <a:endParaRPr lang="en-US" sz="1600" kern="0" dirty="0">
+              <a:solidFill>
+                <a:prstClr val="white"/>
+              </a:solidFill>
+              <a:latin typeface="Calibri" panose="020F0502020204030204"/>
+            </a:endParaRPr>
+          </a:p>
+        </p:txBody>
+      </p:sp>
+      <p:sp>
+        <p:nvSpPr>
+          <p:cNvPr id="87" name="Rectangle 86">
+            <a:extLst>
+              <a:ext uri="{FF2B5EF4-FFF2-40B4-BE49-F238E27FC236}">
+                <a16:creationId xmlns:a16="http://schemas.microsoft.com/office/drawing/2014/main" id="{61A12595-BB68-4783-86C8-EA8F88CEC3A2}"/>
+              </a:ext>
+            </a:extLst>
+          </p:cNvPr>
+          <p:cNvSpPr/>
+          <p:nvPr/>
+        </p:nvSpPr>
+        <p:spPr>
+          <a:xfrm>
+            <a:off x="4455199" y="3493368"/>
+            <a:ext cx="3275247" cy="539808"/>
+          </a:xfrm>
+          <a:prstGeom prst="rect">
+            <a:avLst/>
+          </a:prstGeom>
+          <a:solidFill>
+            <a:srgbClr val="324D7A"/>
+          </a:solidFill>
+          <a:ln w="19050" cap="flat" cmpd="sng" algn="ctr">
+            <a:solidFill>
+              <a:srgbClr val="1F314F"/>
+            </a:solidFill>
+            <a:prstDash val="solid"/>
+            <a:miter lim="800000"/>
+          </a:ln>
+          <a:effectLst/>
+        </p:spPr>
+        <p:txBody>
+          <a:bodyPr lIns="0" tIns="0" rIns="0" bIns="0" rtlCol="0" anchor="ctr"/>
+          <a:lstStyle>
+            <a:defPPr>
+              <a:defRPr lang="en-US"/>
+            </a:defPPr>
+            <a:lvl1pPr marL="0" algn="l" defTabSz="914400" rtl="0" eaLnBrk="1" latinLnBrk="0" hangingPunct="1">
+              <a:defRPr sz="1800" kern="1200">
+                <a:solidFill>
+                  <a:schemeClr val="tx1"/>
+                </a:solidFill>
+                <a:latin typeface="+mn-lt"/>
+                <a:ea typeface="+mn-ea"/>
+                <a:cs typeface="+mn-cs"/>
+              </a:defRPr>
+            </a:lvl1pPr>
+            <a:lvl2pPr marL="457200" algn="l" defTabSz="914400" rtl="0" eaLnBrk="1" latinLnBrk="0" hangingPunct="1">
+              <a:defRPr sz="1800" kern="1200">
+                <a:solidFill>
+                  <a:schemeClr val="tx1"/>
+                </a:solidFill>
+                <a:latin typeface="+mn-lt"/>
+                <a:ea typeface="+mn-ea"/>
+                <a:cs typeface="+mn-cs"/>
+              </a:defRPr>
+            </a:lvl2pPr>
+            <a:lvl3pPr marL="914400" algn="l" defTabSz="914400" rtl="0" eaLnBrk="1" latinLnBrk="0" hangingPunct="1">
+              <a:defRPr sz="1800" kern="1200">
+                <a:solidFill>
+                  <a:schemeClr val="tx1"/>
+                </a:solidFill>
+                <a:latin typeface="+mn-lt"/>
+                <a:ea typeface="+mn-ea"/>
+                <a:cs typeface="+mn-cs"/>
+              </a:defRPr>
+            </a:lvl3pPr>
+            <a:lvl4pPr marL="1371600" algn="l" defTabSz="914400" rtl="0" eaLnBrk="1" latinLnBrk="0" hangingPunct="1">
+              <a:defRPr sz="1800" kern="1200">
+                <a:solidFill>
+                  <a:schemeClr val="tx1"/>
+                </a:solidFill>
+                <a:latin typeface="+mn-lt"/>
+                <a:ea typeface="+mn-ea"/>
+                <a:cs typeface="+mn-cs"/>
+              </a:defRPr>
+            </a:lvl4pPr>
+            <a:lvl5pPr marL="1828800" algn="l" defTabSz="914400" rtl="0" eaLnBrk="1" latinLnBrk="0" hangingPunct="1">
+              <a:defRPr sz="1800" kern="1200">
+                <a:solidFill>
+                  <a:schemeClr val="tx1"/>
+                </a:solidFill>
+                <a:latin typeface="+mn-lt"/>
+                <a:ea typeface="+mn-ea"/>
+                <a:cs typeface="+mn-cs"/>
+              </a:defRPr>
+            </a:lvl5pPr>
+            <a:lvl6pPr marL="2286000" algn="l" defTabSz="914400" rtl="0" eaLnBrk="1" latinLnBrk="0" hangingPunct="1">
+              <a:defRPr sz="1800" kern="1200">
+                <a:solidFill>
+                  <a:schemeClr val="tx1"/>
+                </a:solidFill>
+                <a:latin typeface="+mn-lt"/>
+                <a:ea typeface="+mn-ea"/>
+                <a:cs typeface="+mn-cs"/>
+              </a:defRPr>
+            </a:lvl6pPr>
+            <a:lvl7pPr marL="2743200" algn="l" defTabSz="914400" rtl="0" eaLnBrk="1" latinLnBrk="0" hangingPunct="1">
+              <a:defRPr sz="1800" kern="1200">
+                <a:solidFill>
+                  <a:schemeClr val="tx1"/>
+                </a:solidFill>
+                <a:latin typeface="+mn-lt"/>
+                <a:ea typeface="+mn-ea"/>
+                <a:cs typeface="+mn-cs"/>
+              </a:defRPr>
+            </a:lvl7pPr>
+            <a:lvl8pPr marL="3200400" algn="l" defTabSz="914400" rtl="0" eaLnBrk="1" latinLnBrk="0" hangingPunct="1">
+              <a:defRPr sz="1800" kern="1200">
+                <a:solidFill>
+                  <a:schemeClr val="tx1"/>
+                </a:solidFill>
+                <a:latin typeface="+mn-lt"/>
+                <a:ea typeface="+mn-ea"/>
+                <a:cs typeface="+mn-cs"/>
+              </a:defRPr>
+            </a:lvl8pPr>
+            <a:lvl9pPr marL="3657600" algn="l" defTabSz="914400" rtl="0" eaLnBrk="1" latinLnBrk="0" hangingPunct="1">
+              <a:defRPr sz="1800" kern="1200">
+                <a:solidFill>
+                  <a:schemeClr val="tx1"/>
+                </a:solidFill>
+                <a:latin typeface="+mn-lt"/>
+                <a:ea typeface="+mn-ea"/>
+                <a:cs typeface="+mn-cs"/>
+              </a:defRPr>
+            </a:lvl9pPr>
+          </a:lstStyle>
+          <a:p>
+            <a:pPr algn="ctr">
+              <a:buClrTx/>
+              <a:buFontTx/>
+              <a:buNone/>
+            </a:pPr>
+            <a:r>
+              <a:rPr lang="en-US" sz="1600" kern="0" dirty="0">
+                <a:solidFill>
+                  <a:prstClr val="white"/>
+                </a:solidFill>
+                <a:latin typeface="Calibri" panose="020F0502020204030204"/>
+              </a:rPr>
+              <a:t>Micro XRCE-DDS Client</a:t>
+            </a:r>
+          </a:p>
+        </p:txBody>
+      </p:sp>
+      <p:sp>
+        <p:nvSpPr>
+          <p:cNvPr id="88" name="Rectangle 87">
+            <a:extLst>
+              <a:ext uri="{FF2B5EF4-FFF2-40B4-BE49-F238E27FC236}">
+                <a16:creationId xmlns:a16="http://schemas.microsoft.com/office/drawing/2014/main" id="{FC07ED30-0BC8-46F1-98E9-63E6DEC35C91}"/>
+              </a:ext>
+            </a:extLst>
+          </p:cNvPr>
+          <p:cNvSpPr/>
+          <p:nvPr/>
+        </p:nvSpPr>
+        <p:spPr>
+          <a:xfrm>
+            <a:off x="5647531" y="4455751"/>
+            <a:ext cx="959643" cy="118800"/>
+          </a:xfrm>
+          <a:prstGeom prst="rect">
+            <a:avLst/>
+          </a:prstGeom>
+          <a:solidFill>
+            <a:srgbClr val="324D7A"/>
+          </a:solidFill>
+          <a:ln w="19050" cap="flat" cmpd="sng" algn="ctr">
+            <a:solidFill>
+              <a:srgbClr val="1F314F"/>
+            </a:solidFill>
+            <a:prstDash val="solid"/>
+            <a:miter lim="800000"/>
+          </a:ln>
+          <a:effectLst/>
+        </p:spPr>
+        <p:txBody>
+          <a:bodyPr wrap="none" lIns="0" tIns="0" rIns="0" bIns="0" rtlCol="0" anchor="ctr"/>
+          <a:lstStyle>
+            <a:defPPr>
+              <a:defRPr lang="en-US"/>
+            </a:defPPr>
+            <a:lvl1pPr marL="0" algn="l" defTabSz="914400" rtl="0" eaLnBrk="1" latinLnBrk="0" hangingPunct="1">
+              <a:defRPr sz="1800" kern="1200">
+                <a:solidFill>
+                  <a:schemeClr val="tx1"/>
+                </a:solidFill>
+                <a:latin typeface="+mn-lt"/>
+                <a:ea typeface="+mn-ea"/>
+                <a:cs typeface="+mn-cs"/>
+              </a:defRPr>
+            </a:lvl1pPr>
+            <a:lvl2pPr marL="457200" algn="l" defTabSz="914400" rtl="0" eaLnBrk="1" latinLnBrk="0" hangingPunct="1">
+              <a:defRPr sz="1800" kern="1200">
+                <a:solidFill>
+                  <a:schemeClr val="tx1"/>
+                </a:solidFill>
+                <a:latin typeface="+mn-lt"/>
+                <a:ea typeface="+mn-ea"/>
+                <a:cs typeface="+mn-cs"/>
+              </a:defRPr>
+            </a:lvl2pPr>
+            <a:lvl3pPr marL="914400" algn="l" defTabSz="914400" rtl="0" eaLnBrk="1" latinLnBrk="0" hangingPunct="1">
+              <a:defRPr sz="1800" kern="1200">
+                <a:solidFill>
+                  <a:schemeClr val="tx1"/>
+                </a:solidFill>
+                <a:latin typeface="+mn-lt"/>
+                <a:ea typeface="+mn-ea"/>
+                <a:cs typeface="+mn-cs"/>
+              </a:defRPr>
+            </a:lvl3pPr>
+            <a:lvl4pPr marL="1371600" algn="l" defTabSz="914400" rtl="0" eaLnBrk="1" latinLnBrk="0" hangingPunct="1">
+              <a:defRPr sz="1800" kern="1200">
+                <a:solidFill>
+                  <a:schemeClr val="tx1"/>
+                </a:solidFill>
+                <a:latin typeface="+mn-lt"/>
+                <a:ea typeface="+mn-ea"/>
+                <a:cs typeface="+mn-cs"/>
+              </a:defRPr>
+            </a:lvl4pPr>
+            <a:lvl5pPr marL="1828800" algn="l" defTabSz="914400" rtl="0" eaLnBrk="1" latinLnBrk="0" hangingPunct="1">
+              <a:defRPr sz="1800" kern="1200">
+                <a:solidFill>
+                  <a:schemeClr val="tx1"/>
+                </a:solidFill>
+                <a:latin typeface="+mn-lt"/>
+                <a:ea typeface="+mn-ea"/>
+                <a:cs typeface="+mn-cs"/>
+              </a:defRPr>
+            </a:lvl5pPr>
+            <a:lvl6pPr marL="2286000" algn="l" defTabSz="914400" rtl="0" eaLnBrk="1" latinLnBrk="0" hangingPunct="1">
+              <a:defRPr sz="1800" kern="1200">
+                <a:solidFill>
+                  <a:schemeClr val="tx1"/>
+                </a:solidFill>
+                <a:latin typeface="+mn-lt"/>
+                <a:ea typeface="+mn-ea"/>
+                <a:cs typeface="+mn-cs"/>
+              </a:defRPr>
+            </a:lvl6pPr>
+            <a:lvl7pPr marL="2743200" algn="l" defTabSz="914400" rtl="0" eaLnBrk="1" latinLnBrk="0" hangingPunct="1">
+              <a:defRPr sz="1800" kern="1200">
+                <a:solidFill>
+                  <a:schemeClr val="tx1"/>
+                </a:solidFill>
+                <a:latin typeface="+mn-lt"/>
+                <a:ea typeface="+mn-ea"/>
+                <a:cs typeface="+mn-cs"/>
+              </a:defRPr>
+            </a:lvl7pPr>
+            <a:lvl8pPr marL="3200400" algn="l" defTabSz="914400" rtl="0" eaLnBrk="1" latinLnBrk="0" hangingPunct="1">
+              <a:defRPr sz="1800" kern="1200">
+                <a:solidFill>
+                  <a:schemeClr val="tx1"/>
+                </a:solidFill>
+                <a:latin typeface="+mn-lt"/>
+                <a:ea typeface="+mn-ea"/>
+                <a:cs typeface="+mn-cs"/>
+              </a:defRPr>
+            </a:lvl8pPr>
+            <a:lvl9pPr marL="3657600" algn="l" defTabSz="914400" rtl="0" eaLnBrk="1" latinLnBrk="0" hangingPunct="1">
+              <a:defRPr sz="1800" kern="1200">
+                <a:solidFill>
+                  <a:schemeClr val="tx1"/>
+                </a:solidFill>
+                <a:latin typeface="+mn-lt"/>
+                <a:ea typeface="+mn-ea"/>
+                <a:cs typeface="+mn-cs"/>
+              </a:defRPr>
+            </a:lvl9pPr>
+          </a:lstStyle>
+          <a:p>
+            <a:pPr algn="ctr">
+              <a:buClrTx/>
+              <a:buFontTx/>
+              <a:buNone/>
+              <a:defRPr/>
+            </a:pPr>
+            <a:r>
+              <a:rPr lang="en-US" sz="900" kern="0" dirty="0">
+                <a:solidFill>
+                  <a:prstClr val="white"/>
+                </a:solidFill>
+                <a:latin typeface="Calibri" panose="020F0502020204030204"/>
+              </a:rPr>
+              <a:t>Additional drivers</a:t>
+            </a:r>
           </a:p>
         </p:txBody>
       </p:sp>
@@ -19842,13 +19297,6 @@
   <p:clrMapOvr>
     <a:masterClrMapping/>
   </p:clrMapOvr>
-  <p:timing>
-    <p:tnLst>
-      <p:par>
-        <p:cTn id="1" dur="indefinite" restart="never" nodeType="tmRoot"/>
-      </p:par>
-    </p:tnLst>
-  </p:timing>
 </p:sld>
 </file>
 
@@ -22303,18 +21751,6 @@
               </a:rPr>
               <a:t>C API</a:t>
             </a:r>
-            <a:r>
-              <a:rPr lang="en-US">
-                <a:solidFill>
-                  <a:schemeClr val="lt1"/>
-                </a:solidFill>
-                <a:latin typeface="Calibri"/>
-                <a:ea typeface="Calibri"/>
-                <a:cs typeface="Calibri"/>
-                <a:sym typeface="Calibri"/>
-              </a:rPr>
-              <a:t/>
-            </a:r>
             <a:br>
               <a:rPr lang="en-US">
                 <a:solidFill>
@@ -23093,13 +22529,6 @@
   <p:clrMapOvr>
     <a:masterClrMapping/>
   </p:clrMapOvr>
-  <p:timing>
-    <p:tnLst>
-      <p:par>
-        <p:cTn id="1" dur="indefinite" restart="never" nodeType="tmRoot"/>
-      </p:par>
-    </p:tnLst>
-  </p:timing>
 </p:sld>
 </file>
 

</xml_diff>

<commit_message>
Adjust application component to indicate that user applications can access the OS
</commit_message>
<xml_diff>
--- a/img/micro-ROS_architecture.pptx
+++ b/img/micro-ROS_architecture.pptx
@@ -14645,7 +14645,7 @@
         <p:spPr>
           <a:xfrm>
             <a:off x="3791590" y="3676996"/>
-            <a:ext cx="659778" cy="178524"/>
+            <a:ext cx="508709" cy="178524"/>
           </a:xfrm>
           <a:custGeom>
             <a:avLst/>
@@ -14874,8 +14874,8 @@
         </p:nvSpPr>
         <p:spPr>
           <a:xfrm>
-            <a:off x="6686446" y="4219703"/>
-            <a:ext cx="1044000" cy="776048"/>
+            <a:off x="4318164" y="4195676"/>
+            <a:ext cx="887887" cy="776048"/>
           </a:xfrm>
           <a:prstGeom prst="rect">
             <a:avLst/>
@@ -15013,7 +15013,7 @@
               </a:rPr>
             </a:br>
             <a:r>
-              <a:rPr lang="en-US" sz="1600" kern="0" dirty="0" err="1">
+              <a:rPr lang="en-US" sz="1600" kern="0" dirty="0">
                 <a:solidFill>
                   <a:prstClr val="white"/>
                 </a:solidFill>
@@ -15021,12 +15021,6 @@
               </a:rPr>
               <a:t>arduino</a:t>
             </a:r>
-            <a:endParaRPr lang="en-US" sz="1600" kern="0" dirty="0">
-              <a:solidFill>
-                <a:prstClr val="white"/>
-              </a:solidFill>
-              <a:latin typeface="Calibri" panose="020F0502020204030204"/>
-            </a:endParaRPr>
           </a:p>
         </p:txBody>
       </p:sp>
@@ -15044,8 +15038,8 @@
         </p:nvSpPr>
         <p:spPr>
           <a:xfrm>
-            <a:off x="4455199" y="3257322"/>
-            <a:ext cx="3275249" cy="180000"/>
+            <a:off x="4300299" y="3264862"/>
+            <a:ext cx="2806889" cy="180000"/>
           </a:xfrm>
           <a:prstGeom prst="rect">
             <a:avLst/>
@@ -15191,8 +15185,8 @@
         </p:nvSpPr>
         <p:spPr>
           <a:xfrm>
-            <a:off x="4455199" y="2294747"/>
-            <a:ext cx="3275247" cy="540000"/>
+            <a:off x="4300299" y="2302287"/>
+            <a:ext cx="2806889" cy="540000"/>
           </a:xfrm>
           <a:prstGeom prst="rect">
             <a:avLst/>
@@ -15863,7 +15857,7 @@
         </p:nvSpPr>
         <p:spPr>
           <a:xfrm rot="16200000">
-            <a:off x="6868316" y="3286307"/>
+            <a:off x="7134965" y="3286307"/>
             <a:ext cx="3848094" cy="483843"/>
           </a:xfrm>
           <a:prstGeom prst="rect">
@@ -16215,8 +16209,8 @@
         </p:nvSpPr>
         <p:spPr>
           <a:xfrm>
-            <a:off x="4455198" y="3021276"/>
-            <a:ext cx="3275249" cy="180000"/>
+            <a:off x="4300299" y="3028816"/>
+            <a:ext cx="2806889" cy="180000"/>
           </a:xfrm>
           <a:prstGeom prst="rect">
             <a:avLst/>
@@ -16344,25 +16338,7 @@
                 </a:solidFill>
                 <a:latin typeface="Calibri" panose="020F0502020204030204"/>
               </a:rPr>
-              <a:t>ROS Middleware Interface (</a:t>
-            </a:r>
-            <a:r>
-              <a:rPr lang="en-US" sz="1200" kern="0" dirty="0" err="1">
-                <a:solidFill>
-                  <a:prstClr val="white"/>
-                </a:solidFill>
-                <a:latin typeface="Calibri" panose="020F0502020204030204"/>
-              </a:rPr>
-              <a:t>rmw</a:t>
-            </a:r>
-            <a:r>
-              <a:rPr lang="en-US" sz="1200" kern="0" dirty="0">
-                <a:solidFill>
-                  <a:prstClr val="white"/>
-                </a:solidFill>
-                <a:latin typeface="Calibri" panose="020F0502020204030204"/>
-              </a:rPr>
-              <a:t>)</a:t>
+              <a:t>ROS Middleware Interface (rmw)</a:t>
             </a:r>
           </a:p>
         </p:txBody>
@@ -16381,7 +16357,7 @@
         </p:nvSpPr>
         <p:spPr>
           <a:xfrm>
-            <a:off x="4455199" y="2890793"/>
+            <a:off x="4300299" y="2898333"/>
             <a:ext cx="3275247" cy="74437"/>
           </a:xfrm>
           <a:prstGeom prst="rect">
@@ -16804,7 +16780,7 @@
         </p:nvSpPr>
         <p:spPr>
           <a:xfrm>
-            <a:off x="4455199" y="4089222"/>
+            <a:off x="4309672" y="4065195"/>
             <a:ext cx="3275247" cy="74437"/>
           </a:xfrm>
           <a:prstGeom prst="rect">
@@ -17083,7 +17059,7 @@
               <a:defRPr/>
             </a:pPr>
             <a:r>
-              <a:rPr kumimoji="0" lang="en-US" sz="1600" b="0" i="0" u="none" strike="noStrike" kern="0" cap="none" spc="0" normalizeH="0" baseline="0" noProof="0" dirty="0" err="1">
+              <a:rPr kumimoji="0" lang="en-US" sz="1600" b="0" i="0" u="none" strike="noStrike" kern="0" cap="none" spc="0" normalizeH="0" baseline="0" noProof="0" dirty="0">
                 <a:ln>
                   <a:noFill/>
                 </a:ln>
@@ -17099,20 +17075,6 @@
               </a:rPr>
               <a:t>uP</a:t>
             </a:r>
-            <a:endParaRPr kumimoji="0" lang="en-US" sz="1600" b="0" i="0" u="none" strike="noStrike" kern="0" cap="none" spc="0" normalizeH="0" baseline="0" noProof="0" dirty="0">
-              <a:ln>
-                <a:noFill/>
-              </a:ln>
-              <a:solidFill>
-                <a:prstClr val="white"/>
-              </a:solidFill>
-              <a:effectLst/>
-              <a:uLnTx/>
-              <a:uFillTx/>
-              <a:latin typeface="Calibri" panose="020F0502020204030204"/>
-              <a:ea typeface="+mn-ea"/>
-              <a:cs typeface="+mn-cs"/>
-            </a:endParaRPr>
           </a:p>
         </p:txBody>
       </p:sp>
@@ -17130,8 +17092,8 @@
         </p:nvSpPr>
         <p:spPr>
           <a:xfrm>
-            <a:off x="6468923" y="1604182"/>
-            <a:ext cx="967687" cy="483843"/>
+            <a:off x="7170968" y="1604180"/>
+            <a:ext cx="865563" cy="2435621"/>
           </a:xfrm>
           <a:prstGeom prst="rect">
             <a:avLst/>
@@ -17497,7 +17459,7 @@
         </p:nvSpPr>
         <p:spPr>
           <a:xfrm>
-            <a:off x="3793414" y="3818904"/>
+            <a:off x="3737475" y="3808671"/>
             <a:ext cx="681597" cy="507831"/>
           </a:xfrm>
           <a:prstGeom prst="rect">
@@ -18019,8 +17981,8 @@
         </p:nvSpPr>
         <p:spPr>
           <a:xfrm>
-            <a:off x="4455199" y="5182278"/>
-            <a:ext cx="3275247" cy="270000"/>
+            <a:off x="4300299" y="5182278"/>
+            <a:ext cx="3736232" cy="270000"/>
           </a:xfrm>
           <a:prstGeom prst="rect">
             <a:avLst/>
@@ -18190,8 +18152,8 @@
         </p:nvSpPr>
         <p:spPr>
           <a:xfrm>
-            <a:off x="6091091" y="2294747"/>
-            <a:ext cx="1639356" cy="360000"/>
+            <a:off x="5520856" y="2311073"/>
+            <a:ext cx="1586332" cy="360000"/>
           </a:xfrm>
           <a:prstGeom prst="rect">
             <a:avLst/>
@@ -18358,8 +18320,8 @@
         </p:nvSpPr>
         <p:spPr>
           <a:xfrm>
-            <a:off x="5683378" y="2287571"/>
-            <a:ext cx="922171" cy="304450"/>
+            <a:off x="5184755" y="2284291"/>
+            <a:ext cx="1097858" cy="304450"/>
           </a:xfrm>
           <a:prstGeom prst="rect">
             <a:avLst/>
@@ -18377,7 +18339,7 @@
               <a:buNone/>
             </a:pPr>
             <a:r>
-              <a:rPr lang="en-US" sz="1600" dirty="0" err="1">
+              <a:rPr lang="en-US" sz="1600" dirty="0">
                 <a:solidFill>
                   <a:prstClr val="white"/>
                 </a:solidFill>
@@ -18385,40 +18347,7 @@
                 <a:ea typeface="+mn-ea"/>
                 <a:cs typeface="+mn-cs"/>
               </a:rPr>
-              <a:t>rcl</a:t>
-            </a:r>
-            <a:r>
-              <a:rPr lang="en-US" sz="1600" dirty="0">
-                <a:solidFill>
-                  <a:prstClr val="white"/>
-                </a:solidFill>
-                <a:latin typeface="Calibri" panose="020F0502020204030204"/>
-                <a:ea typeface="+mn-ea"/>
-                <a:cs typeface="+mn-cs"/>
-              </a:rPr>
-              <a:t> + </a:t>
-            </a:r>
-            <a:r>
-              <a:rPr lang="en-US" sz="1600" dirty="0" err="1">
-                <a:solidFill>
-                  <a:prstClr val="white"/>
-                </a:solidFill>
-                <a:latin typeface="Calibri" panose="020F0502020204030204"/>
-                <a:ea typeface="+mn-ea"/>
-                <a:cs typeface="+mn-cs"/>
-              </a:rPr>
-              <a:t>rclc</a:t>
-            </a:r>
-            <a:r>
-              <a:rPr lang="en-US" sz="1600" dirty="0">
-                <a:solidFill>
-                  <a:prstClr val="white"/>
-                </a:solidFill>
-                <a:latin typeface="Calibri" panose="020F0502020204030204"/>
-                <a:ea typeface="+mn-ea"/>
-                <a:cs typeface="+mn-cs"/>
-              </a:rPr>
-              <a:t>: </a:t>
+              <a:t>rcl + rclc: </a:t>
             </a:r>
             <a:endParaRPr lang="en-US" sz="1600" kern="1200" dirty="0">
               <a:solidFill>
@@ -18445,7 +18374,7 @@
         </p:nvSpPr>
         <p:spPr>
           <a:xfrm rot="16200000">
-            <a:off x="7654799" y="4436911"/>
+            <a:off x="7921448" y="4436911"/>
             <a:ext cx="776046" cy="341632"/>
           </a:xfrm>
           <a:prstGeom prst="rect">
@@ -18495,7 +18424,7 @@
         </p:nvSpPr>
         <p:spPr>
           <a:xfrm rot="16200000">
-            <a:off x="7607979" y="3285302"/>
+            <a:off x="7874628" y="3285302"/>
             <a:ext cx="1011899" cy="483844"/>
           </a:xfrm>
           <a:prstGeom prst="rect">
@@ -18566,7 +18495,7 @@
         </p:nvSpPr>
         <p:spPr>
           <a:xfrm rot="16200000">
-            <a:off x="7845765" y="2324657"/>
+            <a:off x="8112414" y="2324657"/>
             <a:ext cx="536334" cy="483846"/>
           </a:xfrm>
           <a:prstGeom prst="rect">
@@ -18637,8 +18566,8 @@
         </p:nvSpPr>
         <p:spPr>
           <a:xfrm>
-            <a:off x="4455199" y="4219705"/>
-            <a:ext cx="2151975" cy="180000"/>
+            <a:off x="5265289" y="4194455"/>
+            <a:ext cx="2771242" cy="180000"/>
           </a:xfrm>
           <a:prstGeom prst="rect">
             <a:avLst/>
@@ -18785,8 +18714,8 @@
         </p:nvSpPr>
         <p:spPr>
           <a:xfrm>
-            <a:off x="4448190" y="4455751"/>
-            <a:ext cx="2158984" cy="540000"/>
+            <a:off x="5264686" y="4431723"/>
+            <a:ext cx="2771845" cy="540000"/>
           </a:xfrm>
           <a:prstGeom prst="rect">
             <a:avLst/>
@@ -18944,7 +18873,7 @@
               <a:t> </a:t>
             </a:r>
             <a:r>
-              <a:rPr lang="en-US" sz="1600" kern="0" dirty="0" err="1">
+              <a:rPr lang="en-US" sz="1600" kern="0" dirty="0">
                 <a:solidFill>
                   <a:prstClr val="white"/>
                 </a:solidFill>
@@ -18980,7 +18909,7 @@
               <a:t> </a:t>
             </a:r>
             <a:r>
-              <a:rPr lang="en-US" sz="1600" kern="0" dirty="0" err="1">
+              <a:rPr lang="en-US" sz="1600" kern="0" dirty="0">
                 <a:solidFill>
                   <a:prstClr val="white"/>
                 </a:solidFill>
@@ -18988,12 +18917,6 @@
               </a:rPr>
               <a:t>NuttX</a:t>
             </a:r>
-            <a:endParaRPr lang="en-US" sz="1600" kern="0" dirty="0">
-              <a:solidFill>
-                <a:prstClr val="white"/>
-              </a:solidFill>
-              <a:latin typeface="Calibri" panose="020F0502020204030204"/>
-            </a:endParaRPr>
           </a:p>
         </p:txBody>
       </p:sp>
@@ -19011,8 +18934,8 @@
         </p:nvSpPr>
         <p:spPr>
           <a:xfrm>
-            <a:off x="4455199" y="3493368"/>
-            <a:ext cx="3275247" cy="539808"/>
+            <a:off x="4300299" y="3499993"/>
+            <a:ext cx="2806889" cy="539808"/>
           </a:xfrm>
           <a:prstGeom prst="rect">
             <a:avLst/>
@@ -19158,7 +19081,7 @@
         </p:nvSpPr>
         <p:spPr>
           <a:xfrm>
-            <a:off x="5647531" y="4455751"/>
+            <a:off x="5502004" y="4431724"/>
             <a:ext cx="959643" cy="118800"/>
           </a:xfrm>
           <a:prstGeom prst="rect">
@@ -20674,7 +20597,7 @@
               <a:buNone/>
             </a:pPr>
             <a:r>
-              <a:rPr lang="en-US" sz="1400" b="0" i="0" u="none" strike="noStrike" cap="none">
+              <a:rPr lang="en-US" sz="1400" b="0" i="0" u="none" strike="noStrike" cap="none" dirty="0">
                 <a:solidFill>
                   <a:schemeClr val="lt1"/>
                 </a:solidFill>
@@ -20685,7 +20608,7 @@
               </a:rPr>
               <a:t>ROS Middleware Interface (rmw)</a:t>
             </a:r>
-            <a:endParaRPr sz="1400" b="1" i="0" u="none" strike="noStrike" cap="none">
+            <a:endParaRPr sz="1400" b="1" i="0" u="none" strike="noStrike" cap="none" dirty="0">
               <a:solidFill>
                 <a:srgbClr val="FFFFFF"/>
               </a:solidFill>

</xml_diff>